<commit_message>
Changed table create sql statements to be compatible with SQL Azure
</commit_message>
<xml_diff>
--- a/Docs/MCM Application Flow.pptx
+++ b/Docs/MCM Application Flow.pptx
@@ -217,7 +217,7 @@
             <a:fld id="{CE74A6EE-E360-4005-A696-0C73C91B5E4F}" type="datetimeFigureOut">
               <a:rPr lang="en-US" smtClean="0"/>
               <a:pPr/>
-              <a:t>2/1/2015</a:t>
+              <a:t>2/13/2015</a:t>
             </a:fld>
             <a:endParaRPr lang="en-US"/>
           </a:p>
@@ -668,7 +668,7 @@
             <a:fld id="{AD33D0BB-003F-42B4-BF7A-CD36EAA9C443}" type="datetimeFigureOut">
               <a:rPr lang="en-US" smtClean="0"/>
               <a:pPr/>
-              <a:t>2/1/2015</a:t>
+              <a:t>2/13/2015</a:t>
             </a:fld>
             <a:endParaRPr lang="en-US"/>
           </a:p>
@@ -847,7 +847,7 @@
             <a:fld id="{AD33D0BB-003F-42B4-BF7A-CD36EAA9C443}" type="datetimeFigureOut">
               <a:rPr lang="en-US" smtClean="0"/>
               <a:pPr/>
-              <a:t>2/1/2015</a:t>
+              <a:t>2/13/2015</a:t>
             </a:fld>
             <a:endParaRPr lang="en-US"/>
           </a:p>
@@ -1029,7 +1029,7 @@
             <a:fld id="{AD33D0BB-003F-42B4-BF7A-CD36EAA9C443}" type="datetimeFigureOut">
               <a:rPr lang="en-US" smtClean="0"/>
               <a:pPr/>
-              <a:t>2/1/2015</a:t>
+              <a:t>2/13/2015</a:t>
             </a:fld>
             <a:endParaRPr lang="en-US"/>
           </a:p>
@@ -1201,7 +1201,7 @@
             <a:fld id="{AD33D0BB-003F-42B4-BF7A-CD36EAA9C443}" type="datetimeFigureOut">
               <a:rPr lang="en-US" smtClean="0"/>
               <a:pPr/>
-              <a:t>2/1/2015</a:t>
+              <a:t>2/13/2015</a:t>
             </a:fld>
             <a:endParaRPr lang="en-US"/>
           </a:p>
@@ -1449,7 +1449,7 @@
             <a:fld id="{AD33D0BB-003F-42B4-BF7A-CD36EAA9C443}" type="datetimeFigureOut">
               <a:rPr lang="en-US" smtClean="0"/>
               <a:pPr/>
-              <a:t>2/1/2015</a:t>
+              <a:t>2/13/2015</a:t>
             </a:fld>
             <a:endParaRPr lang="en-US"/>
           </a:p>
@@ -1739,7 +1739,7 @@
             <a:fld id="{AD33D0BB-003F-42B4-BF7A-CD36EAA9C443}" type="datetimeFigureOut">
               <a:rPr lang="en-US" smtClean="0"/>
               <a:pPr/>
-              <a:t>2/1/2015</a:t>
+              <a:t>2/13/2015</a:t>
             </a:fld>
             <a:endParaRPr lang="en-US"/>
           </a:p>
@@ -2163,7 +2163,7 @@
             <a:fld id="{AD33D0BB-003F-42B4-BF7A-CD36EAA9C443}" type="datetimeFigureOut">
               <a:rPr lang="en-US" smtClean="0"/>
               <a:pPr/>
-              <a:t>2/1/2015</a:t>
+              <a:t>2/13/2015</a:t>
             </a:fld>
             <a:endParaRPr lang="en-US"/>
           </a:p>
@@ -2283,7 +2283,7 @@
             <a:fld id="{AD33D0BB-003F-42B4-BF7A-CD36EAA9C443}" type="datetimeFigureOut">
               <a:rPr lang="en-US" smtClean="0"/>
               <a:pPr/>
-              <a:t>2/1/2015</a:t>
+              <a:t>2/13/2015</a:t>
             </a:fld>
             <a:endParaRPr lang="en-US"/>
           </a:p>
@@ -2380,7 +2380,7 @@
             <a:fld id="{AD33D0BB-003F-42B4-BF7A-CD36EAA9C443}" type="datetimeFigureOut">
               <a:rPr lang="en-US" smtClean="0"/>
               <a:pPr/>
-              <a:t>2/1/2015</a:t>
+              <a:t>2/13/2015</a:t>
             </a:fld>
             <a:endParaRPr lang="en-US"/>
           </a:p>
@@ -2659,7 +2659,7 @@
             <a:fld id="{AD33D0BB-003F-42B4-BF7A-CD36EAA9C443}" type="datetimeFigureOut">
               <a:rPr lang="en-US" smtClean="0"/>
               <a:pPr/>
-              <a:t>2/1/2015</a:t>
+              <a:t>2/13/2015</a:t>
             </a:fld>
             <a:endParaRPr lang="en-US"/>
           </a:p>
@@ -2918,7 +2918,7 @@
             <a:fld id="{AD33D0BB-003F-42B4-BF7A-CD36EAA9C443}" type="datetimeFigureOut">
               <a:rPr lang="en-US" smtClean="0"/>
               <a:pPr/>
-              <a:t>2/1/2015</a:t>
+              <a:t>2/13/2015</a:t>
             </a:fld>
             <a:endParaRPr lang="en-US"/>
           </a:p>
@@ -3133,7 +3133,7 @@
             <a:fld id="{AD33D0BB-003F-42B4-BF7A-CD36EAA9C443}" type="datetimeFigureOut">
               <a:rPr lang="en-US" smtClean="0"/>
               <a:pPr/>
-              <a:t>2/1/2015</a:t>
+              <a:t>2/13/2015</a:t>
             </a:fld>
             <a:endParaRPr lang="en-US"/>
           </a:p>
@@ -5584,11 +5584,7 @@
             </a:r>
             <a:r>
               <a:rPr lang="en-US" dirty="0" smtClean="0"/>
-              <a:t> </a:t>
-            </a:r>
-            <a:r>
-              <a:rPr lang="en-US" dirty="0" smtClean="0"/>
-              <a:t>Features</a:t>
+              <a:t> Features</a:t>
             </a:r>
             <a:endParaRPr lang="en-US" dirty="0"/>
           </a:p>
@@ -5887,11 +5883,7 @@
             </a:pPr>
             <a:r>
               <a:rPr lang="en-US" sz="1400" dirty="0" smtClean="0"/>
-              <a:t>Once Authenticated, the User will be taken to the MCM screen</a:t>
-            </a:r>
-            <a:r>
-              <a:rPr lang="en-US" sz="1400" dirty="0" smtClean="0"/>
-              <a:t>.</a:t>
+              <a:t>Once Authenticated, the User will be taken to the MCM screen.</a:t>
             </a:r>
           </a:p>
           <a:p>
@@ -5955,11 +5947,7 @@
             </a:r>
             <a:r>
               <a:rPr lang="en-US" sz="1400" dirty="0" smtClean="0"/>
-              <a:t> </a:t>
-            </a:r>
-            <a:r>
-              <a:rPr lang="en-US" sz="1400" dirty="0" smtClean="0"/>
-              <a:t>screen: This screen will displays a list of children associated with the logged in User account.</a:t>
+              <a:t> screen: This screen will displays a list of children associated with the logged in User account.</a:t>
             </a:r>
           </a:p>
           <a:p>
@@ -5979,11 +5967,7 @@
             </a:pPr>
             <a:r>
               <a:rPr lang="en-US" sz="1400" dirty="0" smtClean="0"/>
-              <a:t>If there is children associated with the logged in User account, a list of the associated children will be displayed</a:t>
-            </a:r>
-            <a:r>
-              <a:rPr lang="en-US" sz="1400" dirty="0" smtClean="0"/>
-              <a:t>.</a:t>
+              <a:t>If there is children associated with the logged in User account, a list of the associated children will be displayed.</a:t>
             </a:r>
           </a:p>
           <a:p>
@@ -5995,7 +5979,6 @@
               <a:rPr lang="en-US" sz="1400" dirty="0" smtClean="0"/>
               <a:t>Children are added through the Child Profile screens.</a:t>
             </a:r>
-            <a:endParaRPr lang="en-US" sz="1400" dirty="0" smtClean="0"/>
           </a:p>
           <a:p>
             <a:pPr marL="342900" indent="-342900">
@@ -6010,7 +5993,6 @@
               <a:rPr lang="en-US" sz="1400" dirty="0" smtClean="0"/>
               <a:t>:</a:t>
             </a:r>
-            <a:endParaRPr lang="en-US" sz="1400" dirty="0" smtClean="0"/>
           </a:p>
           <a:p>
             <a:pPr marL="800100" lvl="1" indent="-342900">
@@ -6109,7 +6091,6 @@
               <a:rPr lang="en-US" sz="1400" dirty="0" smtClean="0"/>
               <a:t> – A list of items to be included in an I.D. folder for each child. The User can check off each item placed in the folder.</a:t>
             </a:r>
-            <a:endParaRPr lang="en-US" sz="1400" dirty="0" smtClean="0"/>
           </a:p>
         </p:txBody>
       </p:sp>
@@ -7136,14 +7117,13 @@
           <a:p>
             <a:r>
               <a:rPr lang="en-US" sz="900" dirty="0"/>
-              <a:t>)WITH (PAD_INDEX = OFF, STATISTICS_NORECOMPUTE = OFF, IGNORE_DUP_KEY = OFF, ALLOW_ROW_LOCKS = ON, ALLOW_PAGE_LOCKS = ON) ON [PRIMARY]</a:t>
-            </a:r>
-          </a:p>
-          <a:p>
-            <a:r>
-              <a:rPr lang="en-US" sz="900" dirty="0"/>
-              <a:t>) ON [PRIMARY]</a:t>
-            </a:r>
+              <a:t>)WITH (PAD_INDEX = OFF, STATISTICS_NORECOMPUTE = OFF, IGNORE_DUP_KEY = OFF, ALLOW_ROW_LOCKS = ON, ALLOW_PAGE_LOCKS = ON</a:t>
+            </a:r>
+            <a:r>
+              <a:rPr lang="en-US" sz="900" dirty="0" smtClean="0"/>
+              <a:t>))</a:t>
+            </a:r>
+            <a:endParaRPr lang="en-US" sz="900" dirty="0"/>
           </a:p>
           <a:p>
             <a:endParaRPr lang="en-US" sz="900" dirty="0"/>
@@ -7199,7 +7179,7 @@
         <p:spPr>
           <a:xfrm>
             <a:off x="533400" y="533400"/>
-            <a:ext cx="8480207" cy="3939540"/>
+            <a:ext cx="7731604" cy="3785652"/>
           </a:xfrm>
           <a:prstGeom prst="rect">
             <a:avLst/>
@@ -7356,14 +7336,13 @@
           <a:p>
             <a:r>
               <a:rPr lang="en-US" sz="1000" dirty="0"/>
-              <a:t>)WITH (PAD_INDEX = OFF, STATISTICS_NORECOMPUTE = OFF, IGNORE_DUP_KEY = OFF, ALLOW_ROW_LOCKS = ON, ALLOW_PAGE_LOCKS = ON) ON [PRIMARY]</a:t>
-            </a:r>
-          </a:p>
-          <a:p>
-            <a:r>
-              <a:rPr lang="en-US" sz="1000" dirty="0"/>
-              <a:t>) ON [PRIMARY]</a:t>
-            </a:r>
+              <a:t>)WITH (PAD_INDEX = OFF, STATISTICS_NORECOMPUTE = OFF, IGNORE_DUP_KEY = OFF, ALLOW_ROW_LOCKS = ON, ALLOW_PAGE_LOCKS = ON</a:t>
+            </a:r>
+            <a:r>
+              <a:rPr lang="en-US" sz="1000" dirty="0" smtClean="0"/>
+              <a:t>))</a:t>
+            </a:r>
+            <a:endParaRPr lang="en-US" sz="1000" dirty="0"/>
           </a:p>
           <a:p>
             <a:endParaRPr lang="en-US" sz="1000" dirty="0"/>
@@ -7554,7 +7533,7 @@
         <p:spPr>
           <a:xfrm>
             <a:off x="533400" y="609600"/>
-            <a:ext cx="8480207" cy="3631763"/>
+            <a:ext cx="7731604" cy="3477875"/>
           </a:xfrm>
           <a:prstGeom prst="rect">
             <a:avLst/>
@@ -7713,14 +7692,13 @@
           <a:p>
             <a:r>
               <a:rPr lang="en-US" sz="1000" dirty="0"/>
-              <a:t>)WITH (PAD_INDEX = OFF, STATISTICS_NORECOMPUTE = OFF, IGNORE_DUP_KEY = OFF, ALLOW_ROW_LOCKS = ON, ALLOW_PAGE_LOCKS = ON) ON [PRIMARY]</a:t>
-            </a:r>
-          </a:p>
-          <a:p>
-            <a:r>
-              <a:rPr lang="en-US" sz="1000" dirty="0"/>
-              <a:t>) ON [PRIMARY]</a:t>
-            </a:r>
+              <a:t>)WITH (PAD_INDEX = OFF, STATISTICS_NORECOMPUTE = OFF, IGNORE_DUP_KEY = OFF, ALLOW_ROW_LOCKS = ON, ALLOW_PAGE_LOCKS = ON</a:t>
+            </a:r>
+            <a:r>
+              <a:rPr lang="en-US" sz="1000" dirty="0" smtClean="0"/>
+              <a:t>))</a:t>
+            </a:r>
+            <a:endParaRPr lang="en-US" sz="1000" dirty="0"/>
           </a:p>
           <a:p>
             <a:endParaRPr lang="en-US" sz="1000" dirty="0"/>
@@ -7909,7 +7887,7 @@
         <p:spPr>
           <a:xfrm>
             <a:off x="152400" y="152400"/>
-            <a:ext cx="8763000" cy="6709529"/>
+            <a:ext cx="8763000" cy="6401753"/>
           </a:xfrm>
           <a:prstGeom prst="rect">
             <a:avLst/>
@@ -8068,14 +8046,17 @@
           <a:p>
             <a:r>
               <a:rPr lang="en-US" sz="1000" dirty="0"/>
-              <a:t>)WITH (PAD_INDEX = OFF, STATISTICS_NORECOMPUTE = OFF, IGNORE_DUP_KEY = OFF, ALLOW_ROW_LOCKS = ON, ALLOW_PAGE_LOCKS = ON) ON [PRIMARY]</a:t>
-            </a:r>
-          </a:p>
-          <a:p>
-            <a:r>
-              <a:rPr lang="en-US" sz="1000" dirty="0"/>
-              <a:t>) ON [PRIMARY]</a:t>
-            </a:r>
+              <a:t>)WITH (PAD_INDEX = OFF, STATISTICS_NORECOMPUTE = OFF, IGNORE_DUP_KEY = OFF, ALLOW_ROW_LOCKS = ON, ALLOW_PAGE_LOCKS = </a:t>
+            </a:r>
+            <a:r>
+              <a:rPr lang="en-US" sz="1000"/>
+              <a:t>ON</a:t>
+            </a:r>
+            <a:r>
+              <a:rPr lang="en-US" sz="1000" smtClean="0"/>
+              <a:t>))</a:t>
+            </a:r>
+            <a:endParaRPr lang="en-US" sz="1000" dirty="0"/>
           </a:p>
           <a:p>
             <a:endParaRPr lang="en-US" sz="1000" dirty="0"/>
@@ -8221,14 +8202,13 @@
           <a:p>
             <a:r>
               <a:rPr lang="en-US" sz="1000" dirty="0"/>
-              <a:t>)WITH (PAD_INDEX = OFF, STATISTICS_NORECOMPUTE = OFF, IGNORE_DUP_KEY = OFF, ALLOW_ROW_LOCKS = ON, ALLOW_PAGE_LOCKS = ON) ON [PRIMARY]</a:t>
-            </a:r>
-          </a:p>
-          <a:p>
-            <a:r>
-              <a:rPr lang="en-US" sz="1000" dirty="0"/>
-              <a:t>) ON [PRIMARY]</a:t>
-            </a:r>
+              <a:t>)WITH (PAD_INDEX = OFF, STATISTICS_NORECOMPUTE = OFF, IGNORE_DUP_KEY = OFF, ALLOW_ROW_LOCKS = ON, ALLOW_PAGE_LOCKS = ON</a:t>
+            </a:r>
+            <a:r>
+              <a:rPr lang="en-US" sz="1000" dirty="0" smtClean="0"/>
+              <a:t>))</a:t>
+            </a:r>
+            <a:endParaRPr lang="en-US" sz="1000" dirty="0"/>
           </a:p>
           <a:p>
             <a:endParaRPr lang="en-US" sz="1000" dirty="0"/>
@@ -9063,14 +9043,14 @@
 </file>
 
 <file path=customXml/item1.xml><?xml version="1.0" encoding="utf-8"?>
-<Control xmlns="http://schemas.microsoft.com/VisualStudio/2011/storyboarding/control/v1.0">
-  <Id Name="System.Storyboard.Stencil.PhoneApplicationBar" RevisionId="00000000-0000-0000-0000-000000000000" Stencil="System.Windows_Phone_7" StencilRevisionId="00000000-0000-0000-0000-000000000000" StencilVersion="1.0"/>
+<Control xmlns="http://schemas.microsoft.com/VisualStudio/2011/storyboarding/control">
+  <Id Name="System.Storyboarding.WindowsPhoneIcons.Video" RevisionId="5814b1e0-0169-11e0-a976-0800200c9a66" Stencil="System.Storyboarding.WindowsPhoneIcons" StencilRevisionId="5814b1e0-0169-11e0-a976-0800200c9a66" StencilVersion="0.1"/>
 </Control>
 </file>
 
 <file path=customXml/item10.xml><?xml version="1.0" encoding="utf-8"?>
 <Control xmlns="http://schemas.microsoft.com/VisualStudio/2011/storyboarding/control/v1.0">
-  <Id Name="System.Storyboarding.Common.SearchBox" RevisionId="68ea164d-c1de-47a5-804f-d4d1290fa524" Stencil="System.Storyboarding.Common" StencilRevisionId="68ea164d-c1de-47a5-804f-d4d1290fa524" StencilVersion="0.1"/>
+  <Id Name="System.Storyboard.Stencil.PieChart" RevisionId="00000000-0000-0000-0000-000000000000" Stencil="System.Media" StencilRevisionId="00000000-0000-0000-0000-000000000000" StencilVersion="1.0"/>
 </Control>
 </file>
 
@@ -9082,151 +9062,151 @@
 
 <file path=customXml/item12.xml><?xml version="1.0" encoding="utf-8"?>
 <Control xmlns="http://schemas.microsoft.com/VisualStudio/2011/storyboarding/control/v1.0">
-  <Id Name="System.Storyboard.Stencil.TreeList" RevisionId="00000000-0000-0000-0000-000000000000" Stencil="System.Common" StencilRevisionId="00000000-0000-0000-0000-000000000000" StencilVersion="1.0"/>
+  <Id Name="System.Storyboard.Stencil.FourItemList" RevisionId="00000000-0000-0000-0000-000000000000" Stencil="System.Common" StencilRevisionId="00000000-0000-0000-0000-000000000000" StencilVersion="1.0"/>
 </Control>
 </file>
 
 <file path=customXml/item13.xml><?xml version="1.0" encoding="utf-8"?>
 <Control xmlns="http://schemas.microsoft.com/VisualStudio/2011/storyboarding/control/v1.0">
-  <Id Name="System.Storyboard.Stencil.HorizontalScrollbar" RevisionId="00000000-0000-0000-0000-000000000000" Stencil="System.Common" StencilRevisionId="00000000-0000-0000-0000-000000000000" StencilVersion="1.0"/>
+  <Id Name="System.Storyboard.Stencil.StatusBar" RevisionId="00000000-0000-0000-0000-000000000000" Stencil="System.Windows" StencilRevisionId="00000000-0000-0000-0000-000000000000" StencilVersion="1.0"/>
 </Control>
 </file>
 
 <file path=customXml/item14.xml><?xml version="1.0" encoding="utf-8"?>
+<Control xmlns="http://schemas.microsoft.com/VisualStudio/2011/storyboarding/control/v1.0">
+  <Id Name="System.Storyboard.Stencil.LineChart" RevisionId="00000000-0000-0000-0000-000000000000" Stencil="System.Media" StencilRevisionId="00000000-0000-0000-0000-000000000000" StencilVersion="1.0"/>
+</Control>
+</file>
+
+<file path=customXml/item15.xml><?xml version="1.0" encoding="utf-8"?>
+<Control xmlns="http://schemas.microsoft.com/VisualStudio/2011/storyboarding/control/v1.0">
+  <Id Name="System.Storyboard.Stencil.VideoPlayer" RevisionId="00000000-0000-0000-0000-000000000000" Stencil="System.Media" StencilRevisionId="00000000-0000-0000-0000-000000000000" StencilVersion="1.0"/>
+</Control>
+</file>
+
+<file path=customXml/item16.xml><?xml version="1.0" encoding="utf-8"?>
+<Control xmlns="http://schemas.microsoft.com/VisualStudio/2011/storyboarding/control/v1.0">
+  <Id Name="System.Storyboard.Stencil.PhoneBrowserBar" RevisionId="00000000-0000-0000-0000-000000000000" Stencil="System.Windows_Phone_7" StencilRevisionId="00000000-0000-0000-0000-000000000000" StencilVersion="1.0"/>
+</Control>
+</file>
+
+<file path=customXml/item17.xml><?xml version="1.0" encoding="utf-8"?>
+<Control xmlns="http://schemas.microsoft.com/VisualStudio/2011/storyboarding/control/v1.0">
+  <Id Name="System.Storyboard.Stencil.PhoneTile" RevisionId="00000000-0000-0000-0000-000000000000" Stencil="System.Windows_Phone_7" StencilRevisionId="00000000-0000-0000-0000-000000000000" StencilVersion="1.0"/>
+</Control>
+</file>
+
+<file path=customXml/item18.xml><?xml version="1.0" encoding="utf-8"?>
+<Control xmlns="http://schemas.microsoft.com/VisualStudio/2011/storyboarding/control/v1.0">
+  <Id Name="System.Storyboarding.Common.Text" RevisionId="68ea164d-c1de-47a5-804f-d4d1290fa524" Stencil="System.Storyboarding.Common" StencilRevisionId="68ea164d-c1de-47a5-804f-d4d1290fa524" StencilVersion="0.1"/>
+</Control>
+</file>
+
+<file path=customXml/item19.xml><?xml version="1.0" encoding="utf-8"?>
+<Control xmlns="http://schemas.microsoft.com/VisualStudio/2011/storyboarding/control/v1.0">
+  <Id Name="System.Storyboarding.Media.Image" RevisionId="658c0869-8ded-44f2-a68a-f8e8fcb7d3bd" Stencil="System.Storyboarding.Media" StencilRevisionId="658c0869-8ded-44f2-a68a-f8e8fcb7d3bd" StencilVersion="0.1"/>
+</Control>
+</file>
+
+<file path=customXml/item2.xml><?xml version="1.0" encoding="utf-8"?>
+<Control xmlns="http://schemas.microsoft.com/VisualStudio/2011/storyboarding/control/v1.0">
+  <Id Name="System.Storyboarding.Common.Text" RevisionId="68ea164d-c1de-47a5-804f-d4d1290fa524" Stencil="System.Storyboarding.Common" StencilRevisionId="68ea164d-c1de-47a5-804f-d4d1290fa524" StencilVersion="0.1"/>
+</Control>
+</file>
+
+<file path=customXml/item20.xml><?xml version="1.0" encoding="utf-8"?>
+<Control xmlns="http://schemas.microsoft.com/VisualStudio/2011/storyboarding/control/v1.0">
+  <Id Name="System.Storyboard.Stencil.VerticalScrollbar" RevisionId="00000000-0000-0000-0000-000000000000" Stencil="System.Common" StencilRevisionId="00000000-0000-0000-0000-000000000000" StencilVersion="1.0"/>
+</Control>
+</file>
+
+<file path=customXml/item21.xml><?xml version="1.0" encoding="utf-8"?>
+<Control xmlns="http://schemas.microsoft.com/VisualStudio/2011/storyboarding/control">
+  <Id Name="System.Storyboarding.WindowsApps.WindowsAppsMediumWideTile" Revision="1" Stencil="System.Storyboarding.WindowsApps" StencilVersion="0.1"/>
+</Control>
+</file>
+
+<file path=customXml/item22.xml><?xml version="1.0" encoding="utf-8"?>
+<Control xmlns="http://schemas.microsoft.com/VisualStudio/2011/storyboarding/control">
+  <Id Name="System.Storyboarding.WindowsApps.WindowsAppsMediumWideTile" Revision="1" Stencil="System.Storyboarding.WindowsApps" StencilVersion="0.1"/>
+</Control>
+</file>
+
+<file path=customXml/item23.xml><?xml version="1.0" encoding="utf-8"?>
+<Control xmlns="http://schemas.microsoft.com/VisualStudio/2011/storyboarding/control/v1.0">
+  <Id Name="System.Storyboard.Stencil.VerticalScrollbar" RevisionId="00000000-0000-0000-0000-000000000000" Stencil="System.Common" StencilRevisionId="00000000-0000-0000-0000-000000000000" StencilVersion="1.0"/>
+</Control>
+</file>
+
+<file path=customXml/item24.xml><?xml version="1.0" encoding="utf-8"?>
+<Control xmlns="http://schemas.microsoft.com/VisualStudio/2011/storyboarding/control/v1.0">
+  <Id Name="System.Storyboard.Stencil.Title" RevisionId="00000000-0000-0000-0000-000000000000" Stencil="System.Common" StencilRevisionId="00000000-0000-0000-0000-000000000000" StencilVersion="1.0"/>
+</Control>
+</file>
+
+<file path=customXml/item25.xml><?xml version="1.0" encoding="utf-8"?>
+<Control xmlns="http://schemas.microsoft.com/VisualStudio/2011/storyboarding/control">
+  <Id Name="System.Storyboarding.WindowsApps.WindowsAppsMediumWideTile" Revision="1" Stencil="System.Storyboarding.WindowsApps" StencilVersion="0.1"/>
+</Control>
+</file>
+
+<file path=customXml/item26.xml><?xml version="1.0" encoding="utf-8"?>
+<Control xmlns="http://schemas.microsoft.com/VisualStudio/2011/storyboarding/control">
+  <Id Name="System.Storyboarding.WindowsApps.WindowsAppsMediumWideTile" Revision="1" Stencil="System.Storyboarding.WindowsApps" StencilVersion="0.1"/>
+</Control>
+</file>
+
+<file path=customXml/item27.xml><?xml version="1.0" encoding="utf-8"?>
+<Control xmlns="http://schemas.microsoft.com/VisualStudio/2011/storyboarding/control">
+  <Id Name="System.Storyboarding.WindowsApps.WindowsAppsMediumWideTile" Revision="1" Stencil="System.Storyboarding.WindowsApps" StencilVersion="0.1"/>
+</Control>
+</file>
+
+<file path=customXml/item28.xml><?xml version="1.0" encoding="utf-8"?>
+<Control xmlns="http://schemas.microsoft.com/VisualStudio/2011/storyboarding/control/v1.0">
+  <Id Name="System.Storyboard.Stencil.Image" RevisionId="00000000-0000-0000-0000-000000000000" Stencil="System.Media" StencilRevisionId="00000000-0000-0000-0000-000000000000" StencilVersion="1.0"/>
+</Control>
+</file>
+
+<file path=customXml/item29.xml><?xml version="1.0" encoding="utf-8"?>
 <Control xmlns="http://schemas.microsoft.com/VisualStudio/2011/storyboarding/control">
   <Id Name="System.Storyboarding.Backgrounds.RibbonApplication" RevisionId="bdb52a43-f875-417f-a3f8-9b0259dd3051" Stencil="System.Storyboarding.Backgrounds" StencilRevisionId="bdb52a43-f875-417f-a3f8-9b0259dd3051" StencilVersion="0.1"/>
 </Control>
 </file>
 
-<file path=customXml/item15.xml><?xml version="1.0" encoding="utf-8"?>
+<file path=customXml/item3.xml><?xml version="1.0" encoding="utf-8"?>
 <Control xmlns="http://schemas.microsoft.com/VisualStudio/2011/storyboarding/control/v1.0">
-  <Id Name="System.Storyboard.Stencil.Title" RevisionId="00000000-0000-0000-0000-000000000000" Stencil="System.Common" StencilRevisionId="00000000-0000-0000-0000-000000000000" StencilVersion="1.0"/>
+  <Id Name="System.Storyboard.Stencil.PositionControl" RevisionId="00000000-0000-0000-0000-000000000000" Stencil="System.Media" StencilRevisionId="00000000-0000-0000-0000-000000000000" StencilVersion="1.0"/>
 </Control>
 </file>
 
-<file path=customXml/item16.xml><?xml version="1.0" encoding="utf-8"?>
-<Control xmlns="http://schemas.microsoft.com/VisualStudio/2011/storyboarding/control/v1.0">
-  <Id Name="System.Storyboarding.Common.Text" RevisionId="68ea164d-c1de-47a5-804f-d4d1290fa524" Stencil="System.Storyboarding.Common" StencilRevisionId="68ea164d-c1de-47a5-804f-d4d1290fa524" StencilVersion="0.1"/>
-</Control>
-</file>
-
-<file path=customXml/item17.xml><?xml version="1.0" encoding="utf-8"?>
-<Control xmlns="http://schemas.microsoft.com/VisualStudio/2011/storyboarding/control/v1.0">
-  <Id Name="System.Storyboard.Stencil.Label" RevisionId="00000000-0000-0000-0000-000000000000" Stencil="System.Common" StencilRevisionId="00000000-0000-0000-0000-000000000000" StencilVersion="1.0"/>
-</Control>
-</file>
-
-<file path=customXml/item18.xml><?xml version="1.0" encoding="utf-8"?>
+<file path=customXml/item30.xml><?xml version="1.0" encoding="utf-8"?>
 <Control xmlns="http://schemas.microsoft.com/VisualStudio/2011/storyboarding/control/v1.0">
   <Id Name="System.Storyboard.Stencil.PhoneTile" RevisionId="00000000-0000-0000-0000-000000000000" Stencil="System.Windows_Phone_7" StencilRevisionId="00000000-0000-0000-0000-000000000000" StencilVersion="1.0"/>
 </Control>
 </file>
 
-<file path=customXml/item19.xml><?xml version="1.0" encoding="utf-8"?>
+<file path=customXml/item31.xml><?xml version="1.0" encoding="utf-8"?>
 <Control xmlns="http://schemas.microsoft.com/VisualStudio/2011/storyboarding/control/v1.0">
-  <Id Name="System.Storyboard.Stencil.Image" RevisionId="00000000-0000-0000-0000-000000000000" Stencil="System.Media" StencilRevisionId="00000000-0000-0000-0000-000000000000" StencilVersion="1.0"/>
+  <Id Name="System.Storyboard.Stencil.ColorPicker" RevisionId="00000000-0000-0000-0000-000000000000" Stencil="System.Media" StencilRevisionId="00000000-0000-0000-0000-000000000000" StencilVersion="1.0"/>
 </Control>
 </file>
 
-<file path=customXml/item2.xml><?xml version="1.0" encoding="utf-8"?>
-<Control xmlns="http://schemas.microsoft.com/VisualStudio/2011/storyboarding/control/v1.0">
-  <Id Name="System.Storyboard.Stencil.Title" RevisionId="00000000-0000-0000-0000-000000000000" Stencil="System.Common" StencilRevisionId="00000000-0000-0000-0000-000000000000" StencilVersion="1.0"/>
+<file path=customXml/item32.xml><?xml version="1.0" encoding="utf-8"?>
+<Control xmlns="http://schemas.microsoft.com/VisualStudio/2011/storyboarding/control">
+  <Id Name="System.Storyboarding.Backgrounds.WindowsPhone" RevisionId="bdb52a43-f875-417f-a3f8-9b0259dd3051" Stencil="System.Storyboarding.Backgrounds" StencilRevisionId="bdb52a43-f875-417f-a3f8-9b0259dd3051" StencilVersion="0.1"/>
 </Control>
 </file>
 
-<file path=customXml/item20.xml><?xml version="1.0" encoding="utf-8"?>
-<Control xmlns="http://schemas.microsoft.com/VisualStudio/2011/storyboarding/control/v1.0">
-  <Id Name="System.Storyboard.Stencil.Button" RevisionId="00000000-0000-0000-0000-000000000000" Stencil="System.Common" StencilRevisionId="00000000-0000-0000-0000-000000000000" StencilVersion="1.0"/>
-</Control>
-</file>
-
-<file path=customXml/item21.xml><?xml version="1.0" encoding="utf-8"?>
-<Control xmlns="http://schemas.microsoft.com/VisualStudio/2011/storyboarding/control">
-  <Id Name="System.Storyboarding.WindowsPhoneIcons.Video" RevisionId="5814b1e0-0169-11e0-a976-0800200c9a66" Stencil="System.Storyboarding.WindowsPhoneIcons" StencilRevisionId="5814b1e0-0169-11e0-a976-0800200c9a66" StencilVersion="0.1"/>
-</Control>
-</file>
-
-<file path=customXml/item22.xml><?xml version="1.0" encoding="utf-8"?>
+<file path=customXml/item33.xml><?xml version="1.0" encoding="utf-8"?>
 <Control xmlns="http://schemas.microsoft.com/VisualStudio/2011/storyboarding/control/v1.0">
   <Id Name="System.Storyboard.Stencil.PhoneTile" RevisionId="00000000-0000-0000-0000-000000000000" Stencil="System.Windows_Phone_7" StencilRevisionId="00000000-0000-0000-0000-000000000000" StencilVersion="1.0"/>
 </Control>
 </file>
 
-<file path=customXml/item23.xml><?xml version="1.0" encoding="utf-8"?>
-<Control xmlns="http://schemas.microsoft.com/VisualStudio/2011/storyboarding/control/v1.0">
-  <Id Name="System.Storyboard.Stencil.Label" RevisionId="00000000-0000-0000-0000-000000000000" Stencil="System.Common" StencilRevisionId="00000000-0000-0000-0000-000000000000" StencilVersion="1.0"/>
-</Control>
-</file>
-
-<file path=customXml/item24.xml><?xml version="1.0" encoding="utf-8"?>
-<Control xmlns="http://schemas.microsoft.com/VisualStudio/2011/storyboarding/control/v1.0">
-  <Id Name="System.Storyboard.Stencil.FourItemList" RevisionId="00000000-0000-0000-0000-000000000000" Stencil="System.Common" StencilRevisionId="00000000-0000-0000-0000-000000000000" StencilVersion="1.0"/>
-</Control>
-</file>
-
-<file path=customXml/item25.xml><?xml version="1.0" encoding="utf-8"?>
-<Control xmlns="http://schemas.microsoft.com/VisualStudio/2011/storyboarding/control/v1.0">
-  <Id Name="System.Storyboarding.Common.Breadcrumb" RevisionId="68ea164d-c1de-47a5-804f-d4d1290fa524" Stencil="System.Storyboarding.Common" StencilRevisionId="68ea164d-c1de-47a5-804f-d4d1290fa524" StencilVersion="0.1"/>
-</Control>
-</file>
-
-<file path=customXml/item26.xml><?xml version="1.0" encoding="utf-8"?>
-<Control xmlns="http://schemas.microsoft.com/VisualStudio/2011/storyboarding/control/v1.0">
-  <Id Name="System.Storyboard.Stencil.Hyperlink" RevisionId="00000000-0000-0000-0000-000000000000" Stencil="System.Common" StencilRevisionId="00000000-0000-0000-0000-000000000000" StencilVersion="1.0"/>
-</Control>
-</file>
-
-<file path=customXml/item27.xml><?xml version="1.0" encoding="utf-8"?>
-<Control xmlns="http://schemas.microsoft.com/VisualStudio/2011/storyboarding/control/v1.0">
-  <Id Name="System.Storyboard.Stencil.ColorPicker" RevisionId="00000000-0000-0000-0000-000000000000" Stencil="System.Media" StencilRevisionId="00000000-0000-0000-0000-000000000000" StencilVersion="1.0"/>
-</Control>
-</file>
-
-<file path=customXml/item28.xml><?xml version="1.0" encoding="utf-8"?>
-<Control xmlns="http://schemas.microsoft.com/VisualStudio/2011/storyboarding/control/v1.0">
-  <Id Name="System.Storyboarding.Icons.FolderOpen" RevisionId="05cd6d03-c0b2-488e-98a7-d68de69a2cfc" Stencil="System.Storyboarding.Icons" StencilRevisionId="05cd6d03-c0b2-488e-98a7-d68de69a2cfc" StencilVersion="0.1"/>
-</Control>
-</file>
-
-<file path=customXml/item29.xml><?xml version="1.0" encoding="utf-8"?>
-<Control xmlns="http://schemas.microsoft.com/VisualStudio/2011/storyboarding/control/v1.0">
-  <Id Name="System.Storyboard.Stencil.PieChart" RevisionId="00000000-0000-0000-0000-000000000000" Stencil="System.Media" StencilRevisionId="00000000-0000-0000-0000-000000000000" StencilVersion="1.0"/>
-</Control>
-</file>
-
-<file path=customXml/item3.xml><?xml version="1.0" encoding="utf-8"?>
-<Control xmlns="http://schemas.microsoft.com/VisualStudio/2011/storyboarding/control/v1.0">
-  <Id Name="System.Storyboard.Stencil.DatePicker" RevisionId="00000000-0000-0000-0000-000000000000" Stencil="System.Common" StencilRevisionId="00000000-0000-0000-0000-000000000000" StencilVersion="1.0"/>
-</Control>
-</file>
-
-<file path=customXml/item30.xml><?xml version="1.0" encoding="utf-8"?>
-<Control xmlns="http://schemas.microsoft.com/VisualStudio/2011/storyboarding/control">
-  <Id Name="System.Storyboarding.Backgrounds.WindowsPhone" RevisionId="bdb52a43-f875-417f-a3f8-9b0259dd3051" Stencil="System.Storyboarding.Backgrounds" StencilRevisionId="bdb52a43-f875-417f-a3f8-9b0259dd3051" StencilVersion="0.1"/>
-</Control>
-</file>
-
-<file path=customXml/item31.xml><?xml version="1.0" encoding="utf-8"?>
-<Control xmlns="http://schemas.microsoft.com/VisualStudio/2011/storyboarding/control/v1.0">
-  <Id Name="System.Storyboard.Stencil.WidePhoneTile" RevisionId="00000000-0000-0000-0000-000000000000" Stencil="System.Windows_Phone_7" StencilRevisionId="00000000-0000-0000-0000-000000000000" StencilVersion="1.0"/>
-</Control>
-</file>
-
-<file path=customXml/item32.xml><?xml version="1.0" encoding="utf-8"?>
-<Control xmlns="http://schemas.microsoft.com/VisualStudio/2011/storyboarding/control/v1.0">
-  <Id Name="System.Storyboard.Stencil.StatusBar" RevisionId="00000000-0000-0000-0000-000000000000" Stencil="System.Windows" StencilRevisionId="00000000-0000-0000-0000-000000000000" StencilVersion="1.0"/>
-</Control>
-</file>
-
-<file path=customXml/item33.xml><?xml version="1.0" encoding="utf-8"?>
-<Control xmlns="http://schemas.microsoft.com/VisualStudio/2011/storyboarding/control">
-  <Id Name="System.Storyboarding.Backgrounds.WindowsPhoneLandscape" RevisionId="bdb52a43-f875-417f-a3f8-9b0259dd3051" Stencil="System.Storyboarding.Backgrounds" StencilRevisionId="bdb52a43-f875-417f-a3f8-9b0259dd3051" StencilVersion="0.1"/>
-</Control>
-</file>
-
 <file path=customXml/item34.xml><?xml version="1.0" encoding="utf-8"?>
 <Control xmlns="http://schemas.microsoft.com/VisualStudio/2011/storyboarding/control/v1.0">
-  <Id Name="System.Storyboarding.Common.Text" RevisionId="68ea164d-c1de-47a5-804f-d4d1290fa524" Stencil="System.Storyboarding.Common" StencilRevisionId="68ea164d-c1de-47a5-804f-d4d1290fa524" StencilVersion="0.1"/>
+  <Id Name="System.Storyboard.Stencil.PhoneNotification" RevisionId="00000000-0000-0000-0000-000000000000" Stencil="System.Windows_Phone_7" StencilRevisionId="00000000-0000-0000-0000-000000000000" StencilVersion="1.0"/>
 </Control>
 </file>
 
@@ -9238,71 +9218,122 @@
 
 <file path=customXml/item36.xml><?xml version="1.0" encoding="utf-8"?>
 <Control xmlns="http://schemas.microsoft.com/VisualStudio/2011/storyboarding/control/v1.0">
-  <Id Name="System.Storyboard.Stencil.Slider" RevisionId="00000000-0000-0000-0000-000000000000" Stencil="System.Common" StencilRevisionId="00000000-0000-0000-0000-000000000000" StencilVersion="1.0"/>
+  <Id Name="System.Storyboard.Stencil.TreeList" RevisionId="00000000-0000-0000-0000-000000000000" Stencil="System.Common" StencilRevisionId="00000000-0000-0000-0000-000000000000" StencilVersion="1.0"/>
 </Control>
 </file>
 
 <file path=customXml/item37.xml><?xml version="1.0" encoding="utf-8"?>
 <Control xmlns="http://schemas.microsoft.com/VisualStudio/2011/storyboarding/control/v1.0">
-  <Id Name="System.Storyboard.Stencil.LineChart" RevisionId="00000000-0000-0000-0000-000000000000" Stencil="System.Media" StencilRevisionId="00000000-0000-0000-0000-000000000000" StencilVersion="1.0"/>
+  <Id Name="System.Storyboard.Stencil.PieChart" RevisionId="00000000-0000-0000-0000-000000000000" Stencil="System.Media" StencilRevisionId="00000000-0000-0000-0000-000000000000" StencilVersion="1.0"/>
 </Control>
 </file>
 
 <file path=customXml/item38.xml><?xml version="1.0" encoding="utf-8"?>
+<Control xmlns="http://schemas.microsoft.com/VisualStudio/2011/storyboarding/control/v1.0">
+  <Id Name="System.Storyboarding.Common.Text" RevisionId="68ea164d-c1de-47a5-804f-d4d1290fa524" Stencil="System.Storyboarding.Common" StencilRevisionId="68ea164d-c1de-47a5-804f-d4d1290fa524" StencilVersion="0.1"/>
+</Control>
+</file>
+
+<file path=customXml/item39.xml><?xml version="1.0" encoding="utf-8"?>
+<Control xmlns="http://schemas.microsoft.com/VisualStudio/2011/storyboarding/control">
+  <Id Name="System.Storyboarding.WindowsApps.WindowsAppsMediumWideTile" Revision="1" Stencil="System.Storyboarding.WindowsApps" StencilVersion="0.1"/>
+</Control>
+</file>
+
+<file path=customXml/item4.xml><?xml version="1.0" encoding="utf-8"?>
+<Control xmlns="http://schemas.microsoft.com/VisualStudio/2011/storyboarding/control/v1.0">
+  <Id Name="System.Storyboard.Stencil.PlayControls" RevisionId="00000000-0000-0000-0000-000000000000" Stencil="System.Media" StencilRevisionId="00000000-0000-0000-0000-000000000000" StencilVersion="1.0"/>
+</Control>
+</file>
+
+<file path=customXml/item40.xml><?xml version="1.0" encoding="utf-8"?>
+<?mso-contentType ?>
+<FormTemplates xmlns="http://schemas.microsoft.com/sharepoint/v3/contenttype/forms">
+  <Display>DocumentLibraryForm</Display>
+  <Edit>DocumentLibraryForm</Edit>
+  <New>DocumentLibraryForm</New>
+</FormTemplates>
+</file>
+
+<file path=customXml/item41.xml><?xml version="1.0" encoding="utf-8"?>
+<Control xmlns="http://schemas.microsoft.com/VisualStudio/2011/storyboarding/control/v1.0">
+  <Id Name="System.Storyboard.Stencil.TextArea" RevisionId="00000000-0000-0000-0000-000000000000" Stencil="System.Common" StencilRevisionId="00000000-0000-0000-0000-000000000000" StencilVersion="1.0"/>
+</Control>
+</file>
+
+<file path=customXml/item42.xml><?xml version="1.0" encoding="utf-8"?>
+<Control xmlns="http://schemas.microsoft.com/VisualStudio/2011/storyboarding/control/v1.0">
+  <Id Name="System.Storyboard.Stencil.Calendar" RevisionId="00000000-0000-0000-0000-000000000000" Stencil="System.Common" StencilRevisionId="00000000-0000-0000-0000-000000000000" StencilVersion="1.0"/>
+</Control>
+</file>
+
+<file path=customXml/item43.xml><?xml version="1.0" encoding="utf-8"?>
+<Control xmlns="http://schemas.microsoft.com/VisualStudio/2011/storyboarding/control">
+  <Id Name="System.Storyboarding.WindowsApps.WindowsAppsMediumWideTile" Revision="1" Stencil="System.Storyboarding.WindowsApps" StencilVersion="0.1"/>
+</Control>
+</file>
+
+<file path=customXml/item44.xml><?xml version="1.0" encoding="utf-8"?>
+<Control xmlns="http://schemas.microsoft.com/VisualStudio/2011/storyboarding/control">
+  <Id Name="System.Storyboarding.WindowsApps.WindowsAppsMediumWideTile" Revision="1" Stencil="System.Storyboarding.WindowsApps" StencilVersion="0.1"/>
+</Control>
+</file>
+
+<file path=customXml/item45.xml><?xml version="1.0" encoding="utf-8"?>
+<Control xmlns="http://schemas.microsoft.com/VisualStudio/2011/storyboarding/control">
+  <Id Name="System.Storyboarding.WindowsApps.WindowsAppsMediumWideTile" Revision="1" Stencil="System.Storyboarding.WindowsApps" StencilVersion="0.1"/>
+</Control>
+</file>
+
+<file path=customXml/item46.xml><?xml version="1.0" encoding="utf-8"?>
+<Control xmlns="http://schemas.microsoft.com/VisualStudio/2011/storyboarding/control">
+  <Id Name="System.Storyboarding.WindowsApps.WindowsAppsMediumWideTile" Revision="1" Stencil="System.Storyboarding.WindowsApps" StencilVersion="0.1"/>
+</Control>
+</file>
+
+<file path=customXml/item47.xml><?xml version="1.0" encoding="utf-8"?>
+<Control xmlns="http://schemas.microsoft.com/VisualStudio/2011/storyboarding/control/v1.0">
+  <Id Name="System.Storyboard.Stencil.DatePicker" RevisionId="00000000-0000-0000-0000-000000000000" Stencil="System.Common" StencilRevisionId="00000000-0000-0000-0000-000000000000" StencilVersion="1.0"/>
+</Control>
+</file>
+
+<file path=customXml/item48.xml><?xml version="1.0" encoding="utf-8"?>
+<Control xmlns="http://schemas.microsoft.com/VisualStudio/2011/storyboarding/control/v1.0">
+  <Id Name="System.Storyboard.Stencil.TreeList" RevisionId="00000000-0000-0000-0000-000000000000" Stencil="System.Common" StencilRevisionId="00000000-0000-0000-0000-000000000000" StencilVersion="1.0"/>
+</Control>
+</file>
+
+<file path=customXml/item49.xml><?xml version="1.0" encoding="utf-8"?>
+<Control xmlns="http://schemas.microsoft.com/VisualStudio/2011/storyboarding/control/v1.0">
+  <Id Name="System.Storyboard.Stencil.Label" RevisionId="00000000-0000-0000-0000-000000000000" Stencil="System.Common" StencilRevisionId="00000000-0000-0000-0000-000000000000" StencilVersion="1.0"/>
+</Control>
+</file>
+
+<file path=customXml/item5.xml><?xml version="1.0" encoding="utf-8"?>
+<Control xmlns="http://schemas.microsoft.com/VisualStudio/2011/storyboarding/control/v1.0">
+  <Id Name="System.Storyboard.Stencil.ColorPicker" RevisionId="00000000-0000-0000-0000-000000000000" Stencil="System.Media" StencilRevisionId="00000000-0000-0000-0000-000000000000" StencilVersion="1.0"/>
+</Control>
+</file>
+
+<file path=customXml/item50.xml><?xml version="1.0" encoding="utf-8"?>
+<Control xmlns="http://schemas.microsoft.com/VisualStudio/2011/storyboarding/control/v1.0">
+  <Id Name="System.Storyboarding.Common.Breadcrumb" RevisionId="68ea164d-c1de-47a5-804f-d4d1290fa524" Stencil="System.Storyboarding.Common" StencilRevisionId="68ea164d-c1de-47a5-804f-d4d1290fa524" StencilVersion="0.1"/>
+</Control>
+</file>
+
+<file path=customXml/item51.xml><?xml version="1.0" encoding="utf-8"?>
+<Control xmlns="http://schemas.microsoft.com/VisualStudio/2011/storyboarding/control">
+  <Id Name="System.Storyboarding.Backgrounds.WindowsPhoneLandscape" RevisionId="bdb52a43-f875-417f-a3f8-9b0259dd3051" Stencil="System.Storyboarding.Backgrounds" StencilRevisionId="bdb52a43-f875-417f-a3f8-9b0259dd3051" StencilVersion="0.1"/>
+</Control>
+</file>
+
+<file path=customXml/item52.xml><?xml version="1.0" encoding="utf-8"?>
 <Control xmlns="http://schemas.microsoft.com/VisualStudio/2011/storyboarding/control/v1.0">
   <Id Name="System.Storyboard.Stencil.Group" RevisionId="00000000-0000-0000-0000-000000000000" Stencil="System.Windows" StencilRevisionId="00000000-0000-0000-0000-000000000000" StencilVersion="1.0"/>
 </Control>
 </file>
 
-<file path=customXml/item39.xml><?xml version="1.0" encoding="utf-8"?>
-<Control xmlns="http://schemas.microsoft.com/VisualStudio/2011/storyboarding/control/v1.0">
-  <Id Name="System.Storyboard.Stencil.VerticalSplitter" RevisionId="00000000-0000-0000-0000-000000000000" Stencil="System.Windows" StencilRevisionId="00000000-0000-0000-0000-000000000000" StencilVersion="1.0"/>
-</Control>
-</file>
-
-<file path=customXml/item4.xml><?xml version="1.0" encoding="utf-8"?>
-<Control xmlns="http://schemas.microsoft.com/VisualStudio/2011/storyboarding/control/v1.0">
-  <Id Name="System.Storyboarding.Common.Text" RevisionId="68ea164d-c1de-47a5-804f-d4d1290fa524" Stencil="System.Storyboarding.Common" StencilRevisionId="68ea164d-c1de-47a5-804f-d4d1290fa524" StencilVersion="0.1"/>
-</Control>
-</file>
-
-<file path=customXml/item40.xml><?xml version="1.0" encoding="utf-8"?>
-<Control xmlns="http://schemas.microsoft.com/VisualStudio/2011/storyboarding/control/v1.0">
-  <Id Name="System.Storyboard.Stencil.VideoPlayer" RevisionId="00000000-0000-0000-0000-000000000000" Stencil="System.Media" StencilRevisionId="00000000-0000-0000-0000-000000000000" StencilVersion="1.0"/>
-</Control>
-</file>
-
-<file path=customXml/item41.xml><?xml version="1.0" encoding="utf-8"?>
-<Control xmlns="http://schemas.microsoft.com/VisualStudio/2011/storyboarding/control/v1.0">
-  <Id Name="System.Storyboard.Stencil.LineChart" RevisionId="00000000-0000-0000-0000-000000000000" Stencil="System.Media" StencilRevisionId="00000000-0000-0000-0000-000000000000" StencilVersion="1.0"/>
-</Control>
-</file>
-
-<file path=customXml/item42.xml><?xml version="1.0" encoding="utf-8"?>
-<Control xmlns="http://schemas.microsoft.com/VisualStudio/2011/storyboarding/control/v1.0">
-  <Id Name="System.Storyboarding.Common.Text" RevisionId="68ea164d-c1de-47a5-804f-d4d1290fa524" Stencil="System.Storyboarding.Common" StencilRevisionId="68ea164d-c1de-47a5-804f-d4d1290fa524" StencilVersion="0.1"/>
-</Control>
-</file>
-
-<file path=customXml/item43.xml><?xml version="1.0" encoding="utf-8"?>
-<Control xmlns="http://schemas.microsoft.com/VisualStudio/2011/storyboarding/control/v1.0">
-  <Id Name="System.Storyboard.Stencil.PhoneNotification" RevisionId="00000000-0000-0000-0000-000000000000" Stencil="System.Windows_Phone_7" StencilRevisionId="00000000-0000-0000-0000-000000000000" StencilVersion="1.0"/>
-</Control>
-</file>
-
-<file path=customXml/item44.xml><?xml version="1.0" encoding="utf-8"?>
-<Control xmlns="http://schemas.microsoft.com/VisualStudio/2011/storyboarding/control/v1.0">
-  <Id Name="System.Storyboard.Stencil.VerticalBarChart" RevisionId="00000000-0000-0000-0000-000000000000" Stencil="System.Media" StencilRevisionId="00000000-0000-0000-0000-000000000000" StencilVersion="1.0"/>
-</Control>
-</file>
-
-<file path=customXml/item45.xml><?xml version="1.0" encoding="utf-8"?>
-<Control xmlns="http://schemas.microsoft.com/VisualStudio/2011/storyboarding/control/v1.0">
-  <Id Name="System.Storyboard.Stencil.PhoneBrowserBar" RevisionId="00000000-0000-0000-0000-000000000000" Stencil="System.Windows_Phone_7" StencilRevisionId="00000000-0000-0000-0000-000000000000" StencilVersion="1.0"/>
-</Control>
-</file>
-
-<file path=customXml/item46.xml><?xml version="1.0" encoding="utf-8"?>
+<file path=customXml/item53.xml><?xml version="1.0" encoding="utf-8"?>
 <ct:contentTypeSchema xmlns:ct="http://schemas.microsoft.com/office/2006/metadata/contentType" xmlns:ma="http://schemas.microsoft.com/office/2006/metadata/properties/metaAttributes" ct:_="" ma:_="" ma:contentTypeName="Document" ma:contentTypeID="0x01010022C9F813607D1D469674AAA3D24DC85B" ma:contentTypeVersion="0" ma:contentTypeDescription="Create a new document." ma:contentTypeScope="" ma:versionID="2370c695874a1292907530ead749c2be">
   <xsd:schema xmlns:xsd="http://www.w3.org/2001/XMLSchema" xmlns:xs="http://www.w3.org/2001/XMLSchema" xmlns:p="http://schemas.microsoft.com/office/2006/metadata/properties" xmlns:ns2="b4ebf394-daf6-497a-96c5-a2f8c10b38cf" targetNamespace="http://schemas.microsoft.com/office/2006/metadata/properties" ma:root="true" ma:fieldsID="9b19f9f2e3a2b2958cd8578711e95110" ns2:_="">
     <xsd:import namespace="b4ebf394-daf6-497a-96c5-a2f8c10b38cf"/>
@@ -9447,97 +9478,163 @@
 </ct:contentTypeSchema>
 </file>
 
-<file path=customXml/item47.xml><?xml version="1.0" encoding="utf-8"?>
+<file path=customXml/item54.xml><?xml version="1.0" encoding="utf-8"?>
 <Control xmlns="http://schemas.microsoft.com/VisualStudio/2011/storyboarding/control/v1.0">
-  <Id Name="System.Storyboard.Stencil.PositionControl" RevisionId="00000000-0000-0000-0000-000000000000" Stencil="System.Media" StencilRevisionId="00000000-0000-0000-0000-000000000000" StencilVersion="1.0"/>
+  <Id Name="System.Storyboarding.Common.DropdownBox" RevisionId="68ea164d-c1de-47a5-804f-d4d1290fa524" Stencil="System.Storyboarding.Common" StencilRevisionId="68ea164d-c1de-47a5-804f-d4d1290fa524" StencilVersion="0.1"/>
 </Control>
 </file>
 
-<file path=customXml/item48.xml><?xml version="1.0" encoding="utf-8"?>
+<file path=customXml/item55.xml><?xml version="1.0" encoding="utf-8"?>
+<Control xmlns="http://schemas.microsoft.com/VisualStudio/2011/storyboarding/control/v1.0">
+  <Id Name="System.Storyboard.Stencil.Browser" RevisionId="bdb52a43-f875-417f-a3f8-9b0259dd3051" Stencil="System.Backgrounds" StencilRevisionId="bdb52a43-f875-417f-a3f8-9b0259dd3051" StencilVersion="1.0"/>
+</Control>
+</file>
+
+<file path=customXml/item56.xml><?xml version="1.0" encoding="utf-8"?>
+<Control xmlns="http://schemas.microsoft.com/VisualStudio/2011/storyboarding/control/v1.0">
+  <Id Name="System.Storyboard.Stencil.Button" RevisionId="00000000-0000-0000-0000-000000000000" Stencil="System.Common" StencilRevisionId="00000000-0000-0000-0000-000000000000" StencilVersion="1.0"/>
+</Control>
+</file>
+
+<file path=customXml/item57.xml><?xml version="1.0" encoding="utf-8"?>
+<Control xmlns="http://schemas.microsoft.com/VisualStudio/2011/storyboarding/control/v1.0">
+  <Id Name="System.Storyboard.Stencil.LineChart" RevisionId="00000000-0000-0000-0000-000000000000" Stencil="System.Media" StencilRevisionId="00000000-0000-0000-0000-000000000000" StencilVersion="1.0"/>
+</Control>
+</file>
+
+<file path=customXml/item58.xml><?xml version="1.0" encoding="utf-8"?>
+<Control xmlns="http://schemas.microsoft.com/VisualStudio/2011/storyboarding/control/v1.0">
+  <Id Name="System.Storyboard.Stencil.DropdownBox" RevisionId="00000000-0000-0000-0000-000000000000" Stencil="System.Common" StencilRevisionId="00000000-0000-0000-0000-000000000000" StencilVersion="1.0"/>
+</Control>
+</file>
+
+<file path=customXml/item59.xml><?xml version="1.0" encoding="utf-8"?>
 <Control xmlns="http://schemas.microsoft.com/VisualStudio/2011/storyboarding/control/v1.0">
   <Id Name="System.Storyboard.Stencil.PhoneTile" RevisionId="00000000-0000-0000-0000-000000000000" Stencil="System.Windows_Phone_7" StencilRevisionId="00000000-0000-0000-0000-000000000000" StencilVersion="1.0"/>
 </Control>
 </file>
 
-<file path=customXml/item49.xml><?xml version="1.0" encoding="utf-8"?>
+<file path=customXml/item6.xml><?xml version="1.0" encoding="utf-8"?>
+<Control xmlns="http://schemas.microsoft.com/VisualStudio/2011/storyboarding/control">
+  <Id Name="System.Storyboarding.WindowsApps.WindowsAppsMediumWideTile" Revision="1" Stencil="System.Storyboarding.WindowsApps" StencilVersion="0.1"/>
+</Control>
+</file>
+
+<file path=customXml/item60.xml><?xml version="1.0" encoding="utf-8"?>
+<Control xmlns="http://schemas.microsoft.com/VisualStudio/2011/storyboarding/control/v1.0">
+  <Id Name="System.Storyboard.Stencil.DropdownBox" RevisionId="00000000-0000-0000-0000-000000000000" Stencil="System.Common" StencilRevisionId="00000000-0000-0000-0000-000000000000" StencilVersion="1.0"/>
+</Control>
+</file>
+
+<file path=customXml/item61.xml><?xml version="1.0" encoding="utf-8"?>
+<Control xmlns="http://schemas.microsoft.com/VisualStudio/2011/storyboarding/control">
+  <Id Name="System.Storyboarding.WindowsApps.WindowsAppsMediumWideTile" Revision="1" Stencil="System.Storyboarding.WindowsApps" StencilVersion="0.1"/>
+</Control>
+</file>
+
+<file path=customXml/item62.xml><?xml version="1.0" encoding="utf-8"?>
+<Control xmlns="http://schemas.microsoft.com/VisualStudio/2011/storyboarding/control">
+  <Id Name="System.Storyboarding.WindowsApps.WindowsAppsMediumWideTile" Revision="1" Stencil="System.Storyboarding.WindowsApps" StencilVersion="0.1"/>
+</Control>
+</file>
+
+<file path=customXml/item63.xml><?xml version="1.0" encoding="utf-8"?>
+<Control xmlns="http://schemas.microsoft.com/VisualStudio/2011/storyboarding/control">
+  <Id Name="System.Storyboarding.WindowsApps.WindowsAppsMediumWideTile" Revision="1" Stencil="System.Storyboarding.WindowsApps" StencilVersion="0.1"/>
+</Control>
+</file>
+
+<file path=customXml/item64.xml><?xml version="1.0" encoding="utf-8"?>
+<Control xmlns="http://schemas.microsoft.com/VisualStudio/2011/storyboarding/control">
+  <Id Name="System.Storyboarding.WindowsApps.WindowsAppsMediumWideTile" Revision="1" Stencil="System.Storyboarding.WindowsApps" StencilVersion="0.1"/>
+</Control>
+</file>
+
+<file path=customXml/item65.xml><?xml version="1.0" encoding="utf-8"?>
+<Control xmlns="http://schemas.microsoft.com/VisualStudio/2011/storyboarding/control">
+  <Id Name="System.Storyboarding.WindowsApps.WindowsAppsMediumWideTile" Revision="1" Stencil="System.Storyboarding.WindowsApps" StencilVersion="0.1"/>
+</Control>
+</file>
+
+<file path=customXml/item66.xml><?xml version="1.0" encoding="utf-8"?>
+<Control xmlns="http://schemas.microsoft.com/VisualStudio/2011/storyboarding/control/v1.0">
+  <Id Name="System.Storyboard.Stencil.PhoneApplicationBar" RevisionId="00000000-0000-0000-0000-000000000000" Stencil="System.Windows_Phone_7" StencilRevisionId="00000000-0000-0000-0000-000000000000" StencilVersion="1.0"/>
+</Control>
+</file>
+
+<file path=customXml/item67.xml><?xml version="1.0" encoding="utf-8"?>
+<Control xmlns="http://schemas.microsoft.com/VisualStudio/2011/storyboarding/control/v1.0">
+  <Id Name="System.Storyboard.Stencil.PhoneKeyboard" RevisionId="00000000-0000-0000-0000-000000000000" Stencil="System.Windows_Phone_7" StencilRevisionId="00000000-0000-0000-0000-000000000000" StencilVersion="1.0"/>
+</Control>
+</file>
+
+<file path=customXml/item68.xml><?xml version="1.0" encoding="utf-8"?>
+<Control xmlns="http://schemas.microsoft.com/VisualStudio/2011/storyboarding/control/v1.0">
+  <Id Name="System.Storyboard.Stencil.Title" RevisionId="00000000-0000-0000-0000-000000000000" Stencil="System.Common" StencilRevisionId="00000000-0000-0000-0000-000000000000" StencilVersion="1.0"/>
+</Control>
+</file>
+
+<file path=customXml/item69.xml><?xml version="1.0" encoding="utf-8"?>
+<Control xmlns="http://schemas.microsoft.com/VisualStudio/2011/storyboarding/control/v1.0">
+  <Id Name="System.Storyboard.Stencil.Label" RevisionId="00000000-0000-0000-0000-000000000000" Stencil="System.Common" StencilRevisionId="00000000-0000-0000-0000-000000000000" StencilVersion="1.0"/>
+</Control>
+</file>
+
+<file path=customXml/item7.xml><?xml version="1.0" encoding="utf-8"?>
+<Control xmlns="http://schemas.microsoft.com/VisualStudio/2011/storyboarding/control">
+  <Id Name="System.Storyboarding.WindowsApps.WindowsAppsMediumWideTile" Revision="1" Stencil="System.Storyboarding.WindowsApps" StencilVersion="0.1"/>
+</Control>
+</file>
+
+<file path=customXml/item70.xml><?xml version="1.0" encoding="utf-8"?>
+<Control xmlns="http://schemas.microsoft.com/VisualStudio/2011/storyboarding/control/v1.0">
+  <Id Name="System.Storyboarding.Icons.FolderOpen" RevisionId="05cd6d03-c0b2-488e-98a7-d68de69a2cfc" Stencil="System.Storyboarding.Icons" StencilRevisionId="05cd6d03-c0b2-488e-98a7-d68de69a2cfc" StencilVersion="0.1"/>
+</Control>
+</file>
+
+<file path=customXml/item71.xml><?xml version="1.0" encoding="utf-8"?>
+<Control xmlns="http://schemas.microsoft.com/VisualStudio/2011/storyboarding/control/v1.0">
+  <Id Name="System.Storyboard.Stencil.Slider" RevisionId="00000000-0000-0000-0000-000000000000" Stencil="System.Common" StencilRevisionId="00000000-0000-0000-0000-000000000000" StencilVersion="1.0"/>
+</Control>
+</file>
+
+<file path=customXml/item72.xml><?xml version="1.0" encoding="utf-8"?>
 <Control xmlns="http://schemas.microsoft.com/VisualStudio/2011/storyboarding/control">
   <Id Name="System.Storyboarding.Backgrounds.WebBrowser" RevisionId="bdb52a43-f875-417f-a3f8-9b0259dd3051" Stencil="System.Storyboarding.Backgrounds" StencilRevisionId="bdb52a43-f875-417f-a3f8-9b0259dd3051" StencilVersion="0.1"/>
 </Control>
 </file>
 
-<file path=customXml/item5.xml><?xml version="1.0" encoding="utf-8"?>
+<file path=customXml/item73.xml><?xml version="1.0" encoding="utf-8"?>
 <Control xmlns="http://schemas.microsoft.com/VisualStudio/2011/storyboarding/control/v1.0">
-  <Id Name="System.Storyboard.Stencil.VerticalScrollbar" RevisionId="00000000-0000-0000-0000-000000000000" Stencil="System.Common" StencilRevisionId="00000000-0000-0000-0000-000000000000" StencilVersion="1.0"/>
+  <Id Name="System.Storyboarding.Icons.Help" RevisionId="05cd6d03-c0b2-488e-98a7-d68de69a2cfc" Stencil="System.Storyboarding.Icons" StencilRevisionId="05cd6d03-c0b2-488e-98a7-d68de69a2cfc" StencilVersion="0.1"/>
 </Control>
 </file>
 
-<file path=customXml/item50.xml><?xml version="1.0" encoding="utf-8"?>
-<Control xmlns="http://schemas.microsoft.com/VisualStudio/2011/storyboarding/control">
-  <Id Name="System.Storyboarding.Backgrounds.SharePoint" RevisionId="bdb52a43-f875-417f-a3f8-9b0259dd3051" Stencil="System.Storyboarding.Backgrounds" StencilRevisionId="bdb52a43-f875-417f-a3f8-9b0259dd3051" StencilVersion="0.1"/>
+<file path=customXml/item74.xml><?xml version="1.0" encoding="utf-8"?>
+<Control xmlns="http://schemas.microsoft.com/VisualStudio/2011/storyboarding/control/v1.0">
+  <Id Name="System.Storyboarding.Common.SearchBox" RevisionId="68ea164d-c1de-47a5-804f-d4d1290fa524" Stencil="System.Storyboarding.Common" StencilRevisionId="68ea164d-c1de-47a5-804f-d4d1290fa524" StencilVersion="0.1"/>
 </Control>
 </file>
 
-<file path=customXml/item51.xml><?xml version="1.0" encoding="utf-8"?>
-<Control xmlns="http://schemas.microsoft.com/VisualStudio/2011/storyboarding/control/v1.0">
-  <Id Name="System.Storyboard.Stencil.TextArea" RevisionId="00000000-0000-0000-0000-000000000000" Stencil="System.Common" StencilRevisionId="00000000-0000-0000-0000-000000000000" StencilVersion="1.0"/>
-</Control>
-</file>
-
-<file path=customXml/item52.xml><?xml version="1.0" encoding="utf-8"?>
+<file path=customXml/item75.xml><?xml version="1.0" encoding="utf-8"?>
 <Control xmlns="http://schemas.microsoft.com/VisualStudio/2011/storyboarding/control/v1.0">
   <Id Name="System.Storyboard.Stencil.WidePhoneTile" RevisionId="00000000-0000-0000-0000-000000000000" Stencil="System.Windows_Phone_7" StencilRevisionId="00000000-0000-0000-0000-000000000000" StencilVersion="1.0"/>
 </Control>
 </file>
 
-<file path=customXml/item53.xml><?xml version="1.0" encoding="utf-8"?>
+<file path=customXml/item76.xml><?xml version="1.0" encoding="utf-8"?>
 <Control xmlns="http://schemas.microsoft.com/VisualStudio/2011/storyboarding/control/v1.0">
-  <Id Name="System.Storyboard.Stencil.PhoneTile" RevisionId="00000000-0000-0000-0000-000000000000" Stencil="System.Windows_Phone_7" StencilRevisionId="00000000-0000-0000-0000-000000000000" StencilVersion="1.0"/>
+  <Id Name="System.Storyboard.Stencil.VerticalBarChart" RevisionId="00000000-0000-0000-0000-000000000000" Stencil="System.Media" StencilRevisionId="00000000-0000-0000-0000-000000000000" StencilVersion="1.0"/>
 </Control>
 </file>
 
-<file path=customXml/item54.xml><?xml version="1.0" encoding="utf-8"?>
+<file path=customXml/item77.xml><?xml version="1.0" encoding="utf-8"?>
 <Control xmlns="http://schemas.microsoft.com/VisualStudio/2011/storyboarding/control/v1.0">
-  <Id Name="System.Storyboard.Stencil.DropdownBox" RevisionId="00000000-0000-0000-0000-000000000000" Stencil="System.Common" StencilRevisionId="00000000-0000-0000-0000-000000000000" StencilVersion="1.0"/>
+  <Id Name="System.Storyboard.Stencil.WidePhoneTile" RevisionId="00000000-0000-0000-0000-000000000000" Stencil="System.Windows_Phone_7" StencilRevisionId="00000000-0000-0000-0000-000000000000" StencilVersion="1.0"/>
 </Control>
 </file>
 
-<file path=customXml/item55.xml><?xml version="1.0" encoding="utf-8"?>
-<Control xmlns="http://schemas.microsoft.com/VisualStudio/2011/storyboarding/control/v1.0">
-  <Id Name="System.Storyboard.Stencil.Breadcrumb" RevisionId="00000000-0000-0000-0000-000000000000" Stencil="System.Common" StencilRevisionId="00000000-0000-0000-0000-000000000000" StencilVersion="1.0"/>
-</Control>
-</file>
-
-<file path=customXml/item56.xml><?xml version="1.0" encoding="utf-8"?>
-<Control xmlns="http://schemas.microsoft.com/VisualStudio/2011/storyboarding/control/v1.0">
-  <Id Name="System.Storyboard.Stencil.TreeList" RevisionId="00000000-0000-0000-0000-000000000000" Stencil="System.Common" StencilRevisionId="00000000-0000-0000-0000-000000000000" StencilVersion="1.0"/>
-</Control>
-</file>
-
-<file path=customXml/item57.xml><?xml version="1.0" encoding="utf-8"?>
-<Control xmlns="http://schemas.microsoft.com/VisualStudio/2011/storyboarding/control/v1.0">
-  <Id Name="System.Storyboarding.Icons.Help" RevisionId="05cd6d03-c0b2-488e-98a7-d68de69a2cfc" Stencil="System.Storyboarding.Icons" StencilRevisionId="05cd6d03-c0b2-488e-98a7-d68de69a2cfc" StencilVersion="0.1"/>
-</Control>
-</file>
-
-<file path=customXml/item58.xml><?xml version="1.0" encoding="utf-8"?>
-<Control xmlns="http://schemas.microsoft.com/VisualStudio/2011/storyboarding/control/v1.0">
-  <Id Name="System.Storyboarding.Common.Text" RevisionId="68ea164d-c1de-47a5-804f-d4d1290fa524" Stencil="System.Storyboarding.Common" StencilRevisionId="68ea164d-c1de-47a5-804f-d4d1290fa524" StencilVersion="0.1"/>
-</Control>
-</file>
-
-<file path=customXml/item59.xml><?xml version="1.0" encoding="utf-8"?>
-<Control xmlns="http://schemas.microsoft.com/VisualStudio/2011/storyboarding/control/v1.0">
-  <Id Name="System.Storyboarding.Common.DropdownBox" RevisionId="68ea164d-c1de-47a5-804f-d4d1290fa524" Stencil="System.Storyboarding.Common" StencilRevisionId="68ea164d-c1de-47a5-804f-d4d1290fa524" StencilVersion="0.1"/>
-</Control>
-</file>
-
-<file path=customXml/item6.xml><?xml version="1.0" encoding="utf-8"?>
-<Control xmlns="http://schemas.microsoft.com/VisualStudio/2011/storyboarding/control/v1.0">
-  <Id Name="System.Storyboard.Stencil.PhoneKeyboard" RevisionId="00000000-0000-0000-0000-000000000000" Stencil="System.Windows_Phone_7" StencilRevisionId="00000000-0000-0000-0000-000000000000" StencilVersion="1.0"/>
-</Control>
-</file>
-
-<file path=customXml/item60.xml><?xml version="1.0" encoding="utf-8"?>
+<file path=customXml/item78.xml><?xml version="1.0" encoding="utf-8"?>
 <p:properties xmlns:p="http://schemas.microsoft.com/office/2006/metadata/properties" xmlns:xsi="http://www.w3.org/2001/XMLSchema-instance" xmlns:pc="http://schemas.microsoft.com/office/infopath/2007/PartnerControls">
   <documentManagement>
     <_dlc_DocId xmlns="b4ebf394-daf6-497a-96c5-a2f8c10b38cf">TT6HZDVJM2HV-178-540</_dlc_DocId>
@@ -9549,138 +9646,21 @@
 </p:properties>
 </file>
 
-<file path=customXml/item61.xml><?xml version="1.0" encoding="utf-8"?>
+<file path=customXml/item79.xml><?xml version="1.0" encoding="utf-8"?>
+<Control xmlns="http://schemas.microsoft.com/VisualStudio/2011/storyboarding/control">
+  <Id Name="System.Storyboarding.Backgrounds.RibbonApplication" RevisionId="bdb52a43-f875-417f-a3f8-9b0259dd3051" Stencil="System.Storyboarding.Backgrounds" StencilRevisionId="bdb52a43-f875-417f-a3f8-9b0259dd3051" StencilVersion="0.1"/>
+</Control>
+</file>
+
+<file path=customXml/item8.xml><?xml version="1.0" encoding="utf-8"?>
 <Control xmlns="http://schemas.microsoft.com/VisualStudio/2011/storyboarding/control/v1.0">
   <Id Name="System.Storyboard.Stencil.Title" RevisionId="00000000-0000-0000-0000-000000000000" Stencil="System.Common" StencilRevisionId="00000000-0000-0000-0000-000000000000" StencilVersion="1.0"/>
 </Control>
 </file>
 
-<file path=customXml/item62.xml><?xml version="1.0" encoding="utf-8"?>
-<Control xmlns="http://schemas.microsoft.com/VisualStudio/2011/storyboarding/control/v1.0">
-  <Id Name="System.Storyboard.Stencil.PhoneTile" RevisionId="00000000-0000-0000-0000-000000000000" Stencil="System.Windows_Phone_7" StencilRevisionId="00000000-0000-0000-0000-000000000000" StencilVersion="1.0"/>
-</Control>
-</file>
-
-<file path=customXml/item63.xml><?xml version="1.0" encoding="utf-8"?>
-<Control xmlns="http://schemas.microsoft.com/VisualStudio/2011/storyboarding/control/v1.0">
-  <Id Name="System.Storyboard.Stencil.PlayControls" RevisionId="00000000-0000-0000-0000-000000000000" Stencil="System.Media" StencilRevisionId="00000000-0000-0000-0000-000000000000" StencilVersion="1.0"/>
-</Control>
-</file>
-
-<file path=customXml/item64.xml><?xml version="1.0" encoding="utf-8"?>
-<Control xmlns="http://schemas.microsoft.com/VisualStudio/2011/storyboarding/control/v1.0">
-  <Id Name="System.Storyboard.Stencil.PieChart" RevisionId="00000000-0000-0000-0000-000000000000" Stencil="System.Media" StencilRevisionId="00000000-0000-0000-0000-000000000000" StencilVersion="1.0"/>
-</Control>
-</file>
-
-<file path=customXml/item65.xml><?xml version="1.0" encoding="utf-8"?>
-<Control xmlns="http://schemas.microsoft.com/VisualStudio/2011/storyboarding/control">
-  <Id Name="System.Storyboarding.Backgrounds.RibbonApplication" RevisionId="bdb52a43-f875-417f-a3f8-9b0259dd3051" Stencil="System.Storyboarding.Backgrounds" StencilRevisionId="bdb52a43-f875-417f-a3f8-9b0259dd3051" StencilVersion="0.1"/>
-</Control>
-</file>
-
-<file path=customXml/item66.xml><?xml version="1.0" encoding="utf-8"?>
-<Control xmlns="http://schemas.microsoft.com/VisualStudio/2011/storyboarding/control/v1.0">
-  <Id Name="System.Storyboarding.Media.Image" RevisionId="658c0869-8ded-44f2-a68a-f8e8fcb7d3bd" Stencil="System.Storyboarding.Media" StencilRevisionId="658c0869-8ded-44f2-a68a-f8e8fcb7d3bd" StencilVersion="0.1"/>
-</Control>
-</file>
-
-<file path=customXml/item67.xml><?xml version="1.0" encoding="utf-8"?>
-<Control xmlns="http://schemas.microsoft.com/VisualStudio/2011/storyboarding/control/v1.0">
-  <Id Name="System.Storyboard.Stencil.Browser" RevisionId="bdb52a43-f875-417f-a3f8-9b0259dd3051" Stencil="System.Backgrounds" StencilRevisionId="bdb52a43-f875-417f-a3f8-9b0259dd3051" StencilVersion="1.0"/>
-</Control>
-</file>
-
-<file path=customXml/item68.xml><?xml version="1.0" encoding="utf-8"?>
-<Control xmlns="http://schemas.microsoft.com/VisualStudio/2011/storyboarding/control/v1.0">
-  <Id Name="System.Storyboard.Stencil.ColorPicker" RevisionId="00000000-0000-0000-0000-000000000000" Stencil="System.Media" StencilRevisionId="00000000-0000-0000-0000-000000000000" StencilVersion="1.0"/>
-</Control>
-</file>
-
-<file path=customXml/item69.xml><?xml version="1.0" encoding="utf-8"?>
-<Control xmlns="http://schemas.microsoft.com/VisualStudio/2011/storyboarding/control/v1.0">
-  <Id Name="System.Storyboarding.Common.Text" RevisionId="68ea164d-c1de-47a5-804f-d4d1290fa524" Stencil="System.Storyboarding.Common" StencilRevisionId="68ea164d-c1de-47a5-804f-d4d1290fa524" StencilVersion="0.1"/>
-</Control>
-</file>
-
-<file path=customXml/item7.xml><?xml version="1.0" encoding="utf-8"?>
-<Control xmlns="http://schemas.microsoft.com/VisualStudio/2011/storyboarding/control/v1.0">
-  <Id Name="System.Storyboard.Stencil.TabGroup" RevisionId="00000000-0000-0000-0000-000000000000" Stencil="System.Common" StencilRevisionId="00000000-0000-0000-0000-000000000000" StencilVersion="1.0"/>
-</Control>
-</file>
-
-<file path=customXml/item70.xml><?xml version="1.0" encoding="utf-8"?>
-<Control xmlns="http://schemas.microsoft.com/VisualStudio/2011/storyboarding/control/v1.0">
-  <Id Name="System.Storyboard.Stencil.DropdownBox" RevisionId="00000000-0000-0000-0000-000000000000" Stencil="System.Common" StencilRevisionId="00000000-0000-0000-0000-000000000000" StencilVersion="1.0"/>
-</Control>
-</file>
-
-<file path=customXml/item71.xml><?xml version="1.0" encoding="utf-8"?>
-<Control xmlns="http://schemas.microsoft.com/VisualStudio/2011/storyboarding/control/v1.0">
-  <Id Name="System.Storyboard.Stencil.Title" RevisionId="00000000-0000-0000-0000-000000000000" Stencil="System.Common" StencilRevisionId="00000000-0000-0000-0000-000000000000" StencilVersion="1.0"/>
-</Control>
-</file>
-
-<file path=customXml/item72.xml><?xml version="1.0" encoding="utf-8"?>
-<Control xmlns="http://schemas.microsoft.com/VisualStudio/2011/storyboarding/control/v1.0">
-  <Id Name="System.Storyboard.Stencil.Calendar" RevisionId="00000000-0000-0000-0000-000000000000" Stencil="System.Common" StencilRevisionId="00000000-0000-0000-0000-000000000000" StencilVersion="1.0"/>
-</Control>
-</file>
-
-<file path=customXml/item73.xml><?xml version="1.0" encoding="utf-8"?>
+<file path=customXml/item80.xml><?xml version="1.0" encoding="utf-8"?>
 <Control xmlns="http://schemas.microsoft.com/VisualStudio/2011/storyboarding/control/v1.0">
   <Id Name="System.Storyboard.Stencil.PositionControl" RevisionId="00000000-0000-0000-0000-000000000000" Stencil="System.Media" StencilRevisionId="00000000-0000-0000-0000-000000000000" StencilVersion="1.0"/>
-</Control>
-</file>
-
-<file path=customXml/item74.xml><?xml version="1.0" encoding="utf-8"?>
-<Control xmlns="http://schemas.microsoft.com/VisualStudio/2011/storyboarding/control/v1.0">
-  <Id Name="System.Storyboard.Stencil.VerticalScrollbar" RevisionId="00000000-0000-0000-0000-000000000000" Stencil="System.Common" StencilRevisionId="00000000-0000-0000-0000-000000000000" StencilVersion="1.0"/>
-</Control>
-</file>
-
-<file path=customXml/item75.xml><?xml version="1.0" encoding="utf-8"?>
-<Control xmlns="http://schemas.microsoft.com/VisualStudio/2011/storyboarding/control">
-  <Id Name="System.Storyboarding.WindowsApps.WindowsAppsMediumWideTile" Revision="1" Stencil="System.Storyboarding.WindowsApps" StencilVersion="0.1"/>
-</Control>
-</file>
-
-<file path=customXml/item76.xml><?xml version="1.0" encoding="utf-8"?>
-<Control xmlns="http://schemas.microsoft.com/VisualStudio/2011/storyboarding/control">
-  <Id Name="System.Storyboarding.WindowsApps.WindowsAppsMediumWideTile" Revision="1" Stencil="System.Storyboarding.WindowsApps" StencilVersion="0.1"/>
-</Control>
-</file>
-
-<file path=customXml/item77.xml><?xml version="1.0" encoding="utf-8"?>
-<Control xmlns="http://schemas.microsoft.com/VisualStudio/2011/storyboarding/control">
-  <Id Name="System.Storyboarding.WindowsApps.WindowsAppsMediumWideTile" Revision="1" Stencil="System.Storyboarding.WindowsApps" StencilVersion="0.1"/>
-</Control>
-</file>
-
-<file path=customXml/item78.xml><?xml version="1.0" encoding="utf-8"?>
-<Control xmlns="http://schemas.microsoft.com/VisualStudio/2011/storyboarding/control">
-  <Id Name="System.Storyboarding.WindowsApps.WindowsAppsMediumWideTile" Revision="1" Stencil="System.Storyboarding.WindowsApps" StencilVersion="0.1"/>
-</Control>
-</file>
-
-<file path=customXml/item79.xml><?xml version="1.0" encoding="utf-8"?>
-<Control xmlns="http://schemas.microsoft.com/VisualStudio/2011/storyboarding/control">
-  <Id Name="System.Storyboarding.WindowsApps.WindowsAppsMediumWideTile" Revision="1" Stencil="System.Storyboarding.WindowsApps" StencilVersion="0.1"/>
-</Control>
-</file>
-
-<file path=customXml/item8.xml><?xml version="1.0" encoding="utf-8"?>
-<?mso-contentType ?>
-<FormTemplates xmlns="http://schemas.microsoft.com/sharepoint/v3/contenttype/forms">
-  <Display>DocumentLibraryForm</Display>
-  <Edit>DocumentLibraryForm</Edit>
-  <New>DocumentLibraryForm</New>
-</FormTemplates>
-</file>
-
-<file path=customXml/item80.xml><?xml version="1.0" encoding="utf-8"?>
-<Control xmlns="http://schemas.microsoft.com/VisualStudio/2011/storyboarding/control">
-  <Id Name="System.Storyboarding.WindowsApps.WindowsAppsMediumWideTile" Revision="1" Stencil="System.Storyboarding.WindowsApps" StencilVersion="0.1"/>
 </Control>
 </file>
 
@@ -9715,30 +9695,12 @@
 </file>
 
 <file path=customXml/item86.xml><?xml version="1.0" encoding="utf-8"?>
-<Control xmlns="http://schemas.microsoft.com/VisualStudio/2011/storyboarding/control">
-  <Id Name="System.Storyboarding.WindowsApps.WindowsAppsMediumWideTile" Revision="1" Stencil="System.Storyboarding.WindowsApps" StencilVersion="0.1"/>
+<Control xmlns="http://schemas.microsoft.com/VisualStudio/2011/storyboarding/control/v1.0">
+  <Id Name="System.Storyboarding.Common.Text" RevisionId="68ea164d-c1de-47a5-804f-d4d1290fa524" Stencil="System.Storyboarding.Common" StencilRevisionId="68ea164d-c1de-47a5-804f-d4d1290fa524" StencilVersion="0.1"/>
 </Control>
 </file>
 
 <file path=customXml/item87.xml><?xml version="1.0" encoding="utf-8"?>
-<Control xmlns="http://schemas.microsoft.com/VisualStudio/2011/storyboarding/control">
-  <Id Name="System.Storyboarding.WindowsApps.WindowsAppsMediumWideTile" Revision="1" Stencil="System.Storyboarding.WindowsApps" StencilVersion="0.1"/>
-</Control>
-</file>
-
-<file path=customXml/item88.xml><?xml version="1.0" encoding="utf-8"?>
-<Control xmlns="http://schemas.microsoft.com/VisualStudio/2011/storyboarding/control">
-  <Id Name="System.Storyboarding.WindowsApps.WindowsAppsMediumWideTile" Revision="1" Stencil="System.Storyboarding.WindowsApps" StencilVersion="0.1"/>
-</Control>
-</file>
-
-<file path=customXml/item89.xml><?xml version="1.0" encoding="utf-8"?>
-<Control xmlns="http://schemas.microsoft.com/VisualStudio/2011/storyboarding/control">
-  <Id Name="System.Storyboarding.WindowsApps.WindowsAppsMediumWideTile" Revision="1" Stencil="System.Storyboarding.WindowsApps" StencilVersion="0.1"/>
-</Control>
-</file>
-
-<file path=customXml/item9.xml><?xml version="1.0" encoding="utf-8"?>
 <?mso-contentType ?>
 <spe:Receivers xmlns:spe="http://schemas.microsoft.com/sharepoint/events">
   <Receiver>
@@ -9784,27 +9746,45 @@
 </spe:Receivers>
 </file>
 
+<file path=customXml/item88.xml><?xml version="1.0" encoding="utf-8"?>
+<Control xmlns="http://schemas.microsoft.com/VisualStudio/2011/storyboarding/control/v1.0">
+  <Id Name="System.Storyboard.Stencil.HorizontalScrollbar" RevisionId="00000000-0000-0000-0000-000000000000" Stencil="System.Common" StencilRevisionId="00000000-0000-0000-0000-000000000000" StencilVersion="1.0"/>
+</Control>
+</file>
+
+<file path=customXml/item89.xml><?xml version="1.0" encoding="utf-8"?>
+<Control xmlns="http://schemas.microsoft.com/VisualStudio/2011/storyboarding/control/v1.0">
+  <Id Name="System.Storyboard.Stencil.PhoneTile" RevisionId="00000000-0000-0000-0000-000000000000" Stencil="System.Windows_Phone_7" StencilRevisionId="00000000-0000-0000-0000-000000000000" StencilVersion="1.0"/>
+</Control>
+</file>
+
+<file path=customXml/item9.xml><?xml version="1.0" encoding="utf-8"?>
+<Control xmlns="http://schemas.microsoft.com/VisualStudio/2011/storyboarding/control/v1.0">
+  <Id Name="System.Storyboarding.Common.Text" RevisionId="68ea164d-c1de-47a5-804f-d4d1290fa524" Stencil="System.Storyboarding.Common" StencilRevisionId="68ea164d-c1de-47a5-804f-d4d1290fa524" StencilVersion="0.1"/>
+</Control>
+</file>
+
 <file path=customXml/item90.xml><?xml version="1.0" encoding="utf-8"?>
-<Control xmlns="http://schemas.microsoft.com/VisualStudio/2011/storyboarding/control">
-  <Id Name="System.Storyboarding.WindowsApps.WindowsAppsMediumWideTile" Revision="1" Stencil="System.Storyboarding.WindowsApps" StencilVersion="0.1"/>
+<Control xmlns="http://schemas.microsoft.com/VisualStudio/2011/storyboarding/control/v1.0">
+  <Id Name="System.Storyboard.Stencil.VerticalSplitter" RevisionId="00000000-0000-0000-0000-000000000000" Stencil="System.Windows" StencilRevisionId="00000000-0000-0000-0000-000000000000" StencilVersion="1.0"/>
 </Control>
 </file>
 
 <file path=customXml/item91.xml><?xml version="1.0" encoding="utf-8"?>
-<Control xmlns="http://schemas.microsoft.com/VisualStudio/2011/storyboarding/control">
-  <Id Name="System.Storyboarding.WindowsApps.WindowsAppsMediumWideTile" Revision="1" Stencil="System.Storyboarding.WindowsApps" StencilVersion="0.1"/>
+<Control xmlns="http://schemas.microsoft.com/VisualStudio/2011/storyboarding/control/v1.0">
+  <Id Name="System.Storyboarding.Common.Text" RevisionId="68ea164d-c1de-47a5-804f-d4d1290fa524" Stencil="System.Storyboarding.Common" StencilRevisionId="68ea164d-c1de-47a5-804f-d4d1290fa524" StencilVersion="0.1"/>
 </Control>
 </file>
 
 <file path=customXml/item92.xml><?xml version="1.0" encoding="utf-8"?>
 <Control xmlns="http://schemas.microsoft.com/VisualStudio/2011/storyboarding/control">
-  <Id Name="System.Storyboarding.WindowsApps.WindowsAppsMediumWideTile" Revision="1" Stencil="System.Storyboarding.WindowsApps" StencilVersion="0.1"/>
+  <Id Name="System.Storyboarding.Backgrounds.SharePoint" RevisionId="bdb52a43-f875-417f-a3f8-9b0259dd3051" Stencil="System.Storyboarding.Backgrounds" StencilRevisionId="bdb52a43-f875-417f-a3f8-9b0259dd3051" StencilVersion="0.1"/>
 </Control>
 </file>
 
 <file path=customXml/item93.xml><?xml version="1.0" encoding="utf-8"?>
-<Control xmlns="http://schemas.microsoft.com/VisualStudio/2011/storyboarding/control">
-  <Id Name="System.Storyboarding.WindowsApps.WindowsAppsMediumWideTile" Revision="1" Stencil="System.Storyboarding.WindowsApps" StencilVersion="0.1"/>
+<Control xmlns="http://schemas.microsoft.com/VisualStudio/2011/storyboarding/control/v1.0">
+  <Id Name="System.Storyboard.Stencil.Breadcrumb" RevisionId="00000000-0000-0000-0000-000000000000" Stencil="System.Common" StencilRevisionId="00000000-0000-0000-0000-000000000000" StencilVersion="1.0"/>
 </Control>
 </file>
 
@@ -9821,14 +9801,14 @@
 </file>
 
 <file path=customXml/item96.xml><?xml version="1.0" encoding="utf-8"?>
-<Control xmlns="http://schemas.microsoft.com/VisualStudio/2011/storyboarding/control">
-  <Id Name="System.Storyboarding.WindowsApps.WindowsAppsMediumWideTile" Revision="1" Stencil="System.Storyboarding.WindowsApps" StencilVersion="0.1"/>
+<Control xmlns="http://schemas.microsoft.com/VisualStudio/2011/storyboarding/control/v1.0">
+  <Id Name="System.Storyboard.Stencil.TabGroup" RevisionId="00000000-0000-0000-0000-000000000000" Stencil="System.Common" StencilRevisionId="00000000-0000-0000-0000-000000000000" StencilVersion="1.0"/>
 </Control>
 </file>
 
 <file path=customXml/item97.xml><?xml version="1.0" encoding="utf-8"?>
-<Control xmlns="http://schemas.microsoft.com/VisualStudio/2011/storyboarding/control">
-  <Id Name="System.Storyboarding.WindowsApps.WindowsAppsMediumWideTile" Revision="1" Stencil="System.Storyboarding.WindowsApps" StencilVersion="0.1"/>
+<Control xmlns="http://schemas.microsoft.com/VisualStudio/2011/storyboarding/control/v1.0">
+  <Id Name="System.Storyboard.Stencil.Title" RevisionId="00000000-0000-0000-0000-000000000000" Stencil="System.Common" StencilRevisionId="00000000-0000-0000-0000-000000000000" StencilVersion="1.0"/>
 </Control>
 </file>
 
@@ -9839,21 +9819,21 @@
 </file>
 
 <file path=customXml/item99.xml><?xml version="1.0" encoding="utf-8"?>
-<Control xmlns="http://schemas.microsoft.com/VisualStudio/2011/storyboarding/control">
-  <Id Name="System.Storyboarding.WindowsApps.WindowsAppsMediumWideTile" Revision="1" Stencil="System.Storyboarding.WindowsApps" StencilVersion="0.1"/>
+<Control xmlns="http://schemas.microsoft.com/VisualStudio/2011/storyboarding/control/v1.0">
+  <Id Name="System.Storyboard.Stencil.Hyperlink" RevisionId="00000000-0000-0000-0000-000000000000" Stencil="System.Common" StencilRevisionId="00000000-0000-0000-0000-000000000000" StencilVersion="1.0"/>
 </Control>
 </file>
 
 <file path=customXml/itemProps1.xml><?xml version="1.0" encoding="utf-8"?>
-<ds:datastoreItem xmlns:ds="http://schemas.openxmlformats.org/officeDocument/2006/customXml" ds:itemID="{E6C688DD-065A-4726-BCE5-E5AFDA3F5641}">
+<ds:datastoreItem xmlns:ds="http://schemas.openxmlformats.org/officeDocument/2006/customXml" ds:itemID="{70C23831-7801-40F8-9A53-4E9925562CBE}">
   <ds:schemaRefs>
-    <ds:schemaRef ds:uri="http://schemas.microsoft.com/VisualStudio/2011/storyboarding/control/v1.0"/>
+    <ds:schemaRef ds:uri="http://schemas.microsoft.com/VisualStudio/2011/storyboarding/control"/>
   </ds:schemaRefs>
 </ds:datastoreItem>
 </file>
 
 <file path=customXml/itemProps10.xml><?xml version="1.0" encoding="utf-8"?>
-<ds:datastoreItem xmlns:ds="http://schemas.openxmlformats.org/officeDocument/2006/customXml" ds:itemID="{7BF16C54-4775-4FA7-AF88-98AF6D5E8CA6}">
+<ds:datastoreItem xmlns:ds="http://schemas.openxmlformats.org/officeDocument/2006/customXml" ds:itemID="{B4BE880E-F71A-4C21-A1C3-8A2437E3C677}">
   <ds:schemaRefs>
     <ds:schemaRef ds:uri="http://schemas.microsoft.com/VisualStudio/2011/storyboarding/control/v1.0"/>
   </ds:schemaRefs>
@@ -9869,6 +9849,318 @@
 </file>
 
 <file path=customXml/itemProps12.xml><?xml version="1.0" encoding="utf-8"?>
+<ds:datastoreItem xmlns:ds="http://schemas.openxmlformats.org/officeDocument/2006/customXml" ds:itemID="{AB006AED-D3B6-450F-A436-759E490055A5}">
+  <ds:schemaRefs>
+    <ds:schemaRef ds:uri="http://schemas.microsoft.com/VisualStudio/2011/storyboarding/control/v1.0"/>
+  </ds:schemaRefs>
+</ds:datastoreItem>
+</file>
+
+<file path=customXml/itemProps13.xml><?xml version="1.0" encoding="utf-8"?>
+<ds:datastoreItem xmlns:ds="http://schemas.openxmlformats.org/officeDocument/2006/customXml" ds:itemID="{359B13B5-DE77-48C2-859A-70355A1B9D90}">
+  <ds:schemaRefs>
+    <ds:schemaRef ds:uri="http://schemas.microsoft.com/VisualStudio/2011/storyboarding/control/v1.0"/>
+  </ds:schemaRefs>
+</ds:datastoreItem>
+</file>
+
+<file path=customXml/itemProps14.xml><?xml version="1.0" encoding="utf-8"?>
+<ds:datastoreItem xmlns:ds="http://schemas.openxmlformats.org/officeDocument/2006/customXml" ds:itemID="{F395D8ED-A0D3-4F6E-91F3-A29EC16A8083}">
+  <ds:schemaRefs>
+    <ds:schemaRef ds:uri="http://schemas.microsoft.com/VisualStudio/2011/storyboarding/control/v1.0"/>
+  </ds:schemaRefs>
+</ds:datastoreItem>
+</file>
+
+<file path=customXml/itemProps15.xml><?xml version="1.0" encoding="utf-8"?>
+<ds:datastoreItem xmlns:ds="http://schemas.openxmlformats.org/officeDocument/2006/customXml" ds:itemID="{156ACD54-663F-4146-A83C-D39B7758E090}">
+  <ds:schemaRefs>
+    <ds:schemaRef ds:uri="http://schemas.microsoft.com/VisualStudio/2011/storyboarding/control/v1.0"/>
+  </ds:schemaRefs>
+</ds:datastoreItem>
+</file>
+
+<file path=customXml/itemProps16.xml><?xml version="1.0" encoding="utf-8"?>
+<ds:datastoreItem xmlns:ds="http://schemas.openxmlformats.org/officeDocument/2006/customXml" ds:itemID="{CD17C18B-5B11-471F-97AA-CE2EA822BB97}">
+  <ds:schemaRefs>
+    <ds:schemaRef ds:uri="http://schemas.microsoft.com/VisualStudio/2011/storyboarding/control/v1.0"/>
+  </ds:schemaRefs>
+</ds:datastoreItem>
+</file>
+
+<file path=customXml/itemProps17.xml><?xml version="1.0" encoding="utf-8"?>
+<ds:datastoreItem xmlns:ds="http://schemas.openxmlformats.org/officeDocument/2006/customXml" ds:itemID="{BA2C55E9-BDE8-41FC-B02F-EBA8C07A01F8}">
+  <ds:schemaRefs>
+    <ds:schemaRef ds:uri="http://schemas.microsoft.com/VisualStudio/2011/storyboarding/control/v1.0"/>
+  </ds:schemaRefs>
+</ds:datastoreItem>
+</file>
+
+<file path=customXml/itemProps18.xml><?xml version="1.0" encoding="utf-8"?>
+<ds:datastoreItem xmlns:ds="http://schemas.openxmlformats.org/officeDocument/2006/customXml" ds:itemID="{E4D924B8-E923-4751-87E1-B31AA64A9F7B}">
+  <ds:schemaRefs>
+    <ds:schemaRef ds:uri="http://schemas.microsoft.com/VisualStudio/2011/storyboarding/control/v1.0"/>
+  </ds:schemaRefs>
+</ds:datastoreItem>
+</file>
+
+<file path=customXml/itemProps19.xml><?xml version="1.0" encoding="utf-8"?>
+<ds:datastoreItem xmlns:ds="http://schemas.openxmlformats.org/officeDocument/2006/customXml" ds:itemID="{0BD21A30-063A-4397-97B8-0121D45BD9D6}">
+  <ds:schemaRefs>
+    <ds:schemaRef ds:uri="http://schemas.microsoft.com/VisualStudio/2011/storyboarding/control/v1.0"/>
+  </ds:schemaRefs>
+</ds:datastoreItem>
+</file>
+
+<file path=customXml/itemProps2.xml><?xml version="1.0" encoding="utf-8"?>
+<ds:datastoreItem xmlns:ds="http://schemas.openxmlformats.org/officeDocument/2006/customXml" ds:itemID="{729DB56D-F542-4709-9AE0-E83CD92BA163}">
+  <ds:schemaRefs>
+    <ds:schemaRef ds:uri="http://schemas.microsoft.com/VisualStudio/2011/storyboarding/control/v1.0"/>
+  </ds:schemaRefs>
+</ds:datastoreItem>
+</file>
+
+<file path=customXml/itemProps20.xml><?xml version="1.0" encoding="utf-8"?>
+<ds:datastoreItem xmlns:ds="http://schemas.openxmlformats.org/officeDocument/2006/customXml" ds:itemID="{814432F2-7AE9-411E-9F7B-EBBF16C4666D}">
+  <ds:schemaRefs>
+    <ds:schemaRef ds:uri="http://schemas.microsoft.com/VisualStudio/2011/storyboarding/control/v1.0"/>
+  </ds:schemaRefs>
+</ds:datastoreItem>
+</file>
+
+<file path=customXml/itemProps21.xml><?xml version="1.0" encoding="utf-8"?>
+<ds:datastoreItem xmlns:ds="http://schemas.openxmlformats.org/officeDocument/2006/customXml" ds:itemID="{09A94271-A29B-4164-A32F-3A755C9B59FC}">
+  <ds:schemaRefs>
+    <ds:schemaRef ds:uri="http://schemas.microsoft.com/VisualStudio/2011/storyboarding/control"/>
+  </ds:schemaRefs>
+</ds:datastoreItem>
+</file>
+
+<file path=customXml/itemProps22.xml><?xml version="1.0" encoding="utf-8"?>
+<ds:datastoreItem xmlns:ds="http://schemas.openxmlformats.org/officeDocument/2006/customXml" ds:itemID="{23F8C33B-B43F-45BB-B385-DDAB00317A26}">
+  <ds:schemaRefs>
+    <ds:schemaRef ds:uri="http://schemas.microsoft.com/VisualStudio/2011/storyboarding/control"/>
+  </ds:schemaRefs>
+</ds:datastoreItem>
+</file>
+
+<file path=customXml/itemProps23.xml><?xml version="1.0" encoding="utf-8"?>
+<ds:datastoreItem xmlns:ds="http://schemas.openxmlformats.org/officeDocument/2006/customXml" ds:itemID="{B41892D7-DF8B-4D5A-8AD2-983048A35AA0}">
+  <ds:schemaRefs>
+    <ds:schemaRef ds:uri="http://schemas.microsoft.com/VisualStudio/2011/storyboarding/control/v1.0"/>
+  </ds:schemaRefs>
+</ds:datastoreItem>
+</file>
+
+<file path=customXml/itemProps24.xml><?xml version="1.0" encoding="utf-8"?>
+<ds:datastoreItem xmlns:ds="http://schemas.openxmlformats.org/officeDocument/2006/customXml" ds:itemID="{AA5E4F96-8C72-44F9-A0C5-FB007B246D91}">
+  <ds:schemaRefs>
+    <ds:schemaRef ds:uri="http://schemas.microsoft.com/VisualStudio/2011/storyboarding/control/v1.0"/>
+  </ds:schemaRefs>
+</ds:datastoreItem>
+</file>
+
+<file path=customXml/itemProps25.xml><?xml version="1.0" encoding="utf-8"?>
+<ds:datastoreItem xmlns:ds="http://schemas.openxmlformats.org/officeDocument/2006/customXml" ds:itemID="{5A5E7016-2CE6-4389-89D1-05D5203E16D0}">
+  <ds:schemaRefs>
+    <ds:schemaRef ds:uri="http://schemas.microsoft.com/VisualStudio/2011/storyboarding/control"/>
+  </ds:schemaRefs>
+</ds:datastoreItem>
+</file>
+
+<file path=customXml/itemProps26.xml><?xml version="1.0" encoding="utf-8"?>
+<ds:datastoreItem xmlns:ds="http://schemas.openxmlformats.org/officeDocument/2006/customXml" ds:itemID="{AAD6179F-00C3-44B7-9998-E9C87C4FA9EC}">
+  <ds:schemaRefs>
+    <ds:schemaRef ds:uri="http://schemas.microsoft.com/VisualStudio/2011/storyboarding/control"/>
+  </ds:schemaRefs>
+</ds:datastoreItem>
+</file>
+
+<file path=customXml/itemProps27.xml><?xml version="1.0" encoding="utf-8"?>
+<ds:datastoreItem xmlns:ds="http://schemas.openxmlformats.org/officeDocument/2006/customXml" ds:itemID="{BE267193-C1D2-4298-824E-E6BE5E6C1D22}">
+  <ds:schemaRefs>
+    <ds:schemaRef ds:uri="http://schemas.microsoft.com/VisualStudio/2011/storyboarding/control"/>
+  </ds:schemaRefs>
+</ds:datastoreItem>
+</file>
+
+<file path=customXml/itemProps28.xml><?xml version="1.0" encoding="utf-8"?>
+<ds:datastoreItem xmlns:ds="http://schemas.openxmlformats.org/officeDocument/2006/customXml" ds:itemID="{D705ACE5-FAF8-44EC-9622-845721B4A44D}">
+  <ds:schemaRefs>
+    <ds:schemaRef ds:uri="http://schemas.microsoft.com/VisualStudio/2011/storyboarding/control/v1.0"/>
+  </ds:schemaRefs>
+</ds:datastoreItem>
+</file>
+
+<file path=customXml/itemProps29.xml><?xml version="1.0" encoding="utf-8"?>
+<ds:datastoreItem xmlns:ds="http://schemas.openxmlformats.org/officeDocument/2006/customXml" ds:itemID="{574C0546-69B0-4850-A983-CDA8017CD4CE}">
+  <ds:schemaRefs>
+    <ds:schemaRef ds:uri="http://schemas.microsoft.com/VisualStudio/2011/storyboarding/control"/>
+  </ds:schemaRefs>
+</ds:datastoreItem>
+</file>
+
+<file path=customXml/itemProps3.xml><?xml version="1.0" encoding="utf-8"?>
+<ds:datastoreItem xmlns:ds="http://schemas.openxmlformats.org/officeDocument/2006/customXml" ds:itemID="{F17D5AF6-3BD9-4DFF-AE9B-2E10D3430779}">
+  <ds:schemaRefs>
+    <ds:schemaRef ds:uri="http://schemas.microsoft.com/VisualStudio/2011/storyboarding/control/v1.0"/>
+  </ds:schemaRefs>
+</ds:datastoreItem>
+</file>
+
+<file path=customXml/itemProps30.xml><?xml version="1.0" encoding="utf-8"?>
+<ds:datastoreItem xmlns:ds="http://schemas.openxmlformats.org/officeDocument/2006/customXml" ds:itemID="{A2DAA52B-5F52-4A8E-B601-7BF162CD738F}">
+  <ds:schemaRefs>
+    <ds:schemaRef ds:uri="http://schemas.microsoft.com/VisualStudio/2011/storyboarding/control/v1.0"/>
+  </ds:schemaRefs>
+</ds:datastoreItem>
+</file>
+
+<file path=customXml/itemProps31.xml><?xml version="1.0" encoding="utf-8"?>
+<ds:datastoreItem xmlns:ds="http://schemas.openxmlformats.org/officeDocument/2006/customXml" ds:itemID="{B571350C-23C3-4B5A-8F49-FBEB6CF22964}">
+  <ds:schemaRefs>
+    <ds:schemaRef ds:uri="http://schemas.microsoft.com/VisualStudio/2011/storyboarding/control/v1.0"/>
+  </ds:schemaRefs>
+</ds:datastoreItem>
+</file>
+
+<file path=customXml/itemProps32.xml><?xml version="1.0" encoding="utf-8"?>
+<ds:datastoreItem xmlns:ds="http://schemas.openxmlformats.org/officeDocument/2006/customXml" ds:itemID="{A6ECB6E0-BD84-4681-8699-56A1B3F36A60}">
+  <ds:schemaRefs>
+    <ds:schemaRef ds:uri="http://schemas.microsoft.com/VisualStudio/2011/storyboarding/control"/>
+  </ds:schemaRefs>
+</ds:datastoreItem>
+</file>
+
+<file path=customXml/itemProps33.xml><?xml version="1.0" encoding="utf-8"?>
+<ds:datastoreItem xmlns:ds="http://schemas.openxmlformats.org/officeDocument/2006/customXml" ds:itemID="{9C4C7B07-3AE3-46A1-A54D-2BDFAB93A8EF}">
+  <ds:schemaRefs>
+    <ds:schemaRef ds:uri="http://schemas.microsoft.com/VisualStudio/2011/storyboarding/control/v1.0"/>
+  </ds:schemaRefs>
+</ds:datastoreItem>
+</file>
+
+<file path=customXml/itemProps34.xml><?xml version="1.0" encoding="utf-8"?>
+<ds:datastoreItem xmlns:ds="http://schemas.openxmlformats.org/officeDocument/2006/customXml" ds:itemID="{4EE14C2A-AD9F-4617-A8CC-4057921BFCA8}">
+  <ds:schemaRefs>
+    <ds:schemaRef ds:uri="http://schemas.microsoft.com/VisualStudio/2011/storyboarding/control/v1.0"/>
+  </ds:schemaRefs>
+</ds:datastoreItem>
+</file>
+
+<file path=customXml/itemProps35.xml><?xml version="1.0" encoding="utf-8"?>
+<ds:datastoreItem xmlns:ds="http://schemas.openxmlformats.org/officeDocument/2006/customXml" ds:itemID="{416D00B5-FBFE-483F-BE84-520287240459}">
+  <ds:schemaRefs>
+    <ds:schemaRef ds:uri="http://schemas.microsoft.com/VisualStudio/2011/storyboarding/control/v1.0"/>
+  </ds:schemaRefs>
+</ds:datastoreItem>
+</file>
+
+<file path=customXml/itemProps36.xml><?xml version="1.0" encoding="utf-8"?>
+<ds:datastoreItem xmlns:ds="http://schemas.openxmlformats.org/officeDocument/2006/customXml" ds:itemID="{5E2E8CE4-298D-499A-B8B4-4A593AC844A5}">
+  <ds:schemaRefs>
+    <ds:schemaRef ds:uri="http://schemas.microsoft.com/VisualStudio/2011/storyboarding/control/v1.0"/>
+  </ds:schemaRefs>
+</ds:datastoreItem>
+</file>
+
+<file path=customXml/itemProps37.xml><?xml version="1.0" encoding="utf-8"?>
+<ds:datastoreItem xmlns:ds="http://schemas.openxmlformats.org/officeDocument/2006/customXml" ds:itemID="{B2C9D19C-4878-43E0-A5AD-CB76AB49D960}">
+  <ds:schemaRefs>
+    <ds:schemaRef ds:uri="http://schemas.microsoft.com/VisualStudio/2011/storyboarding/control/v1.0"/>
+  </ds:schemaRefs>
+</ds:datastoreItem>
+</file>
+
+<file path=customXml/itemProps38.xml><?xml version="1.0" encoding="utf-8"?>
+<ds:datastoreItem xmlns:ds="http://schemas.openxmlformats.org/officeDocument/2006/customXml" ds:itemID="{6574190A-3D9E-42C1-B276-38E33156AA99}">
+  <ds:schemaRefs>
+    <ds:schemaRef ds:uri="http://schemas.microsoft.com/VisualStudio/2011/storyboarding/control/v1.0"/>
+  </ds:schemaRefs>
+</ds:datastoreItem>
+</file>
+
+<file path=customXml/itemProps39.xml><?xml version="1.0" encoding="utf-8"?>
+<ds:datastoreItem xmlns:ds="http://schemas.openxmlformats.org/officeDocument/2006/customXml" ds:itemID="{F7F9CBAC-60B8-4800-9EA1-9BB1523CD9B4}">
+  <ds:schemaRefs>
+    <ds:schemaRef ds:uri="http://schemas.microsoft.com/VisualStudio/2011/storyboarding/control"/>
+  </ds:schemaRefs>
+</ds:datastoreItem>
+</file>
+
+<file path=customXml/itemProps4.xml><?xml version="1.0" encoding="utf-8"?>
+<ds:datastoreItem xmlns:ds="http://schemas.openxmlformats.org/officeDocument/2006/customXml" ds:itemID="{4BCB20A2-9850-49DA-9BD6-A5D2B0ABF72F}">
+  <ds:schemaRefs>
+    <ds:schemaRef ds:uri="http://schemas.microsoft.com/VisualStudio/2011/storyboarding/control/v1.0"/>
+  </ds:schemaRefs>
+</ds:datastoreItem>
+</file>
+
+<file path=customXml/itemProps40.xml><?xml version="1.0" encoding="utf-8"?>
+<ds:datastoreItem xmlns:ds="http://schemas.openxmlformats.org/officeDocument/2006/customXml" ds:itemID="{B7BD4F34-B154-4D92-BE87-C557EB1B7EFB}">
+  <ds:schemaRefs>
+    <ds:schemaRef ds:uri="http://schemas.microsoft.com/sharepoint/v3/contenttype/forms"/>
+  </ds:schemaRefs>
+</ds:datastoreItem>
+</file>
+
+<file path=customXml/itemProps41.xml><?xml version="1.0" encoding="utf-8"?>
+<ds:datastoreItem xmlns:ds="http://schemas.openxmlformats.org/officeDocument/2006/customXml" ds:itemID="{7C4FADB9-82C5-46C4-AD0E-6B60B5C6AEAE}">
+  <ds:schemaRefs>
+    <ds:schemaRef ds:uri="http://schemas.microsoft.com/VisualStudio/2011/storyboarding/control/v1.0"/>
+  </ds:schemaRefs>
+</ds:datastoreItem>
+</file>
+
+<file path=customXml/itemProps42.xml><?xml version="1.0" encoding="utf-8"?>
+<ds:datastoreItem xmlns:ds="http://schemas.openxmlformats.org/officeDocument/2006/customXml" ds:itemID="{B0DBD337-FDC5-4C36-BF85-C09756391AA1}">
+  <ds:schemaRefs>
+    <ds:schemaRef ds:uri="http://schemas.microsoft.com/VisualStudio/2011/storyboarding/control/v1.0"/>
+  </ds:schemaRefs>
+</ds:datastoreItem>
+</file>
+
+<file path=customXml/itemProps43.xml><?xml version="1.0" encoding="utf-8"?>
+<ds:datastoreItem xmlns:ds="http://schemas.openxmlformats.org/officeDocument/2006/customXml" ds:itemID="{029B11DB-B00D-4F9B-8DF3-D898C360902E}">
+  <ds:schemaRefs>
+    <ds:schemaRef ds:uri="http://schemas.microsoft.com/VisualStudio/2011/storyboarding/control"/>
+  </ds:schemaRefs>
+</ds:datastoreItem>
+</file>
+
+<file path=customXml/itemProps44.xml><?xml version="1.0" encoding="utf-8"?>
+<ds:datastoreItem xmlns:ds="http://schemas.openxmlformats.org/officeDocument/2006/customXml" ds:itemID="{1C7B3C9E-48C2-496C-AAF2-5C37AB663973}">
+  <ds:schemaRefs>
+    <ds:schemaRef ds:uri="http://schemas.microsoft.com/VisualStudio/2011/storyboarding/control"/>
+  </ds:schemaRefs>
+</ds:datastoreItem>
+</file>
+
+<file path=customXml/itemProps45.xml><?xml version="1.0" encoding="utf-8"?>
+<ds:datastoreItem xmlns:ds="http://schemas.openxmlformats.org/officeDocument/2006/customXml" ds:itemID="{2C0B842B-A6BD-4438-89CC-C23BD0A85ECD}">
+  <ds:schemaRefs>
+    <ds:schemaRef ds:uri="http://schemas.microsoft.com/VisualStudio/2011/storyboarding/control"/>
+  </ds:schemaRefs>
+</ds:datastoreItem>
+</file>
+
+<file path=customXml/itemProps46.xml><?xml version="1.0" encoding="utf-8"?>
+<ds:datastoreItem xmlns:ds="http://schemas.openxmlformats.org/officeDocument/2006/customXml" ds:itemID="{1325FCED-59E4-4A0E-AB40-72EC19C3A651}">
+  <ds:schemaRefs>
+    <ds:schemaRef ds:uri="http://schemas.microsoft.com/VisualStudio/2011/storyboarding/control"/>
+  </ds:schemaRefs>
+</ds:datastoreItem>
+</file>
+
+<file path=customXml/itemProps47.xml><?xml version="1.0" encoding="utf-8"?>
+<ds:datastoreItem xmlns:ds="http://schemas.openxmlformats.org/officeDocument/2006/customXml" ds:itemID="{AD9C1405-6371-400D-A0E2-389A1557BE20}">
+  <ds:schemaRefs>
+    <ds:schemaRef ds:uri="http://schemas.microsoft.com/VisualStudio/2011/storyboarding/control/v1.0"/>
+  </ds:schemaRefs>
+</ds:datastoreItem>
+</file>
+
+<file path=customXml/itemProps48.xml><?xml version="1.0" encoding="utf-8"?>
 <ds:datastoreItem xmlns:ds="http://schemas.openxmlformats.org/officeDocument/2006/customXml" ds:itemID="{C1E8400F-CB83-4A16-AF3D-36FAF22BDD23}">
   <ds:schemaRefs>
     <ds:schemaRef ds:uri="http://schemas.microsoft.com/VisualStudio/2011/storyboarding/control/v1.0"/>
@@ -9876,39 +10168,7 @@
 </ds:datastoreItem>
 </file>
 
-<file path=customXml/itemProps13.xml><?xml version="1.0" encoding="utf-8"?>
-<ds:datastoreItem xmlns:ds="http://schemas.openxmlformats.org/officeDocument/2006/customXml" ds:itemID="{CB953D38-E965-4BB2-94FE-DF647E85A654}">
-  <ds:schemaRefs>
-    <ds:schemaRef ds:uri="http://schemas.microsoft.com/VisualStudio/2011/storyboarding/control/v1.0"/>
-  </ds:schemaRefs>
-</ds:datastoreItem>
-</file>
-
-<file path=customXml/itemProps14.xml><?xml version="1.0" encoding="utf-8"?>
-<ds:datastoreItem xmlns:ds="http://schemas.openxmlformats.org/officeDocument/2006/customXml" ds:itemID="{574C0546-69B0-4850-A983-CDA8017CD4CE}">
-  <ds:schemaRefs>
-    <ds:schemaRef ds:uri="http://schemas.microsoft.com/VisualStudio/2011/storyboarding/control"/>
-  </ds:schemaRefs>
-</ds:datastoreItem>
-</file>
-
-<file path=customXml/itemProps15.xml><?xml version="1.0" encoding="utf-8"?>
-<ds:datastoreItem xmlns:ds="http://schemas.openxmlformats.org/officeDocument/2006/customXml" ds:itemID="{D356E6DB-54C9-4389-B932-0F583366BD4B}">
-  <ds:schemaRefs>
-    <ds:schemaRef ds:uri="http://schemas.microsoft.com/VisualStudio/2011/storyboarding/control/v1.0"/>
-  </ds:schemaRefs>
-</ds:datastoreItem>
-</file>
-
-<file path=customXml/itemProps16.xml><?xml version="1.0" encoding="utf-8"?>
-<ds:datastoreItem xmlns:ds="http://schemas.openxmlformats.org/officeDocument/2006/customXml" ds:itemID="{3C6220BE-0F2A-49C6-BFB2-C458479F3F62}">
-  <ds:schemaRefs>
-    <ds:schemaRef ds:uri="http://schemas.microsoft.com/VisualStudio/2011/storyboarding/control/v1.0"/>
-  </ds:schemaRefs>
-</ds:datastoreItem>
-</file>
-
-<file path=customXml/itemProps17.xml><?xml version="1.0" encoding="utf-8"?>
+<file path=customXml/itemProps49.xml><?xml version="1.0" encoding="utf-8"?>
 <ds:datastoreItem xmlns:ds="http://schemas.openxmlformats.org/officeDocument/2006/customXml" ds:itemID="{5423C7C4-EE26-4ED2-9F11-C9ABAA081BA5}">
   <ds:schemaRefs>
     <ds:schemaRef ds:uri="http://schemas.microsoft.com/VisualStudio/2011/storyboarding/control/v1.0"/>
@@ -9916,71 +10176,15 @@
 </ds:datastoreItem>
 </file>
 
-<file path=customXml/itemProps18.xml><?xml version="1.0" encoding="utf-8"?>
-<ds:datastoreItem xmlns:ds="http://schemas.openxmlformats.org/officeDocument/2006/customXml" ds:itemID="{E4A0845B-41B6-4256-8FB3-E31EA581BF55}">
+<file path=customXml/itemProps5.xml><?xml version="1.0" encoding="utf-8"?>
+<ds:datastoreItem xmlns:ds="http://schemas.openxmlformats.org/officeDocument/2006/customXml" ds:itemID="{CC419530-796D-4DBE-BBEE-9A6630A896E1}">
   <ds:schemaRefs>
     <ds:schemaRef ds:uri="http://schemas.microsoft.com/VisualStudio/2011/storyboarding/control/v1.0"/>
   </ds:schemaRefs>
 </ds:datastoreItem>
 </file>
 
-<file path=customXml/itemProps19.xml><?xml version="1.0" encoding="utf-8"?>
-<ds:datastoreItem xmlns:ds="http://schemas.openxmlformats.org/officeDocument/2006/customXml" ds:itemID="{D705ACE5-FAF8-44EC-9622-845721B4A44D}">
-  <ds:schemaRefs>
-    <ds:schemaRef ds:uri="http://schemas.microsoft.com/VisualStudio/2011/storyboarding/control/v1.0"/>
-  </ds:schemaRefs>
-</ds:datastoreItem>
-</file>
-
-<file path=customXml/itemProps2.xml><?xml version="1.0" encoding="utf-8"?>
-<ds:datastoreItem xmlns:ds="http://schemas.openxmlformats.org/officeDocument/2006/customXml" ds:itemID="{699689A1-427B-4DEA-8FDB-0058CB4B38D8}">
-  <ds:schemaRefs>
-    <ds:schemaRef ds:uri="http://schemas.microsoft.com/VisualStudio/2011/storyboarding/control/v1.0"/>
-  </ds:schemaRefs>
-</ds:datastoreItem>
-</file>
-
-<file path=customXml/itemProps20.xml><?xml version="1.0" encoding="utf-8"?>
-<ds:datastoreItem xmlns:ds="http://schemas.openxmlformats.org/officeDocument/2006/customXml" ds:itemID="{A84BE01C-E91B-4A90-8E7F-25887EF8E061}">
-  <ds:schemaRefs>
-    <ds:schemaRef ds:uri="http://schemas.microsoft.com/VisualStudio/2011/storyboarding/control/v1.0"/>
-  </ds:schemaRefs>
-</ds:datastoreItem>
-</file>
-
-<file path=customXml/itemProps21.xml><?xml version="1.0" encoding="utf-8"?>
-<ds:datastoreItem xmlns:ds="http://schemas.openxmlformats.org/officeDocument/2006/customXml" ds:itemID="{70C23831-7801-40F8-9A53-4E9925562CBE}">
-  <ds:schemaRefs>
-    <ds:schemaRef ds:uri="http://schemas.microsoft.com/VisualStudio/2011/storyboarding/control"/>
-  </ds:schemaRefs>
-</ds:datastoreItem>
-</file>
-
-<file path=customXml/itemProps22.xml><?xml version="1.0" encoding="utf-8"?>
-<ds:datastoreItem xmlns:ds="http://schemas.openxmlformats.org/officeDocument/2006/customXml" ds:itemID="{A2DAA52B-5F52-4A8E-B601-7BF162CD738F}">
-  <ds:schemaRefs>
-    <ds:schemaRef ds:uri="http://schemas.microsoft.com/VisualStudio/2011/storyboarding/control/v1.0"/>
-  </ds:schemaRefs>
-</ds:datastoreItem>
-</file>
-
-<file path=customXml/itemProps23.xml><?xml version="1.0" encoding="utf-8"?>
-<ds:datastoreItem xmlns:ds="http://schemas.openxmlformats.org/officeDocument/2006/customXml" ds:itemID="{253B000D-0B23-420C-B5B5-11B6002E5391}">
-  <ds:schemaRefs>
-    <ds:schemaRef ds:uri="http://schemas.microsoft.com/VisualStudio/2011/storyboarding/control/v1.0"/>
-  </ds:schemaRefs>
-</ds:datastoreItem>
-</file>
-
-<file path=customXml/itemProps24.xml><?xml version="1.0" encoding="utf-8"?>
-<ds:datastoreItem xmlns:ds="http://schemas.openxmlformats.org/officeDocument/2006/customXml" ds:itemID="{AB006AED-D3B6-450F-A436-759E490055A5}">
-  <ds:schemaRefs>
-    <ds:schemaRef ds:uri="http://schemas.microsoft.com/VisualStudio/2011/storyboarding/control/v1.0"/>
-  </ds:schemaRefs>
-</ds:datastoreItem>
-</file>
-
-<file path=customXml/itemProps25.xml><?xml version="1.0" encoding="utf-8"?>
+<file path=customXml/itemProps50.xml><?xml version="1.0" encoding="utf-8"?>
 <ds:datastoreItem xmlns:ds="http://schemas.openxmlformats.org/officeDocument/2006/customXml" ds:itemID="{08904217-40E1-4558-95D8-8D709CA82866}">
   <ds:schemaRefs>
     <ds:schemaRef ds:uri="http://schemas.microsoft.com/VisualStudio/2011/storyboarding/control/v1.0"/>
@@ -9988,71 +10192,7 @@
 </ds:datastoreItem>
 </file>
 
-<file path=customXml/itemProps26.xml><?xml version="1.0" encoding="utf-8"?>
-<ds:datastoreItem xmlns:ds="http://schemas.openxmlformats.org/officeDocument/2006/customXml" ds:itemID="{C4783010-23AB-4BDC-BABF-F6576658A2B0}">
-  <ds:schemaRefs>
-    <ds:schemaRef ds:uri="http://schemas.microsoft.com/VisualStudio/2011/storyboarding/control/v1.0"/>
-  </ds:schemaRefs>
-</ds:datastoreItem>
-</file>
-
-<file path=customXml/itemProps27.xml><?xml version="1.0" encoding="utf-8"?>
-<ds:datastoreItem xmlns:ds="http://schemas.openxmlformats.org/officeDocument/2006/customXml" ds:itemID="{B571350C-23C3-4B5A-8F49-FBEB6CF22964}">
-  <ds:schemaRefs>
-    <ds:schemaRef ds:uri="http://schemas.microsoft.com/VisualStudio/2011/storyboarding/control/v1.0"/>
-  </ds:schemaRefs>
-</ds:datastoreItem>
-</file>
-
-<file path=customXml/itemProps28.xml><?xml version="1.0" encoding="utf-8"?>
-<ds:datastoreItem xmlns:ds="http://schemas.openxmlformats.org/officeDocument/2006/customXml" ds:itemID="{19CB1DF2-8822-4520-A56A-045D340F0C71}">
-  <ds:schemaRefs>
-    <ds:schemaRef ds:uri="http://schemas.microsoft.com/VisualStudio/2011/storyboarding/control/v1.0"/>
-  </ds:schemaRefs>
-</ds:datastoreItem>
-</file>
-
-<file path=customXml/itemProps29.xml><?xml version="1.0" encoding="utf-8"?>
-<ds:datastoreItem xmlns:ds="http://schemas.openxmlformats.org/officeDocument/2006/customXml" ds:itemID="{B4BE880E-F71A-4C21-A1C3-8A2437E3C677}">
-  <ds:schemaRefs>
-    <ds:schemaRef ds:uri="http://schemas.microsoft.com/VisualStudio/2011/storyboarding/control/v1.0"/>
-  </ds:schemaRefs>
-</ds:datastoreItem>
-</file>
-
-<file path=customXml/itemProps3.xml><?xml version="1.0" encoding="utf-8"?>
-<ds:datastoreItem xmlns:ds="http://schemas.openxmlformats.org/officeDocument/2006/customXml" ds:itemID="{AD9C1405-6371-400D-A0E2-389A1557BE20}">
-  <ds:schemaRefs>
-    <ds:schemaRef ds:uri="http://schemas.microsoft.com/VisualStudio/2011/storyboarding/control/v1.0"/>
-  </ds:schemaRefs>
-</ds:datastoreItem>
-</file>
-
-<file path=customXml/itemProps30.xml><?xml version="1.0" encoding="utf-8"?>
-<ds:datastoreItem xmlns:ds="http://schemas.openxmlformats.org/officeDocument/2006/customXml" ds:itemID="{A6ECB6E0-BD84-4681-8699-56A1B3F36A60}">
-  <ds:schemaRefs>
-    <ds:schemaRef ds:uri="http://schemas.microsoft.com/VisualStudio/2011/storyboarding/control"/>
-  </ds:schemaRefs>
-</ds:datastoreItem>
-</file>
-
-<file path=customXml/itemProps31.xml><?xml version="1.0" encoding="utf-8"?>
-<ds:datastoreItem xmlns:ds="http://schemas.openxmlformats.org/officeDocument/2006/customXml" ds:itemID="{39536A02-E179-4A1C-9FA7-86EF40631969}">
-  <ds:schemaRefs>
-    <ds:schemaRef ds:uri="http://schemas.microsoft.com/VisualStudio/2011/storyboarding/control/v1.0"/>
-  </ds:schemaRefs>
-</ds:datastoreItem>
-</file>
-
-<file path=customXml/itemProps32.xml><?xml version="1.0" encoding="utf-8"?>
-<ds:datastoreItem xmlns:ds="http://schemas.openxmlformats.org/officeDocument/2006/customXml" ds:itemID="{359B13B5-DE77-48C2-859A-70355A1B9D90}">
-  <ds:schemaRefs>
-    <ds:schemaRef ds:uri="http://schemas.microsoft.com/VisualStudio/2011/storyboarding/control/v1.0"/>
-  </ds:schemaRefs>
-</ds:datastoreItem>
-</file>
-
-<file path=customXml/itemProps33.xml><?xml version="1.0" encoding="utf-8"?>
+<file path=customXml/itemProps51.xml><?xml version="1.0" encoding="utf-8"?>
 <ds:datastoreItem xmlns:ds="http://schemas.openxmlformats.org/officeDocument/2006/customXml" ds:itemID="{E2EFB470-892C-4F70-98FA-B53F970592A9}">
   <ds:schemaRefs>
     <ds:schemaRef ds:uri="http://schemas.microsoft.com/VisualStudio/2011/storyboarding/control"/>
@@ -10060,39 +10200,7 @@
 </ds:datastoreItem>
 </file>
 
-<file path=customXml/itemProps34.xml><?xml version="1.0" encoding="utf-8"?>
-<ds:datastoreItem xmlns:ds="http://schemas.openxmlformats.org/officeDocument/2006/customXml" ds:itemID="{EDE713BE-A567-491C-902D-E6087D824056}">
-  <ds:schemaRefs>
-    <ds:schemaRef ds:uri="http://schemas.microsoft.com/VisualStudio/2011/storyboarding/control/v1.0"/>
-  </ds:schemaRefs>
-</ds:datastoreItem>
-</file>
-
-<file path=customXml/itemProps35.xml><?xml version="1.0" encoding="utf-8"?>
-<ds:datastoreItem xmlns:ds="http://schemas.openxmlformats.org/officeDocument/2006/customXml" ds:itemID="{9C4C7B07-3AE3-46A1-A54D-2BDFAB93A8EF}">
-  <ds:schemaRefs>
-    <ds:schemaRef ds:uri="http://schemas.microsoft.com/VisualStudio/2011/storyboarding/control/v1.0"/>
-  </ds:schemaRefs>
-</ds:datastoreItem>
-</file>
-
-<file path=customXml/itemProps36.xml><?xml version="1.0" encoding="utf-8"?>
-<ds:datastoreItem xmlns:ds="http://schemas.openxmlformats.org/officeDocument/2006/customXml" ds:itemID="{E2968586-6EB5-4B3C-A2E1-82E35F695B75}">
-  <ds:schemaRefs>
-    <ds:schemaRef ds:uri="http://schemas.microsoft.com/VisualStudio/2011/storyboarding/control/v1.0"/>
-  </ds:schemaRefs>
-</ds:datastoreItem>
-</file>
-
-<file path=customXml/itemProps37.xml><?xml version="1.0" encoding="utf-8"?>
-<ds:datastoreItem xmlns:ds="http://schemas.openxmlformats.org/officeDocument/2006/customXml" ds:itemID="{F395D8ED-A0D3-4F6E-91F3-A29EC16A8083}">
-  <ds:schemaRefs>
-    <ds:schemaRef ds:uri="http://schemas.microsoft.com/VisualStudio/2011/storyboarding/control/v1.0"/>
-  </ds:schemaRefs>
-</ds:datastoreItem>
-</file>
-
-<file path=customXml/itemProps38.xml><?xml version="1.0" encoding="utf-8"?>
+<file path=customXml/itemProps52.xml><?xml version="1.0" encoding="utf-8"?>
 <ds:datastoreItem xmlns:ds="http://schemas.openxmlformats.org/officeDocument/2006/customXml" ds:itemID="{6772C88A-36A0-4EAC-86A3-BB16EEADAB3E}">
   <ds:schemaRefs>
     <ds:schemaRef ds:uri="http://schemas.microsoft.com/VisualStudio/2011/storyboarding/control/v1.0"/>
@@ -10100,71 +10208,7 @@
 </ds:datastoreItem>
 </file>
 
-<file path=customXml/itemProps39.xml><?xml version="1.0" encoding="utf-8"?>
-<ds:datastoreItem xmlns:ds="http://schemas.openxmlformats.org/officeDocument/2006/customXml" ds:itemID="{DDEEC505-9111-44CE-9DED-8A454ABEC272}">
-  <ds:schemaRefs>
-    <ds:schemaRef ds:uri="http://schemas.microsoft.com/VisualStudio/2011/storyboarding/control/v1.0"/>
-  </ds:schemaRefs>
-</ds:datastoreItem>
-</file>
-
-<file path=customXml/itemProps4.xml><?xml version="1.0" encoding="utf-8"?>
-<ds:datastoreItem xmlns:ds="http://schemas.openxmlformats.org/officeDocument/2006/customXml" ds:itemID="{20EE139D-44C7-4192-A8B7-E25390148E28}">
-  <ds:schemaRefs>
-    <ds:schemaRef ds:uri="http://schemas.microsoft.com/VisualStudio/2011/storyboarding/control/v1.0"/>
-  </ds:schemaRefs>
-</ds:datastoreItem>
-</file>
-
-<file path=customXml/itemProps40.xml><?xml version="1.0" encoding="utf-8"?>
-<ds:datastoreItem xmlns:ds="http://schemas.openxmlformats.org/officeDocument/2006/customXml" ds:itemID="{156ACD54-663F-4146-A83C-D39B7758E090}">
-  <ds:schemaRefs>
-    <ds:schemaRef ds:uri="http://schemas.microsoft.com/VisualStudio/2011/storyboarding/control/v1.0"/>
-  </ds:schemaRefs>
-</ds:datastoreItem>
-</file>
-
-<file path=customXml/itemProps41.xml><?xml version="1.0" encoding="utf-8"?>
-<ds:datastoreItem xmlns:ds="http://schemas.openxmlformats.org/officeDocument/2006/customXml" ds:itemID="{188F6680-9EB8-4B03-8D3B-773D66FC777A}">
-  <ds:schemaRefs>
-    <ds:schemaRef ds:uri="http://schemas.microsoft.com/VisualStudio/2011/storyboarding/control/v1.0"/>
-  </ds:schemaRefs>
-</ds:datastoreItem>
-</file>
-
-<file path=customXml/itemProps42.xml><?xml version="1.0" encoding="utf-8"?>
-<ds:datastoreItem xmlns:ds="http://schemas.openxmlformats.org/officeDocument/2006/customXml" ds:itemID="{729DB56D-F542-4709-9AE0-E83CD92BA163}">
-  <ds:schemaRefs>
-    <ds:schemaRef ds:uri="http://schemas.microsoft.com/VisualStudio/2011/storyboarding/control/v1.0"/>
-  </ds:schemaRefs>
-</ds:datastoreItem>
-</file>
-
-<file path=customXml/itemProps43.xml><?xml version="1.0" encoding="utf-8"?>
-<ds:datastoreItem xmlns:ds="http://schemas.openxmlformats.org/officeDocument/2006/customXml" ds:itemID="{4EE14C2A-AD9F-4617-A8CC-4057921BFCA8}">
-  <ds:schemaRefs>
-    <ds:schemaRef ds:uri="http://schemas.microsoft.com/VisualStudio/2011/storyboarding/control/v1.0"/>
-  </ds:schemaRefs>
-</ds:datastoreItem>
-</file>
-
-<file path=customXml/itemProps44.xml><?xml version="1.0" encoding="utf-8"?>
-<ds:datastoreItem xmlns:ds="http://schemas.openxmlformats.org/officeDocument/2006/customXml" ds:itemID="{16772130-8F5D-442B-AA11-39D4F229ACC6}">
-  <ds:schemaRefs>
-    <ds:schemaRef ds:uri="http://schemas.microsoft.com/VisualStudio/2011/storyboarding/control/v1.0"/>
-  </ds:schemaRefs>
-</ds:datastoreItem>
-</file>
-
-<file path=customXml/itemProps45.xml><?xml version="1.0" encoding="utf-8"?>
-<ds:datastoreItem xmlns:ds="http://schemas.openxmlformats.org/officeDocument/2006/customXml" ds:itemID="{CD17C18B-5B11-471F-97AA-CE2EA822BB97}">
-  <ds:schemaRefs>
-    <ds:schemaRef ds:uri="http://schemas.microsoft.com/VisualStudio/2011/storyboarding/control/v1.0"/>
-  </ds:schemaRefs>
-</ds:datastoreItem>
-</file>
-
-<file path=customXml/itemProps46.xml><?xml version="1.0" encoding="utf-8"?>
+<file path=customXml/itemProps53.xml><?xml version="1.0" encoding="utf-8"?>
 <ds:datastoreItem xmlns:ds="http://schemas.openxmlformats.org/officeDocument/2006/customXml" ds:itemID="{2FEB3A16-E640-4049-92BF-229BF3B54149}">
   <ds:schemaRefs>
     <ds:schemaRef ds:uri="http://schemas.microsoft.com/office/2006/metadata/contentType"/>
@@ -10182,23 +10226,167 @@
 </ds:datastoreItem>
 </file>
 
-<file path=customXml/itemProps47.xml><?xml version="1.0" encoding="utf-8"?>
-<ds:datastoreItem xmlns:ds="http://schemas.openxmlformats.org/officeDocument/2006/customXml" ds:itemID="{F17D5AF6-3BD9-4DFF-AE9B-2E10D3430779}">
+<file path=customXml/itemProps54.xml><?xml version="1.0" encoding="utf-8"?>
+<ds:datastoreItem xmlns:ds="http://schemas.openxmlformats.org/officeDocument/2006/customXml" ds:itemID="{2B6243A2-99B5-42ED-B049-93E27D774527}">
   <ds:schemaRefs>
     <ds:schemaRef ds:uri="http://schemas.microsoft.com/VisualStudio/2011/storyboarding/control/v1.0"/>
   </ds:schemaRefs>
 </ds:datastoreItem>
 </file>
 
-<file path=customXml/itemProps48.xml><?xml version="1.0" encoding="utf-8"?>
-<ds:datastoreItem xmlns:ds="http://schemas.openxmlformats.org/officeDocument/2006/customXml" ds:itemID="{416D00B5-FBFE-483F-BE84-520287240459}">
+<file path=customXml/itemProps55.xml><?xml version="1.0" encoding="utf-8"?>
+<ds:datastoreItem xmlns:ds="http://schemas.openxmlformats.org/officeDocument/2006/customXml" ds:itemID="{53BC856C-B486-437D-A7B4-612AE9417D7A}">
   <ds:schemaRefs>
     <ds:schemaRef ds:uri="http://schemas.microsoft.com/VisualStudio/2011/storyboarding/control/v1.0"/>
   </ds:schemaRefs>
 </ds:datastoreItem>
 </file>
 
-<file path=customXml/itemProps49.xml><?xml version="1.0" encoding="utf-8"?>
+<file path=customXml/itemProps56.xml><?xml version="1.0" encoding="utf-8"?>
+<ds:datastoreItem xmlns:ds="http://schemas.openxmlformats.org/officeDocument/2006/customXml" ds:itemID="{A84BE01C-E91B-4A90-8E7F-25887EF8E061}">
+  <ds:schemaRefs>
+    <ds:schemaRef ds:uri="http://schemas.microsoft.com/VisualStudio/2011/storyboarding/control/v1.0"/>
+  </ds:schemaRefs>
+</ds:datastoreItem>
+</file>
+
+<file path=customXml/itemProps57.xml><?xml version="1.0" encoding="utf-8"?>
+<ds:datastoreItem xmlns:ds="http://schemas.openxmlformats.org/officeDocument/2006/customXml" ds:itemID="{188F6680-9EB8-4B03-8D3B-773D66FC777A}">
+  <ds:schemaRefs>
+    <ds:schemaRef ds:uri="http://schemas.microsoft.com/VisualStudio/2011/storyboarding/control/v1.0"/>
+  </ds:schemaRefs>
+</ds:datastoreItem>
+</file>
+
+<file path=customXml/itemProps58.xml><?xml version="1.0" encoding="utf-8"?>
+<ds:datastoreItem xmlns:ds="http://schemas.openxmlformats.org/officeDocument/2006/customXml" ds:itemID="{6B22741B-5AC6-4A2C-A57A-E4BDF22E0A90}">
+  <ds:schemaRefs>
+    <ds:schemaRef ds:uri="http://schemas.microsoft.com/VisualStudio/2011/storyboarding/control/v1.0"/>
+  </ds:schemaRefs>
+</ds:datastoreItem>
+</file>
+
+<file path=customXml/itemProps59.xml><?xml version="1.0" encoding="utf-8"?>
+<ds:datastoreItem xmlns:ds="http://schemas.openxmlformats.org/officeDocument/2006/customXml" ds:itemID="{07B11A95-7731-4379-9E1B-32BC87FA2B56}">
+  <ds:schemaRefs>
+    <ds:schemaRef ds:uri="http://schemas.microsoft.com/VisualStudio/2011/storyboarding/control/v1.0"/>
+  </ds:schemaRefs>
+</ds:datastoreItem>
+</file>
+
+<file path=customXml/itemProps6.xml><?xml version="1.0" encoding="utf-8"?>
+<ds:datastoreItem xmlns:ds="http://schemas.openxmlformats.org/officeDocument/2006/customXml" ds:itemID="{5F81420E-DDF3-4689-9969-42E66499CA3E}">
+  <ds:schemaRefs>
+    <ds:schemaRef ds:uri="http://schemas.microsoft.com/VisualStudio/2011/storyboarding/control"/>
+  </ds:schemaRefs>
+</ds:datastoreItem>
+</file>
+
+<file path=customXml/itemProps60.xml><?xml version="1.0" encoding="utf-8"?>
+<ds:datastoreItem xmlns:ds="http://schemas.openxmlformats.org/officeDocument/2006/customXml" ds:itemID="{D8E0912A-795B-4916-9114-34B4F28A0EE3}">
+  <ds:schemaRefs>
+    <ds:schemaRef ds:uri="http://schemas.microsoft.com/VisualStudio/2011/storyboarding/control/v1.0"/>
+  </ds:schemaRefs>
+</ds:datastoreItem>
+</file>
+
+<file path=customXml/itemProps61.xml><?xml version="1.0" encoding="utf-8"?>
+<ds:datastoreItem xmlns:ds="http://schemas.openxmlformats.org/officeDocument/2006/customXml" ds:itemID="{036B989D-7053-42E0-85AB-8864B824736A}">
+  <ds:schemaRefs>
+    <ds:schemaRef ds:uri="http://schemas.microsoft.com/VisualStudio/2011/storyboarding/control"/>
+  </ds:schemaRefs>
+</ds:datastoreItem>
+</file>
+
+<file path=customXml/itemProps62.xml><?xml version="1.0" encoding="utf-8"?>
+<ds:datastoreItem xmlns:ds="http://schemas.openxmlformats.org/officeDocument/2006/customXml" ds:itemID="{B8C6D4DD-FC58-4C97-B28B-C1F0B6B80EE0}">
+  <ds:schemaRefs>
+    <ds:schemaRef ds:uri="http://schemas.microsoft.com/VisualStudio/2011/storyboarding/control"/>
+  </ds:schemaRefs>
+</ds:datastoreItem>
+</file>
+
+<file path=customXml/itemProps63.xml><?xml version="1.0" encoding="utf-8"?>
+<ds:datastoreItem xmlns:ds="http://schemas.openxmlformats.org/officeDocument/2006/customXml" ds:itemID="{CA0F2729-8F0E-4601-8BBB-5DF84EDFD3EB}">
+  <ds:schemaRefs>
+    <ds:schemaRef ds:uri="http://schemas.microsoft.com/VisualStudio/2011/storyboarding/control"/>
+  </ds:schemaRefs>
+</ds:datastoreItem>
+</file>
+
+<file path=customXml/itemProps64.xml><?xml version="1.0" encoding="utf-8"?>
+<ds:datastoreItem xmlns:ds="http://schemas.openxmlformats.org/officeDocument/2006/customXml" ds:itemID="{12DDBF6F-C153-48C1-97C0-85AA34D18FD2}">
+  <ds:schemaRefs>
+    <ds:schemaRef ds:uri="http://schemas.microsoft.com/VisualStudio/2011/storyboarding/control"/>
+  </ds:schemaRefs>
+</ds:datastoreItem>
+</file>
+
+<file path=customXml/itemProps65.xml><?xml version="1.0" encoding="utf-8"?>
+<ds:datastoreItem xmlns:ds="http://schemas.openxmlformats.org/officeDocument/2006/customXml" ds:itemID="{D834D1AF-A33E-4664-8718-80F7137D9192}">
+  <ds:schemaRefs>
+    <ds:schemaRef ds:uri="http://schemas.microsoft.com/VisualStudio/2011/storyboarding/control"/>
+  </ds:schemaRefs>
+</ds:datastoreItem>
+</file>
+
+<file path=customXml/itemProps66.xml><?xml version="1.0" encoding="utf-8"?>
+<ds:datastoreItem xmlns:ds="http://schemas.openxmlformats.org/officeDocument/2006/customXml" ds:itemID="{E6C688DD-065A-4726-BCE5-E5AFDA3F5641}">
+  <ds:schemaRefs>
+    <ds:schemaRef ds:uri="http://schemas.microsoft.com/VisualStudio/2011/storyboarding/control/v1.0"/>
+  </ds:schemaRefs>
+</ds:datastoreItem>
+</file>
+
+<file path=customXml/itemProps67.xml><?xml version="1.0" encoding="utf-8"?>
+<ds:datastoreItem xmlns:ds="http://schemas.openxmlformats.org/officeDocument/2006/customXml" ds:itemID="{288CEDBF-3F9B-47CF-AF84-2B8486359159}">
+  <ds:schemaRefs>
+    <ds:schemaRef ds:uri="http://schemas.microsoft.com/VisualStudio/2011/storyboarding/control/v1.0"/>
+  </ds:schemaRefs>
+</ds:datastoreItem>
+</file>
+
+<file path=customXml/itemProps68.xml><?xml version="1.0" encoding="utf-8"?>
+<ds:datastoreItem xmlns:ds="http://schemas.openxmlformats.org/officeDocument/2006/customXml" ds:itemID="{D356E6DB-54C9-4389-B932-0F583366BD4B}">
+  <ds:schemaRefs>
+    <ds:schemaRef ds:uri="http://schemas.microsoft.com/VisualStudio/2011/storyboarding/control/v1.0"/>
+  </ds:schemaRefs>
+</ds:datastoreItem>
+</file>
+
+<file path=customXml/itemProps69.xml><?xml version="1.0" encoding="utf-8"?>
+<ds:datastoreItem xmlns:ds="http://schemas.openxmlformats.org/officeDocument/2006/customXml" ds:itemID="{253B000D-0B23-420C-B5B5-11B6002E5391}">
+  <ds:schemaRefs>
+    <ds:schemaRef ds:uri="http://schemas.microsoft.com/VisualStudio/2011/storyboarding/control/v1.0"/>
+  </ds:schemaRefs>
+</ds:datastoreItem>
+</file>
+
+<file path=customXml/itemProps7.xml><?xml version="1.0" encoding="utf-8"?>
+<ds:datastoreItem xmlns:ds="http://schemas.openxmlformats.org/officeDocument/2006/customXml" ds:itemID="{68AAD069-500F-4F2F-A35D-83216001A8DC}">
+  <ds:schemaRefs>
+    <ds:schemaRef ds:uri="http://schemas.microsoft.com/VisualStudio/2011/storyboarding/control"/>
+  </ds:schemaRefs>
+</ds:datastoreItem>
+</file>
+
+<file path=customXml/itemProps70.xml><?xml version="1.0" encoding="utf-8"?>
+<ds:datastoreItem xmlns:ds="http://schemas.openxmlformats.org/officeDocument/2006/customXml" ds:itemID="{19CB1DF2-8822-4520-A56A-045D340F0C71}">
+  <ds:schemaRefs>
+    <ds:schemaRef ds:uri="http://schemas.microsoft.com/VisualStudio/2011/storyboarding/control/v1.0"/>
+  </ds:schemaRefs>
+</ds:datastoreItem>
+</file>
+
+<file path=customXml/itemProps71.xml><?xml version="1.0" encoding="utf-8"?>
+<ds:datastoreItem xmlns:ds="http://schemas.openxmlformats.org/officeDocument/2006/customXml" ds:itemID="{E2968586-6EB5-4B3C-A2E1-82E35F695B75}">
+  <ds:schemaRefs>
+    <ds:schemaRef ds:uri="http://schemas.microsoft.com/VisualStudio/2011/storyboarding/control/v1.0"/>
+  </ds:schemaRefs>
+</ds:datastoreItem>
+</file>
+
+<file path=customXml/itemProps72.xml><?xml version="1.0" encoding="utf-8"?>
 <ds:datastoreItem xmlns:ds="http://schemas.openxmlformats.org/officeDocument/2006/customXml" ds:itemID="{387838C4-29F2-40AB-9647-8346D39956AB}">
   <ds:schemaRefs>
     <ds:schemaRef ds:uri="http://schemas.microsoft.com/VisualStudio/2011/storyboarding/control"/>
@@ -10206,31 +10394,39 @@
 </ds:datastoreItem>
 </file>
 
-<file path=customXml/itemProps5.xml><?xml version="1.0" encoding="utf-8"?>
-<ds:datastoreItem xmlns:ds="http://schemas.openxmlformats.org/officeDocument/2006/customXml" ds:itemID="{B41892D7-DF8B-4D5A-8AD2-983048A35AA0}">
+<file path=customXml/itemProps73.xml><?xml version="1.0" encoding="utf-8"?>
+<ds:datastoreItem xmlns:ds="http://schemas.openxmlformats.org/officeDocument/2006/customXml" ds:itemID="{63E54A0C-A919-4747-87DB-6EB5DB41F719}">
   <ds:schemaRefs>
     <ds:schemaRef ds:uri="http://schemas.microsoft.com/VisualStudio/2011/storyboarding/control/v1.0"/>
   </ds:schemaRefs>
 </ds:datastoreItem>
 </file>
 
-<file path=customXml/itemProps50.xml><?xml version="1.0" encoding="utf-8"?>
-<ds:datastoreItem xmlns:ds="http://schemas.openxmlformats.org/officeDocument/2006/customXml" ds:itemID="{379BFC32-51F7-4218-B2AD-CFD6564CE11F}">
-  <ds:schemaRefs>
-    <ds:schemaRef ds:uri="http://schemas.microsoft.com/VisualStudio/2011/storyboarding/control"/>
-  </ds:schemaRefs>
-</ds:datastoreItem>
-</file>
-
-<file path=customXml/itemProps51.xml><?xml version="1.0" encoding="utf-8"?>
-<ds:datastoreItem xmlns:ds="http://schemas.openxmlformats.org/officeDocument/2006/customXml" ds:itemID="{7C4FADB9-82C5-46C4-AD0E-6B60B5C6AEAE}">
+<file path=customXml/itemProps74.xml><?xml version="1.0" encoding="utf-8"?>
+<ds:datastoreItem xmlns:ds="http://schemas.openxmlformats.org/officeDocument/2006/customXml" ds:itemID="{7BF16C54-4775-4FA7-AF88-98AF6D5E8CA6}">
   <ds:schemaRefs>
     <ds:schemaRef ds:uri="http://schemas.microsoft.com/VisualStudio/2011/storyboarding/control/v1.0"/>
   </ds:schemaRefs>
 </ds:datastoreItem>
 </file>
 
-<file path=customXml/itemProps52.xml><?xml version="1.0" encoding="utf-8"?>
+<file path=customXml/itemProps75.xml><?xml version="1.0" encoding="utf-8"?>
+<ds:datastoreItem xmlns:ds="http://schemas.openxmlformats.org/officeDocument/2006/customXml" ds:itemID="{39536A02-E179-4A1C-9FA7-86EF40631969}">
+  <ds:schemaRefs>
+    <ds:schemaRef ds:uri="http://schemas.microsoft.com/VisualStudio/2011/storyboarding/control/v1.0"/>
+  </ds:schemaRefs>
+</ds:datastoreItem>
+</file>
+
+<file path=customXml/itemProps76.xml><?xml version="1.0" encoding="utf-8"?>
+<ds:datastoreItem xmlns:ds="http://schemas.openxmlformats.org/officeDocument/2006/customXml" ds:itemID="{16772130-8F5D-442B-AA11-39D4F229ACC6}">
+  <ds:schemaRefs>
+    <ds:schemaRef ds:uri="http://schemas.microsoft.com/VisualStudio/2011/storyboarding/control/v1.0"/>
+  </ds:schemaRefs>
+</ds:datastoreItem>
+</file>
+
+<file path=customXml/itemProps77.xml><?xml version="1.0" encoding="utf-8"?>
 <ds:datastoreItem xmlns:ds="http://schemas.openxmlformats.org/officeDocument/2006/customXml" ds:itemID="{AECE9E1B-E7C1-46F6-9945-164C1E49BE74}">
   <ds:schemaRefs>
     <ds:schemaRef ds:uri="http://schemas.microsoft.com/VisualStudio/2011/storyboarding/control/v1.0"/>
@@ -10238,71 +10434,7 @@
 </ds:datastoreItem>
 </file>
 
-<file path=customXml/itemProps53.xml><?xml version="1.0" encoding="utf-8"?>
-<ds:datastoreItem xmlns:ds="http://schemas.openxmlformats.org/officeDocument/2006/customXml" ds:itemID="{BA2C55E9-BDE8-41FC-B02F-EBA8C07A01F8}">
-  <ds:schemaRefs>
-    <ds:schemaRef ds:uri="http://schemas.microsoft.com/VisualStudio/2011/storyboarding/control/v1.0"/>
-  </ds:schemaRefs>
-</ds:datastoreItem>
-</file>
-
-<file path=customXml/itemProps54.xml><?xml version="1.0" encoding="utf-8"?>
-<ds:datastoreItem xmlns:ds="http://schemas.openxmlformats.org/officeDocument/2006/customXml" ds:itemID="{6B22741B-5AC6-4A2C-A57A-E4BDF22E0A90}">
-  <ds:schemaRefs>
-    <ds:schemaRef ds:uri="http://schemas.microsoft.com/VisualStudio/2011/storyboarding/control/v1.0"/>
-  </ds:schemaRefs>
-</ds:datastoreItem>
-</file>
-
-<file path=customXml/itemProps55.xml><?xml version="1.0" encoding="utf-8"?>
-<ds:datastoreItem xmlns:ds="http://schemas.openxmlformats.org/officeDocument/2006/customXml" ds:itemID="{4CFA599C-9F1C-4AB4-AB4F-10CF77B58F79}">
-  <ds:schemaRefs>
-    <ds:schemaRef ds:uri="http://schemas.microsoft.com/VisualStudio/2011/storyboarding/control/v1.0"/>
-  </ds:schemaRefs>
-</ds:datastoreItem>
-</file>
-
-<file path=customXml/itemProps56.xml><?xml version="1.0" encoding="utf-8"?>
-<ds:datastoreItem xmlns:ds="http://schemas.openxmlformats.org/officeDocument/2006/customXml" ds:itemID="{5E2E8CE4-298D-499A-B8B4-4A593AC844A5}">
-  <ds:schemaRefs>
-    <ds:schemaRef ds:uri="http://schemas.microsoft.com/VisualStudio/2011/storyboarding/control/v1.0"/>
-  </ds:schemaRefs>
-</ds:datastoreItem>
-</file>
-
-<file path=customXml/itemProps57.xml><?xml version="1.0" encoding="utf-8"?>
-<ds:datastoreItem xmlns:ds="http://schemas.openxmlformats.org/officeDocument/2006/customXml" ds:itemID="{63E54A0C-A919-4747-87DB-6EB5DB41F719}">
-  <ds:schemaRefs>
-    <ds:schemaRef ds:uri="http://schemas.microsoft.com/VisualStudio/2011/storyboarding/control/v1.0"/>
-  </ds:schemaRefs>
-</ds:datastoreItem>
-</file>
-
-<file path=customXml/itemProps58.xml><?xml version="1.0" encoding="utf-8"?>
-<ds:datastoreItem xmlns:ds="http://schemas.openxmlformats.org/officeDocument/2006/customXml" ds:itemID="{E4D924B8-E923-4751-87E1-B31AA64A9F7B}">
-  <ds:schemaRefs>
-    <ds:schemaRef ds:uri="http://schemas.microsoft.com/VisualStudio/2011/storyboarding/control/v1.0"/>
-  </ds:schemaRefs>
-</ds:datastoreItem>
-</file>
-
-<file path=customXml/itemProps59.xml><?xml version="1.0" encoding="utf-8"?>
-<ds:datastoreItem xmlns:ds="http://schemas.openxmlformats.org/officeDocument/2006/customXml" ds:itemID="{2B6243A2-99B5-42ED-B049-93E27D774527}">
-  <ds:schemaRefs>
-    <ds:schemaRef ds:uri="http://schemas.microsoft.com/VisualStudio/2011/storyboarding/control/v1.0"/>
-  </ds:schemaRefs>
-</ds:datastoreItem>
-</file>
-
-<file path=customXml/itemProps6.xml><?xml version="1.0" encoding="utf-8"?>
-<ds:datastoreItem xmlns:ds="http://schemas.openxmlformats.org/officeDocument/2006/customXml" ds:itemID="{288CEDBF-3F9B-47CF-AF84-2B8486359159}">
-  <ds:schemaRefs>
-    <ds:schemaRef ds:uri="http://schemas.microsoft.com/VisualStudio/2011/storyboarding/control/v1.0"/>
-  </ds:schemaRefs>
-</ds:datastoreItem>
-</file>
-
-<file path=customXml/itemProps60.xml><?xml version="1.0" encoding="utf-8"?>
+<file path=customXml/itemProps78.xml><?xml version="1.0" encoding="utf-8"?>
 <ds:datastoreItem xmlns:ds="http://schemas.openxmlformats.org/officeDocument/2006/customXml" ds:itemID="{A9E9510A-02AF-4564-9E17-46676C80E84C}">
   <ds:schemaRefs>
     <ds:schemaRef ds:uri="http://purl.org/dc/terms/"/>
@@ -10318,39 +10450,7 @@
 </ds:datastoreItem>
 </file>
 
-<file path=customXml/itemProps61.xml><?xml version="1.0" encoding="utf-8"?>
-<ds:datastoreItem xmlns:ds="http://schemas.openxmlformats.org/officeDocument/2006/customXml" ds:itemID="{AA5E4F96-8C72-44F9-A0C5-FB007B246D91}">
-  <ds:schemaRefs>
-    <ds:schemaRef ds:uri="http://schemas.microsoft.com/VisualStudio/2011/storyboarding/control/v1.0"/>
-  </ds:schemaRefs>
-</ds:datastoreItem>
-</file>
-
-<file path=customXml/itemProps62.xml><?xml version="1.0" encoding="utf-8"?>
-<ds:datastoreItem xmlns:ds="http://schemas.openxmlformats.org/officeDocument/2006/customXml" ds:itemID="{07B11A95-7731-4379-9E1B-32BC87FA2B56}">
-  <ds:schemaRefs>
-    <ds:schemaRef ds:uri="http://schemas.microsoft.com/VisualStudio/2011/storyboarding/control/v1.0"/>
-  </ds:schemaRefs>
-</ds:datastoreItem>
-</file>
-
-<file path=customXml/itemProps63.xml><?xml version="1.0" encoding="utf-8"?>
-<ds:datastoreItem xmlns:ds="http://schemas.openxmlformats.org/officeDocument/2006/customXml" ds:itemID="{4BCB20A2-9850-49DA-9BD6-A5D2B0ABF72F}">
-  <ds:schemaRefs>
-    <ds:schemaRef ds:uri="http://schemas.microsoft.com/VisualStudio/2011/storyboarding/control/v1.0"/>
-  </ds:schemaRefs>
-</ds:datastoreItem>
-</file>
-
-<file path=customXml/itemProps64.xml><?xml version="1.0" encoding="utf-8"?>
-<ds:datastoreItem xmlns:ds="http://schemas.openxmlformats.org/officeDocument/2006/customXml" ds:itemID="{B2C9D19C-4878-43E0-A5AD-CB76AB49D960}">
-  <ds:schemaRefs>
-    <ds:schemaRef ds:uri="http://schemas.microsoft.com/VisualStudio/2011/storyboarding/control/v1.0"/>
-  </ds:schemaRefs>
-</ds:datastoreItem>
-</file>
-
-<file path=customXml/itemProps65.xml><?xml version="1.0" encoding="utf-8"?>
+<file path=customXml/itemProps79.xml><?xml version="1.0" encoding="utf-8"?>
 <ds:datastoreItem xmlns:ds="http://schemas.openxmlformats.org/officeDocument/2006/customXml" ds:itemID="{E9C4CBB0-7D2F-42EC-9ED0-589327F3DDE1}">
   <ds:schemaRefs>
     <ds:schemaRef ds:uri="http://schemas.microsoft.com/VisualStudio/2011/storyboarding/control"/>
@@ -10358,39 +10458,151 @@
 </ds:datastoreItem>
 </file>
 
-<file path=customXml/itemProps66.xml><?xml version="1.0" encoding="utf-8"?>
-<ds:datastoreItem xmlns:ds="http://schemas.openxmlformats.org/officeDocument/2006/customXml" ds:itemID="{0BD21A30-063A-4397-97B8-0121D45BD9D6}">
+<file path=customXml/itemProps8.xml><?xml version="1.0" encoding="utf-8"?>
+<ds:datastoreItem xmlns:ds="http://schemas.openxmlformats.org/officeDocument/2006/customXml" ds:itemID="{699689A1-427B-4DEA-8FDB-0058CB4B38D8}">
   <ds:schemaRefs>
     <ds:schemaRef ds:uri="http://schemas.microsoft.com/VisualStudio/2011/storyboarding/control/v1.0"/>
   </ds:schemaRefs>
 </ds:datastoreItem>
 </file>
 
-<file path=customXml/itemProps67.xml><?xml version="1.0" encoding="utf-8"?>
-<ds:datastoreItem xmlns:ds="http://schemas.openxmlformats.org/officeDocument/2006/customXml" ds:itemID="{53BC856C-B486-437D-A7B4-612AE9417D7A}">
+<file path=customXml/itemProps80.xml><?xml version="1.0" encoding="utf-8"?>
+<ds:datastoreItem xmlns:ds="http://schemas.openxmlformats.org/officeDocument/2006/customXml" ds:itemID="{A1B88D5F-41A7-488A-960C-6D819000899D}">
   <ds:schemaRefs>
     <ds:schemaRef ds:uri="http://schemas.microsoft.com/VisualStudio/2011/storyboarding/control/v1.0"/>
   </ds:schemaRefs>
 </ds:datastoreItem>
 </file>
 
-<file path=customXml/itemProps68.xml><?xml version="1.0" encoding="utf-8"?>
-<ds:datastoreItem xmlns:ds="http://schemas.openxmlformats.org/officeDocument/2006/customXml" ds:itemID="{CC419530-796D-4DBE-BBEE-9A6630A896E1}">
+<file path=customXml/itemProps81.xml><?xml version="1.0" encoding="utf-8"?>
+<ds:datastoreItem xmlns:ds="http://schemas.openxmlformats.org/officeDocument/2006/customXml" ds:itemID="{1A853509-4993-44ED-BDEC-FF20A239A251}">
+  <ds:schemaRefs>
+    <ds:schemaRef ds:uri="http://schemas.microsoft.com/VisualStudio/2011/storyboarding/control"/>
+  </ds:schemaRefs>
+</ds:datastoreItem>
+</file>
+
+<file path=customXml/itemProps82.xml><?xml version="1.0" encoding="utf-8"?>
+<ds:datastoreItem xmlns:ds="http://schemas.openxmlformats.org/officeDocument/2006/customXml" ds:itemID="{AE0CE2A3-FF32-4259-A452-A173604DCF0C}">
+  <ds:schemaRefs>
+    <ds:schemaRef ds:uri="http://schemas.microsoft.com/VisualStudio/2011/storyboarding/control"/>
+  </ds:schemaRefs>
+</ds:datastoreItem>
+</file>
+
+<file path=customXml/itemProps83.xml><?xml version="1.0" encoding="utf-8"?>
+<ds:datastoreItem xmlns:ds="http://schemas.openxmlformats.org/officeDocument/2006/customXml" ds:itemID="{2E901D8B-281C-4847-BEC4-E1DAD11CFF00}">
+  <ds:schemaRefs>
+    <ds:schemaRef ds:uri="http://schemas.microsoft.com/VisualStudio/2011/storyboarding/control"/>
+  </ds:schemaRefs>
+</ds:datastoreItem>
+</file>
+
+<file path=customXml/itemProps84.xml><?xml version="1.0" encoding="utf-8"?>
+<ds:datastoreItem xmlns:ds="http://schemas.openxmlformats.org/officeDocument/2006/customXml" ds:itemID="{F782368F-0EE3-40FA-B682-80E11F49B65E}">
+  <ds:schemaRefs>
+    <ds:schemaRef ds:uri="http://schemas.microsoft.com/VisualStudio/2011/storyboarding/control"/>
+  </ds:schemaRefs>
+</ds:datastoreItem>
+</file>
+
+<file path=customXml/itemProps85.xml><?xml version="1.0" encoding="utf-8"?>
+<ds:datastoreItem xmlns:ds="http://schemas.openxmlformats.org/officeDocument/2006/customXml" ds:itemID="{FD67FC06-DA15-486F-A046-DF7B79976F60}">
+  <ds:schemaRefs>
+    <ds:schemaRef ds:uri="http://schemas.microsoft.com/VisualStudio/2011/storyboarding/control"/>
+  </ds:schemaRefs>
+</ds:datastoreItem>
+</file>
+
+<file path=customXml/itemProps86.xml><?xml version="1.0" encoding="utf-8"?>
+<ds:datastoreItem xmlns:ds="http://schemas.openxmlformats.org/officeDocument/2006/customXml" ds:itemID="{20EE139D-44C7-4192-A8B7-E25390148E28}">
   <ds:schemaRefs>
     <ds:schemaRef ds:uri="http://schemas.microsoft.com/VisualStudio/2011/storyboarding/control/v1.0"/>
   </ds:schemaRefs>
 </ds:datastoreItem>
 </file>
 
-<file path=customXml/itemProps69.xml><?xml version="1.0" encoding="utf-8"?>
-<ds:datastoreItem xmlns:ds="http://schemas.openxmlformats.org/officeDocument/2006/customXml" ds:itemID="{6574190A-3D9E-42C1-B276-38E33156AA99}">
+<file path=customXml/itemProps87.xml><?xml version="1.0" encoding="utf-8"?>
+<ds:datastoreItem xmlns:ds="http://schemas.openxmlformats.org/officeDocument/2006/customXml" ds:itemID="{18A6A270-A75C-4D7E-86E4-765FF07C5144}">
+  <ds:schemaRefs>
+    <ds:schemaRef ds:uri="http://schemas.microsoft.com/sharepoint/events"/>
+  </ds:schemaRefs>
+</ds:datastoreItem>
+</file>
+
+<file path=customXml/itemProps88.xml><?xml version="1.0" encoding="utf-8"?>
+<ds:datastoreItem xmlns:ds="http://schemas.openxmlformats.org/officeDocument/2006/customXml" ds:itemID="{CB953D38-E965-4BB2-94FE-DF647E85A654}">
   <ds:schemaRefs>
     <ds:schemaRef ds:uri="http://schemas.microsoft.com/VisualStudio/2011/storyboarding/control/v1.0"/>
   </ds:schemaRefs>
 </ds:datastoreItem>
 </file>
 
-<file path=customXml/itemProps7.xml><?xml version="1.0" encoding="utf-8"?>
+<file path=customXml/itemProps89.xml><?xml version="1.0" encoding="utf-8"?>
+<ds:datastoreItem xmlns:ds="http://schemas.openxmlformats.org/officeDocument/2006/customXml" ds:itemID="{E4A0845B-41B6-4256-8FB3-E31EA581BF55}">
+  <ds:schemaRefs>
+    <ds:schemaRef ds:uri="http://schemas.microsoft.com/VisualStudio/2011/storyboarding/control/v1.0"/>
+  </ds:schemaRefs>
+</ds:datastoreItem>
+</file>
+
+<file path=customXml/itemProps9.xml><?xml version="1.0" encoding="utf-8"?>
+<ds:datastoreItem xmlns:ds="http://schemas.openxmlformats.org/officeDocument/2006/customXml" ds:itemID="{3C6220BE-0F2A-49C6-BFB2-C458479F3F62}">
+  <ds:schemaRefs>
+    <ds:schemaRef ds:uri="http://schemas.microsoft.com/VisualStudio/2011/storyboarding/control/v1.0"/>
+  </ds:schemaRefs>
+</ds:datastoreItem>
+</file>
+
+<file path=customXml/itemProps90.xml><?xml version="1.0" encoding="utf-8"?>
+<ds:datastoreItem xmlns:ds="http://schemas.openxmlformats.org/officeDocument/2006/customXml" ds:itemID="{DDEEC505-9111-44CE-9DED-8A454ABEC272}">
+  <ds:schemaRefs>
+    <ds:schemaRef ds:uri="http://schemas.microsoft.com/VisualStudio/2011/storyboarding/control/v1.0"/>
+  </ds:schemaRefs>
+</ds:datastoreItem>
+</file>
+
+<file path=customXml/itemProps91.xml><?xml version="1.0" encoding="utf-8"?>
+<ds:datastoreItem xmlns:ds="http://schemas.openxmlformats.org/officeDocument/2006/customXml" ds:itemID="{EDE713BE-A567-491C-902D-E6087D824056}">
+  <ds:schemaRefs>
+    <ds:schemaRef ds:uri="http://schemas.microsoft.com/VisualStudio/2011/storyboarding/control/v1.0"/>
+  </ds:schemaRefs>
+</ds:datastoreItem>
+</file>
+
+<file path=customXml/itemProps92.xml><?xml version="1.0" encoding="utf-8"?>
+<ds:datastoreItem xmlns:ds="http://schemas.openxmlformats.org/officeDocument/2006/customXml" ds:itemID="{379BFC32-51F7-4218-B2AD-CFD6564CE11F}">
+  <ds:schemaRefs>
+    <ds:schemaRef ds:uri="http://schemas.microsoft.com/VisualStudio/2011/storyboarding/control"/>
+  </ds:schemaRefs>
+</ds:datastoreItem>
+</file>
+
+<file path=customXml/itemProps93.xml><?xml version="1.0" encoding="utf-8"?>
+<ds:datastoreItem xmlns:ds="http://schemas.openxmlformats.org/officeDocument/2006/customXml" ds:itemID="{4CFA599C-9F1C-4AB4-AB4F-10CF77B58F79}">
+  <ds:schemaRefs>
+    <ds:schemaRef ds:uri="http://schemas.microsoft.com/VisualStudio/2011/storyboarding/control/v1.0"/>
+  </ds:schemaRefs>
+</ds:datastoreItem>
+</file>
+
+<file path=customXml/itemProps94.xml><?xml version="1.0" encoding="utf-8"?>
+<ds:datastoreItem xmlns:ds="http://schemas.openxmlformats.org/officeDocument/2006/customXml" ds:itemID="{C40E64A7-7702-4466-95BD-ABEC09272CCB}">
+  <ds:schemaRefs>
+    <ds:schemaRef ds:uri="http://schemas.microsoft.com/VisualStudio/2011/storyboarding/control"/>
+  </ds:schemaRefs>
+</ds:datastoreItem>
+</file>
+
+<file path=customXml/itemProps95.xml><?xml version="1.0" encoding="utf-8"?>
+<ds:datastoreItem xmlns:ds="http://schemas.openxmlformats.org/officeDocument/2006/customXml" ds:itemID="{3ED2EF50-E36E-49D0-9F27-9EDAEC387091}">
+  <ds:schemaRefs>
+    <ds:schemaRef ds:uri="http://schemas.microsoft.com/VisualStudio/2011/storyboarding/control"/>
+  </ds:schemaRefs>
+</ds:datastoreItem>
+</file>
+
+<file path=customXml/itemProps96.xml><?xml version="1.0" encoding="utf-8"?>
 <ds:datastoreItem xmlns:ds="http://schemas.openxmlformats.org/officeDocument/2006/customXml" ds:itemID="{63E5DE85-F05E-4507-B223-806D8F49F058}">
   <ds:schemaRefs>
     <ds:schemaRef ds:uri="http://schemas.microsoft.com/VisualStudio/2011/storyboarding/control/v1.0"/>
@@ -10398,15 +10610,7 @@
 </ds:datastoreItem>
 </file>
 
-<file path=customXml/itemProps70.xml><?xml version="1.0" encoding="utf-8"?>
-<ds:datastoreItem xmlns:ds="http://schemas.openxmlformats.org/officeDocument/2006/customXml" ds:itemID="{D8E0912A-795B-4916-9114-34B4F28A0EE3}">
-  <ds:schemaRefs>
-    <ds:schemaRef ds:uri="http://schemas.microsoft.com/VisualStudio/2011/storyboarding/control/v1.0"/>
-  </ds:schemaRefs>
-</ds:datastoreItem>
-</file>
-
-<file path=customXml/itemProps71.xml><?xml version="1.0" encoding="utf-8"?>
+<file path=customXml/itemProps97.xml><?xml version="1.0" encoding="utf-8"?>
 <ds:datastoreItem xmlns:ds="http://schemas.openxmlformats.org/officeDocument/2006/customXml" ds:itemID="{9C57ED54-5F7A-476D-BFE2-C46C7230CC6B}">
   <ds:schemaRefs>
     <ds:schemaRef ds:uri="http://schemas.microsoft.com/VisualStudio/2011/storyboarding/control/v1.0"/>
@@ -10414,183 +10618,7 @@
 </ds:datastoreItem>
 </file>
 
-<file path=customXml/itemProps72.xml><?xml version="1.0" encoding="utf-8"?>
-<ds:datastoreItem xmlns:ds="http://schemas.openxmlformats.org/officeDocument/2006/customXml" ds:itemID="{B0DBD337-FDC5-4C36-BF85-C09756391AA1}">
-  <ds:schemaRefs>
-    <ds:schemaRef ds:uri="http://schemas.microsoft.com/VisualStudio/2011/storyboarding/control/v1.0"/>
-  </ds:schemaRefs>
-</ds:datastoreItem>
-</file>
-
-<file path=customXml/itemProps73.xml><?xml version="1.0" encoding="utf-8"?>
-<ds:datastoreItem xmlns:ds="http://schemas.openxmlformats.org/officeDocument/2006/customXml" ds:itemID="{A1B88D5F-41A7-488A-960C-6D819000899D}">
-  <ds:schemaRefs>
-    <ds:schemaRef ds:uri="http://schemas.microsoft.com/VisualStudio/2011/storyboarding/control/v1.0"/>
-  </ds:schemaRefs>
-</ds:datastoreItem>
-</file>
-
-<file path=customXml/itemProps74.xml><?xml version="1.0" encoding="utf-8"?>
-<ds:datastoreItem xmlns:ds="http://schemas.openxmlformats.org/officeDocument/2006/customXml" ds:itemID="{814432F2-7AE9-411E-9F7B-EBBF16C4666D}">
-  <ds:schemaRefs>
-    <ds:schemaRef ds:uri="http://schemas.microsoft.com/VisualStudio/2011/storyboarding/control/v1.0"/>
-  </ds:schemaRefs>
-</ds:datastoreItem>
-</file>
-
-<file path=customXml/itemProps75.xml><?xml version="1.0" encoding="utf-8"?>
-<ds:datastoreItem xmlns:ds="http://schemas.openxmlformats.org/officeDocument/2006/customXml" ds:itemID="{036B989D-7053-42E0-85AB-8864B824736A}">
-  <ds:schemaRefs>
-    <ds:schemaRef ds:uri="http://schemas.microsoft.com/VisualStudio/2011/storyboarding/control"/>
-  </ds:schemaRefs>
-</ds:datastoreItem>
-</file>
-
-<file path=customXml/itemProps76.xml><?xml version="1.0" encoding="utf-8"?>
-<ds:datastoreItem xmlns:ds="http://schemas.openxmlformats.org/officeDocument/2006/customXml" ds:itemID="{C40E64A7-7702-4466-95BD-ABEC09272CCB}">
-  <ds:schemaRefs>
-    <ds:schemaRef ds:uri="http://schemas.microsoft.com/VisualStudio/2011/storyboarding/control"/>
-  </ds:schemaRefs>
-</ds:datastoreItem>
-</file>
-
-<file path=customXml/itemProps77.xml><?xml version="1.0" encoding="utf-8"?>
-<ds:datastoreItem xmlns:ds="http://schemas.openxmlformats.org/officeDocument/2006/customXml" ds:itemID="{F7F9CBAC-60B8-4800-9EA1-9BB1523CD9B4}">
-  <ds:schemaRefs>
-    <ds:schemaRef ds:uri="http://schemas.microsoft.com/VisualStudio/2011/storyboarding/control"/>
-  </ds:schemaRefs>
-</ds:datastoreItem>
-</file>
-
-<file path=customXml/itemProps78.xml><?xml version="1.0" encoding="utf-8"?>
-<ds:datastoreItem xmlns:ds="http://schemas.openxmlformats.org/officeDocument/2006/customXml" ds:itemID="{1A853509-4993-44ED-BDEC-FF20A239A251}">
-  <ds:schemaRefs>
-    <ds:schemaRef ds:uri="http://schemas.microsoft.com/VisualStudio/2011/storyboarding/control"/>
-  </ds:schemaRefs>
-</ds:datastoreItem>
-</file>
-
-<file path=customXml/itemProps79.xml><?xml version="1.0" encoding="utf-8"?>
-<ds:datastoreItem xmlns:ds="http://schemas.openxmlformats.org/officeDocument/2006/customXml" ds:itemID="{09A94271-A29B-4164-A32F-3A755C9B59FC}">
-  <ds:schemaRefs>
-    <ds:schemaRef ds:uri="http://schemas.microsoft.com/VisualStudio/2011/storyboarding/control"/>
-  </ds:schemaRefs>
-</ds:datastoreItem>
-</file>
-
-<file path=customXml/itemProps8.xml><?xml version="1.0" encoding="utf-8"?>
-<ds:datastoreItem xmlns:ds="http://schemas.openxmlformats.org/officeDocument/2006/customXml" ds:itemID="{B7BD4F34-B154-4D92-BE87-C557EB1B7EFB}">
-  <ds:schemaRefs>
-    <ds:schemaRef ds:uri="http://schemas.microsoft.com/sharepoint/v3/contenttype/forms"/>
-  </ds:schemaRefs>
-</ds:datastoreItem>
-</file>
-
-<file path=customXml/itemProps80.xml><?xml version="1.0" encoding="utf-8"?>
-<ds:datastoreItem xmlns:ds="http://schemas.openxmlformats.org/officeDocument/2006/customXml" ds:itemID="{029B11DB-B00D-4F9B-8DF3-D898C360902E}">
-  <ds:schemaRefs>
-    <ds:schemaRef ds:uri="http://schemas.microsoft.com/VisualStudio/2011/storyboarding/control"/>
-  </ds:schemaRefs>
-</ds:datastoreItem>
-</file>
-
-<file path=customXml/itemProps81.xml><?xml version="1.0" encoding="utf-8"?>
-<ds:datastoreItem xmlns:ds="http://schemas.openxmlformats.org/officeDocument/2006/customXml" ds:itemID="{AE0CE2A3-FF32-4259-A452-A173604DCF0C}">
-  <ds:schemaRefs>
-    <ds:schemaRef ds:uri="http://schemas.microsoft.com/VisualStudio/2011/storyboarding/control"/>
-  </ds:schemaRefs>
-</ds:datastoreItem>
-</file>
-
-<file path=customXml/itemProps82.xml><?xml version="1.0" encoding="utf-8"?>
-<ds:datastoreItem xmlns:ds="http://schemas.openxmlformats.org/officeDocument/2006/customXml" ds:itemID="{5A5E7016-2CE6-4389-89D1-05D5203E16D0}">
-  <ds:schemaRefs>
-    <ds:schemaRef ds:uri="http://schemas.microsoft.com/VisualStudio/2011/storyboarding/control"/>
-  </ds:schemaRefs>
-</ds:datastoreItem>
-</file>
-
-<file path=customXml/itemProps83.xml><?xml version="1.0" encoding="utf-8"?>
-<ds:datastoreItem xmlns:ds="http://schemas.openxmlformats.org/officeDocument/2006/customXml" ds:itemID="{B8C6D4DD-FC58-4C97-B28B-C1F0B6B80EE0}">
-  <ds:schemaRefs>
-    <ds:schemaRef ds:uri="http://schemas.microsoft.com/VisualStudio/2011/storyboarding/control"/>
-  </ds:schemaRefs>
-</ds:datastoreItem>
-</file>
-
-<file path=customXml/itemProps84.xml><?xml version="1.0" encoding="utf-8"?>
-<ds:datastoreItem xmlns:ds="http://schemas.openxmlformats.org/officeDocument/2006/customXml" ds:itemID="{5F81420E-DDF3-4689-9969-42E66499CA3E}">
-  <ds:schemaRefs>
-    <ds:schemaRef ds:uri="http://schemas.microsoft.com/VisualStudio/2011/storyboarding/control"/>
-  </ds:schemaRefs>
-</ds:datastoreItem>
-</file>
-
-<file path=customXml/itemProps85.xml><?xml version="1.0" encoding="utf-8"?>
-<ds:datastoreItem xmlns:ds="http://schemas.openxmlformats.org/officeDocument/2006/customXml" ds:itemID="{1C7B3C9E-48C2-496C-AAF2-5C37AB663973}">
-  <ds:schemaRefs>
-    <ds:schemaRef ds:uri="http://schemas.microsoft.com/VisualStudio/2011/storyboarding/control"/>
-  </ds:schemaRefs>
-</ds:datastoreItem>
-</file>
-
-<file path=customXml/itemProps86.xml><?xml version="1.0" encoding="utf-8"?>
-<ds:datastoreItem xmlns:ds="http://schemas.openxmlformats.org/officeDocument/2006/customXml" ds:itemID="{2E901D8B-281C-4847-BEC4-E1DAD11CFF00}">
-  <ds:schemaRefs>
-    <ds:schemaRef ds:uri="http://schemas.microsoft.com/VisualStudio/2011/storyboarding/control"/>
-  </ds:schemaRefs>
-</ds:datastoreItem>
-</file>
-
-<file path=customXml/itemProps87.xml><?xml version="1.0" encoding="utf-8"?>
-<ds:datastoreItem xmlns:ds="http://schemas.openxmlformats.org/officeDocument/2006/customXml" ds:itemID="{23F8C33B-B43F-45BB-B385-DDAB00317A26}">
-  <ds:schemaRefs>
-    <ds:schemaRef ds:uri="http://schemas.microsoft.com/VisualStudio/2011/storyboarding/control"/>
-  </ds:schemaRefs>
-</ds:datastoreItem>
-</file>
-
-<file path=customXml/itemProps88.xml><?xml version="1.0" encoding="utf-8"?>
-<ds:datastoreItem xmlns:ds="http://schemas.openxmlformats.org/officeDocument/2006/customXml" ds:itemID="{CA0F2729-8F0E-4601-8BBB-5DF84EDFD3EB}">
-  <ds:schemaRefs>
-    <ds:schemaRef ds:uri="http://schemas.microsoft.com/VisualStudio/2011/storyboarding/control"/>
-  </ds:schemaRefs>
-</ds:datastoreItem>
-</file>
-
-<file path=customXml/itemProps89.xml><?xml version="1.0" encoding="utf-8"?>
-<ds:datastoreItem xmlns:ds="http://schemas.openxmlformats.org/officeDocument/2006/customXml" ds:itemID="{68AAD069-500F-4F2F-A35D-83216001A8DC}">
-  <ds:schemaRefs>
-    <ds:schemaRef ds:uri="http://schemas.microsoft.com/VisualStudio/2011/storyboarding/control"/>
-  </ds:schemaRefs>
-</ds:datastoreItem>
-</file>
-
-<file path=customXml/itemProps9.xml><?xml version="1.0" encoding="utf-8"?>
-<ds:datastoreItem xmlns:ds="http://schemas.openxmlformats.org/officeDocument/2006/customXml" ds:itemID="{18A6A270-A75C-4D7E-86E4-765FF07C5144}">
-  <ds:schemaRefs>
-    <ds:schemaRef ds:uri="http://schemas.microsoft.com/sharepoint/events"/>
-  </ds:schemaRefs>
-</ds:datastoreItem>
-</file>
-
-<file path=customXml/itemProps90.xml><?xml version="1.0" encoding="utf-8"?>
-<ds:datastoreItem xmlns:ds="http://schemas.openxmlformats.org/officeDocument/2006/customXml" ds:itemID="{AAD6179F-00C3-44B7-9998-E9C87C4FA9EC}">
-  <ds:schemaRefs>
-    <ds:schemaRef ds:uri="http://schemas.microsoft.com/VisualStudio/2011/storyboarding/control"/>
-  </ds:schemaRefs>
-</ds:datastoreItem>
-</file>
-
-<file path=customXml/itemProps91.xml><?xml version="1.0" encoding="utf-8"?>
-<ds:datastoreItem xmlns:ds="http://schemas.openxmlformats.org/officeDocument/2006/customXml" ds:itemID="{12DDBF6F-C153-48C1-97C0-85AA34D18FD2}">
-  <ds:schemaRefs>
-    <ds:schemaRef ds:uri="http://schemas.microsoft.com/VisualStudio/2011/storyboarding/control"/>
-  </ds:schemaRefs>
-</ds:datastoreItem>
-</file>
-
-<file path=customXml/itemProps92.xml><?xml version="1.0" encoding="utf-8"?>
+<file path=customXml/itemProps98.xml><?xml version="1.0" encoding="utf-8"?>
 <ds:datastoreItem xmlns:ds="http://schemas.openxmlformats.org/officeDocument/2006/customXml" ds:itemID="{A6E144E0-D919-4B3D-A3BD-4F079B739AC2}">
   <ds:schemaRefs>
     <ds:schemaRef ds:uri="http://schemas.microsoft.com/VisualStudio/2011/storyboarding/control"/>
@@ -10598,58 +10626,10 @@
 </ds:datastoreItem>
 </file>
 
-<file path=customXml/itemProps93.xml><?xml version="1.0" encoding="utf-8"?>
-<ds:datastoreItem xmlns:ds="http://schemas.openxmlformats.org/officeDocument/2006/customXml" ds:itemID="{2C0B842B-A6BD-4438-89CC-C23BD0A85ECD}">
+<file path=customXml/itemProps99.xml><?xml version="1.0" encoding="utf-8"?>
+<ds:datastoreItem xmlns:ds="http://schemas.openxmlformats.org/officeDocument/2006/customXml" ds:itemID="{C4783010-23AB-4BDC-BABF-F6576658A2B0}">
   <ds:schemaRefs>
-    <ds:schemaRef ds:uri="http://schemas.microsoft.com/VisualStudio/2011/storyboarding/control"/>
-  </ds:schemaRefs>
-</ds:datastoreItem>
-</file>
-
-<file path=customXml/itemProps94.xml><?xml version="1.0" encoding="utf-8"?>
-<ds:datastoreItem xmlns:ds="http://schemas.openxmlformats.org/officeDocument/2006/customXml" ds:itemID="{F782368F-0EE3-40FA-B682-80E11F49B65E}">
-  <ds:schemaRefs>
-    <ds:schemaRef ds:uri="http://schemas.microsoft.com/VisualStudio/2011/storyboarding/control"/>
-  </ds:schemaRefs>
-</ds:datastoreItem>
-</file>
-
-<file path=customXml/itemProps95.xml><?xml version="1.0" encoding="utf-8"?>
-<ds:datastoreItem xmlns:ds="http://schemas.openxmlformats.org/officeDocument/2006/customXml" ds:itemID="{BE267193-C1D2-4298-824E-E6BE5E6C1D22}">
-  <ds:schemaRefs>
-    <ds:schemaRef ds:uri="http://schemas.microsoft.com/VisualStudio/2011/storyboarding/control"/>
-  </ds:schemaRefs>
-</ds:datastoreItem>
-</file>
-
-<file path=customXml/itemProps96.xml><?xml version="1.0" encoding="utf-8"?>
-<ds:datastoreItem xmlns:ds="http://schemas.openxmlformats.org/officeDocument/2006/customXml" ds:itemID="{D834D1AF-A33E-4664-8718-80F7137D9192}">
-  <ds:schemaRefs>
-    <ds:schemaRef ds:uri="http://schemas.microsoft.com/VisualStudio/2011/storyboarding/control"/>
-  </ds:schemaRefs>
-</ds:datastoreItem>
-</file>
-
-<file path=customXml/itemProps97.xml><?xml version="1.0" encoding="utf-8"?>
-<ds:datastoreItem xmlns:ds="http://schemas.openxmlformats.org/officeDocument/2006/customXml" ds:itemID="{3ED2EF50-E36E-49D0-9F27-9EDAEC387091}">
-  <ds:schemaRefs>
-    <ds:schemaRef ds:uri="http://schemas.microsoft.com/VisualStudio/2011/storyboarding/control"/>
-  </ds:schemaRefs>
-</ds:datastoreItem>
-</file>
-
-<file path=customXml/itemProps98.xml><?xml version="1.0" encoding="utf-8"?>
-<ds:datastoreItem xmlns:ds="http://schemas.openxmlformats.org/officeDocument/2006/customXml" ds:itemID="{1325FCED-59E4-4A0E-AB40-72EC19C3A651}">
-  <ds:schemaRefs>
-    <ds:schemaRef ds:uri="http://schemas.microsoft.com/VisualStudio/2011/storyboarding/control"/>
-  </ds:schemaRefs>
-</ds:datastoreItem>
-</file>
-
-<file path=customXml/itemProps99.xml><?xml version="1.0" encoding="utf-8"?>
-<ds:datastoreItem xmlns:ds="http://schemas.openxmlformats.org/officeDocument/2006/customXml" ds:itemID="{FD67FC06-DA15-486F-A046-DF7B79976F60}">
-  <ds:schemaRefs>
-    <ds:schemaRef ds:uri="http://schemas.microsoft.com/VisualStudio/2011/storyboarding/control"/>
+    <ds:schemaRef ds:uri="http://schemas.microsoft.com/VisualStudio/2011/storyboarding/control/v1.0"/>
   </ds:schemaRefs>
 </ds:datastoreItem>
 </file>
</xml_diff>

<commit_message>
added create table t-sql for Distinguishing Features
</commit_message>
<xml_diff>
--- a/Docs/MCM Application Flow.pptx
+++ b/Docs/MCM Application Flow.pptx
@@ -5,7 +5,7 @@
     <p:sldMasterId id="2147483670" r:id="rId100"/>
   </p:sldMasterIdLst>
   <p:notesMasterIdLst>
-    <p:notesMasterId r:id="rId111"/>
+    <p:notesMasterId r:id="rId112"/>
   </p:notesMasterIdLst>
   <p:sldIdLst>
     <p:sldId id="266" r:id="rId101"/>
@@ -18,6 +18,7 @@
     <p:sldId id="261" r:id="rId108"/>
     <p:sldId id="268" r:id="rId109"/>
     <p:sldId id="262" r:id="rId110"/>
+    <p:sldId id="272" r:id="rId111"/>
   </p:sldIdLst>
   <p:sldSz cx="9144000" cy="6858000" type="screen4x3"/>
   <p:notesSz cx="6858000" cy="9144000"/>
@@ -218,7 +219,7 @@
             <a:fld id="{CE74A6EE-E360-4005-A696-0C73C91B5E4F}" type="datetimeFigureOut">
               <a:rPr lang="en-US" smtClean="0"/>
               <a:pPr/>
-              <a:t>4/30/2015</a:t>
+              <a:t>5/11/2015</a:t>
             </a:fld>
             <a:endParaRPr lang="en-US"/>
           </a:p>
@@ -669,7 +670,7 @@
             <a:fld id="{AD33D0BB-003F-42B4-BF7A-CD36EAA9C443}" type="datetimeFigureOut">
               <a:rPr lang="en-US" smtClean="0"/>
               <a:pPr/>
-              <a:t>4/30/2015</a:t>
+              <a:t>5/11/2015</a:t>
             </a:fld>
             <a:endParaRPr lang="en-US"/>
           </a:p>
@@ -848,7 +849,7 @@
             <a:fld id="{AD33D0BB-003F-42B4-BF7A-CD36EAA9C443}" type="datetimeFigureOut">
               <a:rPr lang="en-US" smtClean="0"/>
               <a:pPr/>
-              <a:t>4/30/2015</a:t>
+              <a:t>5/11/2015</a:t>
             </a:fld>
             <a:endParaRPr lang="en-US"/>
           </a:p>
@@ -1030,7 +1031,7 @@
             <a:fld id="{AD33D0BB-003F-42B4-BF7A-CD36EAA9C443}" type="datetimeFigureOut">
               <a:rPr lang="en-US" smtClean="0"/>
               <a:pPr/>
-              <a:t>4/30/2015</a:t>
+              <a:t>5/11/2015</a:t>
             </a:fld>
             <a:endParaRPr lang="en-US"/>
           </a:p>
@@ -1202,7 +1203,7 @@
             <a:fld id="{AD33D0BB-003F-42B4-BF7A-CD36EAA9C443}" type="datetimeFigureOut">
               <a:rPr lang="en-US" smtClean="0"/>
               <a:pPr/>
-              <a:t>4/30/2015</a:t>
+              <a:t>5/11/2015</a:t>
             </a:fld>
             <a:endParaRPr lang="en-US"/>
           </a:p>
@@ -1450,7 +1451,7 @@
             <a:fld id="{AD33D0BB-003F-42B4-BF7A-CD36EAA9C443}" type="datetimeFigureOut">
               <a:rPr lang="en-US" smtClean="0"/>
               <a:pPr/>
-              <a:t>4/30/2015</a:t>
+              <a:t>5/11/2015</a:t>
             </a:fld>
             <a:endParaRPr lang="en-US"/>
           </a:p>
@@ -1740,7 +1741,7 @@
             <a:fld id="{AD33D0BB-003F-42B4-BF7A-CD36EAA9C443}" type="datetimeFigureOut">
               <a:rPr lang="en-US" smtClean="0"/>
               <a:pPr/>
-              <a:t>4/30/2015</a:t>
+              <a:t>5/11/2015</a:t>
             </a:fld>
             <a:endParaRPr lang="en-US"/>
           </a:p>
@@ -2164,7 +2165,7 @@
             <a:fld id="{AD33D0BB-003F-42B4-BF7A-CD36EAA9C443}" type="datetimeFigureOut">
               <a:rPr lang="en-US" smtClean="0"/>
               <a:pPr/>
-              <a:t>4/30/2015</a:t>
+              <a:t>5/11/2015</a:t>
             </a:fld>
             <a:endParaRPr lang="en-US"/>
           </a:p>
@@ -2284,7 +2285,7 @@
             <a:fld id="{AD33D0BB-003F-42B4-BF7A-CD36EAA9C443}" type="datetimeFigureOut">
               <a:rPr lang="en-US" smtClean="0"/>
               <a:pPr/>
-              <a:t>4/30/2015</a:t>
+              <a:t>5/11/2015</a:t>
             </a:fld>
             <a:endParaRPr lang="en-US"/>
           </a:p>
@@ -2381,7 +2382,7 @@
             <a:fld id="{AD33D0BB-003F-42B4-BF7A-CD36EAA9C443}" type="datetimeFigureOut">
               <a:rPr lang="en-US" smtClean="0"/>
               <a:pPr/>
-              <a:t>4/30/2015</a:t>
+              <a:t>5/11/2015</a:t>
             </a:fld>
             <a:endParaRPr lang="en-US"/>
           </a:p>
@@ -2660,7 +2661,7 @@
             <a:fld id="{AD33D0BB-003F-42B4-BF7A-CD36EAA9C443}" type="datetimeFigureOut">
               <a:rPr lang="en-US" smtClean="0"/>
               <a:pPr/>
-              <a:t>4/30/2015</a:t>
+              <a:t>5/11/2015</a:t>
             </a:fld>
             <a:endParaRPr lang="en-US"/>
           </a:p>
@@ -2919,7 +2920,7 @@
             <a:fld id="{AD33D0BB-003F-42B4-BF7A-CD36EAA9C443}" type="datetimeFigureOut">
               <a:rPr lang="en-US" smtClean="0"/>
               <a:pPr/>
-              <a:t>4/30/2015</a:t>
+              <a:t>5/11/2015</a:t>
             </a:fld>
             <a:endParaRPr lang="en-US"/>
           </a:p>
@@ -3134,7 +3135,7 @@
             <a:fld id="{AD33D0BB-003F-42B4-BF7A-CD36EAA9C443}" type="datetimeFigureOut">
               <a:rPr lang="en-US" smtClean="0"/>
               <a:pPr/>
-              <a:t>4/30/2015</a:t>
+              <a:t>5/11/2015</a:t>
             </a:fld>
             <a:endParaRPr lang="en-US"/>
           </a:p>
@@ -3923,6 +3924,401 @@
     <p:extLst>
       <p:ext uri="{BB962C8B-B14F-4D97-AF65-F5344CB8AC3E}">
         <p14:creationId xmlns:p14="http://schemas.microsoft.com/office/powerpoint/2010/main" val="3173498555"/>
+      </p:ext>
+    </p:extLst>
+  </p:cSld>
+  <p:clrMapOvr>
+    <a:masterClrMapping/>
+  </p:clrMapOvr>
+  <p:timing>
+    <p:tnLst>
+      <p:par>
+        <p:cTn id="1" dur="indefinite" restart="never" nodeType="tmRoot"/>
+      </p:par>
+    </p:tnLst>
+  </p:timing>
+</p:sld>
+</file>
+
+<file path=ppt/slides/slide11.xml><?xml version="1.0" encoding="utf-8"?>
+<p:sld xmlns:a="http://schemas.openxmlformats.org/drawingml/2006/main" xmlns:r="http://schemas.openxmlformats.org/officeDocument/2006/relationships" xmlns:p="http://schemas.openxmlformats.org/presentationml/2006/main">
+  <p:cSld>
+    <p:spTree>
+      <p:nvGrpSpPr>
+        <p:cNvPr id="1" name=""/>
+        <p:cNvGrpSpPr/>
+        <p:nvPr/>
+      </p:nvGrpSpPr>
+      <p:grpSpPr>
+        <a:xfrm>
+          <a:off x="0" y="0"/>
+          <a:ext cx="0" cy="0"/>
+          <a:chOff x="0" y="0"/>
+          <a:chExt cx="0" cy="0"/>
+        </a:xfrm>
+      </p:grpSpPr>
+      <p:sp>
+        <p:nvSpPr>
+          <p:cNvPr id="3" name="TextBox 2"/>
+          <p:cNvSpPr txBox="1"/>
+          <p:nvPr/>
+        </p:nvSpPr>
+        <p:spPr>
+          <a:xfrm>
+            <a:off x="228600" y="533400"/>
+            <a:ext cx="8384026" cy="4555093"/>
+          </a:xfrm>
+          <a:prstGeom prst="rect">
+            <a:avLst/>
+          </a:prstGeom>
+          <a:noFill/>
+        </p:spPr>
+        <p:txBody>
+          <a:bodyPr wrap="none" rtlCol="0">
+            <a:spAutoFit/>
+          </a:bodyPr>
+          <a:lstStyle/>
+          <a:p>
+            <a:r>
+              <a:rPr lang="en-US" sz="1000" dirty="0"/>
+              <a:t>CREATE TABLE </a:t>
+            </a:r>
+            <a:r>
+              <a:rPr lang="en-US" sz="1000" dirty="0" smtClean="0"/>
+              <a:t>[</a:t>
+            </a:r>
+            <a:r>
+              <a:rPr lang="en-US" sz="1000" dirty="0" err="1"/>
+              <a:t>MissingChildrenMinnesota_Dev</a:t>
+            </a:r>
+            <a:r>
+              <a:rPr lang="en-US" sz="1000" dirty="0" smtClean="0"/>
+              <a:t>].[</a:t>
+            </a:r>
+            <a:r>
+              <a:rPr lang="en-US" sz="1000" dirty="0" err="1"/>
+              <a:t>DistinguishingFeatures</a:t>
+            </a:r>
+            <a:r>
+              <a:rPr lang="en-US" sz="1000" dirty="0"/>
+              <a:t>](</a:t>
+            </a:r>
+          </a:p>
+          <a:p>
+            <a:r>
+              <a:rPr lang="en-US" sz="1000" dirty="0"/>
+              <a:t>[Id] [</a:t>
+            </a:r>
+            <a:r>
+              <a:rPr lang="en-US" sz="1000" dirty="0" err="1"/>
+              <a:t>nvarchar</a:t>
+            </a:r>
+            <a:r>
+              <a:rPr lang="en-US" sz="1000" dirty="0"/>
+              <a:t>](128) NOT NULL DEFAULT (</a:t>
+            </a:r>
+            <a:r>
+              <a:rPr lang="en-US" sz="1000" dirty="0" err="1"/>
+              <a:t>newid</a:t>
+            </a:r>
+            <a:r>
+              <a:rPr lang="en-US" sz="1000" dirty="0"/>
+              <a:t>()),</a:t>
+            </a:r>
+          </a:p>
+          <a:p>
+            <a:r>
+              <a:rPr lang="en-US" sz="1000" dirty="0"/>
+              <a:t>[</a:t>
+            </a:r>
+            <a:r>
+              <a:rPr lang="en-US" sz="1000" dirty="0" err="1"/>
+              <a:t>ChildId</a:t>
+            </a:r>
+            <a:r>
+              <a:rPr lang="en-US" sz="1000" dirty="0"/>
+              <a:t>] [</a:t>
+            </a:r>
+            <a:r>
+              <a:rPr lang="en-US" sz="1000" dirty="0" err="1"/>
+              <a:t>nvarchar</a:t>
+            </a:r>
+            <a:r>
+              <a:rPr lang="en-US" sz="1000" dirty="0"/>
+              <a:t>](128) NOT NULL,</a:t>
+            </a:r>
+          </a:p>
+          <a:p>
+            <a:r>
+              <a:rPr lang="en-US" sz="1000" dirty="0"/>
+              <a:t>[Feature] [</a:t>
+            </a:r>
+            <a:r>
+              <a:rPr lang="en-US" sz="1000" dirty="0" err="1"/>
+              <a:t>nvarchar</a:t>
+            </a:r>
+            <a:r>
+              <a:rPr lang="en-US" sz="1000" dirty="0"/>
+              <a:t>](255) NOT NULL,</a:t>
+            </a:r>
+          </a:p>
+          <a:p>
+            <a:r>
+              <a:rPr lang="en-US" sz="1000" dirty="0"/>
+              <a:t>[</a:t>
+            </a:r>
+            <a:r>
+              <a:rPr lang="en-US" sz="1000" dirty="0" err="1"/>
+              <a:t>BodyChartNbr</a:t>
+            </a:r>
+            <a:r>
+              <a:rPr lang="en-US" sz="1000" dirty="0"/>
+              <a:t>] [</a:t>
+            </a:r>
+            <a:r>
+              <a:rPr lang="en-US" sz="1000" dirty="0" err="1"/>
+              <a:t>int</a:t>
+            </a:r>
+            <a:r>
+              <a:rPr lang="en-US" sz="1000" dirty="0"/>
+              <a:t>] NOT NULL,</a:t>
+            </a:r>
+          </a:p>
+          <a:p>
+            <a:r>
+              <a:rPr lang="en-US" sz="1000" dirty="0"/>
+              <a:t>[Version] [timestamp] NOT NULL,</a:t>
+            </a:r>
+          </a:p>
+          <a:p>
+            <a:r>
+              <a:rPr lang="en-US" sz="1000" dirty="0"/>
+              <a:t>[</a:t>
+            </a:r>
+            <a:r>
+              <a:rPr lang="en-US" sz="1000" dirty="0" err="1"/>
+              <a:t>CreatedAt</a:t>
+            </a:r>
+            <a:r>
+              <a:rPr lang="en-US" sz="1000" dirty="0"/>
+              <a:t>] [</a:t>
+            </a:r>
+            <a:r>
+              <a:rPr lang="en-US" sz="1000" dirty="0" err="1"/>
+              <a:t>datetimeoffset</a:t>
+            </a:r>
+            <a:r>
+              <a:rPr lang="en-US" sz="1000" dirty="0"/>
+              <a:t>](7) NOT NULL DEFAULT (</a:t>
+            </a:r>
+            <a:r>
+              <a:rPr lang="en-US" sz="1000" dirty="0" err="1"/>
+              <a:t>sysutcdatetime</a:t>
+            </a:r>
+            <a:r>
+              <a:rPr lang="en-US" sz="1000" dirty="0"/>
+              <a:t>()),</a:t>
+            </a:r>
+          </a:p>
+          <a:p>
+            <a:r>
+              <a:rPr lang="en-US" sz="1000" dirty="0"/>
+              <a:t>[</a:t>
+            </a:r>
+            <a:r>
+              <a:rPr lang="en-US" sz="1000" dirty="0" err="1"/>
+              <a:t>UpdatedAt</a:t>
+            </a:r>
+            <a:r>
+              <a:rPr lang="en-US" sz="1000" dirty="0"/>
+              <a:t>] [</a:t>
+            </a:r>
+            <a:r>
+              <a:rPr lang="en-US" sz="1000" dirty="0" err="1"/>
+              <a:t>datetimeoffset</a:t>
+            </a:r>
+            <a:r>
+              <a:rPr lang="en-US" sz="1000" dirty="0"/>
+              <a:t>](7) NULL,</a:t>
+            </a:r>
+          </a:p>
+          <a:p>
+            <a:r>
+              <a:rPr lang="en-US" sz="1000" dirty="0"/>
+              <a:t>[Deleted] [bit] NOT NULL,</a:t>
+            </a:r>
+          </a:p>
+          <a:p>
+            <a:r>
+              <a:rPr lang="en-US" sz="1000" dirty="0"/>
+              <a:t> CONSTRAINT [</a:t>
+            </a:r>
+            <a:r>
+              <a:rPr lang="en-US" sz="1000" dirty="0" err="1" smtClean="0"/>
+              <a:t>PK_MissingChildrenMinnesota_Dev.DistinguishingFeatures</a:t>
+            </a:r>
+            <a:r>
+              <a:rPr lang="en-US" sz="1000" dirty="0"/>
+              <a:t>] PRIMARY KEY NONCLUSTERED </a:t>
+            </a:r>
+          </a:p>
+          <a:p>
+            <a:r>
+              <a:rPr lang="en-US" sz="1000" dirty="0"/>
+              <a:t>(</a:t>
+            </a:r>
+          </a:p>
+          <a:p>
+            <a:r>
+              <a:rPr lang="en-US" sz="1000" dirty="0"/>
+              <a:t>[Id] ASC</a:t>
+            </a:r>
+          </a:p>
+          <a:p>
+            <a:r>
+              <a:rPr lang="en-US" sz="1000" dirty="0"/>
+              <a:t>)WITH (PAD_INDEX = OFF, STATISTICS_NORECOMPUTE = OFF, IGNORE_DUP_KEY = OFF, ALLOW_ROW_LOCKS = ON, ALLOW_PAGE_LOCKS = ON)</a:t>
+            </a:r>
+          </a:p>
+          <a:p>
+            <a:r>
+              <a:rPr lang="en-US" sz="1000" dirty="0"/>
+              <a:t>)</a:t>
+            </a:r>
+          </a:p>
+          <a:p>
+            <a:endParaRPr lang="en-US" sz="1000" dirty="0"/>
+          </a:p>
+          <a:p>
+            <a:r>
+              <a:rPr lang="en-US" sz="1000" dirty="0"/>
+              <a:t>GO</a:t>
+            </a:r>
+          </a:p>
+          <a:p>
+            <a:endParaRPr lang="en-US" sz="1000" dirty="0"/>
+          </a:p>
+          <a:p>
+            <a:r>
+              <a:rPr lang="en-US" sz="1000" dirty="0"/>
+              <a:t>SET ANSI_PADDING ON</a:t>
+            </a:r>
+          </a:p>
+          <a:p>
+            <a:endParaRPr lang="en-US" sz="1000" dirty="0"/>
+          </a:p>
+          <a:p>
+            <a:r>
+              <a:rPr lang="en-US" sz="1000" dirty="0"/>
+              <a:t>GO</a:t>
+            </a:r>
+          </a:p>
+          <a:p>
+            <a:endParaRPr lang="en-US" sz="1000" dirty="0"/>
+          </a:p>
+          <a:p>
+            <a:r>
+              <a:rPr lang="en-US" sz="1000" dirty="0"/>
+              <a:t>/****** Object:  Index [</a:t>
+            </a:r>
+            <a:r>
+              <a:rPr lang="en-US" sz="1000" dirty="0" err="1" smtClean="0"/>
+              <a:t>IX_MissingChildrenMinnesota_Dev_DistinguishingFeatures.ChildId</a:t>
+            </a:r>
+            <a:r>
+              <a:rPr lang="en-US" sz="1000" dirty="0"/>
+              <a:t>]    Script Date: 5/11/2015 11:17:58 AM ******/</a:t>
+            </a:r>
+          </a:p>
+          <a:p>
+            <a:r>
+              <a:rPr lang="en-US" sz="1000" dirty="0"/>
+              <a:t>CREATE CLUSTERED INDEX [</a:t>
+            </a:r>
+            <a:r>
+              <a:rPr lang="en-US" sz="1000" dirty="0" err="1" smtClean="0"/>
+              <a:t>IX_MissingChildrenMinnesota_Dev_DistinguishingFeatures.ChildId</a:t>
+            </a:r>
+            <a:r>
+              <a:rPr lang="en-US" sz="1000" dirty="0"/>
+              <a:t>] ON </a:t>
+            </a:r>
+            <a:r>
+              <a:rPr lang="en-US" sz="1000" dirty="0" smtClean="0"/>
+              <a:t>[</a:t>
+            </a:r>
+            <a:r>
+              <a:rPr lang="en-US" sz="1000" dirty="0" err="1"/>
+              <a:t>MissingChildrenMinnesota_Dev</a:t>
+            </a:r>
+            <a:r>
+              <a:rPr lang="en-US" sz="1000" dirty="0" smtClean="0"/>
+              <a:t>].[</a:t>
+            </a:r>
+            <a:r>
+              <a:rPr lang="en-US" sz="1000" dirty="0" err="1"/>
+              <a:t>DistinguishingFeatures</a:t>
+            </a:r>
+            <a:r>
+              <a:rPr lang="en-US" sz="1000" dirty="0"/>
+              <a:t>]</a:t>
+            </a:r>
+          </a:p>
+          <a:p>
+            <a:r>
+              <a:rPr lang="en-US" sz="1000" dirty="0"/>
+              <a:t>(</a:t>
+            </a:r>
+          </a:p>
+          <a:p>
+            <a:r>
+              <a:rPr lang="en-US" sz="1000" dirty="0"/>
+              <a:t>[</a:t>
+            </a:r>
+            <a:r>
+              <a:rPr lang="en-US" sz="1000" dirty="0" err="1"/>
+              <a:t>ChildId</a:t>
+            </a:r>
+            <a:r>
+              <a:rPr lang="en-US" sz="1000" dirty="0"/>
+              <a:t>] ASC</a:t>
+            </a:r>
+          </a:p>
+          <a:p>
+            <a:r>
+              <a:rPr lang="en-US" sz="1000" dirty="0"/>
+              <a:t>)WITH (PAD_INDEX = OFF, STATISTICS_NORECOMPUTE = OFF, SORT_IN_TEMPDB = OFF, DROP_EXISTING = OFF, ONLINE = OFF, ALLOW_ROW_LOCKS = ON</a:t>
+            </a:r>
+            <a:r>
+              <a:rPr lang="en-US" sz="1000" dirty="0" smtClean="0"/>
+              <a:t>, </a:t>
+            </a:r>
+          </a:p>
+          <a:p>
+            <a:r>
+              <a:rPr lang="en-US" sz="1000" dirty="0" smtClean="0"/>
+              <a:t>ALLOW_PAGE_LOCKS </a:t>
+            </a:r>
+            <a:r>
+              <a:rPr lang="en-US" sz="1000" dirty="0"/>
+              <a:t>= ON)</a:t>
+            </a:r>
+          </a:p>
+          <a:p>
+            <a:r>
+              <a:rPr lang="en-US" sz="1000" dirty="0"/>
+              <a:t>GO</a:t>
+            </a:r>
+          </a:p>
+          <a:p>
+            <a:endParaRPr lang="en-US" sz="1000" dirty="0"/>
+          </a:p>
+        </p:txBody>
+      </p:sp>
+    </p:spTree>
+    <p:extLst>
+      <p:ext uri="{BB962C8B-B14F-4D97-AF65-F5344CB8AC3E}">
+        <p14:creationId xmlns:p14="http://schemas.microsoft.com/office/powerpoint/2010/main" val="3132884493"/>
       </p:ext>
     </p:extLst>
   </p:cSld>
@@ -6353,35 +6749,7 @@
             </a:pPr>
             <a:r>
               <a:rPr lang="en-US" sz="1400" dirty="0" smtClean="0"/>
-              <a:t>Child Profile screen: This screen provides </a:t>
-            </a:r>
-            <a:r>
-              <a:rPr lang="en-US" sz="1400" dirty="0" smtClean="0"/>
-              <a:t>navigation to other </a:t>
-            </a:r>
-            <a:r>
-              <a:rPr lang="en-US" sz="1400" dirty="0" smtClean="0"/>
-              <a:t>screens </a:t>
-            </a:r>
-            <a:r>
-              <a:rPr lang="en-US" sz="1400" dirty="0" smtClean="0"/>
-              <a:t>for other types </a:t>
-            </a:r>
-            <a:r>
-              <a:rPr lang="en-US" sz="1400" dirty="0" smtClean="0"/>
-              <a:t>of child information to enter. </a:t>
-            </a:r>
-            <a:r>
-              <a:rPr lang="en-US" sz="1400" dirty="0" smtClean="0"/>
-              <a:t>A Child can be removed from the list </a:t>
-            </a:r>
-            <a:r>
-              <a:rPr lang="en-US" sz="1400" dirty="0" smtClean="0"/>
-              <a:t>using this </a:t>
-            </a:r>
-            <a:r>
-              <a:rPr lang="en-US" sz="1400" dirty="0" smtClean="0"/>
-              <a:t>screen.</a:t>
+              <a:t>Child Profile screen: This screen provides navigation to other screens for other types of child information to enter. A Child can be removed from the list using this screen.</a:t>
             </a:r>
           </a:p>
           <a:p>
@@ -6572,11 +6940,7 @@
           <a:p>
             <a:r>
               <a:rPr lang="en-US" dirty="0" smtClean="0"/>
-              <a:t>The html will stored in the database. The application will retrieve the appropriate html for each of the static screens and save them as a file </a:t>
-            </a:r>
-            <a:r>
-              <a:rPr lang="en-US" dirty="0" smtClean="0"/>
-              <a:t>in the applications internal storage. The application will check if the appropriate file is in the internal storage of the application and determine if a newer version of html is in </a:t>
+              <a:t>The html will stored in the database. The application will retrieve the appropriate html for each of the static screens and save them as a file in the applications internal storage. The application will check if the appropriate file is in the internal storage of the application and determine if a newer version of html is in </a:t>
             </a:r>
             <a:r>
               <a:rPr lang="en-US" smtClean="0"/>
@@ -6855,7 +7219,6 @@
               <a:rPr lang="en-US" sz="1400" dirty="0" smtClean="0"/>
               <a:t>For the mobile device, the photos will be in the internal storage of the application.</a:t>
             </a:r>
-            <a:endParaRPr lang="en-US" sz="1400" dirty="0" smtClean="0"/>
           </a:p>
         </p:txBody>
       </p:sp>
@@ -7058,11 +7421,7 @@
           <a:p>
             <a:r>
               <a:rPr lang="en-US" dirty="0" smtClean="0"/>
-              <a:t>Database </a:t>
-            </a:r>
-            <a:r>
-              <a:rPr lang="en-US" dirty="0" smtClean="0"/>
-              <a:t>Table Scripts</a:t>
+              <a:t>Database Table Scripts</a:t>
             </a:r>
             <a:endParaRPr lang="en-US" dirty="0"/>
           </a:p>
@@ -8545,8 +8904,8 @@
 </file>
 
 <file path=customXml/item1.xml><?xml version="1.0" encoding="utf-8"?>
-<Control xmlns="http://schemas.microsoft.com/VisualStudio/2011/storyboarding/control/v1.0">
-  <Id Name="System.Storyboard.Stencil.TabGroup" RevisionId="00000000-0000-0000-0000-000000000000" Stencil="System.Common" StencilRevisionId="00000000-0000-0000-0000-000000000000" StencilVersion="1.0"/>
+<Control xmlns="http://schemas.microsoft.com/VisualStudio/2011/storyboarding/control">
+  <Id Name="System.Storyboarding.WindowsApps.WindowsAppsMediumWideTile" Revision="1" Stencil="System.Storyboarding.WindowsApps" StencilVersion="0.1"/>
 </Control>
 </file>
 
@@ -8557,253 +8916,60 @@
 </file>
 
 <file path=customXml/item11.xml><?xml version="1.0" encoding="utf-8"?>
-<Control xmlns="http://schemas.microsoft.com/VisualStudio/2011/storyboarding/control">
-  <Id Name="System.Storyboarding.Backgrounds.Window" RevisionId="bdb52a43-f875-417f-a3f8-9b0259dd3051" Stencil="System.Storyboarding.Backgrounds" StencilRevisionId="bdb52a43-f875-417f-a3f8-9b0259dd3051" StencilVersion="0.1"/>
+<Control xmlns="http://schemas.microsoft.com/VisualStudio/2011/storyboarding/control/v1.0">
+  <Id Name="System.Storyboarding.Common.Text" RevisionId="68ea164d-c1de-47a5-804f-d4d1290fa524" Stencil="System.Storyboarding.Common" StencilRevisionId="68ea164d-c1de-47a5-804f-d4d1290fa524" StencilVersion="0.1"/>
 </Control>
 </file>
 
 <file path=customXml/item12.xml><?xml version="1.0" encoding="utf-8"?>
-<Control xmlns="http://schemas.microsoft.com/VisualStudio/2011/storyboarding/control/v1.0">
-  <Id Name="System.Storyboard.Stencil.ColorPicker" RevisionId="00000000-0000-0000-0000-000000000000" Stencil="System.Media" StencilRevisionId="00000000-0000-0000-0000-000000000000" StencilVersion="1.0"/>
-</Control>
-</file>
-
-<file path=customXml/item13.xml><?xml version="1.0" encoding="utf-8"?>
-<?mso-contentType ?>
-<spe:Receivers xmlns:spe="http://schemas.microsoft.com/sharepoint/events">
-  <Receiver>
-    <Name>Document ID Generator</Name>
-    <Synchronization>Synchronous</Synchronization>
-    <Type>10001</Type>
-    <SequenceNumber>1000</SequenceNumber>
-    <Assembly>Microsoft.Office.DocumentManagement, Version=14.0.0.0, Culture=neutral, PublicKeyToken=71e9bce111e9429c</Assembly>
-    <Class>Microsoft.Office.DocumentManagement.Internal.DocIdHandler</Class>
-    <Data/>
-    <Filter/>
-  </Receiver>
-  <Receiver>
-    <Name>Document ID Generator</Name>
-    <Synchronization>Synchronous</Synchronization>
-    <Type>10002</Type>
-    <SequenceNumber>1001</SequenceNumber>
-    <Assembly>Microsoft.Office.DocumentManagement, Version=14.0.0.0, Culture=neutral, PublicKeyToken=71e9bce111e9429c</Assembly>
-    <Class>Microsoft.Office.DocumentManagement.Internal.DocIdHandler</Class>
-    <Data/>
-    <Filter/>
-  </Receiver>
-  <Receiver>
-    <Name>Document ID Generator</Name>
-    <Synchronization>Synchronous</Synchronization>
-    <Type>10004</Type>
-    <SequenceNumber>1002</SequenceNumber>
-    <Assembly>Microsoft.Office.DocumentManagement, Version=14.0.0.0, Culture=neutral, PublicKeyToken=71e9bce111e9429c</Assembly>
-    <Class>Microsoft.Office.DocumentManagement.Internal.DocIdHandler</Class>
-    <Data/>
-    <Filter/>
-  </Receiver>
-  <Receiver>
-    <Name>Document ID Generator</Name>
-    <Synchronization>Synchronous</Synchronization>
-    <Type>10006</Type>
-    <SequenceNumber>1003</SequenceNumber>
-    <Assembly>Microsoft.Office.DocumentManagement, Version=14.0.0.0, Culture=neutral, PublicKeyToken=71e9bce111e9429c</Assembly>
-    <Class>Microsoft.Office.DocumentManagement.Internal.DocIdHandler</Class>
-    <Data/>
-    <Filter/>
-  </Receiver>
-</spe:Receivers>
-</file>
-
-<file path=customXml/item14.xml><?xml version="1.0" encoding="utf-8"?>
-<Control xmlns="http://schemas.microsoft.com/VisualStudio/2011/storyboarding/control/v1.0">
-  <Id Name="System.Storyboard.Stencil.PhoneNotification" RevisionId="00000000-0000-0000-0000-000000000000" Stencil="System.Windows_Phone_7" StencilRevisionId="00000000-0000-0000-0000-000000000000" StencilVersion="1.0"/>
-</Control>
-</file>
-
-<file path=customXml/item15.xml><?xml version="1.0" encoding="utf-8"?>
-<Control xmlns="http://schemas.microsoft.com/VisualStudio/2011/storyboarding/control/v1.0">
-  <Id Name="System.Storyboard.Stencil.Calendar" RevisionId="00000000-0000-0000-0000-000000000000" Stencil="System.Common" StencilRevisionId="00000000-0000-0000-0000-000000000000" StencilVersion="1.0"/>
-</Control>
-</file>
-
-<file path=customXml/item16.xml><?xml version="1.0" encoding="utf-8"?>
-<Control xmlns="http://schemas.microsoft.com/VisualStudio/2011/storyboarding/control/v1.0">
-  <Id Name="System.Storyboard.Stencil.PhoneKeyboard" RevisionId="00000000-0000-0000-0000-000000000000" Stencil="System.Windows_Phone_7" StencilRevisionId="00000000-0000-0000-0000-000000000000" StencilVersion="1.0"/>
-</Control>
-</file>
-
-<file path=customXml/item17.xml><?xml version="1.0" encoding="utf-8"?>
-<Control xmlns="http://schemas.microsoft.com/VisualStudio/2011/storyboarding/control">
-  <Id Name="System.Storyboarding.Backgrounds.SharePoint" RevisionId="bdb52a43-f875-417f-a3f8-9b0259dd3051" Stencil="System.Storyboarding.Backgrounds" StencilRevisionId="bdb52a43-f875-417f-a3f8-9b0259dd3051" StencilVersion="0.1"/>
-</Control>
-</file>
-
-<file path=customXml/item18.xml><?xml version="1.0" encoding="utf-8"?>
 <Control xmlns="http://schemas.microsoft.com/VisualStudio/2011/storyboarding/control">
   <Id Name="System.Storyboarding.WindowsApps.WindowsAppsMediumWideTile" Revision="1" Stencil="System.Storyboarding.WindowsApps" StencilVersion="0.1"/>
 </Control>
 </file>
 
+<file path=customXml/item13.xml><?xml version="1.0" encoding="utf-8"?>
+<Control xmlns="http://schemas.microsoft.com/VisualStudio/2011/storyboarding/control">
+  <Id Name="System.Storyboarding.Backgrounds.WebBrowser" RevisionId="bdb52a43-f875-417f-a3f8-9b0259dd3051" Stencil="System.Storyboarding.Backgrounds" StencilRevisionId="bdb52a43-f875-417f-a3f8-9b0259dd3051" StencilVersion="0.1"/>
+</Control>
+</file>
+
+<file path=customXml/item14.xml><?xml version="1.0" encoding="utf-8"?>
+<Control xmlns="http://schemas.microsoft.com/VisualStudio/2011/storyboarding/control">
+  <Id Name="System.Storyboarding.WindowsApps.WindowsAppsMediumWideTile" Revision="1" Stencil="System.Storyboarding.WindowsApps" StencilVersion="0.1"/>
+</Control>
+</file>
+
+<file path=customXml/item15.xml><?xml version="1.0" encoding="utf-8"?>
+<Control xmlns="http://schemas.microsoft.com/VisualStudio/2011/storyboarding/control/v1.0">
+  <Id Name="System.Storyboarding.Common.Breadcrumb" RevisionId="68ea164d-c1de-47a5-804f-d4d1290fa524" Stencil="System.Storyboarding.Common" StencilRevisionId="68ea164d-c1de-47a5-804f-d4d1290fa524" StencilVersion="0.1"/>
+</Control>
+</file>
+
+<file path=customXml/item16.xml><?xml version="1.0" encoding="utf-8"?>
+<Control xmlns="http://schemas.microsoft.com/VisualStudio/2011/storyboarding/control">
+  <Id Name="System.Storyboarding.WindowsApps.WindowsAppsMediumWideTile" Revision="1" Stencil="System.Storyboarding.WindowsApps" StencilVersion="0.1"/>
+</Control>
+</file>
+
+<file path=customXml/item17.xml><?xml version="1.0" encoding="utf-8"?>
+<Control xmlns="http://schemas.microsoft.com/VisualStudio/2011/storyboarding/control">
+  <Id Name="System.Storyboarding.WindowsApps.WindowsAppsMediumWideTile" Revision="1" Stencil="System.Storyboarding.WindowsApps" StencilVersion="0.1"/>
+</Control>
+</file>
+
+<file path=customXml/item18.xml><?xml version="1.0" encoding="utf-8"?>
+<Control xmlns="http://schemas.microsoft.com/VisualStudio/2011/storyboarding/control/v1.0">
+  <Id Name="System.Storyboard.Stencil.PieChart" RevisionId="00000000-0000-0000-0000-000000000000" Stencil="System.Media" StencilRevisionId="00000000-0000-0000-0000-000000000000" StencilVersion="1.0"/>
+</Control>
+</file>
+
 <file path=customXml/item19.xml><?xml version="1.0" encoding="utf-8"?>
-<Control xmlns="http://schemas.microsoft.com/VisualStudio/2011/storyboarding/control">
-  <Id Name="System.Storyboarding.Backgrounds.RibbonApplication" RevisionId="bdb52a43-f875-417f-a3f8-9b0259dd3051" Stencil="System.Storyboarding.Backgrounds" StencilRevisionId="bdb52a43-f875-417f-a3f8-9b0259dd3051" StencilVersion="0.1"/>
-</Control>
-</file>
-
-<file path=customXml/item2.xml><?xml version="1.0" encoding="utf-8"?>
 <Control xmlns="http://schemas.microsoft.com/VisualStudio/2011/storyboarding/control/v1.0">
   <Id Name="System.Storyboard.Stencil.PhoneTile" RevisionId="00000000-0000-0000-0000-000000000000" Stencil="System.Windows_Phone_7" StencilRevisionId="00000000-0000-0000-0000-000000000000" StencilVersion="1.0"/>
 </Control>
 </file>
 
-<file path=customXml/item20.xml><?xml version="1.0" encoding="utf-8"?>
-<Control xmlns="http://schemas.microsoft.com/VisualStudio/2011/storyboarding/control/v1.0">
-  <Id Name="System.Storyboard.Stencil.LineChart" RevisionId="00000000-0000-0000-0000-000000000000" Stencil="System.Media" StencilRevisionId="00000000-0000-0000-0000-000000000000" StencilVersion="1.0"/>
-</Control>
-</file>
-
-<file path=customXml/item21.xml><?xml version="1.0" encoding="utf-8"?>
-<Control xmlns="http://schemas.microsoft.com/VisualStudio/2011/storyboarding/control">
-  <Id Name="System.Storyboarding.WindowsApps.WindowsAppsMediumWideTile" Revision="1" Stencil="System.Storyboarding.WindowsApps" StencilVersion="0.1"/>
-</Control>
-</file>
-
-<file path=customXml/item22.xml><?xml version="1.0" encoding="utf-8"?>
-<Control xmlns="http://schemas.microsoft.com/VisualStudio/2011/storyboarding/control">
-  <Id Name="System.Storyboarding.WindowsApps.WindowsAppsMediumWideTile" Revision="1" Stencil="System.Storyboarding.WindowsApps" StencilVersion="0.1"/>
-</Control>
-</file>
-
-<file path=customXml/item23.xml><?xml version="1.0" encoding="utf-8"?>
-<?mso-contentType ?>
-<FormTemplates xmlns="http://schemas.microsoft.com/sharepoint/v3/contenttype/forms">
-  <Display>DocumentLibraryForm</Display>
-  <Edit>DocumentLibraryForm</Edit>
-  <New>DocumentLibraryForm</New>
-</FormTemplates>
-</file>
-
-<file path=customXml/item24.xml><?xml version="1.0" encoding="utf-8"?>
-<Control xmlns="http://schemas.microsoft.com/VisualStudio/2011/storyboarding/control">
-  <Id Name="System.Storyboarding.WindowsApps.WindowsAppsMediumWideTile" Revision="1" Stencil="System.Storyboarding.WindowsApps" StencilVersion="0.1"/>
-</Control>
-</file>
-
-<file path=customXml/item25.xml><?xml version="1.0" encoding="utf-8"?>
-<Control xmlns="http://schemas.microsoft.com/VisualStudio/2011/storyboarding/control/v1.0">
-  <Id Name="System.Storyboard.Stencil.DropdownBox" RevisionId="00000000-0000-0000-0000-000000000000" Stencil="System.Common" StencilRevisionId="00000000-0000-0000-0000-000000000000" StencilVersion="1.0"/>
-</Control>
-</file>
-
-<file path=customXml/item26.xml><?xml version="1.0" encoding="utf-8"?>
-<Control xmlns="http://schemas.microsoft.com/VisualStudio/2011/storyboarding/control/v1.0">
-  <Id Name="System.Storyboard.Stencil.Group" RevisionId="00000000-0000-0000-0000-000000000000" Stencil="System.Windows" StencilRevisionId="00000000-0000-0000-0000-000000000000" StencilVersion="1.0"/>
-</Control>
-</file>
-
-<file path=customXml/item27.xml><?xml version="1.0" encoding="utf-8"?>
-<Control xmlns="http://schemas.microsoft.com/VisualStudio/2011/storyboarding/control/v1.0">
-  <Id Name="System.Storyboard.Stencil.TreeList" RevisionId="00000000-0000-0000-0000-000000000000" Stencil="System.Common" StencilRevisionId="00000000-0000-0000-0000-000000000000" StencilVersion="1.0"/>
-</Control>
-</file>
-
-<file path=customXml/item28.xml><?xml version="1.0" encoding="utf-8"?>
-<Control xmlns="http://schemas.microsoft.com/VisualStudio/2011/storyboarding/control">
-  <Id Name="System.Storyboarding.WindowsApps.WindowsAppsMediumWideTile" Revision="1" Stencil="System.Storyboarding.WindowsApps" StencilVersion="0.1"/>
-</Control>
-</file>
-
-<file path=customXml/item29.xml><?xml version="1.0" encoding="utf-8"?>
-<Control xmlns="http://schemas.microsoft.com/VisualStudio/2011/storyboarding/control/v1.0">
-  <Id Name="System.Storyboarding.Common.Text" RevisionId="68ea164d-c1de-47a5-804f-d4d1290fa524" Stencil="System.Storyboarding.Common" StencilRevisionId="68ea164d-c1de-47a5-804f-d4d1290fa524" StencilVersion="0.1"/>
-</Control>
-</file>
-
-<file path=customXml/item3.xml><?xml version="1.0" encoding="utf-8"?>
-<Control xmlns="http://schemas.microsoft.com/VisualStudio/2011/storyboarding/control/v1.0">
-  <Id Name="System.Storyboard.Stencil.PositionControl" RevisionId="00000000-0000-0000-0000-000000000000" Stencil="System.Media" StencilRevisionId="00000000-0000-0000-0000-000000000000" StencilVersion="1.0"/>
-</Control>
-</file>
-
-<file path=customXml/item30.xml><?xml version="1.0" encoding="utf-8"?>
-<Control xmlns="http://schemas.microsoft.com/VisualStudio/2011/storyboarding/control/v1.0">
-  <Id Name="System.Storyboard.Stencil.PhoneBrowserBar" RevisionId="00000000-0000-0000-0000-000000000000" Stencil="System.Windows_Phone_7" StencilRevisionId="00000000-0000-0000-0000-000000000000" StencilVersion="1.0"/>
-</Control>
-</file>
-
-<file path=customXml/item31.xml><?xml version="1.0" encoding="utf-8"?>
-<Control xmlns="http://schemas.microsoft.com/VisualStudio/2011/storyboarding/control/v1.0">
-  <Id Name="System.Storyboard.Stencil.Slider" RevisionId="00000000-0000-0000-0000-000000000000" Stencil="System.Common" StencilRevisionId="00000000-0000-0000-0000-000000000000" StencilVersion="1.0"/>
-</Control>
-</file>
-
-<file path=customXml/item32.xml><?xml version="1.0" encoding="utf-8"?>
-<Control xmlns="http://schemas.microsoft.com/VisualStudio/2011/storyboarding/control/v1.0">
-  <Id Name="System.Storyboarding.Common.Text" RevisionId="68ea164d-c1de-47a5-804f-d4d1290fa524" Stencil="System.Storyboarding.Common" StencilRevisionId="68ea164d-c1de-47a5-804f-d4d1290fa524" StencilVersion="0.1"/>
-</Control>
-</file>
-
-<file path=customXml/item33.xml><?xml version="1.0" encoding="utf-8"?>
-<Control xmlns="http://schemas.microsoft.com/VisualStudio/2011/storyboarding/control/v1.0">
-  <Id Name="System.Storyboard.Stencil.Title" RevisionId="00000000-0000-0000-0000-000000000000" Stencil="System.Common" StencilRevisionId="00000000-0000-0000-0000-000000000000" StencilVersion="1.0"/>
-</Control>
-</file>
-
-<file path=customXml/item34.xml><?xml version="1.0" encoding="utf-8"?>
-<Control xmlns="http://schemas.microsoft.com/VisualStudio/2011/storyboarding/control/v1.0">
-  <Id Name="System.Storyboard.Stencil.LineChart" RevisionId="00000000-0000-0000-0000-000000000000" Stencil="System.Media" StencilRevisionId="00000000-0000-0000-0000-000000000000" StencilVersion="1.0"/>
-</Control>
-</file>
-
-<file path=customXml/item35.xml><?xml version="1.0" encoding="utf-8"?>
-<Control xmlns="http://schemas.microsoft.com/VisualStudio/2011/storyboarding/control">
-  <Id Name="System.Storyboarding.WindowsApps.WindowsAppsMediumWideTile" Revision="1" Stencil="System.Storyboarding.WindowsApps" StencilVersion="0.1"/>
-</Control>
-</file>
-
-<file path=customXml/item36.xml><?xml version="1.0" encoding="utf-8"?>
-<Control xmlns="http://schemas.microsoft.com/VisualStudio/2011/storyboarding/control/v1.0">
-  <Id Name="System.Storyboard.Stencil.PieChart" RevisionId="00000000-0000-0000-0000-000000000000" Stencil="System.Media" StencilRevisionId="00000000-0000-0000-0000-000000000000" StencilVersion="1.0"/>
-</Control>
-</file>
-
-<file path=customXml/item37.xml><?xml version="1.0" encoding="utf-8"?>
-<Control xmlns="http://schemas.microsoft.com/VisualStudio/2011/storyboarding/control">
-  <Id Name="System.Storyboarding.WindowsApps.WindowsAppsMediumWideTile" Revision="1" Stencil="System.Storyboarding.WindowsApps" StencilVersion="0.1"/>
-</Control>
-</file>
-
-<file path=customXml/item38.xml><?xml version="1.0" encoding="utf-8"?>
-<Control xmlns="http://schemas.microsoft.com/VisualStudio/2011/storyboarding/control/v1.0">
-  <Id Name="System.Storyboard.Stencil.Title" RevisionId="00000000-0000-0000-0000-000000000000" Stencil="System.Common" StencilRevisionId="00000000-0000-0000-0000-000000000000" StencilVersion="1.0"/>
-</Control>
-</file>
-
-<file path=customXml/item39.xml><?xml version="1.0" encoding="utf-8"?>
-<Control xmlns="http://schemas.microsoft.com/VisualStudio/2011/storyboarding/control/v1.0">
-  <Id Name="System.Storyboard.Stencil.Label" RevisionId="00000000-0000-0000-0000-000000000000" Stencil="System.Common" StencilRevisionId="00000000-0000-0000-0000-000000000000" StencilVersion="1.0"/>
-</Control>
-</file>
-
-<file path=customXml/item4.xml><?xml version="1.0" encoding="utf-8"?>
-<Control xmlns="http://schemas.microsoft.com/VisualStudio/2011/storyboarding/control">
-  <Id Name="System.Storyboarding.Backgrounds.WindowsPhone" RevisionId="bdb52a43-f875-417f-a3f8-9b0259dd3051" Stencil="System.Storyboarding.Backgrounds" StencilRevisionId="bdb52a43-f875-417f-a3f8-9b0259dd3051" StencilVersion="0.1"/>
-</Control>
-</file>
-
-<file path=customXml/item40.xml><?xml version="1.0" encoding="utf-8"?>
-<Control xmlns="http://schemas.microsoft.com/VisualStudio/2011/storyboarding/control">
-  <Id Name="System.Storyboarding.Backgrounds.WebBrowser" RevisionId="bdb52a43-f875-417f-a3f8-9b0259dd3051" Stencil="System.Storyboarding.Backgrounds" StencilRevisionId="bdb52a43-f875-417f-a3f8-9b0259dd3051" StencilVersion="0.1"/>
-</Control>
-</file>
-
-<file path=customXml/item41.xml><?xml version="1.0" encoding="utf-8"?>
-<Control xmlns="http://schemas.microsoft.com/VisualStudio/2011/storyboarding/control/v1.0">
-  <Id Name="System.Storyboard.Stencil.TreeList" RevisionId="00000000-0000-0000-0000-000000000000" Stencil="System.Common" StencilRevisionId="00000000-0000-0000-0000-000000000000" StencilVersion="1.0"/>
-</Control>
-</file>
-
-<file path=customXml/item42.xml><?xml version="1.0" encoding="utf-8"?>
+<file path=customXml/item2.xml><?xml version="1.0" encoding="utf-8"?>
 <ct:contentTypeSchema xmlns:ct="http://schemas.microsoft.com/office/2006/metadata/contentType" xmlns:ma="http://schemas.microsoft.com/office/2006/metadata/properties/metaAttributes" ct:_="" ma:_="" ma:contentTypeName="Document" ma:contentTypeID="0x01010022C9F813607D1D469674AAA3D24DC85B" ma:contentTypeVersion="0" ma:contentTypeDescription="Create a new document." ma:contentTypeScope="" ma:versionID="2370c695874a1292907530ead749c2be">
   <xsd:schema xmlns:xsd="http://www.w3.org/2001/XMLSchema" xmlns:xs="http://www.w3.org/2001/XMLSchema" xmlns:p="http://schemas.microsoft.com/office/2006/metadata/properties" xmlns:ns2="b4ebf394-daf6-497a-96c5-a2f8c10b38cf" targetNamespace="http://schemas.microsoft.com/office/2006/metadata/properties" ma:root="true" ma:fieldsID="9b19f9f2e3a2b2958cd8578711e95110" ns2:_="">
     <xsd:import namespace="b4ebf394-daf6-497a-96c5-a2f8c10b38cf"/>
@@ -8948,55 +9114,512 @@
 </ct:contentTypeSchema>
 </file>
 
-<file path=customXml/item43.xml><?xml version="1.0" encoding="utf-8"?>
+<file path=customXml/item20.xml><?xml version="1.0" encoding="utf-8"?>
+<Control xmlns="http://schemas.microsoft.com/VisualStudio/2011/storyboarding/control/v1.0">
+  <Id Name="System.Storyboard.Stencil.Breadcrumb" RevisionId="00000000-0000-0000-0000-000000000000" Stencil="System.Common" StencilRevisionId="00000000-0000-0000-0000-000000000000" StencilVersion="1.0"/>
+</Control>
+</file>
+
+<file path=customXml/item21.xml><?xml version="1.0" encoding="utf-8"?>
+<Control xmlns="http://schemas.microsoft.com/VisualStudio/2011/storyboarding/control/v1.0">
+  <Id Name="System.Storyboard.Stencil.Title" RevisionId="00000000-0000-0000-0000-000000000000" Stencil="System.Common" StencilRevisionId="00000000-0000-0000-0000-000000000000" StencilVersion="1.0"/>
+</Control>
+</file>
+
+<file path=customXml/item22.xml><?xml version="1.0" encoding="utf-8"?>
+<Control xmlns="http://schemas.microsoft.com/VisualStudio/2011/storyboarding/control">
+  <Id Name="System.Storyboarding.WindowsApps.WindowsAppsMediumWideTile" Revision="1" Stencil="System.Storyboarding.WindowsApps" StencilVersion="0.1"/>
+</Control>
+</file>
+
+<file path=customXml/item23.xml><?xml version="1.0" encoding="utf-8"?>
+<Control xmlns="http://schemas.microsoft.com/VisualStudio/2011/storyboarding/control/v1.0">
+  <Id Name="System.Storyboarding.Icons.FolderOpen" RevisionId="05cd6d03-c0b2-488e-98a7-d68de69a2cfc" Stencil="System.Storyboarding.Icons" StencilRevisionId="05cd6d03-c0b2-488e-98a7-d68de69a2cfc" StencilVersion="0.1"/>
+</Control>
+</file>
+
+<file path=customXml/item24.xml><?xml version="1.0" encoding="utf-8"?>
+<Control xmlns="http://schemas.microsoft.com/VisualStudio/2011/storyboarding/control/v1.0">
+  <Id Name="System.Storyboarding.Common.Text" RevisionId="68ea164d-c1de-47a5-804f-d4d1290fa524" Stencil="System.Storyboarding.Common" StencilRevisionId="68ea164d-c1de-47a5-804f-d4d1290fa524" StencilVersion="0.1"/>
+</Control>
+</file>
+
+<file path=customXml/item25.xml><?xml version="1.0" encoding="utf-8"?>
+<Control xmlns="http://schemas.microsoft.com/VisualStudio/2011/storyboarding/control/v1.0">
+  <Id Name="System.Storyboard.Stencil.Button" RevisionId="00000000-0000-0000-0000-000000000000" Stencil="System.Common" StencilRevisionId="00000000-0000-0000-0000-000000000000" StencilVersion="1.0"/>
+</Control>
+</file>
+
+<file path=customXml/item26.xml><?xml version="1.0" encoding="utf-8"?>
+<Control xmlns="http://schemas.microsoft.com/VisualStudio/2011/storyboarding/control">
+  <Id Name="System.Storyboarding.Backgrounds.RibbonApplication" RevisionId="bdb52a43-f875-417f-a3f8-9b0259dd3051" Stencil="System.Storyboarding.Backgrounds" StencilRevisionId="bdb52a43-f875-417f-a3f8-9b0259dd3051" StencilVersion="0.1"/>
+</Control>
+</file>
+
+<file path=customXml/item27.xml><?xml version="1.0" encoding="utf-8"?>
+<Control xmlns="http://schemas.microsoft.com/VisualStudio/2011/storyboarding/control/v1.0">
+  <Id Name="System.Storyboard.Stencil.PhoneNotification" RevisionId="00000000-0000-0000-0000-000000000000" Stencil="System.Windows_Phone_7" StencilRevisionId="00000000-0000-0000-0000-000000000000" StencilVersion="1.0"/>
+</Control>
+</file>
+
+<file path=customXml/item28.xml><?xml version="1.0" encoding="utf-8"?>
+<Control xmlns="http://schemas.microsoft.com/VisualStudio/2011/storyboarding/control">
+  <Id Name="System.Storyboarding.WindowsApps.WindowsAppsMediumWideTile" Revision="1" Stencil="System.Storyboarding.WindowsApps" StencilVersion="0.1"/>
+</Control>
+</file>
+
+<file path=customXml/item29.xml><?xml version="1.0" encoding="utf-8"?>
+<Control xmlns="http://schemas.microsoft.com/VisualStudio/2011/storyboarding/control/v1.0">
+  <Id Name="System.Storyboard.Stencil.TreeList" RevisionId="00000000-0000-0000-0000-000000000000" Stencil="System.Common" StencilRevisionId="00000000-0000-0000-0000-000000000000" StencilVersion="1.0"/>
+</Control>
+</file>
+
+<file path=customXml/item3.xml><?xml version="1.0" encoding="utf-8"?>
+<Control xmlns="http://schemas.microsoft.com/VisualStudio/2011/storyboarding/control/v1.0">
+  <Id Name="System.Storyboard.Stencil.DatePicker" RevisionId="00000000-0000-0000-0000-000000000000" Stencil="System.Common" StencilRevisionId="00000000-0000-0000-0000-000000000000" StencilVersion="1.0"/>
+</Control>
+</file>
+
+<file path=customXml/item30.xml><?xml version="1.0" encoding="utf-8"?>
+<Control xmlns="http://schemas.microsoft.com/VisualStudio/2011/storyboarding/control/v1.0">
+  <Id Name="System.Storyboard.Stencil.PhoneBrowserBar" RevisionId="00000000-0000-0000-0000-000000000000" Stencil="System.Windows_Phone_7" StencilRevisionId="00000000-0000-0000-0000-000000000000" StencilVersion="1.0"/>
+</Control>
+</file>
+
+<file path=customXml/item31.xml><?xml version="1.0" encoding="utf-8"?>
+<Control xmlns="http://schemas.microsoft.com/VisualStudio/2011/storyboarding/control">
+  <Id Name="System.Storyboarding.WindowsApps.WindowsAppsMediumWideTile" Revision="1" Stencil="System.Storyboarding.WindowsApps" StencilVersion="0.1"/>
+</Control>
+</file>
+
+<file path=customXml/item32.xml><?xml version="1.0" encoding="utf-8"?>
 <Control xmlns="http://schemas.microsoft.com/VisualStudio/2011/storyboarding/control/v1.0">
   <Id Name="System.Storyboard.Stencil.TextArea" RevisionId="00000000-0000-0000-0000-000000000000" Stencil="System.Common" StencilRevisionId="00000000-0000-0000-0000-000000000000" StencilVersion="1.0"/>
 </Control>
 </file>
 
+<file path=customXml/item33.xml><?xml version="1.0" encoding="utf-8"?>
+<Control xmlns="http://schemas.microsoft.com/VisualStudio/2011/storyboarding/control/v1.0">
+  <Id Name="System.Storyboard.Stencil.WidePhoneTile" RevisionId="00000000-0000-0000-0000-000000000000" Stencil="System.Windows_Phone_7" StencilRevisionId="00000000-0000-0000-0000-000000000000" StencilVersion="1.0"/>
+</Control>
+</file>
+
+<file path=customXml/item34.xml><?xml version="1.0" encoding="utf-8"?>
+<Control xmlns="http://schemas.microsoft.com/VisualStudio/2011/storyboarding/control">
+  <Id Name="System.Storyboarding.Backgrounds.RibbonApplication" RevisionId="bdb52a43-f875-417f-a3f8-9b0259dd3051" Stencil="System.Storyboarding.Backgrounds" StencilRevisionId="bdb52a43-f875-417f-a3f8-9b0259dd3051" StencilVersion="0.1"/>
+</Control>
+</file>
+
+<file path=customXml/item35.xml><?xml version="1.0" encoding="utf-8"?>
+<Control xmlns="http://schemas.microsoft.com/VisualStudio/2011/storyboarding/control/v1.0">
+  <Id Name="System.Storyboard.Stencil.PositionControl" RevisionId="00000000-0000-0000-0000-000000000000" Stencil="System.Media" StencilRevisionId="00000000-0000-0000-0000-000000000000" StencilVersion="1.0"/>
+</Control>
+</file>
+
+<file path=customXml/item36.xml><?xml version="1.0" encoding="utf-8"?>
+<Control xmlns="http://schemas.microsoft.com/VisualStudio/2011/storyboarding/control/v1.0">
+  <Id Name="System.Storyboard.Stencil.VideoPlayer" RevisionId="00000000-0000-0000-0000-000000000000" Stencil="System.Media" StencilRevisionId="00000000-0000-0000-0000-000000000000" StencilVersion="1.0"/>
+</Control>
+</file>
+
+<file path=customXml/item37.xml><?xml version="1.0" encoding="utf-8"?>
+<Control xmlns="http://schemas.microsoft.com/VisualStudio/2011/storyboarding/control/v1.0">
+  <Id Name="System.Storyboard.Stencil.VerticalScrollbar" RevisionId="00000000-0000-0000-0000-000000000000" Stencil="System.Common" StencilRevisionId="00000000-0000-0000-0000-000000000000" StencilVersion="1.0"/>
+</Control>
+</file>
+
+<file path=customXml/item38.xml><?xml version="1.0" encoding="utf-8"?>
+<Control xmlns="http://schemas.microsoft.com/VisualStudio/2011/storyboarding/control/v1.0">
+  <Id Name="System.Storyboard.Stencil.Label" RevisionId="00000000-0000-0000-0000-000000000000" Stencil="System.Common" StencilRevisionId="00000000-0000-0000-0000-000000000000" StencilVersion="1.0"/>
+</Control>
+</file>
+
+<file path=customXml/item39.xml><?xml version="1.0" encoding="utf-8"?>
+<Control xmlns="http://schemas.microsoft.com/VisualStudio/2011/storyboarding/control/v1.0">
+  <Id Name="System.Storyboard.Stencil.FourItemList" RevisionId="00000000-0000-0000-0000-000000000000" Stencil="System.Common" StencilRevisionId="00000000-0000-0000-0000-000000000000" StencilVersion="1.0"/>
+</Control>
+</file>
+
+<file path=customXml/item4.xml><?xml version="1.0" encoding="utf-8"?>
+<Control xmlns="http://schemas.microsoft.com/VisualStudio/2011/storyboarding/control/v1.0">
+  <Id Name="System.Storyboard.Stencil.PhoneTile" RevisionId="00000000-0000-0000-0000-000000000000" Stencil="System.Windows_Phone_7" StencilRevisionId="00000000-0000-0000-0000-000000000000" StencilVersion="1.0"/>
+</Control>
+</file>
+
+<file path=customXml/item40.xml><?xml version="1.0" encoding="utf-8"?>
+<Control xmlns="http://schemas.microsoft.com/VisualStudio/2011/storyboarding/control">
+  <Id Name="System.Storyboarding.WindowsApps.WindowsAppsMediumWideTile" Revision="1" Stencil="System.Storyboarding.WindowsApps" StencilVersion="0.1"/>
+</Control>
+</file>
+
+<file path=customXml/item41.xml><?xml version="1.0" encoding="utf-8"?>
+<Control xmlns="http://schemas.microsoft.com/VisualStudio/2011/storyboarding/control">
+  <Id Name="System.Storyboarding.Backgrounds.WindowsPhoneLandscape" RevisionId="bdb52a43-f875-417f-a3f8-9b0259dd3051" Stencil="System.Storyboarding.Backgrounds" StencilRevisionId="bdb52a43-f875-417f-a3f8-9b0259dd3051" StencilVersion="0.1"/>
+</Control>
+</file>
+
+<file path=customXml/item42.xml><?xml version="1.0" encoding="utf-8"?>
+<Control xmlns="http://schemas.microsoft.com/VisualStudio/2011/storyboarding/control">
+  <Id Name="System.Storyboarding.WindowsApps.WindowsAppsMediumWideTile" Revision="1" Stencil="System.Storyboarding.WindowsApps" StencilVersion="0.1"/>
+</Control>
+</file>
+
+<file path=customXml/item43.xml><?xml version="1.0" encoding="utf-8"?>
+<Control xmlns="http://schemas.microsoft.com/VisualStudio/2011/storyboarding/control">
+  <Id Name="System.Storyboarding.WindowsApps.WindowsAppsMediumWideTile" Revision="1" Stencil="System.Storyboarding.WindowsApps" StencilVersion="0.1"/>
+</Control>
+</file>
+
 <file path=customXml/item44.xml><?xml version="1.0" encoding="utf-8"?>
+<Control xmlns="http://schemas.microsoft.com/VisualStudio/2011/storyboarding/control">
+  <Id Name="System.Storyboarding.WindowsApps.WindowsAppsMediumWideTile" Revision="1" Stencil="System.Storyboarding.WindowsApps" StencilVersion="0.1"/>
+</Control>
+</file>
+
+<file path=customXml/item45.xml><?xml version="1.0" encoding="utf-8"?>
+<Control xmlns="http://schemas.microsoft.com/VisualStudio/2011/storyboarding/control/v1.0">
+  <Id Name="System.Storyboard.Stencil.PositionControl" RevisionId="00000000-0000-0000-0000-000000000000" Stencil="System.Media" StencilRevisionId="00000000-0000-0000-0000-000000000000" StencilVersion="1.0"/>
+</Control>
+</file>
+
+<file path=customXml/item46.xml><?xml version="1.0" encoding="utf-8"?>
+<Control xmlns="http://schemas.microsoft.com/VisualStudio/2011/storyboarding/control/v1.0">
+  <Id Name="System.Storyboard.Stencil.ColorPicker" RevisionId="00000000-0000-0000-0000-000000000000" Stencil="System.Media" StencilRevisionId="00000000-0000-0000-0000-000000000000" StencilVersion="1.0"/>
+</Control>
+</file>
+
+<file path=customXml/item47.xml><?xml version="1.0" encoding="utf-8"?>
+<Control xmlns="http://schemas.microsoft.com/VisualStudio/2011/storyboarding/control">
+  <Id Name="System.Storyboarding.Backgrounds.SharePoint" RevisionId="bdb52a43-f875-417f-a3f8-9b0259dd3051" Stencil="System.Storyboarding.Backgrounds" StencilRevisionId="bdb52a43-f875-417f-a3f8-9b0259dd3051" StencilVersion="0.1"/>
+</Control>
+</file>
+
+<file path=customXml/item48.xml><?xml version="1.0" encoding="utf-8"?>
+<Control xmlns="http://schemas.microsoft.com/VisualStudio/2011/storyboarding/control/v1.0">
+  <Id Name="System.Storyboard.Stencil.DropdownBox" RevisionId="00000000-0000-0000-0000-000000000000" Stencil="System.Common" StencilRevisionId="00000000-0000-0000-0000-000000000000" StencilVersion="1.0"/>
+</Control>
+</file>
+
+<file path=customXml/item49.xml><?xml version="1.0" encoding="utf-8"?>
+<Control xmlns="http://schemas.microsoft.com/VisualStudio/2011/storyboarding/control/v1.0">
+  <Id Name="System.Storyboard.Stencil.Title" RevisionId="00000000-0000-0000-0000-000000000000" Stencil="System.Common" StencilRevisionId="00000000-0000-0000-0000-000000000000" StencilVersion="1.0"/>
+</Control>
+</file>
+
+<file path=customXml/item5.xml><?xml version="1.0" encoding="utf-8"?>
+<Control xmlns="http://schemas.microsoft.com/VisualStudio/2011/storyboarding/control/v1.0">
+  <Id Name="System.Storyboarding.Common.Text" RevisionId="68ea164d-c1de-47a5-804f-d4d1290fa524" Stencil="System.Storyboarding.Common" StencilRevisionId="68ea164d-c1de-47a5-804f-d4d1290fa524" StencilVersion="0.1"/>
+</Control>
+</file>
+
+<file path=customXml/item50.xml><?xml version="1.0" encoding="utf-8"?>
+<Control xmlns="http://schemas.microsoft.com/VisualStudio/2011/storyboarding/control/v1.0">
+  <Id Name="System.Storyboard.Stencil.Title" RevisionId="00000000-0000-0000-0000-000000000000" Stencil="System.Common" StencilRevisionId="00000000-0000-0000-0000-000000000000" StencilVersion="1.0"/>
+</Control>
+</file>
+
+<file path=customXml/item51.xml><?xml version="1.0" encoding="utf-8"?>
+<Control xmlns="http://schemas.microsoft.com/VisualStudio/2011/storyboarding/control">
+  <Id Name="System.Storyboarding.WindowsApps.WindowsAppsMediumWideTile" Revision="1" Stencil="System.Storyboarding.WindowsApps" StencilVersion="0.1"/>
+</Control>
+</file>
+
+<file path=customXml/item52.xml><?xml version="1.0" encoding="utf-8"?>
+<Control xmlns="http://schemas.microsoft.com/VisualStudio/2011/storyboarding/control/v1.0">
+  <Id Name="System.Storyboard.Stencil.PlayControls" RevisionId="00000000-0000-0000-0000-000000000000" Stencil="System.Media" StencilRevisionId="00000000-0000-0000-0000-000000000000" StencilVersion="1.0"/>
+</Control>
+</file>
+
+<file path=customXml/item53.xml><?xml version="1.0" encoding="utf-8"?>
+<Control xmlns="http://schemas.microsoft.com/VisualStudio/2011/storyboarding/control/v1.0">
+  <Id Name="System.Storyboard.Stencil.VerticalBarChart" RevisionId="00000000-0000-0000-0000-000000000000" Stencil="System.Media" StencilRevisionId="00000000-0000-0000-0000-000000000000" StencilVersion="1.0"/>
+</Control>
+</file>
+
+<file path=customXml/item54.xml><?xml version="1.0" encoding="utf-8"?>
+<Control xmlns="http://schemas.microsoft.com/VisualStudio/2011/storyboarding/control/v1.0">
+  <Id Name="System.Storyboard.Stencil.LineChart" RevisionId="00000000-0000-0000-0000-000000000000" Stencil="System.Media" StencilRevisionId="00000000-0000-0000-0000-000000000000" StencilVersion="1.0"/>
+</Control>
+</file>
+
+<file path=customXml/item55.xml><?xml version="1.0" encoding="utf-8"?>
+<Control xmlns="http://schemas.microsoft.com/VisualStudio/2011/storyboarding/control/v1.0">
+  <Id Name="System.Storyboard.Stencil.TreeList" RevisionId="00000000-0000-0000-0000-000000000000" Stencil="System.Common" StencilRevisionId="00000000-0000-0000-0000-000000000000" StencilVersion="1.0"/>
+</Control>
+</file>
+
+<file path=customXml/item56.xml><?xml version="1.0" encoding="utf-8"?>
+<Control xmlns="http://schemas.microsoft.com/VisualStudio/2011/storyboarding/control/v1.0">
+  <Id Name="System.Storyboarding.Common.Text" RevisionId="68ea164d-c1de-47a5-804f-d4d1290fa524" Stencil="System.Storyboarding.Common" StencilRevisionId="68ea164d-c1de-47a5-804f-d4d1290fa524" StencilVersion="0.1"/>
+</Control>
+</file>
+
+<file path=customXml/item57.xml><?xml version="1.0" encoding="utf-8"?>
+<Control xmlns="http://schemas.microsoft.com/VisualStudio/2011/storyboarding/control">
+  <Id Name="System.Storyboarding.WindowsApps.WindowsAppsMediumWideTile" Revision="1" Stencil="System.Storyboarding.WindowsApps" StencilVersion="0.1"/>
+</Control>
+</file>
+
+<file path=customXml/item58.xml><?xml version="1.0" encoding="utf-8"?>
+<Control xmlns="http://schemas.microsoft.com/VisualStudio/2011/storyboarding/control">
+  <Id Name="System.Storyboarding.WindowsPhoneIcons.Video" RevisionId="5814b1e0-0169-11e0-a976-0800200c9a66" Stencil="System.Storyboarding.WindowsPhoneIcons" StencilRevisionId="5814b1e0-0169-11e0-a976-0800200c9a66" StencilVersion="0.1"/>
+</Control>
+</file>
+
+<file path=customXml/item59.xml><?xml version="1.0" encoding="utf-8"?>
+<Control xmlns="http://schemas.microsoft.com/VisualStudio/2011/storyboarding/control/v1.0">
+  <Id Name="System.Storyboard.Stencil.Title" RevisionId="00000000-0000-0000-0000-000000000000" Stencil="System.Common" StencilRevisionId="00000000-0000-0000-0000-000000000000" StencilVersion="1.0"/>
+</Control>
+</file>
+
+<file path=customXml/item6.xml><?xml version="1.0" encoding="utf-8"?>
+<Control xmlns="http://schemas.microsoft.com/VisualStudio/2011/storyboarding/control">
+  <Id Name="System.Storyboarding.WindowsApps.WindowsAppsMediumWideTile" Revision="1" Stencil="System.Storyboarding.WindowsApps" StencilVersion="0.1"/>
+</Control>
+</file>
+
+<file path=customXml/item60.xml><?xml version="1.0" encoding="utf-8"?>
+<Control xmlns="http://schemas.microsoft.com/VisualStudio/2011/storyboarding/control/v1.0">
+  <Id Name="System.Storyboard.Stencil.HorizontalScrollbar" RevisionId="00000000-0000-0000-0000-000000000000" Stencil="System.Common" StencilRevisionId="00000000-0000-0000-0000-000000000000" StencilVersion="1.0"/>
+</Control>
+</file>
+
+<file path=customXml/item61.xml><?xml version="1.0" encoding="utf-8"?>
+<Control xmlns="http://schemas.microsoft.com/VisualStudio/2011/storyboarding/control">
+  <Id Name="System.Storyboarding.WindowsApps.WindowsAppsMediumWideTile" Revision="1" Stencil="System.Storyboarding.WindowsApps" StencilVersion="0.1"/>
+</Control>
+</file>
+
+<file path=customXml/item62.xml><?xml version="1.0" encoding="utf-8"?>
+<Control xmlns="http://schemas.microsoft.com/VisualStudio/2011/storyboarding/control/v1.0">
+  <Id Name="System.Storyboarding.Icons.Help" RevisionId="05cd6d03-c0b2-488e-98a7-d68de69a2cfc" Stencil="System.Storyboarding.Icons" StencilRevisionId="05cd6d03-c0b2-488e-98a7-d68de69a2cfc" StencilVersion="0.1"/>
+</Control>
+</file>
+
+<file path=customXml/item63.xml><?xml version="1.0" encoding="utf-8"?>
+<Control xmlns="http://schemas.microsoft.com/VisualStudio/2011/storyboarding/control/v1.0">
+  <Id Name="System.Storyboard.Stencil.DropdownBox" RevisionId="00000000-0000-0000-0000-000000000000" Stencil="System.Common" StencilRevisionId="00000000-0000-0000-0000-000000000000" StencilVersion="1.0"/>
+</Control>
+</file>
+
+<file path=customXml/item64.xml><?xml version="1.0" encoding="utf-8"?>
+<Control xmlns="http://schemas.microsoft.com/VisualStudio/2011/storyboarding/control/v1.0">
+  <Id Name="System.Storyboard.Stencil.TabGroup" RevisionId="00000000-0000-0000-0000-000000000000" Stencil="System.Common" StencilRevisionId="00000000-0000-0000-0000-000000000000" StencilVersion="1.0"/>
+</Control>
+</file>
+
+<file path=customXml/item65.xml><?xml version="1.0" encoding="utf-8"?>
+<Control xmlns="http://schemas.microsoft.com/VisualStudio/2011/storyboarding/control">
+  <Id Name="System.Storyboarding.WindowsApps.WindowsAppsMediumWideTile" Revision="1" Stencil="System.Storyboarding.WindowsApps" StencilVersion="0.1"/>
+</Control>
+</file>
+
+<file path=customXml/item66.xml><?xml version="1.0" encoding="utf-8"?>
+<Control xmlns="http://schemas.microsoft.com/VisualStudio/2011/storyboarding/control/v1.0">
+  <Id Name="System.Storyboard.Stencil.Calendar" RevisionId="00000000-0000-0000-0000-000000000000" Stencil="System.Common" StencilRevisionId="00000000-0000-0000-0000-000000000000" StencilVersion="1.0"/>
+</Control>
+</file>
+
+<file path=customXml/item67.xml><?xml version="1.0" encoding="utf-8"?>
+<?mso-contentType ?>
+<FormTemplates xmlns="http://schemas.microsoft.com/sharepoint/v3/contenttype/forms">
+  <Display>DocumentLibraryForm</Display>
+  <Edit>DocumentLibraryForm</Edit>
+  <New>DocumentLibraryForm</New>
+</FormTemplates>
+</file>
+
+<file path=customXml/item68.xml><?xml version="1.0" encoding="utf-8"?>
+<Control xmlns="http://schemas.microsoft.com/VisualStudio/2011/storyboarding/control">
+  <Id Name="System.Storyboarding.WindowsApps.WindowsAppsMediumWideTile" Revision="1" Stencil="System.Storyboarding.WindowsApps" StencilVersion="0.1"/>
+</Control>
+</file>
+
+<file path=customXml/item69.xml><?xml version="1.0" encoding="utf-8"?>
+<Control xmlns="http://schemas.microsoft.com/VisualStudio/2011/storyboarding/control/v1.0">
+  <Id Name="System.Storyboard.Stencil.PieChart" RevisionId="00000000-0000-0000-0000-000000000000" Stencil="System.Media" StencilRevisionId="00000000-0000-0000-0000-000000000000" StencilVersion="1.0"/>
+</Control>
+</file>
+
+<file path=customXml/item7.xml><?xml version="1.0" encoding="utf-8"?>
+<Control xmlns="http://schemas.microsoft.com/VisualStudio/2011/storyboarding/control/v1.0">
+  <Id Name="System.Storyboard.Stencil.PhoneTile" RevisionId="00000000-0000-0000-0000-000000000000" Stencil="System.Windows_Phone_7" StencilRevisionId="00000000-0000-0000-0000-000000000000" StencilVersion="1.0"/>
+</Control>
+</file>
+
+<file path=customXml/item70.xml><?xml version="1.0" encoding="utf-8"?>
+<Control xmlns="http://schemas.microsoft.com/VisualStudio/2011/storyboarding/control">
+  <Id Name="System.Storyboarding.WindowsApps.WindowsAppsMediumWideTile" Revision="1" Stencil="System.Storyboarding.WindowsApps" StencilVersion="0.1"/>
+</Control>
+</file>
+
+<file path=customXml/item71.xml><?xml version="1.0" encoding="utf-8"?>
+<Control xmlns="http://schemas.microsoft.com/VisualStudio/2011/storyboarding/control/v1.0">
+  <Id Name="System.Storyboard.Stencil.PhoneTile" RevisionId="00000000-0000-0000-0000-000000000000" Stencil="System.Windows_Phone_7" StencilRevisionId="00000000-0000-0000-0000-000000000000" StencilVersion="1.0"/>
+</Control>
+</file>
+
+<file path=customXml/item72.xml><?xml version="1.0" encoding="utf-8"?>
+<Control xmlns="http://schemas.microsoft.com/VisualStudio/2011/storyboarding/control">
+  <Id Name="System.Storyboarding.WindowsApps.WindowsAppsMediumWideTile" Revision="1" Stencil="System.Storyboarding.WindowsApps" StencilVersion="0.1"/>
+</Control>
+</file>
+
+<file path=customXml/item73.xml><?xml version="1.0" encoding="utf-8"?>
+<Control xmlns="http://schemas.microsoft.com/VisualStudio/2011/storyboarding/control/v1.0">
+  <Id Name="System.Storyboard.Stencil.Slider" RevisionId="00000000-0000-0000-0000-000000000000" Stencil="System.Common" StencilRevisionId="00000000-0000-0000-0000-000000000000" StencilVersion="1.0"/>
+</Control>
+</file>
+
+<file path=customXml/item74.xml><?xml version="1.0" encoding="utf-8"?>
 <Control xmlns="http://schemas.microsoft.com/VisualStudio/2011/storyboarding/control/v1.0">
   <Id Name="System.Storyboard.Stencil.VerticalSplitter" RevisionId="00000000-0000-0000-0000-000000000000" Stencil="System.Windows" StencilRevisionId="00000000-0000-0000-0000-000000000000" StencilVersion="1.0"/>
 </Control>
 </file>
 
-<file path=customXml/item45.xml><?xml version="1.0" encoding="utf-8"?>
+<file path=customXml/item75.xml><?xml version="1.0" encoding="utf-8"?>
+<Control xmlns="http://schemas.microsoft.com/VisualStudio/2011/storyboarding/control/v1.0">
+  <Id Name="System.Storyboard.Stencil.ColorPicker" RevisionId="00000000-0000-0000-0000-000000000000" Stencil="System.Media" StencilRevisionId="00000000-0000-0000-0000-000000000000" StencilVersion="1.0"/>
+</Control>
+</file>
+
+<file path=customXml/item76.xml><?xml version="1.0" encoding="utf-8"?>
+<Control xmlns="http://schemas.microsoft.com/VisualStudio/2011/storyboarding/control/v1.0">
+  <Id Name="System.Storyboard.Stencil.PhoneApplicationBar" RevisionId="00000000-0000-0000-0000-000000000000" Stencil="System.Windows_Phone_7" StencilRevisionId="00000000-0000-0000-0000-000000000000" StencilVersion="1.0"/>
+</Control>
+</file>
+
+<file path=customXml/item77.xml><?xml version="1.0" encoding="utf-8"?>
+<Control xmlns="http://schemas.microsoft.com/VisualStudio/2011/storyboarding/control/v1.0">
+  <Id Name="System.Storyboarding.Common.Text" RevisionId="68ea164d-c1de-47a5-804f-d4d1290fa524" Stencil="System.Storyboarding.Common" StencilRevisionId="68ea164d-c1de-47a5-804f-d4d1290fa524" StencilVersion="0.1"/>
+</Control>
+</file>
+
+<file path=customXml/item78.xml><?xml version="1.0" encoding="utf-8"?>
+<Control xmlns="http://schemas.microsoft.com/VisualStudio/2011/storyboarding/control/v1.0">
+  <Id Name="System.Storyboard.Stencil.PhoneTile" RevisionId="00000000-0000-0000-0000-000000000000" Stencil="System.Windows_Phone_7" StencilRevisionId="00000000-0000-0000-0000-000000000000" StencilVersion="1.0"/>
+</Control>
+</file>
+
+<file path=customXml/item79.xml><?xml version="1.0" encoding="utf-8"?>
+<Control xmlns="http://schemas.microsoft.com/VisualStudio/2011/storyboarding/control/v1.0">
+  <Id Name="System.Storyboarding.Media.Image" RevisionId="658c0869-8ded-44f2-a68a-f8e8fcb7d3bd" Stencil="System.Storyboarding.Media" StencilRevisionId="658c0869-8ded-44f2-a68a-f8e8fcb7d3bd" StencilVersion="0.1"/>
+</Control>
+</file>
+
+<file path=customXml/item8.xml><?xml version="1.0" encoding="utf-8"?>
+<Control xmlns="http://schemas.microsoft.com/VisualStudio/2011/storyboarding/control/v1.0">
+  <Id Name="System.Storyboard.Stencil.PhoneKeyboard" RevisionId="00000000-0000-0000-0000-000000000000" Stencil="System.Windows_Phone_7" StencilRevisionId="00000000-0000-0000-0000-000000000000" StencilVersion="1.0"/>
+</Control>
+</file>
+
+<file path=customXml/item80.xml><?xml version="1.0" encoding="utf-8"?>
+<Control xmlns="http://schemas.microsoft.com/VisualStudio/2011/storyboarding/control/v1.0">
+  <Id Name="System.Storyboard.Stencil.Image" RevisionId="00000000-0000-0000-0000-000000000000" Stencil="System.Media" StencilRevisionId="00000000-0000-0000-0000-000000000000" StencilVersion="1.0"/>
+</Control>
+</file>
+
+<file path=customXml/item81.xml><?xml version="1.0" encoding="utf-8"?>
+<Control xmlns="http://schemas.microsoft.com/VisualStudio/2011/storyboarding/control/v1.0">
+  <Id Name="System.Storyboard.Stencil.StatusBar" RevisionId="00000000-0000-0000-0000-000000000000" Stencil="System.Windows" StencilRevisionId="00000000-0000-0000-0000-000000000000" StencilVersion="1.0"/>
+</Control>
+</file>
+
+<file path=customXml/item82.xml><?xml version="1.0" encoding="utf-8"?>
+<Control xmlns="http://schemas.microsoft.com/VisualStudio/2011/storyboarding/control/v1.0">
+  <Id Name="System.Storyboard.Stencil.Hyperlink" RevisionId="00000000-0000-0000-0000-000000000000" Stencil="System.Common" StencilRevisionId="00000000-0000-0000-0000-000000000000" StencilVersion="1.0"/>
+</Control>
+</file>
+
+<file path=customXml/item83.xml><?xml version="1.0" encoding="utf-8"?>
+<Control xmlns="http://schemas.microsoft.com/VisualStudio/2011/storyboarding/control/v1.0">
+  <Id Name="System.Storyboard.Stencil.WidePhoneTile" RevisionId="00000000-0000-0000-0000-000000000000" Stencil="System.Windows_Phone_7" StencilRevisionId="00000000-0000-0000-0000-000000000000" StencilVersion="1.0"/>
+</Control>
+</file>
+
+<file path=customXml/item84.xml><?xml version="1.0" encoding="utf-8"?>
+<Control xmlns="http://schemas.microsoft.com/VisualStudio/2011/storyboarding/control">
+  <Id Name="System.Storyboarding.Backgrounds.WindowsPhone" RevisionId="bdb52a43-f875-417f-a3f8-9b0259dd3051" Stencil="System.Storyboarding.Backgrounds" StencilRevisionId="bdb52a43-f875-417f-a3f8-9b0259dd3051" StencilVersion="0.1"/>
+</Control>
+</file>
+
+<file path=customXml/item85.xml><?xml version="1.0" encoding="utf-8"?>
+<Control xmlns="http://schemas.microsoft.com/VisualStudio/2011/storyboarding/control/v1.0">
+  <Id Name="System.Storyboard.Stencil.Browser" RevisionId="bdb52a43-f875-417f-a3f8-9b0259dd3051" Stencil="System.Backgrounds" StencilRevisionId="bdb52a43-f875-417f-a3f8-9b0259dd3051" StencilVersion="1.0"/>
+</Control>
+</file>
+
+<file path=customXml/item86.xml><?xml version="1.0" encoding="utf-8"?>
+<?mso-contentType ?>
+<spe:Receivers xmlns:spe="http://schemas.microsoft.com/sharepoint/events">
+  <Receiver>
+    <Name>Document ID Generator</Name>
+    <Synchronization>Synchronous</Synchronization>
+    <Type>10001</Type>
+    <SequenceNumber>1000</SequenceNumber>
+    <Assembly>Microsoft.Office.DocumentManagement, Version=14.0.0.0, Culture=neutral, PublicKeyToken=71e9bce111e9429c</Assembly>
+    <Class>Microsoft.Office.DocumentManagement.Internal.DocIdHandler</Class>
+    <Data/>
+    <Filter/>
+  </Receiver>
+  <Receiver>
+    <Name>Document ID Generator</Name>
+    <Synchronization>Synchronous</Synchronization>
+    <Type>10002</Type>
+    <SequenceNumber>1001</SequenceNumber>
+    <Assembly>Microsoft.Office.DocumentManagement, Version=14.0.0.0, Culture=neutral, PublicKeyToken=71e9bce111e9429c</Assembly>
+    <Class>Microsoft.Office.DocumentManagement.Internal.DocIdHandler</Class>
+    <Data/>
+    <Filter/>
+  </Receiver>
+  <Receiver>
+    <Name>Document ID Generator</Name>
+    <Synchronization>Synchronous</Synchronization>
+    <Type>10004</Type>
+    <SequenceNumber>1002</SequenceNumber>
+    <Assembly>Microsoft.Office.DocumentManagement, Version=14.0.0.0, Culture=neutral, PublicKeyToken=71e9bce111e9429c</Assembly>
+    <Class>Microsoft.Office.DocumentManagement.Internal.DocIdHandler</Class>
+    <Data/>
+    <Filter/>
+  </Receiver>
+  <Receiver>
+    <Name>Document ID Generator</Name>
+    <Synchronization>Synchronous</Synchronization>
+    <Type>10006</Type>
+    <SequenceNumber>1003</SequenceNumber>
+    <Assembly>Microsoft.Office.DocumentManagement, Version=14.0.0.0, Culture=neutral, PublicKeyToken=71e9bce111e9429c</Assembly>
+    <Class>Microsoft.Office.DocumentManagement.Internal.DocIdHandler</Class>
+    <Data/>
+    <Filter/>
+  </Receiver>
+</spe:Receivers>
+</file>
+
+<file path=customXml/item87.xml><?xml version="1.0" encoding="utf-8"?>
 <Control xmlns="http://schemas.microsoft.com/VisualStudio/2011/storyboarding/control">
   <Id Name="System.Storyboarding.WindowsApps.WindowsAppsMediumWideTile" Revision="1" Stencil="System.Storyboarding.WindowsApps" StencilVersion="0.1"/>
 </Control>
 </file>
 
-<file path=customXml/item46.xml><?xml version="1.0" encoding="utf-8"?>
+<file path=customXml/item88.xml><?xml version="1.0" encoding="utf-8"?>
+<Control xmlns="http://schemas.microsoft.com/VisualStudio/2011/storyboarding/control/v1.0">
+  <Id Name="System.Storyboard.Stencil.Label" RevisionId="00000000-0000-0000-0000-000000000000" Stencil="System.Common" StencilRevisionId="00000000-0000-0000-0000-000000000000" StencilVersion="1.0"/>
+</Control>
+</file>
+
+<file path=customXml/item89.xml><?xml version="1.0" encoding="utf-8"?>
+<Control xmlns="http://schemas.microsoft.com/VisualStudio/2011/storyboarding/control/v1.0">
+  <Id Name="System.Storyboard.Stencil.LineChart" RevisionId="00000000-0000-0000-0000-000000000000" Stencil="System.Media" StencilRevisionId="00000000-0000-0000-0000-000000000000" StencilVersion="1.0"/>
+</Control>
+</file>
+
+<file path=customXml/item9.xml><?xml version="1.0" encoding="utf-8"?>
 <Control xmlns="http://schemas.microsoft.com/VisualStudio/2011/storyboarding/control">
-  <Id Name="System.Storyboarding.WindowsApps.WindowsAppsMediumWideTile" Revision="1" Stencil="System.Storyboarding.WindowsApps" StencilVersion="0.1"/>
+  <Id Name="System.Storyboarding.Backgrounds.Window" RevisionId="bdb52a43-f875-417f-a3f8-9b0259dd3051" Stencil="System.Storyboarding.Backgrounds" StencilRevisionId="bdb52a43-f875-417f-a3f8-9b0259dd3051" StencilVersion="0.1"/>
 </Control>
 </file>
 
-<file path=customXml/item47.xml><?xml version="1.0" encoding="utf-8"?>
-<Control xmlns="http://schemas.microsoft.com/VisualStudio/2011/storyboarding/control/v1.0">
-  <Id Name="System.Storyboard.Stencil.DatePicker" RevisionId="00000000-0000-0000-0000-000000000000" Stencil="System.Common" StencilRevisionId="00000000-0000-0000-0000-000000000000" StencilVersion="1.0"/>
-</Control>
-</file>
-
-<file path=customXml/item48.xml><?xml version="1.0" encoding="utf-8"?>
-<Control xmlns="http://schemas.microsoft.com/VisualStudio/2011/storyboarding/control/v1.0">
-  <Id Name="System.Storyboard.Stencil.WidePhoneTile" RevisionId="00000000-0000-0000-0000-000000000000" Stencil="System.Windows_Phone_7" StencilRevisionId="00000000-0000-0000-0000-000000000000" StencilVersion="1.0"/>
-</Control>
-</file>
-
-<file path=customXml/item49.xml><?xml version="1.0" encoding="utf-8"?>
-<Control xmlns="http://schemas.microsoft.com/VisualStudio/2011/storyboarding/control">
-  <Id Name="System.Storyboarding.WindowsApps.WindowsAppsMediumWideTile" Revision="1" Stencil="System.Storyboarding.WindowsApps" StencilVersion="0.1"/>
-</Control>
-</file>
-
-<file path=customXml/item5.xml><?xml version="1.0" encoding="utf-8"?>
-<Control xmlns="http://schemas.microsoft.com/VisualStudio/2011/storyboarding/control/v1.0">
-  <Id Name="System.Storyboard.Stencil.Title" RevisionId="00000000-0000-0000-0000-000000000000" Stencil="System.Common" StencilRevisionId="00000000-0000-0000-0000-000000000000" StencilVersion="1.0"/>
-</Control>
-</file>
-
-<file path=customXml/item50.xml><?xml version="1.0" encoding="utf-8"?>
+<file path=customXml/item90.xml><?xml version="1.0" encoding="utf-8"?>
 <p:properties xmlns:p="http://schemas.microsoft.com/office/2006/metadata/properties" xmlns:xsi="http://www.w3.org/2001/XMLSchema-instance" xmlns:pc="http://schemas.microsoft.com/office/infopath/2007/PartnerControls">
   <documentManagement>
     <_dlc_DocId xmlns="b4ebf394-daf6-497a-96c5-a2f8c10b38cf">TT6HZDVJM2HV-178-540</_dlc_DocId>
@@ -9008,273 +9631,9 @@
 </p:properties>
 </file>
 
-<file path=customXml/item51.xml><?xml version="1.0" encoding="utf-8"?>
-<Control xmlns="http://schemas.microsoft.com/VisualStudio/2011/storyboarding/control/v1.0">
-  <Id Name="System.Storyboard.Stencil.FourItemList" RevisionId="00000000-0000-0000-0000-000000000000" Stencil="System.Common" StencilRevisionId="00000000-0000-0000-0000-000000000000" StencilVersion="1.0"/>
-</Control>
-</file>
-
-<file path=customXml/item52.xml><?xml version="1.0" encoding="utf-8"?>
-<Control xmlns="http://schemas.microsoft.com/VisualStudio/2011/storyboarding/control/v1.0">
-  <Id Name="System.Storyboard.Stencil.ColorPicker" RevisionId="00000000-0000-0000-0000-000000000000" Stencil="System.Media" StencilRevisionId="00000000-0000-0000-0000-000000000000" StencilVersion="1.0"/>
-</Control>
-</file>
-
-<file path=customXml/item53.xml><?xml version="1.0" encoding="utf-8"?>
-<Control xmlns="http://schemas.microsoft.com/VisualStudio/2011/storyboarding/control/v1.0">
-  <Id Name="System.Storyboarding.Common.Breadcrumb" RevisionId="68ea164d-c1de-47a5-804f-d4d1290fa524" Stencil="System.Storyboarding.Common" StencilRevisionId="68ea164d-c1de-47a5-804f-d4d1290fa524" StencilVersion="0.1"/>
-</Control>
-</file>
-
-<file path=customXml/item54.xml><?xml version="1.0" encoding="utf-8"?>
-<Control xmlns="http://schemas.microsoft.com/VisualStudio/2011/storyboarding/control/v1.0">
-  <Id Name="System.Storyboarding.Common.Text" RevisionId="68ea164d-c1de-47a5-804f-d4d1290fa524" Stencil="System.Storyboarding.Common" StencilRevisionId="68ea164d-c1de-47a5-804f-d4d1290fa524" StencilVersion="0.1"/>
-</Control>
-</file>
-
-<file path=customXml/item55.xml><?xml version="1.0" encoding="utf-8"?>
+<file path=customXml/item91.xml><?xml version="1.0" encoding="utf-8"?>
 <Control xmlns="http://schemas.microsoft.com/VisualStudio/2011/storyboarding/control">
   <Id Name="System.Storyboarding.WindowsApps.WindowsAppsMediumWideTile" Revision="1" Stencil="System.Storyboarding.WindowsApps" StencilVersion="0.1"/>
-</Control>
-</file>
-
-<file path=customXml/item56.xml><?xml version="1.0" encoding="utf-8"?>
-<Control xmlns="http://schemas.microsoft.com/VisualStudio/2011/storyboarding/control">
-  <Id Name="System.Storyboarding.Backgrounds.RibbonApplication" RevisionId="bdb52a43-f875-417f-a3f8-9b0259dd3051" Stencil="System.Storyboarding.Backgrounds" StencilRevisionId="bdb52a43-f875-417f-a3f8-9b0259dd3051" StencilVersion="0.1"/>
-</Control>
-</file>
-
-<file path=customXml/item57.xml><?xml version="1.0" encoding="utf-8"?>
-<Control xmlns="http://schemas.microsoft.com/VisualStudio/2011/storyboarding/control/v1.0">
-  <Id Name="System.Storyboard.Stencil.PhoneTile" RevisionId="00000000-0000-0000-0000-000000000000" Stencil="System.Windows_Phone_7" StencilRevisionId="00000000-0000-0000-0000-000000000000" StencilVersion="1.0"/>
-</Control>
-</file>
-
-<file path=customXml/item58.xml><?xml version="1.0" encoding="utf-8"?>
-<Control xmlns="http://schemas.microsoft.com/VisualStudio/2011/storyboarding/control">
-  <Id Name="System.Storyboarding.WindowsApps.WindowsAppsMediumWideTile" Revision="1" Stencil="System.Storyboarding.WindowsApps" StencilVersion="0.1"/>
-</Control>
-</file>
-
-<file path=customXml/item59.xml><?xml version="1.0" encoding="utf-8"?>
-<Control xmlns="http://schemas.microsoft.com/VisualStudio/2011/storyboarding/control/v1.0">
-  <Id Name="System.Storyboard.Stencil.PlayControls" RevisionId="00000000-0000-0000-0000-000000000000" Stencil="System.Media" StencilRevisionId="00000000-0000-0000-0000-000000000000" StencilVersion="1.0"/>
-</Control>
-</file>
-
-<file path=customXml/item6.xml><?xml version="1.0" encoding="utf-8"?>
-<Control xmlns="http://schemas.microsoft.com/VisualStudio/2011/storyboarding/control">
-  <Id Name="System.Storyboarding.WindowsApps.WindowsAppsMediumWideTile" Revision="1" Stencil="System.Storyboarding.WindowsApps" StencilVersion="0.1"/>
-</Control>
-</file>
-
-<file path=customXml/item60.xml><?xml version="1.0" encoding="utf-8"?>
-<Control xmlns="http://schemas.microsoft.com/VisualStudio/2011/storyboarding/control/v1.0">
-  <Id Name="System.Storyboard.Stencil.PhoneApplicationBar" RevisionId="00000000-0000-0000-0000-000000000000" Stencil="System.Windows_Phone_7" StencilRevisionId="00000000-0000-0000-0000-000000000000" StencilVersion="1.0"/>
-</Control>
-</file>
-
-<file path=customXml/item61.xml><?xml version="1.0" encoding="utf-8"?>
-<Control xmlns="http://schemas.microsoft.com/VisualStudio/2011/storyboarding/control">
-  <Id Name="System.Storyboarding.WindowsApps.WindowsAppsMediumWideTile" Revision="1" Stencil="System.Storyboarding.WindowsApps" StencilVersion="0.1"/>
-</Control>
-</file>
-
-<file path=customXml/item62.xml><?xml version="1.0" encoding="utf-8"?>
-<Control xmlns="http://schemas.microsoft.com/VisualStudio/2011/storyboarding/control">
-  <Id Name="System.Storyboarding.WindowsApps.WindowsAppsMediumWideTile" Revision="1" Stencil="System.Storyboarding.WindowsApps" StencilVersion="0.1"/>
-</Control>
-</file>
-
-<file path=customXml/item63.xml><?xml version="1.0" encoding="utf-8"?>
-<Control xmlns="http://schemas.microsoft.com/VisualStudio/2011/storyboarding/control/v1.0">
-  <Id Name="System.Storyboard.Stencil.PhoneTile" RevisionId="00000000-0000-0000-0000-000000000000" Stencil="System.Windows_Phone_7" StencilRevisionId="00000000-0000-0000-0000-000000000000" StencilVersion="1.0"/>
-</Control>
-</file>
-
-<file path=customXml/item64.xml><?xml version="1.0" encoding="utf-8"?>
-<Control xmlns="http://schemas.microsoft.com/VisualStudio/2011/storyboarding/control/v1.0">
-  <Id Name="System.Storyboard.Stencil.PositionControl" RevisionId="00000000-0000-0000-0000-000000000000" Stencil="System.Media" StencilRevisionId="00000000-0000-0000-0000-000000000000" StencilVersion="1.0"/>
-</Control>
-</file>
-
-<file path=customXml/item65.xml><?xml version="1.0" encoding="utf-8"?>
-<Control xmlns="http://schemas.microsoft.com/VisualStudio/2011/storyboarding/control/v1.0">
-  <Id Name="System.Storyboarding.Common.Text" RevisionId="68ea164d-c1de-47a5-804f-d4d1290fa524" Stencil="System.Storyboarding.Common" StencilRevisionId="68ea164d-c1de-47a5-804f-d4d1290fa524" StencilVersion="0.1"/>
-</Control>
-</file>
-
-<file path=customXml/item66.xml><?xml version="1.0" encoding="utf-8"?>
-<Control xmlns="http://schemas.microsoft.com/VisualStudio/2011/storyboarding/control">
-  <Id Name="System.Storyboarding.WindowsApps.WindowsAppsMediumWideTile" Revision="1" Stencil="System.Storyboarding.WindowsApps" StencilVersion="0.1"/>
-</Control>
-</file>
-
-<file path=customXml/item67.xml><?xml version="1.0" encoding="utf-8"?>
-<Control xmlns="http://schemas.microsoft.com/VisualStudio/2011/storyboarding/control/v1.0">
-  <Id Name="System.Storyboard.Stencil.VerticalBarChart" RevisionId="00000000-0000-0000-0000-000000000000" Stencil="System.Media" StencilRevisionId="00000000-0000-0000-0000-000000000000" StencilVersion="1.0"/>
-</Control>
-</file>
-
-<file path=customXml/item68.xml><?xml version="1.0" encoding="utf-8"?>
-<Control xmlns="http://schemas.microsoft.com/VisualStudio/2011/storyboarding/control/v1.0">
-  <Id Name="System.Storyboarding.Common.Text" RevisionId="68ea164d-c1de-47a5-804f-d4d1290fa524" Stencil="System.Storyboarding.Common" StencilRevisionId="68ea164d-c1de-47a5-804f-d4d1290fa524" StencilVersion="0.1"/>
-</Control>
-</file>
-
-<file path=customXml/item69.xml><?xml version="1.0" encoding="utf-8"?>
-<Control xmlns="http://schemas.microsoft.com/VisualStudio/2011/storyboarding/control/v1.0">
-  <Id Name="System.Storyboard.Stencil.VideoPlayer" RevisionId="00000000-0000-0000-0000-000000000000" Stencil="System.Media" StencilRevisionId="00000000-0000-0000-0000-000000000000" StencilVersion="1.0"/>
-</Control>
-</file>
-
-<file path=customXml/item7.xml><?xml version="1.0" encoding="utf-8"?>
-<Control xmlns="http://schemas.microsoft.com/VisualStudio/2011/storyboarding/control/v1.0">
-  <Id Name="System.Storyboarding.Common.DropdownBox" RevisionId="68ea164d-c1de-47a5-804f-d4d1290fa524" Stencil="System.Storyboarding.Common" StencilRevisionId="68ea164d-c1de-47a5-804f-d4d1290fa524" StencilVersion="0.1"/>
-</Control>
-</file>
-
-<file path=customXml/item70.xml><?xml version="1.0" encoding="utf-8"?>
-<Control xmlns="http://schemas.microsoft.com/VisualStudio/2011/storyboarding/control">
-  <Id Name="System.Storyboarding.WindowsPhoneIcons.Video" RevisionId="5814b1e0-0169-11e0-a976-0800200c9a66" Stencil="System.Storyboarding.WindowsPhoneIcons" StencilRevisionId="5814b1e0-0169-11e0-a976-0800200c9a66" StencilVersion="0.1"/>
-</Control>
-</file>
-
-<file path=customXml/item71.xml><?xml version="1.0" encoding="utf-8"?>
-<Control xmlns="http://schemas.microsoft.com/VisualStudio/2011/storyboarding/control/v1.0">
-  <Id Name="System.Storyboarding.Common.SearchBox" RevisionId="68ea164d-c1de-47a5-804f-d4d1290fa524" Stencil="System.Storyboarding.Common" StencilRevisionId="68ea164d-c1de-47a5-804f-d4d1290fa524" StencilVersion="0.1"/>
-</Control>
-</file>
-
-<file path=customXml/item72.xml><?xml version="1.0" encoding="utf-8"?>
-<Control xmlns="http://schemas.microsoft.com/VisualStudio/2011/storyboarding/control">
-  <Id Name="System.Storyboarding.WindowsApps.WindowsAppsMediumWideTile" Revision="1" Stencil="System.Storyboarding.WindowsApps" StencilVersion="0.1"/>
-</Control>
-</file>
-
-<file path=customXml/item73.xml><?xml version="1.0" encoding="utf-8"?>
-<Control xmlns="http://schemas.microsoft.com/VisualStudio/2011/storyboarding/control/v1.0">
-  <Id Name="System.Storyboard.Stencil.PhoneTile" RevisionId="00000000-0000-0000-0000-000000000000" Stencil="System.Windows_Phone_7" StencilRevisionId="00000000-0000-0000-0000-000000000000" StencilVersion="1.0"/>
-</Control>
-</file>
-
-<file path=customXml/item74.xml><?xml version="1.0" encoding="utf-8"?>
-<Control xmlns="http://schemas.microsoft.com/VisualStudio/2011/storyboarding/control/v1.0">
-  <Id Name="System.Storyboard.Stencil.PieChart" RevisionId="00000000-0000-0000-0000-000000000000" Stencil="System.Media" StencilRevisionId="00000000-0000-0000-0000-000000000000" StencilVersion="1.0"/>
-</Control>
-</file>
-
-<file path=customXml/item75.xml><?xml version="1.0" encoding="utf-8"?>
-<Control xmlns="http://schemas.microsoft.com/VisualStudio/2011/storyboarding/control/v1.0">
-  <Id Name="System.Storyboard.Stencil.Title" RevisionId="00000000-0000-0000-0000-000000000000" Stencil="System.Common" StencilRevisionId="00000000-0000-0000-0000-000000000000" StencilVersion="1.0"/>
-</Control>
-</file>
-
-<file path=customXml/item76.xml><?xml version="1.0" encoding="utf-8"?>
-<Control xmlns="http://schemas.microsoft.com/VisualStudio/2011/storyboarding/control">
-  <Id Name="System.Storyboarding.WindowsApps.WindowsAppsMediumWideTile" Revision="1" Stencil="System.Storyboarding.WindowsApps" StencilVersion="0.1"/>
-</Control>
-</file>
-
-<file path=customXml/item77.xml><?xml version="1.0" encoding="utf-8"?>
-<Control xmlns="http://schemas.microsoft.com/VisualStudio/2011/storyboarding/control/v1.0">
-  <Id Name="System.Storyboard.Stencil.VerticalScrollbar" RevisionId="00000000-0000-0000-0000-000000000000" Stencil="System.Common" StencilRevisionId="00000000-0000-0000-0000-000000000000" StencilVersion="1.0"/>
-</Control>
-</file>
-
-<file path=customXml/item78.xml><?xml version="1.0" encoding="utf-8"?>
-<Control xmlns="http://schemas.microsoft.com/VisualStudio/2011/storyboarding/control/v1.0">
-  <Id Name="System.Storyboarding.Media.Image" RevisionId="658c0869-8ded-44f2-a68a-f8e8fcb7d3bd" Stencil="System.Storyboarding.Media" StencilRevisionId="658c0869-8ded-44f2-a68a-f8e8fcb7d3bd" StencilVersion="0.1"/>
-</Control>
-</file>
-
-<file path=customXml/item79.xml><?xml version="1.0" encoding="utf-8"?>
-<Control xmlns="http://schemas.microsoft.com/VisualStudio/2011/storyboarding/control/v1.0">
-  <Id Name="System.Storyboard.Stencil.PhoneTile" RevisionId="00000000-0000-0000-0000-000000000000" Stencil="System.Windows_Phone_7" StencilRevisionId="00000000-0000-0000-0000-000000000000" StencilVersion="1.0"/>
-</Control>
-</file>
-
-<file path=customXml/item8.xml><?xml version="1.0" encoding="utf-8"?>
-<Control xmlns="http://schemas.microsoft.com/VisualStudio/2011/storyboarding/control/v1.0">
-  <Id Name="System.Storyboard.Stencil.Label" RevisionId="00000000-0000-0000-0000-000000000000" Stencil="System.Common" StencilRevisionId="00000000-0000-0000-0000-000000000000" StencilVersion="1.0"/>
-</Control>
-</file>
-
-<file path=customXml/item80.xml><?xml version="1.0" encoding="utf-8"?>
-<Control xmlns="http://schemas.microsoft.com/VisualStudio/2011/storyboarding/control">
-  <Id Name="System.Storyboarding.Backgrounds.WindowsPhoneLandscape" RevisionId="bdb52a43-f875-417f-a3f8-9b0259dd3051" Stencil="System.Storyboarding.Backgrounds" StencilRevisionId="bdb52a43-f875-417f-a3f8-9b0259dd3051" StencilVersion="0.1"/>
-</Control>
-</file>
-
-<file path=customXml/item81.xml><?xml version="1.0" encoding="utf-8"?>
-<Control xmlns="http://schemas.microsoft.com/VisualStudio/2011/storyboarding/control/v1.0">
-  <Id Name="System.Storyboard.Stencil.Image" RevisionId="00000000-0000-0000-0000-000000000000" Stencil="System.Media" StencilRevisionId="00000000-0000-0000-0000-000000000000" StencilVersion="1.0"/>
-</Control>
-</file>
-
-<file path=customXml/item82.xml><?xml version="1.0" encoding="utf-8"?>
-<Control xmlns="http://schemas.microsoft.com/VisualStudio/2011/storyboarding/control/v1.0">
-  <Id Name="System.Storyboarding.Icons.FolderOpen" RevisionId="05cd6d03-c0b2-488e-98a7-d68de69a2cfc" Stencil="System.Storyboarding.Icons" StencilRevisionId="05cd6d03-c0b2-488e-98a7-d68de69a2cfc" StencilVersion="0.1"/>
-</Control>
-</file>
-
-<file path=customXml/item83.xml><?xml version="1.0" encoding="utf-8"?>
-<Control xmlns="http://schemas.microsoft.com/VisualStudio/2011/storyboarding/control/v1.0">
-  <Id Name="System.Storyboard.Stencil.HorizontalScrollbar" RevisionId="00000000-0000-0000-0000-000000000000" Stencil="System.Common" StencilRevisionId="00000000-0000-0000-0000-000000000000" StencilVersion="1.0"/>
-</Control>
-</file>
-
-<file path=customXml/item84.xml><?xml version="1.0" encoding="utf-8"?>
-<Control xmlns="http://schemas.microsoft.com/VisualStudio/2011/storyboarding/control">
-  <Id Name="System.Storyboarding.WindowsApps.WindowsAppsMediumWideTile" Revision="1" Stencil="System.Storyboarding.WindowsApps" StencilVersion="0.1"/>
-</Control>
-</file>
-
-<file path=customXml/item85.xml><?xml version="1.0" encoding="utf-8"?>
-<Control xmlns="http://schemas.microsoft.com/VisualStudio/2011/storyboarding/control">
-  <Id Name="System.Storyboarding.WindowsApps.WindowsAppsMediumWideTile" Revision="1" Stencil="System.Storyboarding.WindowsApps" StencilVersion="0.1"/>
-</Control>
-</file>
-
-<file path=customXml/item86.xml><?xml version="1.0" encoding="utf-8"?>
-<Control xmlns="http://schemas.microsoft.com/VisualStudio/2011/storyboarding/control/v1.0">
-  <Id Name="System.Storyboard.Stencil.StatusBar" RevisionId="00000000-0000-0000-0000-000000000000" Stencil="System.Windows" StencilRevisionId="00000000-0000-0000-0000-000000000000" StencilVersion="1.0"/>
-</Control>
-</file>
-
-<file path=customXml/item87.xml><?xml version="1.0" encoding="utf-8"?>
-<Control xmlns="http://schemas.microsoft.com/VisualStudio/2011/storyboarding/control/v1.0">
-  <Id Name="System.Storyboard.Stencil.Breadcrumb" RevisionId="00000000-0000-0000-0000-000000000000" Stencil="System.Common" StencilRevisionId="00000000-0000-0000-0000-000000000000" StencilVersion="1.0"/>
-</Control>
-</file>
-
-<file path=customXml/item88.xml><?xml version="1.0" encoding="utf-8"?>
-<Control xmlns="http://schemas.microsoft.com/VisualStudio/2011/storyboarding/control">
-  <Id Name="System.Storyboarding.WindowsApps.WindowsAppsMediumWideTile" Revision="1" Stencil="System.Storyboarding.WindowsApps" StencilVersion="0.1"/>
-</Control>
-</file>
-
-<file path=customXml/item89.xml><?xml version="1.0" encoding="utf-8"?>
-<Control xmlns="http://schemas.microsoft.com/VisualStudio/2011/storyboarding/control/v1.0">
-  <Id Name="System.Storyboard.Stencil.PhoneTile" RevisionId="00000000-0000-0000-0000-000000000000" Stencil="System.Windows_Phone_7" StencilRevisionId="00000000-0000-0000-0000-000000000000" StencilVersion="1.0"/>
-</Control>
-</file>
-
-<file path=customXml/item9.xml><?xml version="1.0" encoding="utf-8"?>
-<Control xmlns="http://schemas.microsoft.com/VisualStudio/2011/storyboarding/control/v1.0">
-  <Id Name="System.Storyboard.Stencil.Browser" RevisionId="bdb52a43-f875-417f-a3f8-9b0259dd3051" Stencil="System.Backgrounds" StencilRevisionId="bdb52a43-f875-417f-a3f8-9b0259dd3051" StencilVersion="1.0"/>
-</Control>
-</file>
-
-<file path=customXml/item90.xml><?xml version="1.0" encoding="utf-8"?>
-<Control xmlns="http://schemas.microsoft.com/VisualStudio/2011/storyboarding/control/v1.0">
-  <Id Name="System.Storyboarding.Common.Text" RevisionId="68ea164d-c1de-47a5-804f-d4d1290fa524" Stencil="System.Storyboarding.Common" StencilRevisionId="68ea164d-c1de-47a5-804f-d4d1290fa524" StencilVersion="0.1"/>
-</Control>
-</file>
-
-<file path=customXml/item91.xml><?xml version="1.0" encoding="utf-8"?>
-<Control xmlns="http://schemas.microsoft.com/VisualStudio/2011/storyboarding/control/v1.0">
-  <Id Name="System.Storyboarding.Icons.Help" RevisionId="05cd6d03-c0b2-488e-98a7-d68de69a2cfc" Stencil="System.Storyboarding.Icons" StencilRevisionId="05cd6d03-c0b2-488e-98a7-d68de69a2cfc" StencilVersion="0.1"/>
 </Control>
 </file>
 
@@ -9285,152 +9644,48 @@
 </file>
 
 <file path=customXml/item93.xml><?xml version="1.0" encoding="utf-8"?>
+<Control xmlns="http://schemas.microsoft.com/VisualStudio/2011/storyboarding/control/v1.0">
+  <Id Name="System.Storyboard.Stencil.VerticalScrollbar" RevisionId="00000000-0000-0000-0000-000000000000" Stencil="System.Common" StencilRevisionId="00000000-0000-0000-0000-000000000000" StencilVersion="1.0"/>
+</Control>
+</file>
+
+<file path=customXml/item94.xml><?xml version="1.0" encoding="utf-8"?>
+<Control xmlns="http://schemas.microsoft.com/VisualStudio/2011/storyboarding/control/v1.0">
+  <Id Name="System.Storyboarding.Common.DropdownBox" RevisionId="68ea164d-c1de-47a5-804f-d4d1290fa524" Stencil="System.Storyboarding.Common" StencilRevisionId="68ea164d-c1de-47a5-804f-d4d1290fa524" StencilVersion="0.1"/>
+</Control>
+</file>
+
+<file path=customXml/item95.xml><?xml version="1.0" encoding="utf-8"?>
+<Control xmlns="http://schemas.microsoft.com/VisualStudio/2011/storyboarding/control/v1.0">
+  <Id Name="System.Storyboarding.Common.SearchBox" RevisionId="68ea164d-c1de-47a5-804f-d4d1290fa524" Stencil="System.Storyboarding.Common" StencilRevisionId="68ea164d-c1de-47a5-804f-d4d1290fa524" StencilVersion="0.1"/>
+</Control>
+</file>
+
+<file path=customXml/item96.xml><?xml version="1.0" encoding="utf-8"?>
 <Control xmlns="http://schemas.microsoft.com/VisualStudio/2011/storyboarding/control">
   <Id Name="System.Storyboarding.WindowsApps.WindowsAppsMediumWideTile" Revision="1" Stencil="System.Storyboarding.WindowsApps" StencilVersion="0.1"/>
 </Control>
 </file>
 
-<file path=customXml/item94.xml><?xml version="1.0" encoding="utf-8"?>
-<Control xmlns="http://schemas.microsoft.com/VisualStudio/2011/storyboarding/control/v1.0">
-  <Id Name="System.Storyboard.Stencil.Hyperlink" RevisionId="00000000-0000-0000-0000-000000000000" Stencil="System.Common" StencilRevisionId="00000000-0000-0000-0000-000000000000" StencilVersion="1.0"/>
-</Control>
-</file>
-
-<file path=customXml/item95.xml><?xml version="1.0" encoding="utf-8"?>
-<Control xmlns="http://schemas.microsoft.com/VisualStudio/2011/storyboarding/control/v1.0">
-  <Id Name="System.Storyboard.Stencil.Button" RevisionId="00000000-0000-0000-0000-000000000000" Stencil="System.Common" StencilRevisionId="00000000-0000-0000-0000-000000000000" StencilVersion="1.0"/>
-</Control>
-</file>
-
-<file path=customXml/item96.xml><?xml version="1.0" encoding="utf-8"?>
-<Control xmlns="http://schemas.microsoft.com/VisualStudio/2011/storyboarding/control/v1.0">
-  <Id Name="System.Storyboard.Stencil.DropdownBox" RevisionId="00000000-0000-0000-0000-000000000000" Stencil="System.Common" StencilRevisionId="00000000-0000-0000-0000-000000000000" StencilVersion="1.0"/>
-</Control>
-</file>
-
 <file path=customXml/item97.xml><?xml version="1.0" encoding="utf-8"?>
 <Control xmlns="http://schemas.microsoft.com/VisualStudio/2011/storyboarding/control/v1.0">
-  <Id Name="System.Storyboard.Stencil.VerticalScrollbar" RevisionId="00000000-0000-0000-0000-000000000000" Stencil="System.Common" StencilRevisionId="00000000-0000-0000-0000-000000000000" StencilVersion="1.0"/>
+  <Id Name="System.Storyboard.Stencil.PhoneTile" RevisionId="00000000-0000-0000-0000-000000000000" Stencil="System.Windows_Phone_7" StencilRevisionId="00000000-0000-0000-0000-000000000000" StencilVersion="1.0"/>
 </Control>
 </file>
 
 <file path=customXml/item98.xml><?xml version="1.0" encoding="utf-8"?>
-<Control xmlns="http://schemas.microsoft.com/VisualStudio/2011/storyboarding/control">
-  <Id Name="System.Storyboarding.WindowsApps.WindowsAppsMediumWideTile" Revision="1" Stencil="System.Storyboarding.WindowsApps" StencilVersion="0.1"/>
+<Control xmlns="http://schemas.microsoft.com/VisualStudio/2011/storyboarding/control/v1.0">
+  <Id Name="System.Storyboarding.Common.Text" RevisionId="68ea164d-c1de-47a5-804f-d4d1290fa524" Stencil="System.Storyboarding.Common" StencilRevisionId="68ea164d-c1de-47a5-804f-d4d1290fa524" StencilVersion="0.1"/>
 </Control>
 </file>
 
 <file path=customXml/item99.xml><?xml version="1.0" encoding="utf-8"?>
 <Control xmlns="http://schemas.microsoft.com/VisualStudio/2011/storyboarding/control/v1.0">
-  <Id Name="System.Storyboard.Stencil.WidePhoneTile" RevisionId="00000000-0000-0000-0000-000000000000" Stencil="System.Windows_Phone_7" StencilRevisionId="00000000-0000-0000-0000-000000000000" StencilVersion="1.0"/>
+  <Id Name="System.Storyboard.Stencil.Group" RevisionId="00000000-0000-0000-0000-000000000000" Stencil="System.Windows" StencilRevisionId="00000000-0000-0000-0000-000000000000" StencilVersion="1.0"/>
 </Control>
 </file>
 
 <file path=customXml/itemProps1.xml><?xml version="1.0" encoding="utf-8"?>
-<ds:datastoreItem xmlns:ds="http://schemas.openxmlformats.org/officeDocument/2006/customXml" ds:itemID="{63E5DE85-F05E-4507-B223-806D8F49F058}">
-  <ds:schemaRefs>
-    <ds:schemaRef ds:uri="http://schemas.microsoft.com/VisualStudio/2011/storyboarding/control/v1.0"/>
-  </ds:schemaRefs>
-</ds:datastoreItem>
-</file>
-
-<file path=customXml/itemProps10.xml><?xml version="1.0" encoding="utf-8"?>
-<ds:datastoreItem xmlns:ds="http://schemas.openxmlformats.org/officeDocument/2006/customXml" ds:itemID="{12DDBF6F-C153-48C1-97C0-85AA34D18FD2}">
-  <ds:schemaRefs>
-    <ds:schemaRef ds:uri="http://schemas.microsoft.com/VisualStudio/2011/storyboarding/control"/>
-  </ds:schemaRefs>
-</ds:datastoreItem>
-</file>
-
-<file path=customXml/itemProps11.xml><?xml version="1.0" encoding="utf-8"?>
-<ds:datastoreItem xmlns:ds="http://schemas.openxmlformats.org/officeDocument/2006/customXml" ds:itemID="{1AF31726-A62F-4331-8622-ED351D5149B7}">
-  <ds:schemaRefs>
-    <ds:schemaRef ds:uri="http://schemas.microsoft.com/VisualStudio/2011/storyboarding/control"/>
-  </ds:schemaRefs>
-</ds:datastoreItem>
-</file>
-
-<file path=customXml/itemProps12.xml><?xml version="1.0" encoding="utf-8"?>
-<ds:datastoreItem xmlns:ds="http://schemas.openxmlformats.org/officeDocument/2006/customXml" ds:itemID="{B571350C-23C3-4B5A-8F49-FBEB6CF22964}">
-  <ds:schemaRefs>
-    <ds:schemaRef ds:uri="http://schemas.microsoft.com/VisualStudio/2011/storyboarding/control/v1.0"/>
-  </ds:schemaRefs>
-</ds:datastoreItem>
-</file>
-
-<file path=customXml/itemProps13.xml><?xml version="1.0" encoding="utf-8"?>
-<ds:datastoreItem xmlns:ds="http://schemas.openxmlformats.org/officeDocument/2006/customXml" ds:itemID="{18A6A270-A75C-4D7E-86E4-765FF07C5144}">
-  <ds:schemaRefs>
-    <ds:schemaRef ds:uri="http://schemas.microsoft.com/sharepoint/events"/>
-  </ds:schemaRefs>
-</ds:datastoreItem>
-</file>
-
-<file path=customXml/itemProps14.xml><?xml version="1.0" encoding="utf-8"?>
-<ds:datastoreItem xmlns:ds="http://schemas.openxmlformats.org/officeDocument/2006/customXml" ds:itemID="{4EE14C2A-AD9F-4617-A8CC-4057921BFCA8}">
-  <ds:schemaRefs>
-    <ds:schemaRef ds:uri="http://schemas.microsoft.com/VisualStudio/2011/storyboarding/control/v1.0"/>
-  </ds:schemaRefs>
-</ds:datastoreItem>
-</file>
-
-<file path=customXml/itemProps15.xml><?xml version="1.0" encoding="utf-8"?>
-<ds:datastoreItem xmlns:ds="http://schemas.openxmlformats.org/officeDocument/2006/customXml" ds:itemID="{B0DBD337-FDC5-4C36-BF85-C09756391AA1}">
-  <ds:schemaRefs>
-    <ds:schemaRef ds:uri="http://schemas.microsoft.com/VisualStudio/2011/storyboarding/control/v1.0"/>
-  </ds:schemaRefs>
-</ds:datastoreItem>
-</file>
-
-<file path=customXml/itemProps16.xml><?xml version="1.0" encoding="utf-8"?>
-<ds:datastoreItem xmlns:ds="http://schemas.openxmlformats.org/officeDocument/2006/customXml" ds:itemID="{288CEDBF-3F9B-47CF-AF84-2B8486359159}">
-  <ds:schemaRefs>
-    <ds:schemaRef ds:uri="http://schemas.microsoft.com/VisualStudio/2011/storyboarding/control/v1.0"/>
-  </ds:schemaRefs>
-</ds:datastoreItem>
-</file>
-
-<file path=customXml/itemProps17.xml><?xml version="1.0" encoding="utf-8"?>
-<ds:datastoreItem xmlns:ds="http://schemas.openxmlformats.org/officeDocument/2006/customXml" ds:itemID="{379BFC32-51F7-4218-B2AD-CFD6564CE11F}">
-  <ds:schemaRefs>
-    <ds:schemaRef ds:uri="http://schemas.microsoft.com/VisualStudio/2011/storyboarding/control"/>
-  </ds:schemaRefs>
-</ds:datastoreItem>
-</file>
-
-<file path=customXml/itemProps18.xml><?xml version="1.0" encoding="utf-8"?>
-<ds:datastoreItem xmlns:ds="http://schemas.openxmlformats.org/officeDocument/2006/customXml" ds:itemID="{B8C6D4DD-FC58-4C97-B28B-C1F0B6B80EE0}">
-  <ds:schemaRefs>
-    <ds:schemaRef ds:uri="http://schemas.microsoft.com/VisualStudio/2011/storyboarding/control"/>
-  </ds:schemaRefs>
-</ds:datastoreItem>
-</file>
-
-<file path=customXml/itemProps19.xml><?xml version="1.0" encoding="utf-8"?>
-<ds:datastoreItem xmlns:ds="http://schemas.openxmlformats.org/officeDocument/2006/customXml" ds:itemID="{E9C4CBB0-7D2F-42EC-9ED0-589327F3DDE1}">
-  <ds:schemaRefs>
-    <ds:schemaRef ds:uri="http://schemas.microsoft.com/VisualStudio/2011/storyboarding/control"/>
-  </ds:schemaRefs>
-</ds:datastoreItem>
-</file>
-
-<file path=customXml/itemProps2.xml><?xml version="1.0" encoding="utf-8"?>
-<ds:datastoreItem xmlns:ds="http://schemas.openxmlformats.org/officeDocument/2006/customXml" ds:itemID="{BA2C55E9-BDE8-41FC-B02F-EBA8C07A01F8}">
-  <ds:schemaRefs>
-    <ds:schemaRef ds:uri="http://schemas.microsoft.com/VisualStudio/2011/storyboarding/control/v1.0"/>
-  </ds:schemaRefs>
-</ds:datastoreItem>
-</file>
-
-<file path=customXml/itemProps20.xml><?xml version="1.0" encoding="utf-8"?>
-<ds:datastoreItem xmlns:ds="http://schemas.openxmlformats.org/officeDocument/2006/customXml" ds:itemID="{F395D8ED-A0D3-4F6E-91F3-A29EC16A8083}">
-  <ds:schemaRefs>
-    <ds:schemaRef ds:uri="http://schemas.microsoft.com/VisualStudio/2011/storyboarding/control/v1.0"/>
-  </ds:schemaRefs>
-</ds:datastoreItem>
-</file>
-
-<file path=customXml/itemProps21.xml><?xml version="1.0" encoding="utf-8"?>
 <ds:datastoreItem xmlns:ds="http://schemas.openxmlformats.org/officeDocument/2006/customXml" ds:itemID="{68AAD069-500F-4F2F-A35D-83216001A8DC}">
   <ds:schemaRefs>
     <ds:schemaRef ds:uri="http://schemas.microsoft.com/VisualStudio/2011/storyboarding/control"/>
@@ -9438,23 +9693,7 @@
 </ds:datastoreItem>
 </file>
 
-<file path=customXml/itemProps22.xml><?xml version="1.0" encoding="utf-8"?>
-<ds:datastoreItem xmlns:ds="http://schemas.openxmlformats.org/officeDocument/2006/customXml" ds:itemID="{2C0B842B-A6BD-4438-89CC-C23BD0A85ECD}">
-  <ds:schemaRefs>
-    <ds:schemaRef ds:uri="http://schemas.microsoft.com/VisualStudio/2011/storyboarding/control"/>
-  </ds:schemaRefs>
-</ds:datastoreItem>
-</file>
-
-<file path=customXml/itemProps23.xml><?xml version="1.0" encoding="utf-8"?>
-<ds:datastoreItem xmlns:ds="http://schemas.openxmlformats.org/officeDocument/2006/customXml" ds:itemID="{B7BD4F34-B154-4D92-BE87-C557EB1B7EFB}">
-  <ds:schemaRefs>
-    <ds:schemaRef ds:uri="http://schemas.microsoft.com/sharepoint/v3/contenttype/forms"/>
-  </ds:schemaRefs>
-</ds:datastoreItem>
-</file>
-
-<file path=customXml/itemProps24.xml><?xml version="1.0" encoding="utf-8"?>
+<file path=customXml/itemProps10.xml><?xml version="1.0" encoding="utf-8"?>
 <ds:datastoreItem xmlns:ds="http://schemas.openxmlformats.org/officeDocument/2006/customXml" ds:itemID="{BE267193-C1D2-4298-824E-E6BE5E6C1D22}">
   <ds:schemaRefs>
     <ds:schemaRef ds:uri="http://schemas.microsoft.com/VisualStudio/2011/storyboarding/control"/>
@@ -9462,71 +9701,7 @@
 </ds:datastoreItem>
 </file>
 
-<file path=customXml/itemProps25.xml><?xml version="1.0" encoding="utf-8"?>
-<ds:datastoreItem xmlns:ds="http://schemas.openxmlformats.org/officeDocument/2006/customXml" ds:itemID="{D8E0912A-795B-4916-9114-34B4F28A0EE3}">
-  <ds:schemaRefs>
-    <ds:schemaRef ds:uri="http://schemas.microsoft.com/VisualStudio/2011/storyboarding/control/v1.0"/>
-  </ds:schemaRefs>
-</ds:datastoreItem>
-</file>
-
-<file path=customXml/itemProps26.xml><?xml version="1.0" encoding="utf-8"?>
-<ds:datastoreItem xmlns:ds="http://schemas.openxmlformats.org/officeDocument/2006/customXml" ds:itemID="{6772C88A-36A0-4EAC-86A3-BB16EEADAB3E}">
-  <ds:schemaRefs>
-    <ds:schemaRef ds:uri="http://schemas.microsoft.com/VisualStudio/2011/storyboarding/control/v1.0"/>
-  </ds:schemaRefs>
-</ds:datastoreItem>
-</file>
-
-<file path=customXml/itemProps27.xml><?xml version="1.0" encoding="utf-8"?>
-<ds:datastoreItem xmlns:ds="http://schemas.openxmlformats.org/officeDocument/2006/customXml" ds:itemID="{5E2E8CE4-298D-499A-B8B4-4A593AC844A5}">
-  <ds:schemaRefs>
-    <ds:schemaRef ds:uri="http://schemas.microsoft.com/VisualStudio/2011/storyboarding/control/v1.0"/>
-  </ds:schemaRefs>
-</ds:datastoreItem>
-</file>
-
-<file path=customXml/itemProps28.xml><?xml version="1.0" encoding="utf-8"?>
-<ds:datastoreItem xmlns:ds="http://schemas.openxmlformats.org/officeDocument/2006/customXml" ds:itemID="{09A94271-A29B-4164-A32F-3A755C9B59FC}">
-  <ds:schemaRefs>
-    <ds:schemaRef ds:uri="http://schemas.microsoft.com/VisualStudio/2011/storyboarding/control"/>
-  </ds:schemaRefs>
-</ds:datastoreItem>
-</file>
-
-<file path=customXml/itemProps29.xml><?xml version="1.0" encoding="utf-8"?>
-<ds:datastoreItem xmlns:ds="http://schemas.openxmlformats.org/officeDocument/2006/customXml" ds:itemID="{EDE713BE-A567-491C-902D-E6087D824056}">
-  <ds:schemaRefs>
-    <ds:schemaRef ds:uri="http://schemas.microsoft.com/VisualStudio/2011/storyboarding/control/v1.0"/>
-  </ds:schemaRefs>
-</ds:datastoreItem>
-</file>
-
-<file path=customXml/itemProps3.xml><?xml version="1.0" encoding="utf-8"?>
-<ds:datastoreItem xmlns:ds="http://schemas.openxmlformats.org/officeDocument/2006/customXml" ds:itemID="{F17D5AF6-3BD9-4DFF-AE9B-2E10D3430779}">
-  <ds:schemaRefs>
-    <ds:schemaRef ds:uri="http://schemas.microsoft.com/VisualStudio/2011/storyboarding/control/v1.0"/>
-  </ds:schemaRefs>
-</ds:datastoreItem>
-</file>
-
-<file path=customXml/itemProps30.xml><?xml version="1.0" encoding="utf-8"?>
-<ds:datastoreItem xmlns:ds="http://schemas.openxmlformats.org/officeDocument/2006/customXml" ds:itemID="{CD17C18B-5B11-471F-97AA-CE2EA822BB97}">
-  <ds:schemaRefs>
-    <ds:schemaRef ds:uri="http://schemas.microsoft.com/VisualStudio/2011/storyboarding/control/v1.0"/>
-  </ds:schemaRefs>
-</ds:datastoreItem>
-</file>
-
-<file path=customXml/itemProps31.xml><?xml version="1.0" encoding="utf-8"?>
-<ds:datastoreItem xmlns:ds="http://schemas.openxmlformats.org/officeDocument/2006/customXml" ds:itemID="{E2968586-6EB5-4B3C-A2E1-82E35F695B75}">
-  <ds:schemaRefs>
-    <ds:schemaRef ds:uri="http://schemas.microsoft.com/VisualStudio/2011/storyboarding/control/v1.0"/>
-  </ds:schemaRefs>
-</ds:datastoreItem>
-</file>
-
-<file path=customXml/itemProps32.xml><?xml version="1.0" encoding="utf-8"?>
+<file path=customXml/itemProps11.xml><?xml version="1.0" encoding="utf-8"?>
 <ds:datastoreItem xmlns:ds="http://schemas.openxmlformats.org/officeDocument/2006/customXml" ds:itemID="{3C6220BE-0F2A-49C6-BFB2-C458479F3F62}">
   <ds:schemaRefs>
     <ds:schemaRef ds:uri="http://schemas.microsoft.com/VisualStudio/2011/storyboarding/control/v1.0"/>
@@ -9534,39 +9709,7 @@
 </ds:datastoreItem>
 </file>
 
-<file path=customXml/itemProps33.xml><?xml version="1.0" encoding="utf-8"?>
-<ds:datastoreItem xmlns:ds="http://schemas.openxmlformats.org/officeDocument/2006/customXml" ds:itemID="{AA5E4F96-8C72-44F9-A0C5-FB007B246D91}">
-  <ds:schemaRefs>
-    <ds:schemaRef ds:uri="http://schemas.microsoft.com/VisualStudio/2011/storyboarding/control/v1.0"/>
-  </ds:schemaRefs>
-</ds:datastoreItem>
-</file>
-
-<file path=customXml/itemProps34.xml><?xml version="1.0" encoding="utf-8"?>
-<ds:datastoreItem xmlns:ds="http://schemas.openxmlformats.org/officeDocument/2006/customXml" ds:itemID="{188F6680-9EB8-4B03-8D3B-773D66FC777A}">
-  <ds:schemaRefs>
-    <ds:schemaRef ds:uri="http://schemas.microsoft.com/VisualStudio/2011/storyboarding/control/v1.0"/>
-  </ds:schemaRefs>
-</ds:datastoreItem>
-</file>
-
-<file path=customXml/itemProps35.xml><?xml version="1.0" encoding="utf-8"?>
-<ds:datastoreItem xmlns:ds="http://schemas.openxmlformats.org/officeDocument/2006/customXml" ds:itemID="{036B989D-7053-42E0-85AB-8864B824736A}">
-  <ds:schemaRefs>
-    <ds:schemaRef ds:uri="http://schemas.microsoft.com/VisualStudio/2011/storyboarding/control"/>
-  </ds:schemaRefs>
-</ds:datastoreItem>
-</file>
-
-<file path=customXml/itemProps36.xml><?xml version="1.0" encoding="utf-8"?>
-<ds:datastoreItem xmlns:ds="http://schemas.openxmlformats.org/officeDocument/2006/customXml" ds:itemID="{B4BE880E-F71A-4C21-A1C3-8A2437E3C677}">
-  <ds:schemaRefs>
-    <ds:schemaRef ds:uri="http://schemas.microsoft.com/VisualStudio/2011/storyboarding/control/v1.0"/>
-  </ds:schemaRefs>
-</ds:datastoreItem>
-</file>
-
-<file path=customXml/itemProps37.xml><?xml version="1.0" encoding="utf-8"?>
+<file path=customXml/itemProps12.xml><?xml version="1.0" encoding="utf-8"?>
 <ds:datastoreItem xmlns:ds="http://schemas.openxmlformats.org/officeDocument/2006/customXml" ds:itemID="{029B11DB-B00D-4F9B-8DF3-D898C360902E}">
   <ds:schemaRefs>
     <ds:schemaRef ds:uri="http://schemas.microsoft.com/VisualStudio/2011/storyboarding/control"/>
@@ -9574,31 +9717,7 @@
 </ds:datastoreItem>
 </file>
 
-<file path=customXml/itemProps38.xml><?xml version="1.0" encoding="utf-8"?>
-<ds:datastoreItem xmlns:ds="http://schemas.openxmlformats.org/officeDocument/2006/customXml" ds:itemID="{D356E6DB-54C9-4389-B932-0F583366BD4B}">
-  <ds:schemaRefs>
-    <ds:schemaRef ds:uri="http://schemas.microsoft.com/VisualStudio/2011/storyboarding/control/v1.0"/>
-  </ds:schemaRefs>
-</ds:datastoreItem>
-</file>
-
-<file path=customXml/itemProps39.xml><?xml version="1.0" encoding="utf-8"?>
-<ds:datastoreItem xmlns:ds="http://schemas.openxmlformats.org/officeDocument/2006/customXml" ds:itemID="{253B000D-0B23-420C-B5B5-11B6002E5391}">
-  <ds:schemaRefs>
-    <ds:schemaRef ds:uri="http://schemas.microsoft.com/VisualStudio/2011/storyboarding/control/v1.0"/>
-  </ds:schemaRefs>
-</ds:datastoreItem>
-</file>
-
-<file path=customXml/itemProps4.xml><?xml version="1.0" encoding="utf-8"?>
-<ds:datastoreItem xmlns:ds="http://schemas.openxmlformats.org/officeDocument/2006/customXml" ds:itemID="{A6ECB6E0-BD84-4681-8699-56A1B3F36A60}">
-  <ds:schemaRefs>
-    <ds:schemaRef ds:uri="http://schemas.microsoft.com/VisualStudio/2011/storyboarding/control"/>
-  </ds:schemaRefs>
-</ds:datastoreItem>
-</file>
-
-<file path=customXml/itemProps40.xml><?xml version="1.0" encoding="utf-8"?>
+<file path=customXml/itemProps13.xml><?xml version="1.0" encoding="utf-8"?>
 <ds:datastoreItem xmlns:ds="http://schemas.openxmlformats.org/officeDocument/2006/customXml" ds:itemID="{387838C4-29F2-40AB-9647-8346D39956AB}">
   <ds:schemaRefs>
     <ds:schemaRef ds:uri="http://schemas.microsoft.com/VisualStudio/2011/storyboarding/control"/>
@@ -9606,15 +9725,55 @@
 </ds:datastoreItem>
 </file>
 
-<file path=customXml/itemProps41.xml><?xml version="1.0" encoding="utf-8"?>
-<ds:datastoreItem xmlns:ds="http://schemas.openxmlformats.org/officeDocument/2006/customXml" ds:itemID="{C1E8400F-CB83-4A16-AF3D-36FAF22BDD23}">
+<file path=customXml/itemProps14.xml><?xml version="1.0" encoding="utf-8"?>
+<ds:datastoreItem xmlns:ds="http://schemas.openxmlformats.org/officeDocument/2006/customXml" ds:itemID="{5F81420E-DDF3-4689-9969-42E66499CA3E}">
+  <ds:schemaRefs>
+    <ds:schemaRef ds:uri="http://schemas.microsoft.com/VisualStudio/2011/storyboarding/control"/>
+  </ds:schemaRefs>
+</ds:datastoreItem>
+</file>
+
+<file path=customXml/itemProps15.xml><?xml version="1.0" encoding="utf-8"?>
+<ds:datastoreItem xmlns:ds="http://schemas.openxmlformats.org/officeDocument/2006/customXml" ds:itemID="{08904217-40E1-4558-95D8-8D709CA82866}">
   <ds:schemaRefs>
     <ds:schemaRef ds:uri="http://schemas.microsoft.com/VisualStudio/2011/storyboarding/control/v1.0"/>
   </ds:schemaRefs>
 </ds:datastoreItem>
 </file>
 
-<file path=customXml/itemProps42.xml><?xml version="1.0" encoding="utf-8"?>
+<file path=customXml/itemProps16.xml><?xml version="1.0" encoding="utf-8"?>
+<ds:datastoreItem xmlns:ds="http://schemas.openxmlformats.org/officeDocument/2006/customXml" ds:itemID="{2E901D8B-281C-4847-BEC4-E1DAD11CFF00}">
+  <ds:schemaRefs>
+    <ds:schemaRef ds:uri="http://schemas.microsoft.com/VisualStudio/2011/storyboarding/control"/>
+  </ds:schemaRefs>
+</ds:datastoreItem>
+</file>
+
+<file path=customXml/itemProps17.xml><?xml version="1.0" encoding="utf-8"?>
+<ds:datastoreItem xmlns:ds="http://schemas.openxmlformats.org/officeDocument/2006/customXml" ds:itemID="{D834D1AF-A33E-4664-8718-80F7137D9192}">
+  <ds:schemaRefs>
+    <ds:schemaRef ds:uri="http://schemas.microsoft.com/VisualStudio/2011/storyboarding/control"/>
+  </ds:schemaRefs>
+</ds:datastoreItem>
+</file>
+
+<file path=customXml/itemProps18.xml><?xml version="1.0" encoding="utf-8"?>
+<ds:datastoreItem xmlns:ds="http://schemas.openxmlformats.org/officeDocument/2006/customXml" ds:itemID="{B2C9D19C-4878-43E0-A5AD-CB76AB49D960}">
+  <ds:schemaRefs>
+    <ds:schemaRef ds:uri="http://schemas.microsoft.com/VisualStudio/2011/storyboarding/control/v1.0"/>
+  </ds:schemaRefs>
+</ds:datastoreItem>
+</file>
+
+<file path=customXml/itemProps19.xml><?xml version="1.0" encoding="utf-8"?>
+<ds:datastoreItem xmlns:ds="http://schemas.openxmlformats.org/officeDocument/2006/customXml" ds:itemID="{E4A0845B-41B6-4256-8FB3-E31EA581BF55}">
+  <ds:schemaRefs>
+    <ds:schemaRef ds:uri="http://schemas.microsoft.com/VisualStudio/2011/storyboarding/control/v1.0"/>
+  </ds:schemaRefs>
+</ds:datastoreItem>
+</file>
+
+<file path=customXml/itemProps2.xml><?xml version="1.0" encoding="utf-8"?>
 <ds:datastoreItem xmlns:ds="http://schemas.openxmlformats.org/officeDocument/2006/customXml" ds:itemID="{2FEB3A16-E640-4049-92BF-229BF3B54149}">
   <ds:schemaRefs>
     <ds:schemaRef ds:uri="http://schemas.microsoft.com/office/2006/metadata/contentType"/>
@@ -9632,7 +9791,111 @@
 </ds:datastoreItem>
 </file>
 
-<file path=customXml/itemProps43.xml><?xml version="1.0" encoding="utf-8"?>
+<file path=customXml/itemProps20.xml><?xml version="1.0" encoding="utf-8"?>
+<ds:datastoreItem xmlns:ds="http://schemas.openxmlformats.org/officeDocument/2006/customXml" ds:itemID="{4CFA599C-9F1C-4AB4-AB4F-10CF77B58F79}">
+  <ds:schemaRefs>
+    <ds:schemaRef ds:uri="http://schemas.microsoft.com/VisualStudio/2011/storyboarding/control/v1.0"/>
+  </ds:schemaRefs>
+</ds:datastoreItem>
+</file>
+
+<file path=customXml/itemProps21.xml><?xml version="1.0" encoding="utf-8"?>
+<ds:datastoreItem xmlns:ds="http://schemas.openxmlformats.org/officeDocument/2006/customXml" ds:itemID="{699689A1-427B-4DEA-8FDB-0058CB4B38D8}">
+  <ds:schemaRefs>
+    <ds:schemaRef ds:uri="http://schemas.microsoft.com/VisualStudio/2011/storyboarding/control/v1.0"/>
+  </ds:schemaRefs>
+</ds:datastoreItem>
+</file>
+
+<file path=customXml/itemProps22.xml><?xml version="1.0" encoding="utf-8"?>
+<ds:datastoreItem xmlns:ds="http://schemas.openxmlformats.org/officeDocument/2006/customXml" ds:itemID="{3ED2EF50-E36E-49D0-9F27-9EDAEC387091}">
+  <ds:schemaRefs>
+    <ds:schemaRef ds:uri="http://schemas.microsoft.com/VisualStudio/2011/storyboarding/control"/>
+  </ds:schemaRefs>
+</ds:datastoreItem>
+</file>
+
+<file path=customXml/itemProps23.xml><?xml version="1.0" encoding="utf-8"?>
+<ds:datastoreItem xmlns:ds="http://schemas.openxmlformats.org/officeDocument/2006/customXml" ds:itemID="{19CB1DF2-8822-4520-A56A-045D340F0C71}">
+  <ds:schemaRefs>
+    <ds:schemaRef ds:uri="http://schemas.microsoft.com/VisualStudio/2011/storyboarding/control/v1.0"/>
+  </ds:schemaRefs>
+</ds:datastoreItem>
+</file>
+
+<file path=customXml/itemProps24.xml><?xml version="1.0" encoding="utf-8"?>
+<ds:datastoreItem xmlns:ds="http://schemas.openxmlformats.org/officeDocument/2006/customXml" ds:itemID="{6574190A-3D9E-42C1-B276-38E33156AA99}">
+  <ds:schemaRefs>
+    <ds:schemaRef ds:uri="http://schemas.microsoft.com/VisualStudio/2011/storyboarding/control/v1.0"/>
+  </ds:schemaRefs>
+</ds:datastoreItem>
+</file>
+
+<file path=customXml/itemProps25.xml><?xml version="1.0" encoding="utf-8"?>
+<ds:datastoreItem xmlns:ds="http://schemas.openxmlformats.org/officeDocument/2006/customXml" ds:itemID="{A84BE01C-E91B-4A90-8E7F-25887EF8E061}">
+  <ds:schemaRefs>
+    <ds:schemaRef ds:uri="http://schemas.microsoft.com/VisualStudio/2011/storyboarding/control/v1.0"/>
+  </ds:schemaRefs>
+</ds:datastoreItem>
+</file>
+
+<file path=customXml/itemProps26.xml><?xml version="1.0" encoding="utf-8"?>
+<ds:datastoreItem xmlns:ds="http://schemas.openxmlformats.org/officeDocument/2006/customXml" ds:itemID="{E9C4CBB0-7D2F-42EC-9ED0-589327F3DDE1}">
+  <ds:schemaRefs>
+    <ds:schemaRef ds:uri="http://schemas.microsoft.com/VisualStudio/2011/storyboarding/control"/>
+  </ds:schemaRefs>
+</ds:datastoreItem>
+</file>
+
+<file path=customXml/itemProps27.xml><?xml version="1.0" encoding="utf-8"?>
+<ds:datastoreItem xmlns:ds="http://schemas.openxmlformats.org/officeDocument/2006/customXml" ds:itemID="{4EE14C2A-AD9F-4617-A8CC-4057921BFCA8}">
+  <ds:schemaRefs>
+    <ds:schemaRef ds:uri="http://schemas.microsoft.com/VisualStudio/2011/storyboarding/control/v1.0"/>
+  </ds:schemaRefs>
+</ds:datastoreItem>
+</file>
+
+<file path=customXml/itemProps28.xml><?xml version="1.0" encoding="utf-8"?>
+<ds:datastoreItem xmlns:ds="http://schemas.openxmlformats.org/officeDocument/2006/customXml" ds:itemID="{2C0B842B-A6BD-4438-89CC-C23BD0A85ECD}">
+  <ds:schemaRefs>
+    <ds:schemaRef ds:uri="http://schemas.microsoft.com/VisualStudio/2011/storyboarding/control"/>
+  </ds:schemaRefs>
+</ds:datastoreItem>
+</file>
+
+<file path=customXml/itemProps29.xml><?xml version="1.0" encoding="utf-8"?>
+<ds:datastoreItem xmlns:ds="http://schemas.openxmlformats.org/officeDocument/2006/customXml" ds:itemID="{5E2E8CE4-298D-499A-B8B4-4A593AC844A5}">
+  <ds:schemaRefs>
+    <ds:schemaRef ds:uri="http://schemas.microsoft.com/VisualStudio/2011/storyboarding/control/v1.0"/>
+  </ds:schemaRefs>
+</ds:datastoreItem>
+</file>
+
+<file path=customXml/itemProps3.xml><?xml version="1.0" encoding="utf-8"?>
+<ds:datastoreItem xmlns:ds="http://schemas.openxmlformats.org/officeDocument/2006/customXml" ds:itemID="{AD9C1405-6371-400D-A0E2-389A1557BE20}">
+  <ds:schemaRefs>
+    <ds:schemaRef ds:uri="http://schemas.microsoft.com/VisualStudio/2011/storyboarding/control/v1.0"/>
+  </ds:schemaRefs>
+</ds:datastoreItem>
+</file>
+
+<file path=customXml/itemProps30.xml><?xml version="1.0" encoding="utf-8"?>
+<ds:datastoreItem xmlns:ds="http://schemas.openxmlformats.org/officeDocument/2006/customXml" ds:itemID="{CD17C18B-5B11-471F-97AA-CE2EA822BB97}">
+  <ds:schemaRefs>
+    <ds:schemaRef ds:uri="http://schemas.microsoft.com/VisualStudio/2011/storyboarding/control/v1.0"/>
+  </ds:schemaRefs>
+</ds:datastoreItem>
+</file>
+
+<file path=customXml/itemProps31.xml><?xml version="1.0" encoding="utf-8"?>
+<ds:datastoreItem xmlns:ds="http://schemas.openxmlformats.org/officeDocument/2006/customXml" ds:itemID="{036B989D-7053-42E0-85AB-8864B824736A}">
+  <ds:schemaRefs>
+    <ds:schemaRef ds:uri="http://schemas.microsoft.com/VisualStudio/2011/storyboarding/control"/>
+  </ds:schemaRefs>
+</ds:datastoreItem>
+</file>
+
+<file path=customXml/itemProps32.xml><?xml version="1.0" encoding="utf-8"?>
 <ds:datastoreItem xmlns:ds="http://schemas.openxmlformats.org/officeDocument/2006/customXml" ds:itemID="{7C4FADB9-82C5-46C4-AD0E-6B60B5C6AEAE}">
   <ds:schemaRefs>
     <ds:schemaRef ds:uri="http://schemas.microsoft.com/VisualStudio/2011/storyboarding/control/v1.0"/>
@@ -9640,7 +9903,367 @@
 </ds:datastoreItem>
 </file>
 
+<file path=customXml/itemProps33.xml><?xml version="1.0" encoding="utf-8"?>
+<ds:datastoreItem xmlns:ds="http://schemas.openxmlformats.org/officeDocument/2006/customXml" ds:itemID="{39536A02-E179-4A1C-9FA7-86EF40631969}">
+  <ds:schemaRefs>
+    <ds:schemaRef ds:uri="http://schemas.microsoft.com/VisualStudio/2011/storyboarding/control/v1.0"/>
+  </ds:schemaRefs>
+</ds:datastoreItem>
+</file>
+
+<file path=customXml/itemProps34.xml><?xml version="1.0" encoding="utf-8"?>
+<ds:datastoreItem xmlns:ds="http://schemas.openxmlformats.org/officeDocument/2006/customXml" ds:itemID="{574C0546-69B0-4850-A983-CDA8017CD4CE}">
+  <ds:schemaRefs>
+    <ds:schemaRef ds:uri="http://schemas.microsoft.com/VisualStudio/2011/storyboarding/control"/>
+  </ds:schemaRefs>
+</ds:datastoreItem>
+</file>
+
+<file path=customXml/itemProps35.xml><?xml version="1.0" encoding="utf-8"?>
+<ds:datastoreItem xmlns:ds="http://schemas.openxmlformats.org/officeDocument/2006/customXml" ds:itemID="{A1B88D5F-41A7-488A-960C-6D819000899D}">
+  <ds:schemaRefs>
+    <ds:schemaRef ds:uri="http://schemas.microsoft.com/VisualStudio/2011/storyboarding/control/v1.0"/>
+  </ds:schemaRefs>
+</ds:datastoreItem>
+</file>
+
+<file path=customXml/itemProps36.xml><?xml version="1.0" encoding="utf-8"?>
+<ds:datastoreItem xmlns:ds="http://schemas.openxmlformats.org/officeDocument/2006/customXml" ds:itemID="{156ACD54-663F-4146-A83C-D39B7758E090}">
+  <ds:schemaRefs>
+    <ds:schemaRef ds:uri="http://schemas.microsoft.com/VisualStudio/2011/storyboarding/control/v1.0"/>
+  </ds:schemaRefs>
+</ds:datastoreItem>
+</file>
+
+<file path=customXml/itemProps37.xml><?xml version="1.0" encoding="utf-8"?>
+<ds:datastoreItem xmlns:ds="http://schemas.openxmlformats.org/officeDocument/2006/customXml" ds:itemID="{B41892D7-DF8B-4D5A-8AD2-983048A35AA0}">
+  <ds:schemaRefs>
+    <ds:schemaRef ds:uri="http://schemas.microsoft.com/VisualStudio/2011/storyboarding/control/v1.0"/>
+  </ds:schemaRefs>
+</ds:datastoreItem>
+</file>
+
+<file path=customXml/itemProps38.xml><?xml version="1.0" encoding="utf-8"?>
+<ds:datastoreItem xmlns:ds="http://schemas.openxmlformats.org/officeDocument/2006/customXml" ds:itemID="{5423C7C4-EE26-4ED2-9F11-C9ABAA081BA5}">
+  <ds:schemaRefs>
+    <ds:schemaRef ds:uri="http://schemas.microsoft.com/VisualStudio/2011/storyboarding/control/v1.0"/>
+  </ds:schemaRefs>
+</ds:datastoreItem>
+</file>
+
+<file path=customXml/itemProps39.xml><?xml version="1.0" encoding="utf-8"?>
+<ds:datastoreItem xmlns:ds="http://schemas.openxmlformats.org/officeDocument/2006/customXml" ds:itemID="{AB006AED-D3B6-450F-A436-759E490055A5}">
+  <ds:schemaRefs>
+    <ds:schemaRef ds:uri="http://schemas.microsoft.com/VisualStudio/2011/storyboarding/control/v1.0"/>
+  </ds:schemaRefs>
+</ds:datastoreItem>
+</file>
+
+<file path=customXml/itemProps4.xml><?xml version="1.0" encoding="utf-8"?>
+<ds:datastoreItem xmlns:ds="http://schemas.openxmlformats.org/officeDocument/2006/customXml" ds:itemID="{A2DAA52B-5F52-4A8E-B601-7BF162CD738F}">
+  <ds:schemaRefs>
+    <ds:schemaRef ds:uri="http://schemas.microsoft.com/VisualStudio/2011/storyboarding/control/v1.0"/>
+  </ds:schemaRefs>
+</ds:datastoreItem>
+</file>
+
+<file path=customXml/itemProps40.xml><?xml version="1.0" encoding="utf-8"?>
+<ds:datastoreItem xmlns:ds="http://schemas.openxmlformats.org/officeDocument/2006/customXml" ds:itemID="{1325FCED-59E4-4A0E-AB40-72EC19C3A651}">
+  <ds:schemaRefs>
+    <ds:schemaRef ds:uri="http://schemas.microsoft.com/VisualStudio/2011/storyboarding/control"/>
+  </ds:schemaRefs>
+</ds:datastoreItem>
+</file>
+
+<file path=customXml/itemProps41.xml><?xml version="1.0" encoding="utf-8"?>
+<ds:datastoreItem xmlns:ds="http://schemas.openxmlformats.org/officeDocument/2006/customXml" ds:itemID="{E2EFB470-892C-4F70-98FA-B53F970592A9}">
+  <ds:schemaRefs>
+    <ds:schemaRef ds:uri="http://schemas.microsoft.com/VisualStudio/2011/storyboarding/control"/>
+  </ds:schemaRefs>
+</ds:datastoreItem>
+</file>
+
+<file path=customXml/itemProps42.xml><?xml version="1.0" encoding="utf-8"?>
+<ds:datastoreItem xmlns:ds="http://schemas.openxmlformats.org/officeDocument/2006/customXml" ds:itemID="{F7F9CBAC-60B8-4800-9EA1-9BB1523CD9B4}">
+  <ds:schemaRefs>
+    <ds:schemaRef ds:uri="http://schemas.microsoft.com/VisualStudio/2011/storyboarding/control"/>
+  </ds:schemaRefs>
+</ds:datastoreItem>
+</file>
+
+<file path=customXml/itemProps43.xml><?xml version="1.0" encoding="utf-8"?>
+<ds:datastoreItem xmlns:ds="http://schemas.openxmlformats.org/officeDocument/2006/customXml" ds:itemID="{F782368F-0EE3-40FA-B682-80E11F49B65E}">
+  <ds:schemaRefs>
+    <ds:schemaRef ds:uri="http://schemas.microsoft.com/VisualStudio/2011/storyboarding/control"/>
+  </ds:schemaRefs>
+</ds:datastoreItem>
+</file>
+
 <file path=customXml/itemProps44.xml><?xml version="1.0" encoding="utf-8"?>
+<ds:datastoreItem xmlns:ds="http://schemas.openxmlformats.org/officeDocument/2006/customXml" ds:itemID="{AE0CE2A3-FF32-4259-A452-A173604DCF0C}">
+  <ds:schemaRefs>
+    <ds:schemaRef ds:uri="http://schemas.microsoft.com/VisualStudio/2011/storyboarding/control"/>
+  </ds:schemaRefs>
+</ds:datastoreItem>
+</file>
+
+<file path=customXml/itemProps45.xml><?xml version="1.0" encoding="utf-8"?>
+<ds:datastoreItem xmlns:ds="http://schemas.openxmlformats.org/officeDocument/2006/customXml" ds:itemID="{F17D5AF6-3BD9-4DFF-AE9B-2E10D3430779}">
+  <ds:schemaRefs>
+    <ds:schemaRef ds:uri="http://schemas.microsoft.com/VisualStudio/2011/storyboarding/control/v1.0"/>
+  </ds:schemaRefs>
+</ds:datastoreItem>
+</file>
+
+<file path=customXml/itemProps46.xml><?xml version="1.0" encoding="utf-8"?>
+<ds:datastoreItem xmlns:ds="http://schemas.openxmlformats.org/officeDocument/2006/customXml" ds:itemID="{B571350C-23C3-4B5A-8F49-FBEB6CF22964}">
+  <ds:schemaRefs>
+    <ds:schemaRef ds:uri="http://schemas.microsoft.com/VisualStudio/2011/storyboarding/control/v1.0"/>
+  </ds:schemaRefs>
+</ds:datastoreItem>
+</file>
+
+<file path=customXml/itemProps47.xml><?xml version="1.0" encoding="utf-8"?>
+<ds:datastoreItem xmlns:ds="http://schemas.openxmlformats.org/officeDocument/2006/customXml" ds:itemID="{379BFC32-51F7-4218-B2AD-CFD6564CE11F}">
+  <ds:schemaRefs>
+    <ds:schemaRef ds:uri="http://schemas.microsoft.com/VisualStudio/2011/storyboarding/control"/>
+  </ds:schemaRefs>
+</ds:datastoreItem>
+</file>
+
+<file path=customXml/itemProps48.xml><?xml version="1.0" encoding="utf-8"?>
+<ds:datastoreItem xmlns:ds="http://schemas.openxmlformats.org/officeDocument/2006/customXml" ds:itemID="{D8E0912A-795B-4916-9114-34B4F28A0EE3}">
+  <ds:schemaRefs>
+    <ds:schemaRef ds:uri="http://schemas.microsoft.com/VisualStudio/2011/storyboarding/control/v1.0"/>
+  </ds:schemaRefs>
+</ds:datastoreItem>
+</file>
+
+<file path=customXml/itemProps49.xml><?xml version="1.0" encoding="utf-8"?>
+<ds:datastoreItem xmlns:ds="http://schemas.openxmlformats.org/officeDocument/2006/customXml" ds:itemID="{AA5E4F96-8C72-44F9-A0C5-FB007B246D91}">
+  <ds:schemaRefs>
+    <ds:schemaRef ds:uri="http://schemas.microsoft.com/VisualStudio/2011/storyboarding/control/v1.0"/>
+  </ds:schemaRefs>
+</ds:datastoreItem>
+</file>
+
+<file path=customXml/itemProps5.xml><?xml version="1.0" encoding="utf-8"?>
+<ds:datastoreItem xmlns:ds="http://schemas.openxmlformats.org/officeDocument/2006/customXml" ds:itemID="{729DB56D-F542-4709-9AE0-E83CD92BA163}">
+  <ds:schemaRefs>
+    <ds:schemaRef ds:uri="http://schemas.microsoft.com/VisualStudio/2011/storyboarding/control/v1.0"/>
+  </ds:schemaRefs>
+</ds:datastoreItem>
+</file>
+
+<file path=customXml/itemProps50.xml><?xml version="1.0" encoding="utf-8"?>
+<ds:datastoreItem xmlns:ds="http://schemas.openxmlformats.org/officeDocument/2006/customXml" ds:itemID="{D356E6DB-54C9-4389-B932-0F583366BD4B}">
+  <ds:schemaRefs>
+    <ds:schemaRef ds:uri="http://schemas.microsoft.com/VisualStudio/2011/storyboarding/control/v1.0"/>
+  </ds:schemaRefs>
+</ds:datastoreItem>
+</file>
+
+<file path=customXml/itemProps51.xml><?xml version="1.0" encoding="utf-8"?>
+<ds:datastoreItem xmlns:ds="http://schemas.openxmlformats.org/officeDocument/2006/customXml" ds:itemID="{5A5E7016-2CE6-4389-89D1-05D5203E16D0}">
+  <ds:schemaRefs>
+    <ds:schemaRef ds:uri="http://schemas.microsoft.com/VisualStudio/2011/storyboarding/control"/>
+  </ds:schemaRefs>
+</ds:datastoreItem>
+</file>
+
+<file path=customXml/itemProps52.xml><?xml version="1.0" encoding="utf-8"?>
+<ds:datastoreItem xmlns:ds="http://schemas.openxmlformats.org/officeDocument/2006/customXml" ds:itemID="{4BCB20A2-9850-49DA-9BD6-A5D2B0ABF72F}">
+  <ds:schemaRefs>
+    <ds:schemaRef ds:uri="http://schemas.microsoft.com/VisualStudio/2011/storyboarding/control/v1.0"/>
+  </ds:schemaRefs>
+</ds:datastoreItem>
+</file>
+
+<file path=customXml/itemProps53.xml><?xml version="1.0" encoding="utf-8"?>
+<ds:datastoreItem xmlns:ds="http://schemas.openxmlformats.org/officeDocument/2006/customXml" ds:itemID="{16772130-8F5D-442B-AA11-39D4F229ACC6}">
+  <ds:schemaRefs>
+    <ds:schemaRef ds:uri="http://schemas.microsoft.com/VisualStudio/2011/storyboarding/control/v1.0"/>
+  </ds:schemaRefs>
+</ds:datastoreItem>
+</file>
+
+<file path=customXml/itemProps54.xml><?xml version="1.0" encoding="utf-8"?>
+<ds:datastoreItem xmlns:ds="http://schemas.openxmlformats.org/officeDocument/2006/customXml" ds:itemID="{F395D8ED-A0D3-4F6E-91F3-A29EC16A8083}">
+  <ds:schemaRefs>
+    <ds:schemaRef ds:uri="http://schemas.microsoft.com/VisualStudio/2011/storyboarding/control/v1.0"/>
+  </ds:schemaRefs>
+</ds:datastoreItem>
+</file>
+
+<file path=customXml/itemProps55.xml><?xml version="1.0" encoding="utf-8"?>
+<ds:datastoreItem xmlns:ds="http://schemas.openxmlformats.org/officeDocument/2006/customXml" ds:itemID="{C1E8400F-CB83-4A16-AF3D-36FAF22BDD23}">
+  <ds:schemaRefs>
+    <ds:schemaRef ds:uri="http://schemas.microsoft.com/VisualStudio/2011/storyboarding/control/v1.0"/>
+  </ds:schemaRefs>
+</ds:datastoreItem>
+</file>
+
+<file path=customXml/itemProps56.xml><?xml version="1.0" encoding="utf-8"?>
+<ds:datastoreItem xmlns:ds="http://schemas.openxmlformats.org/officeDocument/2006/customXml" ds:itemID="{20EE139D-44C7-4192-A8B7-E25390148E28}">
+  <ds:schemaRefs>
+    <ds:schemaRef ds:uri="http://schemas.microsoft.com/VisualStudio/2011/storyboarding/control/v1.0"/>
+  </ds:schemaRefs>
+</ds:datastoreItem>
+</file>
+
+<file path=customXml/itemProps57.xml><?xml version="1.0" encoding="utf-8"?>
+<ds:datastoreItem xmlns:ds="http://schemas.openxmlformats.org/officeDocument/2006/customXml" ds:itemID="{CA0F2729-8F0E-4601-8BBB-5DF84EDFD3EB}">
+  <ds:schemaRefs>
+    <ds:schemaRef ds:uri="http://schemas.microsoft.com/VisualStudio/2011/storyboarding/control"/>
+  </ds:schemaRefs>
+</ds:datastoreItem>
+</file>
+
+<file path=customXml/itemProps58.xml><?xml version="1.0" encoding="utf-8"?>
+<ds:datastoreItem xmlns:ds="http://schemas.openxmlformats.org/officeDocument/2006/customXml" ds:itemID="{70C23831-7801-40F8-9A53-4E9925562CBE}">
+  <ds:schemaRefs>
+    <ds:schemaRef ds:uri="http://schemas.microsoft.com/VisualStudio/2011/storyboarding/control"/>
+  </ds:schemaRefs>
+</ds:datastoreItem>
+</file>
+
+<file path=customXml/itemProps59.xml><?xml version="1.0" encoding="utf-8"?>
+<ds:datastoreItem xmlns:ds="http://schemas.openxmlformats.org/officeDocument/2006/customXml" ds:itemID="{9C57ED54-5F7A-476D-BFE2-C46C7230CC6B}">
+  <ds:schemaRefs>
+    <ds:schemaRef ds:uri="http://schemas.microsoft.com/VisualStudio/2011/storyboarding/control/v1.0"/>
+  </ds:schemaRefs>
+</ds:datastoreItem>
+</file>
+
+<file path=customXml/itemProps6.xml><?xml version="1.0" encoding="utf-8"?>
+<ds:datastoreItem xmlns:ds="http://schemas.openxmlformats.org/officeDocument/2006/customXml" ds:itemID="{FD67FC06-DA15-486F-A046-DF7B79976F60}">
+  <ds:schemaRefs>
+    <ds:schemaRef ds:uri="http://schemas.microsoft.com/VisualStudio/2011/storyboarding/control"/>
+  </ds:schemaRefs>
+</ds:datastoreItem>
+</file>
+
+<file path=customXml/itemProps60.xml><?xml version="1.0" encoding="utf-8"?>
+<ds:datastoreItem xmlns:ds="http://schemas.openxmlformats.org/officeDocument/2006/customXml" ds:itemID="{CB953D38-E965-4BB2-94FE-DF647E85A654}">
+  <ds:schemaRefs>
+    <ds:schemaRef ds:uri="http://schemas.microsoft.com/VisualStudio/2011/storyboarding/control/v1.0"/>
+  </ds:schemaRefs>
+</ds:datastoreItem>
+</file>
+
+<file path=customXml/itemProps61.xml><?xml version="1.0" encoding="utf-8"?>
+<ds:datastoreItem xmlns:ds="http://schemas.openxmlformats.org/officeDocument/2006/customXml" ds:itemID="{23F8C33B-B43F-45BB-B385-DDAB00317A26}">
+  <ds:schemaRefs>
+    <ds:schemaRef ds:uri="http://schemas.microsoft.com/VisualStudio/2011/storyboarding/control"/>
+  </ds:schemaRefs>
+</ds:datastoreItem>
+</file>
+
+<file path=customXml/itemProps62.xml><?xml version="1.0" encoding="utf-8"?>
+<ds:datastoreItem xmlns:ds="http://schemas.openxmlformats.org/officeDocument/2006/customXml" ds:itemID="{63E54A0C-A919-4747-87DB-6EB5DB41F719}">
+  <ds:schemaRefs>
+    <ds:schemaRef ds:uri="http://schemas.microsoft.com/VisualStudio/2011/storyboarding/control/v1.0"/>
+  </ds:schemaRefs>
+</ds:datastoreItem>
+</file>
+
+<file path=customXml/itemProps63.xml><?xml version="1.0" encoding="utf-8"?>
+<ds:datastoreItem xmlns:ds="http://schemas.openxmlformats.org/officeDocument/2006/customXml" ds:itemID="{6B22741B-5AC6-4A2C-A57A-E4BDF22E0A90}">
+  <ds:schemaRefs>
+    <ds:schemaRef ds:uri="http://schemas.microsoft.com/VisualStudio/2011/storyboarding/control/v1.0"/>
+  </ds:schemaRefs>
+</ds:datastoreItem>
+</file>
+
+<file path=customXml/itemProps64.xml><?xml version="1.0" encoding="utf-8"?>
+<ds:datastoreItem xmlns:ds="http://schemas.openxmlformats.org/officeDocument/2006/customXml" ds:itemID="{63E5DE85-F05E-4507-B223-806D8F49F058}">
+  <ds:schemaRefs>
+    <ds:schemaRef ds:uri="http://schemas.microsoft.com/VisualStudio/2011/storyboarding/control/v1.0"/>
+  </ds:schemaRefs>
+</ds:datastoreItem>
+</file>
+
+<file path=customXml/itemProps65.xml><?xml version="1.0" encoding="utf-8"?>
+<ds:datastoreItem xmlns:ds="http://schemas.openxmlformats.org/officeDocument/2006/customXml" ds:itemID="{1C7B3C9E-48C2-496C-AAF2-5C37AB663973}">
+  <ds:schemaRefs>
+    <ds:schemaRef ds:uri="http://schemas.microsoft.com/VisualStudio/2011/storyboarding/control"/>
+  </ds:schemaRefs>
+</ds:datastoreItem>
+</file>
+
+<file path=customXml/itemProps66.xml><?xml version="1.0" encoding="utf-8"?>
+<ds:datastoreItem xmlns:ds="http://schemas.openxmlformats.org/officeDocument/2006/customXml" ds:itemID="{B0DBD337-FDC5-4C36-BF85-C09756391AA1}">
+  <ds:schemaRefs>
+    <ds:schemaRef ds:uri="http://schemas.microsoft.com/VisualStudio/2011/storyboarding/control/v1.0"/>
+  </ds:schemaRefs>
+</ds:datastoreItem>
+</file>
+
+<file path=customXml/itemProps67.xml><?xml version="1.0" encoding="utf-8"?>
+<ds:datastoreItem xmlns:ds="http://schemas.openxmlformats.org/officeDocument/2006/customXml" ds:itemID="{B7BD4F34-B154-4D92-BE87-C557EB1B7EFB}">
+  <ds:schemaRefs>
+    <ds:schemaRef ds:uri="http://schemas.microsoft.com/sharepoint/v3/contenttype/forms"/>
+  </ds:schemaRefs>
+</ds:datastoreItem>
+</file>
+
+<file path=customXml/itemProps68.xml><?xml version="1.0" encoding="utf-8"?>
+<ds:datastoreItem xmlns:ds="http://schemas.openxmlformats.org/officeDocument/2006/customXml" ds:itemID="{09A94271-A29B-4164-A32F-3A755C9B59FC}">
+  <ds:schemaRefs>
+    <ds:schemaRef ds:uri="http://schemas.microsoft.com/VisualStudio/2011/storyboarding/control"/>
+  </ds:schemaRefs>
+</ds:datastoreItem>
+</file>
+
+<file path=customXml/itemProps69.xml><?xml version="1.0" encoding="utf-8"?>
+<ds:datastoreItem xmlns:ds="http://schemas.openxmlformats.org/officeDocument/2006/customXml" ds:itemID="{B4BE880E-F71A-4C21-A1C3-8A2437E3C677}">
+  <ds:schemaRefs>
+    <ds:schemaRef ds:uri="http://schemas.microsoft.com/VisualStudio/2011/storyboarding/control/v1.0"/>
+  </ds:schemaRefs>
+</ds:datastoreItem>
+</file>
+
+<file path=customXml/itemProps7.xml><?xml version="1.0" encoding="utf-8"?>
+<ds:datastoreItem xmlns:ds="http://schemas.openxmlformats.org/officeDocument/2006/customXml" ds:itemID="{07B11A95-7731-4379-9E1B-32BC87FA2B56}">
+  <ds:schemaRefs>
+    <ds:schemaRef ds:uri="http://schemas.microsoft.com/VisualStudio/2011/storyboarding/control/v1.0"/>
+  </ds:schemaRefs>
+</ds:datastoreItem>
+</file>
+
+<file path=customXml/itemProps70.xml><?xml version="1.0" encoding="utf-8"?>
+<ds:datastoreItem xmlns:ds="http://schemas.openxmlformats.org/officeDocument/2006/customXml" ds:itemID="{A6E144E0-D919-4B3D-A3BD-4F079B739AC2}">
+  <ds:schemaRefs>
+    <ds:schemaRef ds:uri="http://schemas.microsoft.com/VisualStudio/2011/storyboarding/control"/>
+  </ds:schemaRefs>
+</ds:datastoreItem>
+</file>
+
+<file path=customXml/itemProps71.xml><?xml version="1.0" encoding="utf-8"?>
+<ds:datastoreItem xmlns:ds="http://schemas.openxmlformats.org/officeDocument/2006/customXml" ds:itemID="{416D00B5-FBFE-483F-BE84-520287240459}">
+  <ds:schemaRefs>
+    <ds:schemaRef ds:uri="http://schemas.microsoft.com/VisualStudio/2011/storyboarding/control/v1.0"/>
+  </ds:schemaRefs>
+</ds:datastoreItem>
+</file>
+
+<file path=customXml/itemProps72.xml><?xml version="1.0" encoding="utf-8"?>
+<ds:datastoreItem xmlns:ds="http://schemas.openxmlformats.org/officeDocument/2006/customXml" ds:itemID="{12DDBF6F-C153-48C1-97C0-85AA34D18FD2}">
+  <ds:schemaRefs>
+    <ds:schemaRef ds:uri="http://schemas.microsoft.com/VisualStudio/2011/storyboarding/control"/>
+  </ds:schemaRefs>
+</ds:datastoreItem>
+</file>
+
+<file path=customXml/itemProps73.xml><?xml version="1.0" encoding="utf-8"?>
+<ds:datastoreItem xmlns:ds="http://schemas.openxmlformats.org/officeDocument/2006/customXml" ds:itemID="{E2968586-6EB5-4B3C-A2E1-82E35F695B75}">
+  <ds:schemaRefs>
+    <ds:schemaRef ds:uri="http://schemas.microsoft.com/VisualStudio/2011/storyboarding/control/v1.0"/>
+  </ds:schemaRefs>
+</ds:datastoreItem>
+</file>
+
+<file path=customXml/itemProps74.xml><?xml version="1.0" encoding="utf-8"?>
 <ds:datastoreItem xmlns:ds="http://schemas.openxmlformats.org/officeDocument/2006/customXml" ds:itemID="{DDEEC505-9111-44CE-9DED-8A454ABEC272}">
   <ds:schemaRefs>
     <ds:schemaRef ds:uri="http://schemas.microsoft.com/VisualStudio/2011/storyboarding/control/v1.0"/>
@@ -9648,55 +10271,143 @@
 </ds:datastoreItem>
 </file>
 
-<file path=customXml/itemProps45.xml><?xml version="1.0" encoding="utf-8"?>
-<ds:datastoreItem xmlns:ds="http://schemas.openxmlformats.org/officeDocument/2006/customXml" ds:itemID="{5F81420E-DDF3-4689-9969-42E66499CA3E}">
+<file path=customXml/itemProps75.xml><?xml version="1.0" encoding="utf-8"?>
+<ds:datastoreItem xmlns:ds="http://schemas.openxmlformats.org/officeDocument/2006/customXml" ds:itemID="{CC419530-796D-4DBE-BBEE-9A6630A896E1}">
+  <ds:schemaRefs>
+    <ds:schemaRef ds:uri="http://schemas.microsoft.com/VisualStudio/2011/storyboarding/control/v1.0"/>
+  </ds:schemaRefs>
+</ds:datastoreItem>
+</file>
+
+<file path=customXml/itemProps76.xml><?xml version="1.0" encoding="utf-8"?>
+<ds:datastoreItem xmlns:ds="http://schemas.openxmlformats.org/officeDocument/2006/customXml" ds:itemID="{E6C688DD-065A-4726-BCE5-E5AFDA3F5641}">
+  <ds:schemaRefs>
+    <ds:schemaRef ds:uri="http://schemas.microsoft.com/VisualStudio/2011/storyboarding/control/v1.0"/>
+  </ds:schemaRefs>
+</ds:datastoreItem>
+</file>
+
+<file path=customXml/itemProps77.xml><?xml version="1.0" encoding="utf-8"?>
+<ds:datastoreItem xmlns:ds="http://schemas.openxmlformats.org/officeDocument/2006/customXml" ds:itemID="{E4D924B8-E923-4751-87E1-B31AA64A9F7B}">
+  <ds:schemaRefs>
+    <ds:schemaRef ds:uri="http://schemas.microsoft.com/VisualStudio/2011/storyboarding/control/v1.0"/>
+  </ds:schemaRefs>
+</ds:datastoreItem>
+</file>
+
+<file path=customXml/itemProps78.xml><?xml version="1.0" encoding="utf-8"?>
+<ds:datastoreItem xmlns:ds="http://schemas.openxmlformats.org/officeDocument/2006/customXml" ds:itemID="{9C4C7B07-3AE3-46A1-A54D-2BDFAB93A8EF}">
+  <ds:schemaRefs>
+    <ds:schemaRef ds:uri="http://schemas.microsoft.com/VisualStudio/2011/storyboarding/control/v1.0"/>
+  </ds:schemaRefs>
+</ds:datastoreItem>
+</file>
+
+<file path=customXml/itemProps79.xml><?xml version="1.0" encoding="utf-8"?>
+<ds:datastoreItem xmlns:ds="http://schemas.openxmlformats.org/officeDocument/2006/customXml" ds:itemID="{0BD21A30-063A-4397-97B8-0121D45BD9D6}">
+  <ds:schemaRefs>
+    <ds:schemaRef ds:uri="http://schemas.microsoft.com/VisualStudio/2011/storyboarding/control/v1.0"/>
+  </ds:schemaRefs>
+</ds:datastoreItem>
+</file>
+
+<file path=customXml/itemProps8.xml><?xml version="1.0" encoding="utf-8"?>
+<ds:datastoreItem xmlns:ds="http://schemas.openxmlformats.org/officeDocument/2006/customXml" ds:itemID="{288CEDBF-3F9B-47CF-AF84-2B8486359159}">
+  <ds:schemaRefs>
+    <ds:schemaRef ds:uri="http://schemas.microsoft.com/VisualStudio/2011/storyboarding/control/v1.0"/>
+  </ds:schemaRefs>
+</ds:datastoreItem>
+</file>
+
+<file path=customXml/itemProps80.xml><?xml version="1.0" encoding="utf-8"?>
+<ds:datastoreItem xmlns:ds="http://schemas.openxmlformats.org/officeDocument/2006/customXml" ds:itemID="{D705ACE5-FAF8-44EC-9622-845721B4A44D}">
+  <ds:schemaRefs>
+    <ds:schemaRef ds:uri="http://schemas.microsoft.com/VisualStudio/2011/storyboarding/control/v1.0"/>
+  </ds:schemaRefs>
+</ds:datastoreItem>
+</file>
+
+<file path=customXml/itemProps81.xml><?xml version="1.0" encoding="utf-8"?>
+<ds:datastoreItem xmlns:ds="http://schemas.openxmlformats.org/officeDocument/2006/customXml" ds:itemID="{359B13B5-DE77-48C2-859A-70355A1B9D90}">
+  <ds:schemaRefs>
+    <ds:schemaRef ds:uri="http://schemas.microsoft.com/VisualStudio/2011/storyboarding/control/v1.0"/>
+  </ds:schemaRefs>
+</ds:datastoreItem>
+</file>
+
+<file path=customXml/itemProps82.xml><?xml version="1.0" encoding="utf-8"?>
+<ds:datastoreItem xmlns:ds="http://schemas.openxmlformats.org/officeDocument/2006/customXml" ds:itemID="{C4783010-23AB-4BDC-BABF-F6576658A2B0}">
+  <ds:schemaRefs>
+    <ds:schemaRef ds:uri="http://schemas.microsoft.com/VisualStudio/2011/storyboarding/control/v1.0"/>
+  </ds:schemaRefs>
+</ds:datastoreItem>
+</file>
+
+<file path=customXml/itemProps83.xml><?xml version="1.0" encoding="utf-8"?>
+<ds:datastoreItem xmlns:ds="http://schemas.openxmlformats.org/officeDocument/2006/customXml" ds:itemID="{AECE9E1B-E7C1-46F6-9945-164C1E49BE74}">
+  <ds:schemaRefs>
+    <ds:schemaRef ds:uri="http://schemas.microsoft.com/VisualStudio/2011/storyboarding/control/v1.0"/>
+  </ds:schemaRefs>
+</ds:datastoreItem>
+</file>
+
+<file path=customXml/itemProps84.xml><?xml version="1.0" encoding="utf-8"?>
+<ds:datastoreItem xmlns:ds="http://schemas.openxmlformats.org/officeDocument/2006/customXml" ds:itemID="{A6ECB6E0-BD84-4681-8699-56A1B3F36A60}">
   <ds:schemaRefs>
     <ds:schemaRef ds:uri="http://schemas.microsoft.com/VisualStudio/2011/storyboarding/control"/>
   </ds:schemaRefs>
 </ds:datastoreItem>
 </file>
 
-<file path=customXml/itemProps46.xml><?xml version="1.0" encoding="utf-8"?>
-<ds:datastoreItem xmlns:ds="http://schemas.openxmlformats.org/officeDocument/2006/customXml" ds:itemID="{5A5E7016-2CE6-4389-89D1-05D5203E16D0}">
+<file path=customXml/itemProps85.xml><?xml version="1.0" encoding="utf-8"?>
+<ds:datastoreItem xmlns:ds="http://schemas.openxmlformats.org/officeDocument/2006/customXml" ds:itemID="{53BC856C-B486-437D-A7B4-612AE9417D7A}">
+  <ds:schemaRefs>
+    <ds:schemaRef ds:uri="http://schemas.microsoft.com/VisualStudio/2011/storyboarding/control/v1.0"/>
+  </ds:schemaRefs>
+</ds:datastoreItem>
+</file>
+
+<file path=customXml/itemProps86.xml><?xml version="1.0" encoding="utf-8"?>
+<ds:datastoreItem xmlns:ds="http://schemas.openxmlformats.org/officeDocument/2006/customXml" ds:itemID="{18A6A270-A75C-4D7E-86E4-765FF07C5144}">
+  <ds:schemaRefs>
+    <ds:schemaRef ds:uri="http://schemas.microsoft.com/sharepoint/events"/>
+  </ds:schemaRefs>
+</ds:datastoreItem>
+</file>
+
+<file path=customXml/itemProps87.xml><?xml version="1.0" encoding="utf-8"?>
+<ds:datastoreItem xmlns:ds="http://schemas.openxmlformats.org/officeDocument/2006/customXml" ds:itemID="{B8C6D4DD-FC58-4C97-B28B-C1F0B6B80EE0}">
   <ds:schemaRefs>
     <ds:schemaRef ds:uri="http://schemas.microsoft.com/VisualStudio/2011/storyboarding/control"/>
   </ds:schemaRefs>
 </ds:datastoreItem>
 </file>
 
-<file path=customXml/itemProps47.xml><?xml version="1.0" encoding="utf-8"?>
-<ds:datastoreItem xmlns:ds="http://schemas.openxmlformats.org/officeDocument/2006/customXml" ds:itemID="{AD9C1405-6371-400D-A0E2-389A1557BE20}">
+<file path=customXml/itemProps88.xml><?xml version="1.0" encoding="utf-8"?>
+<ds:datastoreItem xmlns:ds="http://schemas.openxmlformats.org/officeDocument/2006/customXml" ds:itemID="{253B000D-0B23-420C-B5B5-11B6002E5391}">
   <ds:schemaRefs>
     <ds:schemaRef ds:uri="http://schemas.microsoft.com/VisualStudio/2011/storyboarding/control/v1.0"/>
   </ds:schemaRefs>
 </ds:datastoreItem>
 </file>
 
-<file path=customXml/itemProps48.xml><?xml version="1.0" encoding="utf-8"?>
-<ds:datastoreItem xmlns:ds="http://schemas.openxmlformats.org/officeDocument/2006/customXml" ds:itemID="{39536A02-E179-4A1C-9FA7-86EF40631969}">
+<file path=customXml/itemProps89.xml><?xml version="1.0" encoding="utf-8"?>
+<ds:datastoreItem xmlns:ds="http://schemas.openxmlformats.org/officeDocument/2006/customXml" ds:itemID="{188F6680-9EB8-4B03-8D3B-773D66FC777A}">
   <ds:schemaRefs>
     <ds:schemaRef ds:uri="http://schemas.microsoft.com/VisualStudio/2011/storyboarding/control/v1.0"/>
   </ds:schemaRefs>
 </ds:datastoreItem>
 </file>
 
-<file path=customXml/itemProps49.xml><?xml version="1.0" encoding="utf-8"?>
-<ds:datastoreItem xmlns:ds="http://schemas.openxmlformats.org/officeDocument/2006/customXml" ds:itemID="{A6E144E0-D919-4B3D-A3BD-4F079B739AC2}">
+<file path=customXml/itemProps9.xml><?xml version="1.0" encoding="utf-8"?>
+<ds:datastoreItem xmlns:ds="http://schemas.openxmlformats.org/officeDocument/2006/customXml" ds:itemID="{1AF31726-A62F-4331-8622-ED351D5149B7}">
   <ds:schemaRefs>
     <ds:schemaRef ds:uri="http://schemas.microsoft.com/VisualStudio/2011/storyboarding/control"/>
   </ds:schemaRefs>
 </ds:datastoreItem>
 </file>
 
-<file path=customXml/itemProps5.xml><?xml version="1.0" encoding="utf-8"?>
-<ds:datastoreItem xmlns:ds="http://schemas.openxmlformats.org/officeDocument/2006/customXml" ds:itemID="{699689A1-427B-4DEA-8FDB-0058CB4B38D8}">
-  <ds:schemaRefs>
-    <ds:schemaRef ds:uri="http://schemas.microsoft.com/VisualStudio/2011/storyboarding/control/v1.0"/>
-  </ds:schemaRefs>
-</ds:datastoreItem>
-</file>
-
-<file path=customXml/itemProps50.xml><?xml version="1.0" encoding="utf-8"?>
+<file path=customXml/itemProps90.xml><?xml version="1.0" encoding="utf-8"?>
 <ds:datastoreItem xmlns:ds="http://schemas.openxmlformats.org/officeDocument/2006/customXml" ds:itemID="{A9E9510A-02AF-4564-9E17-46676C80E84C}">
   <ds:schemaRefs>
     <ds:schemaRef ds:uri="http://purl.org/dc/terms/"/>
@@ -9712,39 +10423,7 @@
 </ds:datastoreItem>
 </file>
 
-<file path=customXml/itemProps51.xml><?xml version="1.0" encoding="utf-8"?>
-<ds:datastoreItem xmlns:ds="http://schemas.openxmlformats.org/officeDocument/2006/customXml" ds:itemID="{AB006AED-D3B6-450F-A436-759E490055A5}">
-  <ds:schemaRefs>
-    <ds:schemaRef ds:uri="http://schemas.microsoft.com/VisualStudio/2011/storyboarding/control/v1.0"/>
-  </ds:schemaRefs>
-</ds:datastoreItem>
-</file>
-
-<file path=customXml/itemProps52.xml><?xml version="1.0" encoding="utf-8"?>
-<ds:datastoreItem xmlns:ds="http://schemas.openxmlformats.org/officeDocument/2006/customXml" ds:itemID="{CC419530-796D-4DBE-BBEE-9A6630A896E1}">
-  <ds:schemaRefs>
-    <ds:schemaRef ds:uri="http://schemas.microsoft.com/VisualStudio/2011/storyboarding/control/v1.0"/>
-  </ds:schemaRefs>
-</ds:datastoreItem>
-</file>
-
-<file path=customXml/itemProps53.xml><?xml version="1.0" encoding="utf-8"?>
-<ds:datastoreItem xmlns:ds="http://schemas.openxmlformats.org/officeDocument/2006/customXml" ds:itemID="{08904217-40E1-4558-95D8-8D709CA82866}">
-  <ds:schemaRefs>
-    <ds:schemaRef ds:uri="http://schemas.microsoft.com/VisualStudio/2011/storyboarding/control/v1.0"/>
-  </ds:schemaRefs>
-</ds:datastoreItem>
-</file>
-
-<file path=customXml/itemProps54.xml><?xml version="1.0" encoding="utf-8"?>
-<ds:datastoreItem xmlns:ds="http://schemas.openxmlformats.org/officeDocument/2006/customXml" ds:itemID="{20EE139D-44C7-4192-A8B7-E25390148E28}">
-  <ds:schemaRefs>
-    <ds:schemaRef ds:uri="http://schemas.microsoft.com/VisualStudio/2011/storyboarding/control/v1.0"/>
-  </ds:schemaRefs>
-</ds:datastoreItem>
-</file>
-
-<file path=customXml/itemProps55.xml><?xml version="1.0" encoding="utf-8"?>
+<file path=customXml/itemProps91.xml><?xml version="1.0" encoding="utf-8"?>
 <ds:datastoreItem xmlns:ds="http://schemas.openxmlformats.org/officeDocument/2006/customXml" ds:itemID="{C40E64A7-7702-4466-95BD-ABEC09272CCB}">
   <ds:schemaRefs>
     <ds:schemaRef ds:uri="http://schemas.microsoft.com/VisualStudio/2011/storyboarding/control"/>
@@ -9752,127 +10431,23 @@
 </ds:datastoreItem>
 </file>
 
-<file path=customXml/itemProps56.xml><?xml version="1.0" encoding="utf-8"?>
-<ds:datastoreItem xmlns:ds="http://schemas.openxmlformats.org/officeDocument/2006/customXml" ds:itemID="{574C0546-69B0-4850-A983-CDA8017CD4CE}">
+<file path=customXml/itemProps92.xml><?xml version="1.0" encoding="utf-8"?>
+<ds:datastoreItem xmlns:ds="http://schemas.openxmlformats.org/officeDocument/2006/customXml" ds:itemID="{AAD6179F-00C3-44B7-9998-E9C87C4FA9EC}">
   <ds:schemaRefs>
     <ds:schemaRef ds:uri="http://schemas.microsoft.com/VisualStudio/2011/storyboarding/control"/>
   </ds:schemaRefs>
 </ds:datastoreItem>
 </file>
 
-<file path=customXml/itemProps57.xml><?xml version="1.0" encoding="utf-8"?>
-<ds:datastoreItem xmlns:ds="http://schemas.openxmlformats.org/officeDocument/2006/customXml" ds:itemID="{416D00B5-FBFE-483F-BE84-520287240459}">
+<file path=customXml/itemProps93.xml><?xml version="1.0" encoding="utf-8"?>
+<ds:datastoreItem xmlns:ds="http://schemas.openxmlformats.org/officeDocument/2006/customXml" ds:itemID="{814432F2-7AE9-411E-9F7B-EBBF16C4666D}">
   <ds:schemaRefs>
     <ds:schemaRef ds:uri="http://schemas.microsoft.com/VisualStudio/2011/storyboarding/control/v1.0"/>
   </ds:schemaRefs>
 </ds:datastoreItem>
 </file>
 
-<file path=customXml/itemProps58.xml><?xml version="1.0" encoding="utf-8"?>
-<ds:datastoreItem xmlns:ds="http://schemas.openxmlformats.org/officeDocument/2006/customXml" ds:itemID="{2E901D8B-281C-4847-BEC4-E1DAD11CFF00}">
-  <ds:schemaRefs>
-    <ds:schemaRef ds:uri="http://schemas.microsoft.com/VisualStudio/2011/storyboarding/control"/>
-  </ds:schemaRefs>
-</ds:datastoreItem>
-</file>
-
-<file path=customXml/itemProps59.xml><?xml version="1.0" encoding="utf-8"?>
-<ds:datastoreItem xmlns:ds="http://schemas.openxmlformats.org/officeDocument/2006/customXml" ds:itemID="{4BCB20A2-9850-49DA-9BD6-A5D2B0ABF72F}">
-  <ds:schemaRefs>
-    <ds:schemaRef ds:uri="http://schemas.microsoft.com/VisualStudio/2011/storyboarding/control/v1.0"/>
-  </ds:schemaRefs>
-</ds:datastoreItem>
-</file>
-
-<file path=customXml/itemProps6.xml><?xml version="1.0" encoding="utf-8"?>
-<ds:datastoreItem xmlns:ds="http://schemas.openxmlformats.org/officeDocument/2006/customXml" ds:itemID="{1C7B3C9E-48C2-496C-AAF2-5C37AB663973}">
-  <ds:schemaRefs>
-    <ds:schemaRef ds:uri="http://schemas.microsoft.com/VisualStudio/2011/storyboarding/control"/>
-  </ds:schemaRefs>
-</ds:datastoreItem>
-</file>
-
-<file path=customXml/itemProps60.xml><?xml version="1.0" encoding="utf-8"?>
-<ds:datastoreItem xmlns:ds="http://schemas.openxmlformats.org/officeDocument/2006/customXml" ds:itemID="{E6C688DD-065A-4726-BCE5-E5AFDA3F5641}">
-  <ds:schemaRefs>
-    <ds:schemaRef ds:uri="http://schemas.microsoft.com/VisualStudio/2011/storyboarding/control/v1.0"/>
-  </ds:schemaRefs>
-</ds:datastoreItem>
-</file>
-
-<file path=customXml/itemProps61.xml><?xml version="1.0" encoding="utf-8"?>
-<ds:datastoreItem xmlns:ds="http://schemas.openxmlformats.org/officeDocument/2006/customXml" ds:itemID="{3ED2EF50-E36E-49D0-9F27-9EDAEC387091}">
-  <ds:schemaRefs>
-    <ds:schemaRef ds:uri="http://schemas.microsoft.com/VisualStudio/2011/storyboarding/control"/>
-  </ds:schemaRefs>
-</ds:datastoreItem>
-</file>
-
-<file path=customXml/itemProps62.xml><?xml version="1.0" encoding="utf-8"?>
-<ds:datastoreItem xmlns:ds="http://schemas.openxmlformats.org/officeDocument/2006/customXml" ds:itemID="{CA0F2729-8F0E-4601-8BBB-5DF84EDFD3EB}">
-  <ds:schemaRefs>
-    <ds:schemaRef ds:uri="http://schemas.microsoft.com/VisualStudio/2011/storyboarding/control"/>
-  </ds:schemaRefs>
-</ds:datastoreItem>
-</file>
-
-<file path=customXml/itemProps63.xml><?xml version="1.0" encoding="utf-8"?>
-<ds:datastoreItem xmlns:ds="http://schemas.openxmlformats.org/officeDocument/2006/customXml" ds:itemID="{A2DAA52B-5F52-4A8E-B601-7BF162CD738F}">
-  <ds:schemaRefs>
-    <ds:schemaRef ds:uri="http://schemas.microsoft.com/VisualStudio/2011/storyboarding/control/v1.0"/>
-  </ds:schemaRefs>
-</ds:datastoreItem>
-</file>
-
-<file path=customXml/itemProps64.xml><?xml version="1.0" encoding="utf-8"?>
-<ds:datastoreItem xmlns:ds="http://schemas.openxmlformats.org/officeDocument/2006/customXml" ds:itemID="{A1B88D5F-41A7-488A-960C-6D819000899D}">
-  <ds:schemaRefs>
-    <ds:schemaRef ds:uri="http://schemas.microsoft.com/VisualStudio/2011/storyboarding/control/v1.0"/>
-  </ds:schemaRefs>
-</ds:datastoreItem>
-</file>
-
-<file path=customXml/itemProps65.xml><?xml version="1.0" encoding="utf-8"?>
-<ds:datastoreItem xmlns:ds="http://schemas.openxmlformats.org/officeDocument/2006/customXml" ds:itemID="{E4D924B8-E923-4751-87E1-B31AA64A9F7B}">
-  <ds:schemaRefs>
-    <ds:schemaRef ds:uri="http://schemas.microsoft.com/VisualStudio/2011/storyboarding/control/v1.0"/>
-  </ds:schemaRefs>
-</ds:datastoreItem>
-</file>
-
-<file path=customXml/itemProps66.xml><?xml version="1.0" encoding="utf-8"?>
-<ds:datastoreItem xmlns:ds="http://schemas.openxmlformats.org/officeDocument/2006/customXml" ds:itemID="{D834D1AF-A33E-4664-8718-80F7137D9192}">
-  <ds:schemaRefs>
-    <ds:schemaRef ds:uri="http://schemas.microsoft.com/VisualStudio/2011/storyboarding/control"/>
-  </ds:schemaRefs>
-</ds:datastoreItem>
-</file>
-
-<file path=customXml/itemProps67.xml><?xml version="1.0" encoding="utf-8"?>
-<ds:datastoreItem xmlns:ds="http://schemas.openxmlformats.org/officeDocument/2006/customXml" ds:itemID="{16772130-8F5D-442B-AA11-39D4F229ACC6}">
-  <ds:schemaRefs>
-    <ds:schemaRef ds:uri="http://schemas.microsoft.com/VisualStudio/2011/storyboarding/control/v1.0"/>
-  </ds:schemaRefs>
-</ds:datastoreItem>
-</file>
-
-<file path=customXml/itemProps68.xml><?xml version="1.0" encoding="utf-8"?>
-<ds:datastoreItem xmlns:ds="http://schemas.openxmlformats.org/officeDocument/2006/customXml" ds:itemID="{729DB56D-F542-4709-9AE0-E83CD92BA163}">
-  <ds:schemaRefs>
-    <ds:schemaRef ds:uri="http://schemas.microsoft.com/VisualStudio/2011/storyboarding/control/v1.0"/>
-  </ds:schemaRefs>
-</ds:datastoreItem>
-</file>
-
-<file path=customXml/itemProps69.xml><?xml version="1.0" encoding="utf-8"?>
-<ds:datastoreItem xmlns:ds="http://schemas.openxmlformats.org/officeDocument/2006/customXml" ds:itemID="{156ACD54-663F-4146-A83C-D39B7758E090}">
-  <ds:schemaRefs>
-    <ds:schemaRef ds:uri="http://schemas.microsoft.com/VisualStudio/2011/storyboarding/control/v1.0"/>
-  </ds:schemaRefs>
-</ds:datastoreItem>
-</file>
-
-<file path=customXml/itemProps7.xml><?xml version="1.0" encoding="utf-8"?>
+<file path=customXml/itemProps94.xml><?xml version="1.0" encoding="utf-8"?>
 <ds:datastoreItem xmlns:ds="http://schemas.openxmlformats.org/officeDocument/2006/customXml" ds:itemID="{2B6243A2-99B5-42ED-B049-93E27D774527}">
   <ds:schemaRefs>
     <ds:schemaRef ds:uri="http://schemas.microsoft.com/VisualStudio/2011/storyboarding/control/v1.0"/>
@@ -9880,15 +10455,7 @@
 </ds:datastoreItem>
 </file>
 
-<file path=customXml/itemProps70.xml><?xml version="1.0" encoding="utf-8"?>
-<ds:datastoreItem xmlns:ds="http://schemas.openxmlformats.org/officeDocument/2006/customXml" ds:itemID="{70C23831-7801-40F8-9A53-4E9925562CBE}">
-  <ds:schemaRefs>
-    <ds:schemaRef ds:uri="http://schemas.microsoft.com/VisualStudio/2011/storyboarding/control"/>
-  </ds:schemaRefs>
-</ds:datastoreItem>
-</file>
-
-<file path=customXml/itemProps71.xml><?xml version="1.0" encoding="utf-8"?>
+<file path=customXml/itemProps95.xml><?xml version="1.0" encoding="utf-8"?>
 <ds:datastoreItem xmlns:ds="http://schemas.openxmlformats.org/officeDocument/2006/customXml" ds:itemID="{7BF16C54-4775-4FA7-AF88-98AF6D5E8CA6}">
   <ds:schemaRefs>
     <ds:schemaRef ds:uri="http://schemas.microsoft.com/VisualStudio/2011/storyboarding/control/v1.0"/>
@@ -9896,183 +10463,7 @@
 </ds:datastoreItem>
 </file>
 
-<file path=customXml/itemProps72.xml><?xml version="1.0" encoding="utf-8"?>
-<ds:datastoreItem xmlns:ds="http://schemas.openxmlformats.org/officeDocument/2006/customXml" ds:itemID="{1325FCED-59E4-4A0E-AB40-72EC19C3A651}">
-  <ds:schemaRefs>
-    <ds:schemaRef ds:uri="http://schemas.microsoft.com/VisualStudio/2011/storyboarding/control"/>
-  </ds:schemaRefs>
-</ds:datastoreItem>
-</file>
-
-<file path=customXml/itemProps73.xml><?xml version="1.0" encoding="utf-8"?>
-<ds:datastoreItem xmlns:ds="http://schemas.openxmlformats.org/officeDocument/2006/customXml" ds:itemID="{9C4C7B07-3AE3-46A1-A54D-2BDFAB93A8EF}">
-  <ds:schemaRefs>
-    <ds:schemaRef ds:uri="http://schemas.microsoft.com/VisualStudio/2011/storyboarding/control/v1.0"/>
-  </ds:schemaRefs>
-</ds:datastoreItem>
-</file>
-
-<file path=customXml/itemProps74.xml><?xml version="1.0" encoding="utf-8"?>
-<ds:datastoreItem xmlns:ds="http://schemas.openxmlformats.org/officeDocument/2006/customXml" ds:itemID="{B2C9D19C-4878-43E0-A5AD-CB76AB49D960}">
-  <ds:schemaRefs>
-    <ds:schemaRef ds:uri="http://schemas.microsoft.com/VisualStudio/2011/storyboarding/control/v1.0"/>
-  </ds:schemaRefs>
-</ds:datastoreItem>
-</file>
-
-<file path=customXml/itemProps75.xml><?xml version="1.0" encoding="utf-8"?>
-<ds:datastoreItem xmlns:ds="http://schemas.openxmlformats.org/officeDocument/2006/customXml" ds:itemID="{9C57ED54-5F7A-476D-BFE2-C46C7230CC6B}">
-  <ds:schemaRefs>
-    <ds:schemaRef ds:uri="http://schemas.microsoft.com/VisualStudio/2011/storyboarding/control/v1.0"/>
-  </ds:schemaRefs>
-</ds:datastoreItem>
-</file>
-
-<file path=customXml/itemProps76.xml><?xml version="1.0" encoding="utf-8"?>
-<ds:datastoreItem xmlns:ds="http://schemas.openxmlformats.org/officeDocument/2006/customXml" ds:itemID="{AAD6179F-00C3-44B7-9998-E9C87C4FA9EC}">
-  <ds:schemaRefs>
-    <ds:schemaRef ds:uri="http://schemas.microsoft.com/VisualStudio/2011/storyboarding/control"/>
-  </ds:schemaRefs>
-</ds:datastoreItem>
-</file>
-
-<file path=customXml/itemProps77.xml><?xml version="1.0" encoding="utf-8"?>
-<ds:datastoreItem xmlns:ds="http://schemas.openxmlformats.org/officeDocument/2006/customXml" ds:itemID="{B41892D7-DF8B-4D5A-8AD2-983048A35AA0}">
-  <ds:schemaRefs>
-    <ds:schemaRef ds:uri="http://schemas.microsoft.com/VisualStudio/2011/storyboarding/control/v1.0"/>
-  </ds:schemaRefs>
-</ds:datastoreItem>
-</file>
-
-<file path=customXml/itemProps78.xml><?xml version="1.0" encoding="utf-8"?>
-<ds:datastoreItem xmlns:ds="http://schemas.openxmlformats.org/officeDocument/2006/customXml" ds:itemID="{0BD21A30-063A-4397-97B8-0121D45BD9D6}">
-  <ds:schemaRefs>
-    <ds:schemaRef ds:uri="http://schemas.microsoft.com/VisualStudio/2011/storyboarding/control/v1.0"/>
-  </ds:schemaRefs>
-</ds:datastoreItem>
-</file>
-
-<file path=customXml/itemProps79.xml><?xml version="1.0" encoding="utf-8"?>
-<ds:datastoreItem xmlns:ds="http://schemas.openxmlformats.org/officeDocument/2006/customXml" ds:itemID="{E4A0845B-41B6-4256-8FB3-E31EA581BF55}">
-  <ds:schemaRefs>
-    <ds:schemaRef ds:uri="http://schemas.microsoft.com/VisualStudio/2011/storyboarding/control/v1.0"/>
-  </ds:schemaRefs>
-</ds:datastoreItem>
-</file>
-
-<file path=customXml/itemProps8.xml><?xml version="1.0" encoding="utf-8"?>
-<ds:datastoreItem xmlns:ds="http://schemas.openxmlformats.org/officeDocument/2006/customXml" ds:itemID="{5423C7C4-EE26-4ED2-9F11-C9ABAA081BA5}">
-  <ds:schemaRefs>
-    <ds:schemaRef ds:uri="http://schemas.microsoft.com/VisualStudio/2011/storyboarding/control/v1.0"/>
-  </ds:schemaRefs>
-</ds:datastoreItem>
-</file>
-
-<file path=customXml/itemProps80.xml><?xml version="1.0" encoding="utf-8"?>
-<ds:datastoreItem xmlns:ds="http://schemas.openxmlformats.org/officeDocument/2006/customXml" ds:itemID="{E2EFB470-892C-4F70-98FA-B53F970592A9}">
-  <ds:schemaRefs>
-    <ds:schemaRef ds:uri="http://schemas.microsoft.com/VisualStudio/2011/storyboarding/control"/>
-  </ds:schemaRefs>
-</ds:datastoreItem>
-</file>
-
-<file path=customXml/itemProps81.xml><?xml version="1.0" encoding="utf-8"?>
-<ds:datastoreItem xmlns:ds="http://schemas.openxmlformats.org/officeDocument/2006/customXml" ds:itemID="{D705ACE5-FAF8-44EC-9622-845721B4A44D}">
-  <ds:schemaRefs>
-    <ds:schemaRef ds:uri="http://schemas.microsoft.com/VisualStudio/2011/storyboarding/control/v1.0"/>
-  </ds:schemaRefs>
-</ds:datastoreItem>
-</file>
-
-<file path=customXml/itemProps82.xml><?xml version="1.0" encoding="utf-8"?>
-<ds:datastoreItem xmlns:ds="http://schemas.openxmlformats.org/officeDocument/2006/customXml" ds:itemID="{19CB1DF2-8822-4520-A56A-045D340F0C71}">
-  <ds:schemaRefs>
-    <ds:schemaRef ds:uri="http://schemas.microsoft.com/VisualStudio/2011/storyboarding/control/v1.0"/>
-  </ds:schemaRefs>
-</ds:datastoreItem>
-</file>
-
-<file path=customXml/itemProps83.xml><?xml version="1.0" encoding="utf-8"?>
-<ds:datastoreItem xmlns:ds="http://schemas.openxmlformats.org/officeDocument/2006/customXml" ds:itemID="{CB953D38-E965-4BB2-94FE-DF647E85A654}">
-  <ds:schemaRefs>
-    <ds:schemaRef ds:uri="http://schemas.microsoft.com/VisualStudio/2011/storyboarding/control/v1.0"/>
-  </ds:schemaRefs>
-</ds:datastoreItem>
-</file>
-
-<file path=customXml/itemProps84.xml><?xml version="1.0" encoding="utf-8"?>
-<ds:datastoreItem xmlns:ds="http://schemas.openxmlformats.org/officeDocument/2006/customXml" ds:itemID="{FD67FC06-DA15-486F-A046-DF7B79976F60}">
-  <ds:schemaRefs>
-    <ds:schemaRef ds:uri="http://schemas.microsoft.com/VisualStudio/2011/storyboarding/control"/>
-  </ds:schemaRefs>
-</ds:datastoreItem>
-</file>
-
-<file path=customXml/itemProps85.xml><?xml version="1.0" encoding="utf-8"?>
-<ds:datastoreItem xmlns:ds="http://schemas.openxmlformats.org/officeDocument/2006/customXml" ds:itemID="{F7F9CBAC-60B8-4800-9EA1-9BB1523CD9B4}">
-  <ds:schemaRefs>
-    <ds:schemaRef ds:uri="http://schemas.microsoft.com/VisualStudio/2011/storyboarding/control"/>
-  </ds:schemaRefs>
-</ds:datastoreItem>
-</file>
-
-<file path=customXml/itemProps86.xml><?xml version="1.0" encoding="utf-8"?>
-<ds:datastoreItem xmlns:ds="http://schemas.openxmlformats.org/officeDocument/2006/customXml" ds:itemID="{359B13B5-DE77-48C2-859A-70355A1B9D90}">
-  <ds:schemaRefs>
-    <ds:schemaRef ds:uri="http://schemas.microsoft.com/VisualStudio/2011/storyboarding/control/v1.0"/>
-  </ds:schemaRefs>
-</ds:datastoreItem>
-</file>
-
-<file path=customXml/itemProps87.xml><?xml version="1.0" encoding="utf-8"?>
-<ds:datastoreItem xmlns:ds="http://schemas.openxmlformats.org/officeDocument/2006/customXml" ds:itemID="{4CFA599C-9F1C-4AB4-AB4F-10CF77B58F79}">
-  <ds:schemaRefs>
-    <ds:schemaRef ds:uri="http://schemas.microsoft.com/VisualStudio/2011/storyboarding/control/v1.0"/>
-  </ds:schemaRefs>
-</ds:datastoreItem>
-</file>
-
-<file path=customXml/itemProps88.xml><?xml version="1.0" encoding="utf-8"?>
-<ds:datastoreItem xmlns:ds="http://schemas.openxmlformats.org/officeDocument/2006/customXml" ds:itemID="{23F8C33B-B43F-45BB-B385-DDAB00317A26}">
-  <ds:schemaRefs>
-    <ds:schemaRef ds:uri="http://schemas.microsoft.com/VisualStudio/2011/storyboarding/control"/>
-  </ds:schemaRefs>
-</ds:datastoreItem>
-</file>
-
-<file path=customXml/itemProps89.xml><?xml version="1.0" encoding="utf-8"?>
-<ds:datastoreItem xmlns:ds="http://schemas.openxmlformats.org/officeDocument/2006/customXml" ds:itemID="{07B11A95-7731-4379-9E1B-32BC87FA2B56}">
-  <ds:schemaRefs>
-    <ds:schemaRef ds:uri="http://schemas.microsoft.com/VisualStudio/2011/storyboarding/control/v1.0"/>
-  </ds:schemaRefs>
-</ds:datastoreItem>
-</file>
-
-<file path=customXml/itemProps9.xml><?xml version="1.0" encoding="utf-8"?>
-<ds:datastoreItem xmlns:ds="http://schemas.openxmlformats.org/officeDocument/2006/customXml" ds:itemID="{53BC856C-B486-437D-A7B4-612AE9417D7A}">
-  <ds:schemaRefs>
-    <ds:schemaRef ds:uri="http://schemas.microsoft.com/VisualStudio/2011/storyboarding/control/v1.0"/>
-  </ds:schemaRefs>
-</ds:datastoreItem>
-</file>
-
-<file path=customXml/itemProps90.xml><?xml version="1.0" encoding="utf-8"?>
-<ds:datastoreItem xmlns:ds="http://schemas.openxmlformats.org/officeDocument/2006/customXml" ds:itemID="{6574190A-3D9E-42C1-B276-38E33156AA99}">
-  <ds:schemaRefs>
-    <ds:schemaRef ds:uri="http://schemas.microsoft.com/VisualStudio/2011/storyboarding/control/v1.0"/>
-  </ds:schemaRefs>
-</ds:datastoreItem>
-</file>
-
-<file path=customXml/itemProps91.xml><?xml version="1.0" encoding="utf-8"?>
-<ds:datastoreItem xmlns:ds="http://schemas.openxmlformats.org/officeDocument/2006/customXml" ds:itemID="{63E54A0C-A919-4747-87DB-6EB5DB41F719}">
-  <ds:schemaRefs>
-    <ds:schemaRef ds:uri="http://schemas.microsoft.com/VisualStudio/2011/storyboarding/control/v1.0"/>
-  </ds:schemaRefs>
-</ds:datastoreItem>
-</file>
-
-<file path=customXml/itemProps92.xml><?xml version="1.0" encoding="utf-8"?>
+<file path=customXml/itemProps96.xml><?xml version="1.0" encoding="utf-8"?>
 <ds:datastoreItem xmlns:ds="http://schemas.openxmlformats.org/officeDocument/2006/customXml" ds:itemID="{1A853509-4993-44ED-BDEC-FF20A239A251}">
   <ds:schemaRefs>
     <ds:schemaRef ds:uri="http://schemas.microsoft.com/VisualStudio/2011/storyboarding/control"/>
@@ -10080,56 +10471,24 @@
 </ds:datastoreItem>
 </file>
 
-<file path=customXml/itemProps93.xml><?xml version="1.0" encoding="utf-8"?>
-<ds:datastoreItem xmlns:ds="http://schemas.openxmlformats.org/officeDocument/2006/customXml" ds:itemID="{F782368F-0EE3-40FA-B682-80E11F49B65E}">
-  <ds:schemaRefs>
-    <ds:schemaRef ds:uri="http://schemas.microsoft.com/VisualStudio/2011/storyboarding/control"/>
-  </ds:schemaRefs>
-</ds:datastoreItem>
-</file>
-
-<file path=customXml/itemProps94.xml><?xml version="1.0" encoding="utf-8"?>
-<ds:datastoreItem xmlns:ds="http://schemas.openxmlformats.org/officeDocument/2006/customXml" ds:itemID="{C4783010-23AB-4BDC-BABF-F6576658A2B0}">
+<file path=customXml/itemProps97.xml><?xml version="1.0" encoding="utf-8"?>
+<ds:datastoreItem xmlns:ds="http://schemas.openxmlformats.org/officeDocument/2006/customXml" ds:itemID="{BA2C55E9-BDE8-41FC-B02F-EBA8C07A01F8}">
   <ds:schemaRefs>
     <ds:schemaRef ds:uri="http://schemas.microsoft.com/VisualStudio/2011/storyboarding/control/v1.0"/>
   </ds:schemaRefs>
 </ds:datastoreItem>
 </file>
 
-<file path=customXml/itemProps95.xml><?xml version="1.0" encoding="utf-8"?>
-<ds:datastoreItem xmlns:ds="http://schemas.openxmlformats.org/officeDocument/2006/customXml" ds:itemID="{A84BE01C-E91B-4A90-8E7F-25887EF8E061}">
+<file path=customXml/itemProps98.xml><?xml version="1.0" encoding="utf-8"?>
+<ds:datastoreItem xmlns:ds="http://schemas.openxmlformats.org/officeDocument/2006/customXml" ds:itemID="{EDE713BE-A567-491C-902D-E6087D824056}">
   <ds:schemaRefs>
     <ds:schemaRef ds:uri="http://schemas.microsoft.com/VisualStudio/2011/storyboarding/control/v1.0"/>
   </ds:schemaRefs>
 </ds:datastoreItem>
 </file>
 
-<file path=customXml/itemProps96.xml><?xml version="1.0" encoding="utf-8"?>
-<ds:datastoreItem xmlns:ds="http://schemas.openxmlformats.org/officeDocument/2006/customXml" ds:itemID="{6B22741B-5AC6-4A2C-A57A-E4BDF22E0A90}">
-  <ds:schemaRefs>
-    <ds:schemaRef ds:uri="http://schemas.microsoft.com/VisualStudio/2011/storyboarding/control/v1.0"/>
-  </ds:schemaRefs>
-</ds:datastoreItem>
-</file>
-
-<file path=customXml/itemProps97.xml><?xml version="1.0" encoding="utf-8"?>
-<ds:datastoreItem xmlns:ds="http://schemas.openxmlformats.org/officeDocument/2006/customXml" ds:itemID="{814432F2-7AE9-411E-9F7B-EBBF16C4666D}">
-  <ds:schemaRefs>
-    <ds:schemaRef ds:uri="http://schemas.microsoft.com/VisualStudio/2011/storyboarding/control/v1.0"/>
-  </ds:schemaRefs>
-</ds:datastoreItem>
-</file>
-
-<file path=customXml/itemProps98.xml><?xml version="1.0" encoding="utf-8"?>
-<ds:datastoreItem xmlns:ds="http://schemas.openxmlformats.org/officeDocument/2006/customXml" ds:itemID="{AE0CE2A3-FF32-4259-A452-A173604DCF0C}">
-  <ds:schemaRefs>
-    <ds:schemaRef ds:uri="http://schemas.microsoft.com/VisualStudio/2011/storyboarding/control"/>
-  </ds:schemaRefs>
-</ds:datastoreItem>
-</file>
-
 <file path=customXml/itemProps99.xml><?xml version="1.0" encoding="utf-8"?>
-<ds:datastoreItem xmlns:ds="http://schemas.openxmlformats.org/officeDocument/2006/customXml" ds:itemID="{AECE9E1B-E7C1-46F6-9945-164C1E49BE74}">
+<ds:datastoreItem xmlns:ds="http://schemas.openxmlformats.org/officeDocument/2006/customXml" ds:itemID="{6772C88A-36A0-4EAC-86A3-BB16EEADAB3E}">
   <ds:schemaRefs>
     <ds:schemaRef ds:uri="http://schemas.microsoft.com/VisualStudio/2011/storyboarding/control/v1.0"/>
   </ds:schemaRefs>

</xml_diff>

<commit_message>
updated powerpoint slide for StaticContent database table script
</commit_message>
<xml_diff>
--- a/Docs/MCM Application Flow.pptx
+++ b/Docs/MCM Application Flow.pptx
@@ -223,7 +223,7 @@
             <a:fld id="{CE74A6EE-E360-4005-A696-0C73C91B5E4F}" type="datetimeFigureOut">
               <a:rPr lang="en-US" smtClean="0"/>
               <a:pPr/>
-              <a:t>5/15/2015</a:t>
+              <a:t>5/20/2015</a:t>
             </a:fld>
             <a:endParaRPr lang="en-US"/>
           </a:p>
@@ -674,7 +674,7 @@
             <a:fld id="{AD33D0BB-003F-42B4-BF7A-CD36EAA9C443}" type="datetimeFigureOut">
               <a:rPr lang="en-US" smtClean="0"/>
               <a:pPr/>
-              <a:t>5/15/2015</a:t>
+              <a:t>5/20/2015</a:t>
             </a:fld>
             <a:endParaRPr lang="en-US"/>
           </a:p>
@@ -853,7 +853,7 @@
             <a:fld id="{AD33D0BB-003F-42B4-BF7A-CD36EAA9C443}" type="datetimeFigureOut">
               <a:rPr lang="en-US" smtClean="0"/>
               <a:pPr/>
-              <a:t>5/15/2015</a:t>
+              <a:t>5/20/2015</a:t>
             </a:fld>
             <a:endParaRPr lang="en-US"/>
           </a:p>
@@ -1035,7 +1035,7 @@
             <a:fld id="{AD33D0BB-003F-42B4-BF7A-CD36EAA9C443}" type="datetimeFigureOut">
               <a:rPr lang="en-US" smtClean="0"/>
               <a:pPr/>
-              <a:t>5/15/2015</a:t>
+              <a:t>5/20/2015</a:t>
             </a:fld>
             <a:endParaRPr lang="en-US"/>
           </a:p>
@@ -1207,7 +1207,7 @@
             <a:fld id="{AD33D0BB-003F-42B4-BF7A-CD36EAA9C443}" type="datetimeFigureOut">
               <a:rPr lang="en-US" smtClean="0"/>
               <a:pPr/>
-              <a:t>5/15/2015</a:t>
+              <a:t>5/20/2015</a:t>
             </a:fld>
             <a:endParaRPr lang="en-US"/>
           </a:p>
@@ -1455,7 +1455,7 @@
             <a:fld id="{AD33D0BB-003F-42B4-BF7A-CD36EAA9C443}" type="datetimeFigureOut">
               <a:rPr lang="en-US" smtClean="0"/>
               <a:pPr/>
-              <a:t>5/15/2015</a:t>
+              <a:t>5/20/2015</a:t>
             </a:fld>
             <a:endParaRPr lang="en-US"/>
           </a:p>
@@ -1745,7 +1745,7 @@
             <a:fld id="{AD33D0BB-003F-42B4-BF7A-CD36EAA9C443}" type="datetimeFigureOut">
               <a:rPr lang="en-US" smtClean="0"/>
               <a:pPr/>
-              <a:t>5/15/2015</a:t>
+              <a:t>5/20/2015</a:t>
             </a:fld>
             <a:endParaRPr lang="en-US"/>
           </a:p>
@@ -2169,7 +2169,7 @@
             <a:fld id="{AD33D0BB-003F-42B4-BF7A-CD36EAA9C443}" type="datetimeFigureOut">
               <a:rPr lang="en-US" smtClean="0"/>
               <a:pPr/>
-              <a:t>5/15/2015</a:t>
+              <a:t>5/20/2015</a:t>
             </a:fld>
             <a:endParaRPr lang="en-US"/>
           </a:p>
@@ -2289,7 +2289,7 @@
             <a:fld id="{AD33D0BB-003F-42B4-BF7A-CD36EAA9C443}" type="datetimeFigureOut">
               <a:rPr lang="en-US" smtClean="0"/>
               <a:pPr/>
-              <a:t>5/15/2015</a:t>
+              <a:t>5/20/2015</a:t>
             </a:fld>
             <a:endParaRPr lang="en-US"/>
           </a:p>
@@ -2386,7 +2386,7 @@
             <a:fld id="{AD33D0BB-003F-42B4-BF7A-CD36EAA9C443}" type="datetimeFigureOut">
               <a:rPr lang="en-US" smtClean="0"/>
               <a:pPr/>
-              <a:t>5/15/2015</a:t>
+              <a:t>5/20/2015</a:t>
             </a:fld>
             <a:endParaRPr lang="en-US"/>
           </a:p>
@@ -2665,7 +2665,7 @@
             <a:fld id="{AD33D0BB-003F-42B4-BF7A-CD36EAA9C443}" type="datetimeFigureOut">
               <a:rPr lang="en-US" smtClean="0"/>
               <a:pPr/>
-              <a:t>5/15/2015</a:t>
+              <a:t>5/20/2015</a:t>
             </a:fld>
             <a:endParaRPr lang="en-US"/>
           </a:p>
@@ -2924,7 +2924,7 @@
             <a:fld id="{AD33D0BB-003F-42B4-BF7A-CD36EAA9C443}" type="datetimeFigureOut">
               <a:rPr lang="en-US" smtClean="0"/>
               <a:pPr/>
-              <a:t>5/15/2015</a:t>
+              <a:t>5/20/2015</a:t>
             </a:fld>
             <a:endParaRPr lang="en-US"/>
           </a:p>
@@ -3139,7 +3139,7 @@
             <a:fld id="{AD33D0BB-003F-42B4-BF7A-CD36EAA9C443}" type="datetimeFigureOut">
               <a:rPr lang="en-US" smtClean="0"/>
               <a:pPr/>
-              <a:t>5/15/2015</a:t>
+              <a:t>5/20/2015</a:t>
             </a:fld>
             <a:endParaRPr lang="en-US"/>
           </a:p>
@@ -5455,7 +5455,7 @@
         <p:spPr>
           <a:xfrm>
             <a:off x="228601" y="533400"/>
-            <a:ext cx="8763000" cy="4216539"/>
+            <a:ext cx="8763000" cy="4062651"/>
           </a:xfrm>
           <a:prstGeom prst="rect">
             <a:avLst/>
@@ -5518,7 +5518,7 @@
             </a:r>
             <a:r>
               <a:rPr lang="en-US" sz="1000" dirty="0" err="1"/>
-              <a:t>StaticContentId</a:t>
+              <a:t>ContentTypeCode</a:t>
             </a:r>
             <a:r>
               <a:rPr lang="en-US" sz="1000" dirty="0"/>
@@ -5526,11 +5526,11 @@
             </a:r>
             <a:r>
               <a:rPr lang="en-US" sz="1000" dirty="0" err="1"/>
-              <a:t>int</a:t>
-            </a:r>
-            <a:r>
-              <a:rPr lang="en-US" sz="1000" dirty="0"/>
-              <a:t>] NOT NULL,</a:t>
+              <a:t>nvarchar</a:t>
+            </a:r>
+            <a:r>
+              <a:rPr lang="en-US" sz="1000" dirty="0"/>
+              <a:t>](25) NOT NULL,</a:t>
             </a:r>
           </a:p>
           <a:p>
@@ -5540,19 +5540,211 @@
             </a:r>
             <a:r>
               <a:rPr lang="en-US" sz="1000" dirty="0" err="1"/>
+              <a:t>ContentName</a:t>
+            </a:r>
+            <a:r>
+              <a:rPr lang="en-US" sz="1000" dirty="0"/>
+              <a:t>] [</a:t>
+            </a:r>
+            <a:r>
+              <a:rPr lang="en-US" sz="1000" dirty="0" err="1"/>
+              <a:t>nvarchar</a:t>
+            </a:r>
+            <a:r>
+              <a:rPr lang="en-US" sz="1000" dirty="0"/>
+              <a:t>](25) NOT NULL,</a:t>
+            </a:r>
+          </a:p>
+          <a:p>
+            <a:r>
+              <a:rPr lang="en-US" sz="1000" dirty="0"/>
+              <a:t>[Content] [</a:t>
+            </a:r>
+            <a:r>
+              <a:rPr lang="en-US" sz="1000" dirty="0" err="1"/>
+              <a:t>nvarchar</a:t>
+            </a:r>
+            <a:r>
+              <a:rPr lang="en-US" sz="1000" dirty="0"/>
+              <a:t>](4000) NOT NULL,</a:t>
+            </a:r>
+          </a:p>
+          <a:p>
+            <a:r>
+              <a:rPr lang="en-US" sz="1000" dirty="0"/>
+              <a:t>[Version] [timestamp] NOT NULL,</a:t>
+            </a:r>
+          </a:p>
+          <a:p>
+            <a:r>
+              <a:rPr lang="en-US" sz="1000" dirty="0"/>
+              <a:t>[</a:t>
+            </a:r>
+            <a:r>
+              <a:rPr lang="en-US" sz="1000" dirty="0" err="1"/>
+              <a:t>CreatedAt</a:t>
+            </a:r>
+            <a:r>
+              <a:rPr lang="en-US" sz="1000" dirty="0"/>
+              <a:t>] [</a:t>
+            </a:r>
+            <a:r>
+              <a:rPr lang="en-US" sz="1000" dirty="0" err="1"/>
+              <a:t>datetimeoffset</a:t>
+            </a:r>
+            <a:r>
+              <a:rPr lang="en-US" sz="1000" dirty="0"/>
+              <a:t>](7) NOT NULL DEFAULT (</a:t>
+            </a:r>
+            <a:r>
+              <a:rPr lang="en-US" sz="1000" dirty="0" err="1"/>
+              <a:t>sysutcdatetime</a:t>
+            </a:r>
+            <a:r>
+              <a:rPr lang="en-US" sz="1000" dirty="0"/>
+              <a:t>()),</a:t>
+            </a:r>
+          </a:p>
+          <a:p>
+            <a:r>
+              <a:rPr lang="en-US" sz="1000" dirty="0"/>
+              <a:t>[</a:t>
+            </a:r>
+            <a:r>
+              <a:rPr lang="en-US" sz="1000" dirty="0" err="1"/>
+              <a:t>UpdatedAt</a:t>
+            </a:r>
+            <a:r>
+              <a:rPr lang="en-US" sz="1000" dirty="0"/>
+              <a:t>] [</a:t>
+            </a:r>
+            <a:r>
+              <a:rPr lang="en-US" sz="1000" dirty="0" err="1"/>
+              <a:t>datetimeoffset</a:t>
+            </a:r>
+            <a:r>
+              <a:rPr lang="en-US" sz="1000" dirty="0"/>
+              <a:t>](7) NULL,</a:t>
+            </a:r>
+          </a:p>
+          <a:p>
+            <a:r>
+              <a:rPr lang="en-US" sz="1000" dirty="0"/>
+              <a:t>[Deleted] [bit] NOT NULL DEFAULT (0),</a:t>
+            </a:r>
+          </a:p>
+          <a:p>
+            <a:r>
+              <a:rPr lang="en-US" sz="1000" dirty="0"/>
+              <a:t> CONSTRAINT [</a:t>
+            </a:r>
+            <a:r>
+              <a:rPr lang="en-US" sz="1000" dirty="0" err="1"/>
+              <a:t>PK_MissingChildrenMinnesota_Dev.StaticContents</a:t>
+            </a:r>
+            <a:r>
+              <a:rPr lang="en-US" sz="1000" dirty="0"/>
+              <a:t>] PRIMARY KEY NONCLUSTERED </a:t>
+            </a:r>
+          </a:p>
+          <a:p>
+            <a:r>
+              <a:rPr lang="en-US" sz="1000" dirty="0"/>
+              <a:t>(</a:t>
+            </a:r>
+          </a:p>
+          <a:p>
+            <a:r>
+              <a:rPr lang="en-US" sz="1000" dirty="0"/>
+              <a:t>[Id] ASC</a:t>
+            </a:r>
+          </a:p>
+          <a:p>
+            <a:r>
+              <a:rPr lang="en-US" sz="1000" dirty="0"/>
+              <a:t>)WITH (PAD_INDEX = OFF, STATISTICS_NORECOMPUTE = OFF, IGNORE_DUP_KEY = OFF, ALLOW_ROW_LOCKS = ON, ALLOW_PAGE_LOCKS = ON)</a:t>
+            </a:r>
+          </a:p>
+          <a:p>
+            <a:r>
+              <a:rPr lang="en-US" sz="1000" dirty="0"/>
+              <a:t>)</a:t>
+            </a:r>
+          </a:p>
+          <a:p>
+            <a:endParaRPr lang="en-US" sz="1000" dirty="0"/>
+          </a:p>
+          <a:p>
+            <a:r>
+              <a:rPr lang="en-US" sz="1000" dirty="0"/>
+              <a:t>GO</a:t>
+            </a:r>
+          </a:p>
+          <a:p>
+            <a:endParaRPr lang="en-US" sz="1000" dirty="0"/>
+          </a:p>
+          <a:p>
+            <a:r>
+              <a:rPr lang="en-US" sz="1000" dirty="0"/>
+              <a:t>/****** Object:  Index [</a:t>
+            </a:r>
+            <a:r>
+              <a:rPr lang="en-US" sz="1000" dirty="0" err="1"/>
+              <a:t>IX_MissingChildrenMinnesota_Dev_Children.ContentTypeCode</a:t>
+            </a:r>
+            <a:r>
+              <a:rPr lang="en-US" sz="1000" dirty="0"/>
+              <a:t>]    Script Date: 5/15/2015 10:51:49 AM ******/</a:t>
+            </a:r>
+          </a:p>
+          <a:p>
+            <a:r>
+              <a:rPr lang="en-US" sz="1000" dirty="0"/>
+              <a:t>CREATE UNIQUE CLUSTERED INDEX [</a:t>
+            </a:r>
+            <a:r>
+              <a:rPr lang="en-US" sz="1000" dirty="0" err="1"/>
+              <a:t>IX_MissingChildrenMinnesota_Dev_StaticContents.Compound</a:t>
+            </a:r>
+            <a:r>
+              <a:rPr lang="en-US" sz="1000" dirty="0"/>
+              <a:t>] ON [</a:t>
+            </a:r>
+            <a:r>
+              <a:rPr lang="en-US" sz="1000" dirty="0" err="1"/>
+              <a:t>MissingChildrenMinnesota_Dev</a:t>
+            </a:r>
+            <a:r>
+              <a:rPr lang="en-US" sz="1000" dirty="0"/>
+              <a:t>].[</a:t>
+            </a:r>
+            <a:r>
+              <a:rPr lang="en-US" sz="1000" dirty="0" err="1"/>
+              <a:t>StaticContents</a:t>
+            </a:r>
+            <a:r>
+              <a:rPr lang="en-US" sz="1000" dirty="0"/>
+              <a:t>]</a:t>
+            </a:r>
+          </a:p>
+          <a:p>
+            <a:r>
+              <a:rPr lang="en-US" sz="1000" dirty="0"/>
+              <a:t>(</a:t>
+            </a:r>
+          </a:p>
+          <a:p>
+            <a:r>
+              <a:rPr lang="en-US" sz="1000" dirty="0"/>
+              <a:t>[</a:t>
+            </a:r>
+            <a:r>
+              <a:rPr lang="en-US" sz="1000" dirty="0" err="1"/>
               <a:t>ContentTypeCode</a:t>
             </a:r>
             <a:r>
               <a:rPr lang="en-US" sz="1000" dirty="0"/>
-              <a:t>] [</a:t>
-            </a:r>
-            <a:r>
-              <a:rPr lang="en-US" sz="1000" dirty="0" err="1"/>
-              <a:t>nvarchar</a:t>
-            </a:r>
-            <a:r>
-              <a:rPr lang="en-US" sz="1000" dirty="0"/>
-              <a:t>](25) NOT NULL,</a:t>
+              <a:t>] ASC,</a:t>
             </a:r>
           </a:p>
           <a:p>
@@ -5563,220 +5755,6 @@
             <a:r>
               <a:rPr lang="en-US" sz="1000" dirty="0" err="1"/>
               <a:t>ContentName</a:t>
-            </a:r>
-            <a:r>
-              <a:rPr lang="en-US" sz="1000" dirty="0"/>
-              <a:t>] [</a:t>
-            </a:r>
-            <a:r>
-              <a:rPr lang="en-US" sz="1000" dirty="0" err="1"/>
-              <a:t>nvarchar</a:t>
-            </a:r>
-            <a:r>
-              <a:rPr lang="en-US" sz="1000" dirty="0"/>
-              <a:t>](25) NOT NULL,</a:t>
-            </a:r>
-          </a:p>
-          <a:p>
-            <a:r>
-              <a:rPr lang="en-US" sz="1000" dirty="0"/>
-              <a:t>[Content] [</a:t>
-            </a:r>
-            <a:r>
-              <a:rPr lang="en-US" sz="1000" dirty="0" err="1"/>
-              <a:t>nvarchar</a:t>
-            </a:r>
-            <a:r>
-              <a:rPr lang="en-US" sz="1000" dirty="0"/>
-              <a:t>](4000) NOT NULL,</a:t>
-            </a:r>
-          </a:p>
-          <a:p>
-            <a:r>
-              <a:rPr lang="en-US" sz="1000" dirty="0"/>
-              <a:t>[Version] [timestamp] NOT NULL,</a:t>
-            </a:r>
-          </a:p>
-          <a:p>
-            <a:r>
-              <a:rPr lang="en-US" sz="1000" dirty="0"/>
-              <a:t>[</a:t>
-            </a:r>
-            <a:r>
-              <a:rPr lang="en-US" sz="1000" dirty="0" err="1"/>
-              <a:t>CreatedAt</a:t>
-            </a:r>
-            <a:r>
-              <a:rPr lang="en-US" sz="1000" dirty="0"/>
-              <a:t>] [</a:t>
-            </a:r>
-            <a:r>
-              <a:rPr lang="en-US" sz="1000" dirty="0" err="1"/>
-              <a:t>datetimeoffset</a:t>
-            </a:r>
-            <a:r>
-              <a:rPr lang="en-US" sz="1000" dirty="0"/>
-              <a:t>](7) NOT NULL DEFAULT (</a:t>
-            </a:r>
-            <a:r>
-              <a:rPr lang="en-US" sz="1000" dirty="0" err="1"/>
-              <a:t>sysutcdatetime</a:t>
-            </a:r>
-            <a:r>
-              <a:rPr lang="en-US" sz="1000" dirty="0"/>
-              <a:t>()),</a:t>
-            </a:r>
-          </a:p>
-          <a:p>
-            <a:r>
-              <a:rPr lang="en-US" sz="1000" dirty="0"/>
-              <a:t>[</a:t>
-            </a:r>
-            <a:r>
-              <a:rPr lang="en-US" sz="1000" dirty="0" err="1"/>
-              <a:t>UpdatedAt</a:t>
-            </a:r>
-            <a:r>
-              <a:rPr lang="en-US" sz="1000" dirty="0"/>
-              <a:t>] [</a:t>
-            </a:r>
-            <a:r>
-              <a:rPr lang="en-US" sz="1000" dirty="0" err="1"/>
-              <a:t>datetimeoffset</a:t>
-            </a:r>
-            <a:r>
-              <a:rPr lang="en-US" sz="1000" dirty="0"/>
-              <a:t>](7) NULL,</a:t>
-            </a:r>
-          </a:p>
-          <a:p>
-            <a:r>
-              <a:rPr lang="en-US" sz="1000" dirty="0"/>
-              <a:t>[Deleted] [bit] NOT NULL DEFAULT (0),</a:t>
-            </a:r>
-          </a:p>
-          <a:p>
-            <a:r>
-              <a:rPr lang="en-US" sz="1000" dirty="0"/>
-              <a:t> CONSTRAINT [</a:t>
-            </a:r>
-            <a:r>
-              <a:rPr lang="en-US" sz="1000" dirty="0" err="1"/>
-              <a:t>PK_MissingChildrenMinnesota_Dev.StaticContents</a:t>
-            </a:r>
-            <a:r>
-              <a:rPr lang="en-US" sz="1000" dirty="0"/>
-              <a:t>] PRIMARY KEY NONCLUSTERED </a:t>
-            </a:r>
-          </a:p>
-          <a:p>
-            <a:r>
-              <a:rPr lang="en-US" sz="1000" dirty="0"/>
-              <a:t>(</a:t>
-            </a:r>
-          </a:p>
-          <a:p>
-            <a:r>
-              <a:rPr lang="en-US" sz="1000" dirty="0"/>
-              <a:t>[Id] ASC</a:t>
-            </a:r>
-          </a:p>
-          <a:p>
-            <a:r>
-              <a:rPr lang="en-US" sz="1000" dirty="0"/>
-              <a:t>)WITH (PAD_INDEX = OFF, STATISTICS_NORECOMPUTE = OFF, IGNORE_DUP_KEY = OFF, ALLOW_ROW_LOCKS = ON, ALLOW_PAGE_LOCKS = ON)</a:t>
-            </a:r>
-          </a:p>
-          <a:p>
-            <a:r>
-              <a:rPr lang="en-US" sz="1000" dirty="0"/>
-              <a:t>)</a:t>
-            </a:r>
-          </a:p>
-          <a:p>
-            <a:endParaRPr lang="en-US" sz="1000" dirty="0"/>
-          </a:p>
-          <a:p>
-            <a:r>
-              <a:rPr lang="en-US" sz="1000" dirty="0"/>
-              <a:t>GO</a:t>
-            </a:r>
-          </a:p>
-          <a:p>
-            <a:endParaRPr lang="en-US" sz="1000" dirty="0"/>
-          </a:p>
-          <a:p>
-            <a:r>
-              <a:rPr lang="en-US" sz="1000" dirty="0"/>
-              <a:t>/****** Object:  Index [</a:t>
-            </a:r>
-            <a:r>
-              <a:rPr lang="en-US" sz="1000" dirty="0" err="1"/>
-              <a:t>IX_MissingChildrenMinnesota_Dev_Children.ContentTypeCode</a:t>
-            </a:r>
-            <a:r>
-              <a:rPr lang="en-US" sz="1000" dirty="0"/>
-              <a:t>]    Script Date: 5/15/2015 10:51:49 AM ******/</a:t>
-            </a:r>
-          </a:p>
-          <a:p>
-            <a:r>
-              <a:rPr lang="en-US" sz="1000" dirty="0"/>
-              <a:t>CREATE UNIQUE CLUSTERED INDEX [</a:t>
-            </a:r>
-            <a:r>
-              <a:rPr lang="en-US" sz="1000" dirty="0" err="1"/>
-              <a:t>IX_MissingChildrenMinnesota_Dev_StaticContents.Compound</a:t>
-            </a:r>
-            <a:r>
-              <a:rPr lang="en-US" sz="1000" dirty="0"/>
-              <a:t>] ON [</a:t>
-            </a:r>
-            <a:r>
-              <a:rPr lang="en-US" sz="1000" dirty="0" err="1"/>
-              <a:t>MissingChildrenMinnesota_Dev</a:t>
-            </a:r>
-            <a:r>
-              <a:rPr lang="en-US" sz="1000" dirty="0"/>
-              <a:t>].[</a:t>
-            </a:r>
-            <a:r>
-              <a:rPr lang="en-US" sz="1000" dirty="0" err="1"/>
-              <a:t>StaticContents</a:t>
-            </a:r>
-            <a:r>
-              <a:rPr lang="en-US" sz="1000" dirty="0"/>
-              <a:t>]</a:t>
-            </a:r>
-          </a:p>
-          <a:p>
-            <a:r>
-              <a:rPr lang="en-US" sz="1000" dirty="0"/>
-              <a:t>(</a:t>
-            </a:r>
-          </a:p>
-          <a:p>
-            <a:r>
-              <a:rPr lang="en-US" sz="1000" dirty="0"/>
-              <a:t>[</a:t>
-            </a:r>
-            <a:r>
-              <a:rPr lang="en-US" sz="1000" dirty="0" err="1"/>
-              <a:t>StaticContentId</a:t>
-            </a:r>
-            <a:r>
-              <a:rPr lang="en-US" sz="1000" dirty="0"/>
-              <a:t>] ASC,</a:t>
-            </a:r>
-          </a:p>
-          <a:p>
-            <a:r>
-              <a:rPr lang="en-US" sz="1000" dirty="0"/>
-              <a:t>[</a:t>
-            </a:r>
-            <a:r>
-              <a:rPr lang="en-US" sz="1000" dirty="0" err="1"/>
-              <a:t>ContentTypeCode</a:t>
             </a:r>
             <a:r>
               <a:rPr lang="en-US" sz="1000" dirty="0"/>
@@ -8823,13 +8801,8 @@
             </a:pPr>
             <a:r>
               <a:rPr lang="en-US" dirty="0" smtClean="0"/>
-              <a:t>A Child object may have one or more Child Measurements</a:t>
-            </a:r>
-            <a:r>
-              <a:rPr lang="en-US" dirty="0" smtClean="0"/>
-              <a:t>. (Note: There is a question of whether a history of the child measurements is needed. Even though the pamphlet shows different lines of child measurements as to seem to keep a history, can it just keep the most current child measurement / just one entry. For now, the database supports keeping a history. The application provides an interface that will only support one entry.</a:t>
-            </a:r>
-            <a:endParaRPr lang="en-US" dirty="0" smtClean="0"/>
+              <a:t>A Child object may have one or more Child Measurements. (Note: There is a question of whether a history of the child measurements is needed. Even though the pamphlet shows different lines of child measurements as to seem to keep a history, can it just keep the most current child measurement / just one entry. For now, the database supports keeping a history. The application provides an interface that will only support one entry.</a:t>
+            </a:r>
           </a:p>
           <a:p>
             <a:pPr marL="342900" indent="-342900">
@@ -10415,101 +10388,11 @@
 
 <file path=customXml/item1.xml><?xml version="1.0" encoding="utf-8"?>
 <Control xmlns="http://schemas.microsoft.com/VisualStudio/2011/storyboarding/control/v1.0">
-  <Id Name="System.Storyboard.Stencil.Title" RevisionId="00000000-0000-0000-0000-000000000000" Stencil="System.Common" StencilRevisionId="00000000-0000-0000-0000-000000000000" StencilVersion="1.0"/>
-</Control>
-</file>
-
-<file path=customXml/item10.xml><?xml version="1.0" encoding="utf-8"?>
-<Control xmlns="http://schemas.microsoft.com/VisualStudio/2011/storyboarding/control/v1.0">
   <Id Name="System.Storyboarding.Common.Text" RevisionId="68ea164d-c1de-47a5-804f-d4d1290fa524" Stencil="System.Storyboarding.Common" StencilRevisionId="68ea164d-c1de-47a5-804f-d4d1290fa524" StencilVersion="0.1"/>
 </Control>
 </file>
 
-<file path=customXml/item11.xml><?xml version="1.0" encoding="utf-8"?>
-<Control xmlns="http://schemas.microsoft.com/VisualStudio/2011/storyboarding/control/v1.0">
-  <Id Name="System.Storyboard.Stencil.TextArea" RevisionId="00000000-0000-0000-0000-000000000000" Stencil="System.Common" StencilRevisionId="00000000-0000-0000-0000-000000000000" StencilVersion="1.0"/>
-</Control>
-</file>
-
-<file path=customXml/item12.xml><?xml version="1.0" encoding="utf-8"?>
-<Control xmlns="http://schemas.microsoft.com/VisualStudio/2011/storyboarding/control/v1.0">
-  <Id Name="System.Storyboard.Stencil.VerticalScrollbar" RevisionId="00000000-0000-0000-0000-000000000000" Stencil="System.Common" StencilRevisionId="00000000-0000-0000-0000-000000000000" StencilVersion="1.0"/>
-</Control>
-</file>
-
-<file path=customXml/item13.xml><?xml version="1.0" encoding="utf-8"?>
-<Control xmlns="http://schemas.microsoft.com/VisualStudio/2011/storyboarding/control">
-  <Id Name="System.Storyboarding.WindowsApps.WindowsAppsMediumWideTile" Revision="1" Stencil="System.Storyboarding.WindowsApps" StencilVersion="0.1"/>
-</Control>
-</file>
-
-<file path=customXml/item14.xml><?xml version="1.0" encoding="utf-8"?>
-<Control xmlns="http://schemas.microsoft.com/VisualStudio/2011/storyboarding/control/v1.0">
-  <Id Name="System.Storyboard.Stencil.PositionControl" RevisionId="00000000-0000-0000-0000-000000000000" Stencil="System.Media" StencilRevisionId="00000000-0000-0000-0000-000000000000" StencilVersion="1.0"/>
-</Control>
-</file>
-
-<file path=customXml/item15.xml><?xml version="1.0" encoding="utf-8"?>
-<Control xmlns="http://schemas.microsoft.com/VisualStudio/2011/storyboarding/control/v1.0">
-  <Id Name="System.Storyboard.Stencil.VerticalBarChart" RevisionId="00000000-0000-0000-0000-000000000000" Stencil="System.Media" StencilRevisionId="00000000-0000-0000-0000-000000000000" StencilVersion="1.0"/>
-</Control>
-</file>
-
-<file path=customXml/item16.xml><?xml version="1.0" encoding="utf-8"?>
-<Control xmlns="http://schemas.microsoft.com/VisualStudio/2011/storyboarding/control">
-  <Id Name="System.Storyboarding.WindowsPhoneIcons.Video" RevisionId="5814b1e0-0169-11e0-a976-0800200c9a66" Stencil="System.Storyboarding.WindowsPhoneIcons" StencilRevisionId="5814b1e0-0169-11e0-a976-0800200c9a66" StencilVersion="0.1"/>
-</Control>
-</file>
-
-<file path=customXml/item17.xml><?xml version="1.0" encoding="utf-8"?>
-<Control xmlns="http://schemas.microsoft.com/VisualStudio/2011/storyboarding/control/v1.0">
-  <Id Name="System.Storyboard.Stencil.Calendar" RevisionId="00000000-0000-0000-0000-000000000000" Stencil="System.Common" StencilRevisionId="00000000-0000-0000-0000-000000000000" StencilVersion="1.0"/>
-</Control>
-</file>
-
-<file path=customXml/item18.xml><?xml version="1.0" encoding="utf-8"?>
-<Control xmlns="http://schemas.microsoft.com/VisualStudio/2011/storyboarding/control/v1.0">
-  <Id Name="System.Storyboard.Stencil.VerticalSplitter" RevisionId="00000000-0000-0000-0000-000000000000" Stencil="System.Windows" StencilRevisionId="00000000-0000-0000-0000-000000000000" StencilVersion="1.0"/>
-</Control>
-</file>
-
-<file path=customXml/item19.xml><?xml version="1.0" encoding="utf-8"?>
-<Control xmlns="http://schemas.microsoft.com/VisualStudio/2011/storyboarding/control/v1.0">
-  <Id Name="System.Storyboarding.Media.Image" RevisionId="658c0869-8ded-44f2-a68a-f8e8fcb7d3bd" Stencil="System.Storyboarding.Media" StencilRevisionId="658c0869-8ded-44f2-a68a-f8e8fcb7d3bd" StencilVersion="0.1"/>
-</Control>
-</file>
-
-<file path=customXml/item2.xml><?xml version="1.0" encoding="utf-8"?>
-<Control xmlns="http://schemas.microsoft.com/VisualStudio/2011/storyboarding/control">
-  <Id Name="System.Storyboarding.WindowsApps.WindowsAppsMediumWideTile" Revision="1" Stencil="System.Storyboarding.WindowsApps" StencilVersion="0.1"/>
-</Control>
-</file>
-
-<file path=customXml/item20.xml><?xml version="1.0" encoding="utf-8"?>
-<Control xmlns="http://schemas.microsoft.com/VisualStudio/2011/storyboarding/control">
-  <Id Name="System.Storyboarding.WindowsApps.WindowsAppsMediumWideTile" Revision="1" Stencil="System.Storyboarding.WindowsApps" StencilVersion="0.1"/>
-</Control>
-</file>
-
-<file path=customXml/item21.xml><?xml version="1.0" encoding="utf-8"?>
-<Control xmlns="http://schemas.microsoft.com/VisualStudio/2011/storyboarding/control/v1.0">
-  <Id Name="System.Storyboarding.Common.Text" RevisionId="68ea164d-c1de-47a5-804f-d4d1290fa524" Stencil="System.Storyboarding.Common" StencilRevisionId="68ea164d-c1de-47a5-804f-d4d1290fa524" StencilVersion="0.1"/>
-</Control>
-</file>
-
-<file path=customXml/item22.xml><?xml version="1.0" encoding="utf-8"?>
-<Control xmlns="http://schemas.microsoft.com/VisualStudio/2011/storyboarding/control">
-  <Id Name="System.Storyboarding.WindowsApps.WindowsAppsMediumWideTile" Revision="1" Stencil="System.Storyboarding.WindowsApps" StencilVersion="0.1"/>
-</Control>
-</file>
-
-<file path=customXml/item23.xml><?xml version="1.0" encoding="utf-8"?>
-<Control xmlns="http://schemas.microsoft.com/VisualStudio/2011/storyboarding/control/v1.0">
-  <Id Name="System.Storyboard.Stencil.Hyperlink" RevisionId="00000000-0000-0000-0000-000000000000" Stencil="System.Common" StencilRevisionId="00000000-0000-0000-0000-000000000000" StencilVersion="1.0"/>
-</Control>
-</file>
-
-<file path=customXml/item24.xml><?xml version="1.0" encoding="utf-8"?>
+<file path=customXml/item10.xml><?xml version="1.0" encoding="utf-8"?>
 <p:properties xmlns:p="http://schemas.microsoft.com/office/2006/metadata/properties" xmlns:xsi="http://www.w3.org/2001/XMLSchema-instance" xmlns:pc="http://schemas.microsoft.com/office/infopath/2007/PartnerControls">
   <documentManagement>
     <_dlc_DocId xmlns="b4ebf394-daf6-497a-96c5-a2f8c10b38cf">TT6HZDVJM2HV-178-540</_dlc_DocId>
@@ -10521,193 +10404,31 @@
 </p:properties>
 </file>
 
-<file path=customXml/item25.xml><?xml version="1.0" encoding="utf-8"?>
-<Control xmlns="http://schemas.microsoft.com/VisualStudio/2011/storyboarding/control/v1.0">
-  <Id Name="System.Storyboarding.Common.SearchBox" RevisionId="68ea164d-c1de-47a5-804f-d4d1290fa524" Stencil="System.Storyboarding.Common" StencilRevisionId="68ea164d-c1de-47a5-804f-d4d1290fa524" StencilVersion="0.1"/>
-</Control>
-</file>
-
-<file path=customXml/item26.xml><?xml version="1.0" encoding="utf-8"?>
-<Control xmlns="http://schemas.microsoft.com/VisualStudio/2011/storyboarding/control/v1.0">
-  <Id Name="System.Storyboard.Stencil.PhoneTile" RevisionId="00000000-0000-0000-0000-000000000000" Stencil="System.Windows_Phone_7" StencilRevisionId="00000000-0000-0000-0000-000000000000" StencilVersion="1.0"/>
-</Control>
-</file>
-
-<file path=customXml/item27.xml><?xml version="1.0" encoding="utf-8"?>
+<file path=customXml/item11.xml><?xml version="1.0" encoding="utf-8"?>
 <Control xmlns="http://schemas.microsoft.com/VisualStudio/2011/storyboarding/control">
   <Id Name="System.Storyboarding.WindowsApps.WindowsAppsMediumWideTile" Revision="1" Stencil="System.Storyboarding.WindowsApps" StencilVersion="0.1"/>
 </Control>
 </file>
 
-<file path=customXml/item28.xml><?xml version="1.0" encoding="utf-8"?>
+<file path=customXml/item12.xml><?xml version="1.0" encoding="utf-8"?>
+<Control xmlns="http://schemas.microsoft.com/VisualStudio/2011/storyboarding/control/v1.0">
+  <Id Name="System.Storyboarding.Common.Text" RevisionId="68ea164d-c1de-47a5-804f-d4d1290fa524" Stencil="System.Storyboarding.Common" StencilRevisionId="68ea164d-c1de-47a5-804f-d4d1290fa524" StencilVersion="0.1"/>
+</Control>
+</file>
+
+<file path=customXml/item13.xml><?xml version="1.0" encoding="utf-8"?>
 <Control xmlns="http://schemas.microsoft.com/VisualStudio/2011/storyboarding/control">
   <Id Name="System.Storyboarding.WindowsApps.WindowsAppsMediumWideTile" Revision="1" Stencil="System.Storyboarding.WindowsApps" StencilVersion="0.1"/>
 </Control>
 </file>
 
-<file path=customXml/item29.xml><?xml version="1.0" encoding="utf-8"?>
-<Control xmlns="http://schemas.microsoft.com/VisualStudio/2011/storyboarding/control/v1.0">
-  <Id Name="System.Storyboard.Stencil.PhoneNotification" RevisionId="00000000-0000-0000-0000-000000000000" Stencil="System.Windows_Phone_7" StencilRevisionId="00000000-0000-0000-0000-000000000000" StencilVersion="1.0"/>
-</Control>
-</file>
-
-<file path=customXml/item3.xml><?xml version="1.0" encoding="utf-8"?>
-<Control xmlns="http://schemas.microsoft.com/VisualStudio/2011/storyboarding/control">
-  <Id Name="System.Storyboarding.Backgrounds.SharePoint" RevisionId="bdb52a43-f875-417f-a3f8-9b0259dd3051" Stencil="System.Storyboarding.Backgrounds" StencilRevisionId="bdb52a43-f875-417f-a3f8-9b0259dd3051" StencilVersion="0.1"/>
-</Control>
-</file>
-
-<file path=customXml/item30.xml><?xml version="1.0" encoding="utf-8"?>
-<Control xmlns="http://schemas.microsoft.com/VisualStudio/2011/storyboarding/control/v1.0">
-  <Id Name="System.Storyboard.Stencil.PhoneBrowserBar" RevisionId="00000000-0000-0000-0000-000000000000" Stencil="System.Windows_Phone_7" StencilRevisionId="00000000-0000-0000-0000-000000000000" StencilVersion="1.0"/>
-</Control>
-</file>
-
-<file path=customXml/item31.xml><?xml version="1.0" encoding="utf-8"?>
-<Control xmlns="http://schemas.microsoft.com/VisualStudio/2011/storyboarding/control/v1.0">
-  <Id Name="System.Storyboard.Stencil.PositionControl" RevisionId="00000000-0000-0000-0000-000000000000" Stencil="System.Media" StencilRevisionId="00000000-0000-0000-0000-000000000000" StencilVersion="1.0"/>
-</Control>
-</file>
-
-<file path=customXml/item32.xml><?xml version="1.0" encoding="utf-8"?>
-<Control xmlns="http://schemas.microsoft.com/VisualStudio/2011/storyboarding/control">
-  <Id Name="System.Storyboarding.WindowsApps.WindowsAppsMediumWideTile" Revision="1" Stencil="System.Storyboarding.WindowsApps" StencilVersion="0.1"/>
-</Control>
-</file>
-
-<file path=customXml/item33.xml><?xml version="1.0" encoding="utf-8"?>
-<Control xmlns="http://schemas.microsoft.com/VisualStudio/2011/storyboarding/control/v1.0">
-  <Id Name="System.Storyboard.Stencil.DropdownBox" RevisionId="00000000-0000-0000-0000-000000000000" Stencil="System.Common" StencilRevisionId="00000000-0000-0000-0000-000000000000" StencilVersion="1.0"/>
-</Control>
-</file>
-
-<file path=customXml/item34.xml><?xml version="1.0" encoding="utf-8"?>
-<Control xmlns="http://schemas.microsoft.com/VisualStudio/2011/storyboarding/control/v1.0">
-  <Id Name="System.Storyboarding.Common.Text" RevisionId="68ea164d-c1de-47a5-804f-d4d1290fa524" Stencil="System.Storyboarding.Common" StencilRevisionId="68ea164d-c1de-47a5-804f-d4d1290fa524" StencilVersion="0.1"/>
-</Control>
-</file>
-
-<file path=customXml/item35.xml><?xml version="1.0" encoding="utf-8"?>
-<Control xmlns="http://schemas.microsoft.com/VisualStudio/2011/storyboarding/control/v1.0">
-  <Id Name="System.Storyboard.Stencil.TabGroup" RevisionId="00000000-0000-0000-0000-000000000000" Stencil="System.Common" StencilRevisionId="00000000-0000-0000-0000-000000000000" StencilVersion="1.0"/>
-</Control>
-</file>
-
-<file path=customXml/item36.xml><?xml version="1.0" encoding="utf-8"?>
-<Control xmlns="http://schemas.microsoft.com/VisualStudio/2011/storyboarding/control/v1.0">
-  <Id Name="System.Storyboard.Stencil.PieChart" RevisionId="00000000-0000-0000-0000-000000000000" Stencil="System.Media" StencilRevisionId="00000000-0000-0000-0000-000000000000" StencilVersion="1.0"/>
-</Control>
-</file>
-
-<file path=customXml/item37.xml><?xml version="1.0" encoding="utf-8"?>
-<Control xmlns="http://schemas.microsoft.com/VisualStudio/2011/storyboarding/control/v1.0">
-  <Id Name="System.Storyboarding.Common.Text" RevisionId="68ea164d-c1de-47a5-804f-d4d1290fa524" Stencil="System.Storyboarding.Common" StencilRevisionId="68ea164d-c1de-47a5-804f-d4d1290fa524" StencilVersion="0.1"/>
-</Control>
-</file>
-
-<file path=customXml/item38.xml><?xml version="1.0" encoding="utf-8"?>
-<Control xmlns="http://schemas.microsoft.com/VisualStudio/2011/storyboarding/control/v1.0">
-  <Id Name="System.Storyboard.Stencil.PhoneKeyboard" RevisionId="00000000-0000-0000-0000-000000000000" Stencil="System.Windows_Phone_7" StencilRevisionId="00000000-0000-0000-0000-000000000000" StencilVersion="1.0"/>
-</Control>
-</file>
-
-<file path=customXml/item39.xml><?xml version="1.0" encoding="utf-8"?>
-<Control xmlns="http://schemas.microsoft.com/VisualStudio/2011/storyboarding/control">
-  <Id Name="System.Storyboarding.WindowsApps.WindowsAppsMediumWideTile" Revision="1" Stencil="System.Storyboarding.WindowsApps" StencilVersion="0.1"/>
-</Control>
-</file>
-
-<file path=customXml/item4.xml><?xml version="1.0" encoding="utf-8"?>
-<Control xmlns="http://schemas.microsoft.com/VisualStudio/2011/storyboarding/control/v1.0">
-  <Id Name="System.Storyboard.Stencil.DropdownBox" RevisionId="00000000-0000-0000-0000-000000000000" Stencil="System.Common" StencilRevisionId="00000000-0000-0000-0000-000000000000" StencilVersion="1.0"/>
-</Control>
-</file>
-
-<file path=customXml/item40.xml><?xml version="1.0" encoding="utf-8"?>
-<Control xmlns="http://schemas.microsoft.com/VisualStudio/2011/storyboarding/control">
-  <Id Name="System.Storyboarding.WindowsApps.WindowsAppsMediumWideTile" Revision="1" Stencil="System.Storyboarding.WindowsApps" StencilVersion="0.1"/>
-</Control>
-</file>
-
-<file path=customXml/item41.xml><?xml version="1.0" encoding="utf-8"?>
-<Control xmlns="http://schemas.microsoft.com/VisualStudio/2011/storyboarding/control/v1.0">
-  <Id Name="System.Storyboard.Stencil.Image" RevisionId="00000000-0000-0000-0000-000000000000" Stencil="System.Media" StencilRevisionId="00000000-0000-0000-0000-000000000000" StencilVersion="1.0"/>
-</Control>
-</file>
-
-<file path=customXml/item42.xml><?xml version="1.0" encoding="utf-8"?>
-<Control xmlns="http://schemas.microsoft.com/VisualStudio/2011/storyboarding/control/v1.0">
-  <Id Name="System.Storyboard.Stencil.Browser" RevisionId="bdb52a43-f875-417f-a3f8-9b0259dd3051" Stencil="System.Backgrounds" StencilRevisionId="bdb52a43-f875-417f-a3f8-9b0259dd3051" StencilVersion="1.0"/>
-</Control>
-</file>
-
-<file path=customXml/item43.xml><?xml version="1.0" encoding="utf-8"?>
-<Control xmlns="http://schemas.microsoft.com/VisualStudio/2011/storyboarding/control/v1.0">
-  <Id Name="System.Storyboard.Stencil.VerticalScrollbar" RevisionId="00000000-0000-0000-0000-000000000000" Stencil="System.Common" StencilRevisionId="00000000-0000-0000-0000-000000000000" StencilVersion="1.0"/>
-</Control>
-</file>
-
-<file path=customXml/item44.xml><?xml version="1.0" encoding="utf-8"?>
-<Control xmlns="http://schemas.microsoft.com/VisualStudio/2011/storyboarding/control/v1.0">
-  <Id Name="System.Storyboarding.Common.Text" RevisionId="68ea164d-c1de-47a5-804f-d4d1290fa524" Stencil="System.Storyboarding.Common" StencilRevisionId="68ea164d-c1de-47a5-804f-d4d1290fa524" StencilVersion="0.1"/>
-</Control>
-</file>
-
-<file path=customXml/item45.xml><?xml version="1.0" encoding="utf-8"?>
+<file path=customXml/item14.xml><?xml version="1.0" encoding="utf-8"?>
 <Control xmlns="http://schemas.microsoft.com/VisualStudio/2011/storyboarding/control/v1.0">
   <Id Name="System.Storyboard.Stencil.DatePicker" RevisionId="00000000-0000-0000-0000-000000000000" Stencil="System.Common" StencilRevisionId="00000000-0000-0000-0000-000000000000" StencilVersion="1.0"/>
 </Control>
 </file>
 
-<file path=customXml/item46.xml><?xml version="1.0" encoding="utf-8"?>
-<Control xmlns="http://schemas.microsoft.com/VisualStudio/2011/storyboarding/control">
-  <Id Name="System.Storyboarding.WindowsApps.WindowsAppsMediumWideTile" Revision="1" Stencil="System.Storyboarding.WindowsApps" StencilVersion="0.1"/>
-</Control>
-</file>
-
-<file path=customXml/item47.xml><?xml version="1.0" encoding="utf-8"?>
-<Control xmlns="http://schemas.microsoft.com/VisualStudio/2011/storyboarding/control">
-  <Id Name="System.Storyboarding.WindowsApps.WindowsAppsMediumWideTile" Revision="1" Stencil="System.Storyboarding.WindowsApps" StencilVersion="0.1"/>
-</Control>
-</file>
-
-<file path=customXml/item48.xml><?xml version="1.0" encoding="utf-8"?>
-<Control xmlns="http://schemas.microsoft.com/VisualStudio/2011/storyboarding/control/v1.0">
-  <Id Name="System.Storyboard.Stencil.Button" RevisionId="00000000-0000-0000-0000-000000000000" Stencil="System.Common" StencilRevisionId="00000000-0000-0000-0000-000000000000" StencilVersion="1.0"/>
-</Control>
-</file>
-
-<file path=customXml/item49.xml><?xml version="1.0" encoding="utf-8"?>
-<Control xmlns="http://schemas.microsoft.com/VisualStudio/2011/storyboarding/control/v1.0">
-  <Id Name="System.Storyboard.Stencil.WidePhoneTile" RevisionId="00000000-0000-0000-0000-000000000000" Stencil="System.Windows_Phone_7" StencilRevisionId="00000000-0000-0000-0000-000000000000" StencilVersion="1.0"/>
-</Control>
-</file>
-
-<file path=customXml/item5.xml><?xml version="1.0" encoding="utf-8"?>
-<Control xmlns="http://schemas.microsoft.com/VisualStudio/2011/storyboarding/control">
-  <Id Name="System.Storyboarding.WindowsApps.WindowsAppsMediumWideTile" Revision="1" Stencil="System.Storyboarding.WindowsApps" StencilVersion="0.1"/>
-</Control>
-</file>
-
-<file path=customXml/item50.xml><?xml version="1.0" encoding="utf-8"?>
-<Control xmlns="http://schemas.microsoft.com/VisualStudio/2011/storyboarding/control/v1.0">
-  <Id Name="System.Storyboard.Stencil.Label" RevisionId="00000000-0000-0000-0000-000000000000" Stencil="System.Common" StencilRevisionId="00000000-0000-0000-0000-000000000000" StencilVersion="1.0"/>
-</Control>
-</file>
-
-<file path=customXml/item51.xml><?xml version="1.0" encoding="utf-8"?>
-<Control xmlns="http://schemas.microsoft.com/VisualStudio/2011/storyboarding/control/v1.0">
-  <Id Name="System.Storyboard.Stencil.ColorPicker" RevisionId="00000000-0000-0000-0000-000000000000" Stencil="System.Media" StencilRevisionId="00000000-0000-0000-0000-000000000000" StencilVersion="1.0"/>
-</Control>
-</file>
-
-<file path=customXml/item52.xml><?xml version="1.0" encoding="utf-8"?>
-<Control xmlns="http://schemas.microsoft.com/VisualStudio/2011/storyboarding/control/v1.0">
-  <Id Name="System.Storyboard.Stencil.Title" RevisionId="00000000-0000-0000-0000-000000000000" Stencil="System.Common" StencilRevisionId="00000000-0000-0000-0000-000000000000" StencilVersion="1.0"/>
-</Control>
-</file>
-
-<file path=customXml/item53.xml><?xml version="1.0" encoding="utf-8"?>
+<file path=customXml/item15.xml><?xml version="1.0" encoding="utf-8"?>
 <?mso-contentType ?>
 <FormTemplates xmlns="http://schemas.microsoft.com/sharepoint/v3/contenttype/forms">
   <Display>DocumentLibraryForm</Display>
@@ -10716,63 +10437,315 @@
 </FormTemplates>
 </file>
 
+<file path=customXml/item16.xml><?xml version="1.0" encoding="utf-8"?>
+<Control xmlns="http://schemas.microsoft.com/VisualStudio/2011/storyboarding/control">
+  <Id Name="System.Storyboarding.WindowsApps.WindowsAppsMediumWideTile" Revision="1" Stencil="System.Storyboarding.WindowsApps" StencilVersion="0.1"/>
+</Control>
+</file>
+
+<file path=customXml/item17.xml><?xml version="1.0" encoding="utf-8"?>
+<Control xmlns="http://schemas.microsoft.com/VisualStudio/2011/storyboarding/control/v1.0">
+  <Id Name="System.Storyboarding.Common.Breadcrumb" RevisionId="68ea164d-c1de-47a5-804f-d4d1290fa524" Stencil="System.Storyboarding.Common" StencilRevisionId="68ea164d-c1de-47a5-804f-d4d1290fa524" StencilVersion="0.1"/>
+</Control>
+</file>
+
+<file path=customXml/item18.xml><?xml version="1.0" encoding="utf-8"?>
+<Control xmlns="http://schemas.microsoft.com/VisualStudio/2011/storyboarding/control">
+  <Id Name="System.Storyboarding.WindowsApps.WindowsAppsMediumWideTile" Revision="1" Stencil="System.Storyboarding.WindowsApps" StencilVersion="0.1"/>
+</Control>
+</file>
+
+<file path=customXml/item19.xml><?xml version="1.0" encoding="utf-8"?>
+<Control xmlns="http://schemas.microsoft.com/VisualStudio/2011/storyboarding/control/v1.0">
+  <Id Name="System.Storyboard.Stencil.PhoneTile" RevisionId="00000000-0000-0000-0000-000000000000" Stencil="System.Windows_Phone_7" StencilRevisionId="00000000-0000-0000-0000-000000000000" StencilVersion="1.0"/>
+</Control>
+</file>
+
+<file path=customXml/item2.xml><?xml version="1.0" encoding="utf-8"?>
+<Control xmlns="http://schemas.microsoft.com/VisualStudio/2011/storyboarding/control/v1.0">
+  <Id Name="System.Storyboard.Stencil.Browser" RevisionId="bdb52a43-f875-417f-a3f8-9b0259dd3051" Stencil="System.Backgrounds" StencilRevisionId="bdb52a43-f875-417f-a3f8-9b0259dd3051" StencilVersion="1.0"/>
+</Control>
+</file>
+
+<file path=customXml/item20.xml><?xml version="1.0" encoding="utf-8"?>
+<Control xmlns="http://schemas.microsoft.com/VisualStudio/2011/storyboarding/control/v1.0">
+  <Id Name="System.Storyboard.Stencil.PieChart" RevisionId="00000000-0000-0000-0000-000000000000" Stencil="System.Media" StencilRevisionId="00000000-0000-0000-0000-000000000000" StencilVersion="1.0"/>
+</Control>
+</file>
+
+<file path=customXml/item21.xml><?xml version="1.0" encoding="utf-8"?>
+<Control xmlns="http://schemas.microsoft.com/VisualStudio/2011/storyboarding/control">
+  <Id Name="System.Storyboarding.WindowsApps.WindowsAppsMediumWideTile" Revision="1" Stencil="System.Storyboarding.WindowsApps" StencilVersion="0.1"/>
+</Control>
+</file>
+
+<file path=customXml/item22.xml><?xml version="1.0" encoding="utf-8"?>
+<Control xmlns="http://schemas.microsoft.com/VisualStudio/2011/storyboarding/control/v1.0">
+  <Id Name="System.Storyboard.Stencil.Label" RevisionId="00000000-0000-0000-0000-000000000000" Stencil="System.Common" StencilRevisionId="00000000-0000-0000-0000-000000000000" StencilVersion="1.0"/>
+</Control>
+</file>
+
+<file path=customXml/item23.xml><?xml version="1.0" encoding="utf-8"?>
+<Control xmlns="http://schemas.microsoft.com/VisualStudio/2011/storyboarding/control/v1.0">
+  <Id Name="System.Storyboarding.Common.DropdownBox" RevisionId="68ea164d-c1de-47a5-804f-d4d1290fa524" Stencil="System.Storyboarding.Common" StencilRevisionId="68ea164d-c1de-47a5-804f-d4d1290fa524" StencilVersion="0.1"/>
+</Control>
+</file>
+
+<file path=customXml/item24.xml><?xml version="1.0" encoding="utf-8"?>
+<Control xmlns="http://schemas.microsoft.com/VisualStudio/2011/storyboarding/control/v1.0">
+  <Id Name="System.Storyboard.Stencil.Title" RevisionId="00000000-0000-0000-0000-000000000000" Stencil="System.Common" StencilRevisionId="00000000-0000-0000-0000-000000000000" StencilVersion="1.0"/>
+</Control>
+</file>
+
+<file path=customXml/item25.xml><?xml version="1.0" encoding="utf-8"?>
+<Control xmlns="http://schemas.microsoft.com/VisualStudio/2011/storyboarding/control/v1.0">
+  <Id Name="System.Storyboard.Stencil.PhoneTile" RevisionId="00000000-0000-0000-0000-000000000000" Stencil="System.Windows_Phone_7" StencilRevisionId="00000000-0000-0000-0000-000000000000" StencilVersion="1.0"/>
+</Control>
+</file>
+
+<file path=customXml/item26.xml><?xml version="1.0" encoding="utf-8"?>
+<Control xmlns="http://schemas.microsoft.com/VisualStudio/2011/storyboarding/control/v1.0">
+  <Id Name="System.Storyboarding.Media.Image" RevisionId="658c0869-8ded-44f2-a68a-f8e8fcb7d3bd" Stencil="System.Storyboarding.Media" StencilRevisionId="658c0869-8ded-44f2-a68a-f8e8fcb7d3bd" StencilVersion="0.1"/>
+</Control>
+</file>
+
+<file path=customXml/item27.xml><?xml version="1.0" encoding="utf-8"?>
+<Control xmlns="http://schemas.microsoft.com/VisualStudio/2011/storyboarding/control/v1.0">
+  <Id Name="System.Storyboard.Stencil.PositionControl" RevisionId="00000000-0000-0000-0000-000000000000" Stencil="System.Media" StencilRevisionId="00000000-0000-0000-0000-000000000000" StencilVersion="1.0"/>
+</Control>
+</file>
+
+<file path=customXml/item28.xml><?xml version="1.0" encoding="utf-8"?>
+<Control xmlns="http://schemas.microsoft.com/VisualStudio/2011/storyboarding/control">
+  <Id Name="System.Storyboarding.WindowsApps.WindowsAppsMediumWideTile" Revision="1" Stencil="System.Storyboarding.WindowsApps" StencilVersion="0.1"/>
+</Control>
+</file>
+
+<file path=customXml/item29.xml><?xml version="1.0" encoding="utf-8"?>
+<Control xmlns="http://schemas.microsoft.com/VisualStudio/2011/storyboarding/control">
+  <Id Name="System.Storyboarding.WindowsApps.WindowsAppsMediumWideTile" Revision="1" Stencil="System.Storyboarding.WindowsApps" StencilVersion="0.1"/>
+</Control>
+</file>
+
+<file path=customXml/item3.xml><?xml version="1.0" encoding="utf-8"?>
+<Control xmlns="http://schemas.microsoft.com/VisualStudio/2011/storyboarding/control">
+  <Id Name="System.Storyboarding.WindowsApps.WindowsAppsMediumWideTile" Revision="1" Stencil="System.Storyboarding.WindowsApps" StencilVersion="0.1"/>
+</Control>
+</file>
+
+<file path=customXml/item30.xml><?xml version="1.0" encoding="utf-8"?>
+<Control xmlns="http://schemas.microsoft.com/VisualStudio/2011/storyboarding/control/v1.0">
+  <Id Name="System.Storyboard.Stencil.PhoneBrowserBar" RevisionId="00000000-0000-0000-0000-000000000000" Stencil="System.Windows_Phone_7" StencilRevisionId="00000000-0000-0000-0000-000000000000" StencilVersion="1.0"/>
+</Control>
+</file>
+
+<file path=customXml/item31.xml><?xml version="1.0" encoding="utf-8"?>
+<Control xmlns="http://schemas.microsoft.com/VisualStudio/2011/storyboarding/control/v1.0">
+  <Id Name="System.Storyboard.Stencil.TabGroup" RevisionId="00000000-0000-0000-0000-000000000000" Stencil="System.Common" StencilRevisionId="00000000-0000-0000-0000-000000000000" StencilVersion="1.0"/>
+</Control>
+</file>
+
+<file path=customXml/item32.xml><?xml version="1.0" encoding="utf-8"?>
+<Control xmlns="http://schemas.microsoft.com/VisualStudio/2011/storyboarding/control/v1.0">
+  <Id Name="System.Storyboard.Stencil.VerticalScrollbar" RevisionId="00000000-0000-0000-0000-000000000000" Stencil="System.Common" StencilRevisionId="00000000-0000-0000-0000-000000000000" StencilVersion="1.0"/>
+</Control>
+</file>
+
+<file path=customXml/item33.xml><?xml version="1.0" encoding="utf-8"?>
+<Control xmlns="http://schemas.microsoft.com/VisualStudio/2011/storyboarding/control/v1.0">
+  <Id Name="System.Storyboard.Stencil.Button" RevisionId="00000000-0000-0000-0000-000000000000" Stencil="System.Common" StencilRevisionId="00000000-0000-0000-0000-000000000000" StencilVersion="1.0"/>
+</Control>
+</file>
+
+<file path=customXml/item34.xml><?xml version="1.0" encoding="utf-8"?>
+<Control xmlns="http://schemas.microsoft.com/VisualStudio/2011/storyboarding/control/v1.0">
+  <Id Name="System.Storyboard.Stencil.LineChart" RevisionId="00000000-0000-0000-0000-000000000000" Stencil="System.Media" StencilRevisionId="00000000-0000-0000-0000-000000000000" StencilVersion="1.0"/>
+</Control>
+</file>
+
+<file path=customXml/item35.xml><?xml version="1.0" encoding="utf-8"?>
+<Control xmlns="http://schemas.microsoft.com/VisualStudio/2011/storyboarding/control">
+  <Id Name="System.Storyboarding.WindowsApps.WindowsAppsMediumWideTile" Revision="1" Stencil="System.Storyboarding.WindowsApps" StencilVersion="0.1"/>
+</Control>
+</file>
+
+<file path=customXml/item36.xml><?xml version="1.0" encoding="utf-8"?>
+<Control xmlns="http://schemas.microsoft.com/VisualStudio/2011/storyboarding/control/v1.0">
+  <Id Name="System.Storyboard.Stencil.VideoPlayer" RevisionId="00000000-0000-0000-0000-000000000000" Stencil="System.Media" StencilRevisionId="00000000-0000-0000-0000-000000000000" StencilVersion="1.0"/>
+</Control>
+</file>
+
+<file path=customXml/item37.xml><?xml version="1.0" encoding="utf-8"?>
+<Control xmlns="http://schemas.microsoft.com/VisualStudio/2011/storyboarding/control">
+  <Id Name="System.Storyboarding.WindowsApps.WindowsAppsMediumWideTile" Revision="1" Stencil="System.Storyboarding.WindowsApps" StencilVersion="0.1"/>
+</Control>
+</file>
+
+<file path=customXml/item38.xml><?xml version="1.0" encoding="utf-8"?>
+<Control xmlns="http://schemas.microsoft.com/VisualStudio/2011/storyboarding/control">
+  <Id Name="System.Storyboarding.WindowsApps.WindowsAppsMediumWideTile" Revision="1" Stencil="System.Storyboarding.WindowsApps" StencilVersion="0.1"/>
+</Control>
+</file>
+
+<file path=customXml/item39.xml><?xml version="1.0" encoding="utf-8"?>
+<Control xmlns="http://schemas.microsoft.com/VisualStudio/2011/storyboarding/control/v1.0">
+  <Id Name="System.Storyboard.Stencil.ColorPicker" RevisionId="00000000-0000-0000-0000-000000000000" Stencil="System.Media" StencilRevisionId="00000000-0000-0000-0000-000000000000" StencilVersion="1.0"/>
+</Control>
+</file>
+
+<file path=customXml/item4.xml><?xml version="1.0" encoding="utf-8"?>
+<Control xmlns="http://schemas.microsoft.com/VisualStudio/2011/storyboarding/control">
+  <Id Name="System.Storyboarding.WindowsApps.WindowsAppsMediumWideTile" Revision="1" Stencil="System.Storyboarding.WindowsApps" StencilVersion="0.1"/>
+</Control>
+</file>
+
+<file path=customXml/item40.xml><?xml version="1.0" encoding="utf-8"?>
+<Control xmlns="http://schemas.microsoft.com/VisualStudio/2011/storyboarding/control">
+  <Id Name="System.Storyboarding.WindowsApps.WindowsAppsMediumWideTile" Revision="1" Stencil="System.Storyboarding.WindowsApps" StencilVersion="0.1"/>
+</Control>
+</file>
+
+<file path=customXml/item41.xml><?xml version="1.0" encoding="utf-8"?>
+<Control xmlns="http://schemas.microsoft.com/VisualStudio/2011/storyboarding/control/v1.0">
+  <Id Name="System.Storyboard.Stencil.StatusBar" RevisionId="00000000-0000-0000-0000-000000000000" Stencil="System.Windows" StencilRevisionId="00000000-0000-0000-0000-000000000000" StencilVersion="1.0"/>
+</Control>
+</file>
+
+<file path=customXml/item42.xml><?xml version="1.0" encoding="utf-8"?>
+<Control xmlns="http://schemas.microsoft.com/VisualStudio/2011/storyboarding/control">
+  <Id Name="System.Storyboarding.Backgrounds.Window" RevisionId="bdb52a43-f875-417f-a3f8-9b0259dd3051" Stencil="System.Storyboarding.Backgrounds" StencilRevisionId="bdb52a43-f875-417f-a3f8-9b0259dd3051" StencilVersion="0.1"/>
+</Control>
+</file>
+
+<file path=customXml/item43.xml><?xml version="1.0" encoding="utf-8"?>
+<Control xmlns="http://schemas.microsoft.com/VisualStudio/2011/storyboarding/control/v1.0">
+  <Id Name="System.Storyboard.Stencil.PhoneTile" RevisionId="00000000-0000-0000-0000-000000000000" Stencil="System.Windows_Phone_7" StencilRevisionId="00000000-0000-0000-0000-000000000000" StencilVersion="1.0"/>
+</Control>
+</file>
+
+<file path=customXml/item44.xml><?xml version="1.0" encoding="utf-8"?>
+<Control xmlns="http://schemas.microsoft.com/VisualStudio/2011/storyboarding/control/v1.0">
+  <Id Name="System.Storyboard.Stencil.TreeList" RevisionId="00000000-0000-0000-0000-000000000000" Stencil="System.Common" StencilRevisionId="00000000-0000-0000-0000-000000000000" StencilVersion="1.0"/>
+</Control>
+</file>
+
+<file path=customXml/item45.xml><?xml version="1.0" encoding="utf-8"?>
+<Control xmlns="http://schemas.microsoft.com/VisualStudio/2011/storyboarding/control">
+  <Id Name="System.Storyboarding.Backgrounds.SharePoint" RevisionId="bdb52a43-f875-417f-a3f8-9b0259dd3051" Stencil="System.Storyboarding.Backgrounds" StencilRevisionId="bdb52a43-f875-417f-a3f8-9b0259dd3051" StencilVersion="0.1"/>
+</Control>
+</file>
+
+<file path=customXml/item46.xml><?xml version="1.0" encoding="utf-8"?>
+<Control xmlns="http://schemas.microsoft.com/VisualStudio/2011/storyboarding/control/v1.0">
+  <Id Name="System.Storyboard.Stencil.VerticalScrollbar" RevisionId="00000000-0000-0000-0000-000000000000" Stencil="System.Common" StencilRevisionId="00000000-0000-0000-0000-000000000000" StencilVersion="1.0"/>
+</Control>
+</file>
+
+<file path=customXml/item47.xml><?xml version="1.0" encoding="utf-8"?>
+<Control xmlns="http://schemas.microsoft.com/VisualStudio/2011/storyboarding/control/v1.0">
+  <Id Name="System.Storyboard.Stencil.Calendar" RevisionId="00000000-0000-0000-0000-000000000000" Stencil="System.Common" StencilRevisionId="00000000-0000-0000-0000-000000000000" StencilVersion="1.0"/>
+</Control>
+</file>
+
+<file path=customXml/item48.xml><?xml version="1.0" encoding="utf-8"?>
+<Control xmlns="http://schemas.microsoft.com/VisualStudio/2011/storyboarding/control/v1.0">
+  <Id Name="System.Storyboarding.Common.SearchBox" RevisionId="68ea164d-c1de-47a5-804f-d4d1290fa524" Stencil="System.Storyboarding.Common" StencilRevisionId="68ea164d-c1de-47a5-804f-d4d1290fa524" StencilVersion="0.1"/>
+</Control>
+</file>
+
+<file path=customXml/item49.xml><?xml version="1.0" encoding="utf-8"?>
+<Control xmlns="http://schemas.microsoft.com/VisualStudio/2011/storyboarding/control/v1.0">
+  <Id Name="System.Storyboard.Stencil.DropdownBox" RevisionId="00000000-0000-0000-0000-000000000000" Stencil="System.Common" StencilRevisionId="00000000-0000-0000-0000-000000000000" StencilVersion="1.0"/>
+</Control>
+</file>
+
+<file path=customXml/item5.xml><?xml version="1.0" encoding="utf-8"?>
+<Control xmlns="http://schemas.microsoft.com/VisualStudio/2011/storyboarding/control">
+  <Id Name="System.Storyboarding.WindowsApps.WindowsAppsMediumWideTile" Revision="1" Stencil="System.Storyboarding.WindowsApps" StencilVersion="0.1"/>
+</Control>
+</file>
+
+<file path=customXml/item50.xml><?xml version="1.0" encoding="utf-8"?>
+<Control xmlns="http://schemas.microsoft.com/VisualStudio/2011/storyboarding/control/v1.0">
+  <Id Name="System.Storyboard.Stencil.PhoneKeyboard" RevisionId="00000000-0000-0000-0000-000000000000" Stencil="System.Windows_Phone_7" StencilRevisionId="00000000-0000-0000-0000-000000000000" StencilVersion="1.0"/>
+</Control>
+</file>
+
+<file path=customXml/item51.xml><?xml version="1.0" encoding="utf-8"?>
+<Control xmlns="http://schemas.microsoft.com/VisualStudio/2011/storyboarding/control">
+  <Id Name="System.Storyboarding.WindowsApps.WindowsAppsMediumWideTile" Revision="1" Stencil="System.Storyboarding.WindowsApps" StencilVersion="0.1"/>
+</Control>
+</file>
+
+<file path=customXml/item52.xml><?xml version="1.0" encoding="utf-8"?>
+<Control xmlns="http://schemas.microsoft.com/VisualStudio/2011/storyboarding/control/v1.0">
+  <Id Name="System.Storyboard.Stencil.ColorPicker" RevisionId="00000000-0000-0000-0000-000000000000" Stencil="System.Media" StencilRevisionId="00000000-0000-0000-0000-000000000000" StencilVersion="1.0"/>
+</Control>
+</file>
+
+<file path=customXml/item53.xml><?xml version="1.0" encoding="utf-8"?>
+<Control xmlns="http://schemas.microsoft.com/VisualStudio/2011/storyboarding/control/v1.0">
+  <Id Name="System.Storyboarding.Icons.FolderOpen" RevisionId="05cd6d03-c0b2-488e-98a7-d68de69a2cfc" Stencil="System.Storyboarding.Icons" StencilRevisionId="05cd6d03-c0b2-488e-98a7-d68de69a2cfc" StencilVersion="0.1"/>
+</Control>
+</file>
+
 <file path=customXml/item54.xml><?xml version="1.0" encoding="utf-8"?>
+<Control xmlns="http://schemas.microsoft.com/VisualStudio/2011/storyboarding/control">
+  <Id Name="System.Storyboarding.WindowsApps.WindowsAppsMediumWideTile" Revision="1" Stencil="System.Storyboarding.WindowsApps" StencilVersion="0.1"/>
+</Control>
+</file>
+
+<file path=customXml/item55.xml><?xml version="1.0" encoding="utf-8"?>
+<Control xmlns="http://schemas.microsoft.com/VisualStudio/2011/storyboarding/control/v1.0">
+  <Id Name="System.Storyboard.Stencil.Image" RevisionId="00000000-0000-0000-0000-000000000000" Stencil="System.Media" StencilRevisionId="00000000-0000-0000-0000-000000000000" StencilVersion="1.0"/>
+</Control>
+</file>
+
+<file path=customXml/item56.xml><?xml version="1.0" encoding="utf-8"?>
 <Control xmlns="http://schemas.microsoft.com/VisualStudio/2011/storyboarding/control/v1.0">
   <Id Name="System.Storyboard.Stencil.Breadcrumb" RevisionId="00000000-0000-0000-0000-000000000000" Stencil="System.Common" StencilRevisionId="00000000-0000-0000-0000-000000000000" StencilVersion="1.0"/>
 </Control>
 </file>
 
-<file path=customXml/item55.xml><?xml version="1.0" encoding="utf-8"?>
-<Control xmlns="http://schemas.microsoft.com/VisualStudio/2011/storyboarding/control">
-  <Id Name="System.Storyboarding.Backgrounds.WindowsPhoneLandscape" RevisionId="bdb52a43-f875-417f-a3f8-9b0259dd3051" Stencil="System.Storyboarding.Backgrounds" StencilRevisionId="bdb52a43-f875-417f-a3f8-9b0259dd3051" StencilVersion="0.1"/>
-</Control>
-</file>
-
-<file path=customXml/item56.xml><?xml version="1.0" encoding="utf-8"?>
-<Control xmlns="http://schemas.microsoft.com/VisualStudio/2011/storyboarding/control/v1.0">
-  <Id Name="System.Storyboard.Stencil.LineChart" RevisionId="00000000-0000-0000-0000-000000000000" Stencil="System.Media" StencilRevisionId="00000000-0000-0000-0000-000000000000" StencilVersion="1.0"/>
-</Control>
-</file>
-
 <file path=customXml/item57.xml><?xml version="1.0" encoding="utf-8"?>
-<Control xmlns="http://schemas.microsoft.com/VisualStudio/2011/storyboarding/control/v1.0">
-  <Id Name="System.Storyboarding.Icons.Help" RevisionId="05cd6d03-c0b2-488e-98a7-d68de69a2cfc" Stencil="System.Storyboarding.Icons" StencilRevisionId="05cd6d03-c0b2-488e-98a7-d68de69a2cfc" StencilVersion="0.1"/>
-</Control>
-</file>
-
-<file path=customXml/item58.xml><?xml version="1.0" encoding="utf-8"?>
 <Control xmlns="http://schemas.microsoft.com/VisualStudio/2011/storyboarding/control">
   <Id Name="System.Storyboarding.WindowsApps.WindowsAppsMediumWideTile" Revision="1" Stencil="System.Storyboarding.WindowsApps" StencilVersion="0.1"/>
 </Control>
 </file>
 
+<file path=customXml/item58.xml><?xml version="1.0" encoding="utf-8"?>
+<Control xmlns="http://schemas.microsoft.com/VisualStudio/2011/storyboarding/control/v1.0">
+  <Id Name="System.Storyboard.Stencil.Title" RevisionId="00000000-0000-0000-0000-000000000000" Stencil="System.Common" StencilRevisionId="00000000-0000-0000-0000-000000000000" StencilVersion="1.0"/>
+</Control>
+</file>
+
 <file path=customXml/item59.xml><?xml version="1.0" encoding="utf-8"?>
 <Control xmlns="http://schemas.microsoft.com/VisualStudio/2011/storyboarding/control/v1.0">
-  <Id Name="System.Storyboard.Stencil.ColorPicker" RevisionId="00000000-0000-0000-0000-000000000000" Stencil="System.Media" StencilRevisionId="00000000-0000-0000-0000-000000000000" StencilVersion="1.0"/>
+  <Id Name="System.Storyboard.Stencil.PlayControls" RevisionId="00000000-0000-0000-0000-000000000000" Stencil="System.Media" StencilRevisionId="00000000-0000-0000-0000-000000000000" StencilVersion="1.0"/>
 </Control>
 </file>
 
 <file path=customXml/item6.xml><?xml version="1.0" encoding="utf-8"?>
-<Control xmlns="http://schemas.microsoft.com/VisualStudio/2011/storyboarding/control">
-  <Id Name="System.Storyboarding.Backgrounds.WindowsPhone" RevisionId="bdb52a43-f875-417f-a3f8-9b0259dd3051" Stencil="System.Storyboarding.Backgrounds" StencilRevisionId="bdb52a43-f875-417f-a3f8-9b0259dd3051" StencilVersion="0.1"/>
+<Control xmlns="http://schemas.microsoft.com/VisualStudio/2011/storyboarding/control/v1.0">
+  <Id Name="System.Storyboard.Stencil.PhoneTile" RevisionId="00000000-0000-0000-0000-000000000000" Stencil="System.Windows_Phone_7" StencilRevisionId="00000000-0000-0000-0000-000000000000" StencilVersion="1.0"/>
 </Control>
 </file>
 
 <file path=customXml/item60.xml><?xml version="1.0" encoding="utf-8"?>
 <Control xmlns="http://schemas.microsoft.com/VisualStudio/2011/storyboarding/control/v1.0">
-  <Id Name="System.Storyboard.Stencil.WidePhoneTile" RevisionId="00000000-0000-0000-0000-000000000000" Stencil="System.Windows_Phone_7" StencilRevisionId="00000000-0000-0000-0000-000000000000" StencilVersion="1.0"/>
+  <Id Name="System.Storyboard.Stencil.Group" RevisionId="00000000-0000-0000-0000-000000000000" Stencil="System.Windows" StencilRevisionId="00000000-0000-0000-0000-000000000000" StencilVersion="1.0"/>
 </Control>
 </file>
 
 <file path=customXml/item61.xml><?xml version="1.0" encoding="utf-8"?>
 <Control xmlns="http://schemas.microsoft.com/VisualStudio/2011/storyboarding/control/v1.0">
-  <Id Name="System.Storyboard.Stencil.Label" RevisionId="00000000-0000-0000-0000-000000000000" Stencil="System.Common" StencilRevisionId="00000000-0000-0000-0000-000000000000" StencilVersion="1.0"/>
+  <Id Name="System.Storyboard.Stencil.FourItemList" RevisionId="00000000-0000-0000-0000-000000000000" Stencil="System.Common" StencilRevisionId="00000000-0000-0000-0000-000000000000" StencilVersion="1.0"/>
 </Control>
 </file>
 
 <file path=customXml/item62.xml><?xml version="1.0" encoding="utf-8"?>
-<Control xmlns="http://schemas.microsoft.com/VisualStudio/2011/storyboarding/control">
-  <Id Name="System.Storyboarding.WindowsApps.WindowsAppsMediumWideTile" Revision="1" Stencil="System.Storyboarding.WindowsApps" StencilVersion="0.1"/>
+<Control xmlns="http://schemas.microsoft.com/VisualStudio/2011/storyboarding/control/v1.0">
+  <Id Name="System.Storyboard.Stencil.TreeList" RevisionId="00000000-0000-0000-0000-000000000000" Stencil="System.Common" StencilRevisionId="00000000-0000-0000-0000-000000000000" StencilVersion="1.0"/>
 </Control>
 </file>
 
@@ -10783,26 +10756,26 @@
 </file>
 
 <file path=customXml/item64.xml><?xml version="1.0" encoding="utf-8"?>
-<Control xmlns="http://schemas.microsoft.com/VisualStudio/2011/storyboarding/control">
-  <Id Name="System.Storyboarding.WindowsApps.WindowsAppsMediumWideTile" Revision="1" Stencil="System.Storyboarding.WindowsApps" StencilVersion="0.1"/>
+<Control xmlns="http://schemas.microsoft.com/VisualStudio/2011/storyboarding/control/v1.0">
+  <Id Name="System.Storyboard.Stencil.Title" RevisionId="00000000-0000-0000-0000-000000000000" Stencil="System.Common" StencilRevisionId="00000000-0000-0000-0000-000000000000" StencilVersion="1.0"/>
 </Control>
 </file>
 
 <file path=customXml/item65.xml><?xml version="1.0" encoding="utf-8"?>
 <Control xmlns="http://schemas.microsoft.com/VisualStudio/2011/storyboarding/control">
-  <Id Name="System.Storyboarding.WindowsApps.WindowsAppsMediumWideTile" Revision="1" Stencil="System.Storyboarding.WindowsApps" StencilVersion="0.1"/>
+  <Id Name="System.Storyboarding.Backgrounds.WindowsPhone" RevisionId="bdb52a43-f875-417f-a3f8-9b0259dd3051" Stencil="System.Storyboarding.Backgrounds" StencilRevisionId="bdb52a43-f875-417f-a3f8-9b0259dd3051" StencilVersion="0.1"/>
 </Control>
 </file>
 
 <file path=customXml/item66.xml><?xml version="1.0" encoding="utf-8"?>
 <Control xmlns="http://schemas.microsoft.com/VisualStudio/2011/storyboarding/control/v1.0">
-  <Id Name="System.Storyboarding.Common.Breadcrumb" RevisionId="68ea164d-c1de-47a5-804f-d4d1290fa524" Stencil="System.Storyboarding.Common" StencilRevisionId="68ea164d-c1de-47a5-804f-d4d1290fa524" StencilVersion="0.1"/>
+  <Id Name="System.Storyboard.Stencil.VerticalBarChart" RevisionId="00000000-0000-0000-0000-000000000000" Stencil="System.Media" StencilRevisionId="00000000-0000-0000-0000-000000000000" StencilVersion="1.0"/>
 </Control>
 </file>
 
 <file path=customXml/item67.xml><?xml version="1.0" encoding="utf-8"?>
 <Control xmlns="http://schemas.microsoft.com/VisualStudio/2011/storyboarding/control/v1.0">
-  <Id Name="System.Storyboarding.Icons.FolderOpen" RevisionId="05cd6d03-c0b2-488e-98a7-d68de69a2cfc" Stencil="System.Storyboarding.Icons" StencilRevisionId="05cd6d03-c0b2-488e-98a7-d68de69a2cfc" StencilVersion="0.1"/>
+  <Id Name="System.Storyboard.Stencil.Hyperlink" RevisionId="00000000-0000-0000-0000-000000000000" Stencil="System.Common" StencilRevisionId="00000000-0000-0000-0000-000000000000" StencilVersion="1.0"/>
 </Control>
 </file>
 
@@ -10814,55 +10787,55 @@
 
 <file path=customXml/item69.xml><?xml version="1.0" encoding="utf-8"?>
 <Control xmlns="http://schemas.microsoft.com/VisualStudio/2011/storyboarding/control/v1.0">
-  <Id Name="System.Storyboard.Stencil.VideoPlayer" RevisionId="00000000-0000-0000-0000-000000000000" Stencil="System.Media" StencilRevisionId="00000000-0000-0000-0000-000000000000" StencilVersion="1.0"/>
+  <Id Name="System.Storyboard.Stencil.PieChart" RevisionId="00000000-0000-0000-0000-000000000000" Stencil="System.Media" StencilRevisionId="00000000-0000-0000-0000-000000000000" StencilVersion="1.0"/>
 </Control>
 </file>
 
 <file path=customXml/item7.xml><?xml version="1.0" encoding="utf-8"?>
+<Control xmlns="http://schemas.microsoft.com/VisualStudio/2011/storyboarding/control">
+  <Id Name="System.Storyboarding.Backgrounds.RibbonApplication" RevisionId="bdb52a43-f875-417f-a3f8-9b0259dd3051" Stencil="System.Storyboarding.Backgrounds" StencilRevisionId="bdb52a43-f875-417f-a3f8-9b0259dd3051" StencilVersion="0.1"/>
+</Control>
+</file>
+
+<file path=customXml/item70.xml><?xml version="1.0" encoding="utf-8"?>
 <Control xmlns="http://schemas.microsoft.com/VisualStudio/2011/storyboarding/control/v1.0">
-  <Id Name="System.Storyboard.Stencil.LineChart" RevisionId="00000000-0000-0000-0000-000000000000" Stencil="System.Media" StencilRevisionId="00000000-0000-0000-0000-000000000000" StencilVersion="1.0"/>
+  <Id Name="System.Storyboard.Stencil.WidePhoneTile" RevisionId="00000000-0000-0000-0000-000000000000" Stencil="System.Windows_Phone_7" StencilRevisionId="00000000-0000-0000-0000-000000000000" StencilVersion="1.0"/>
 </Control>
 </file>
 
-<file path=customXml/item70.xml><?xml version="1.0" encoding="utf-8"?>
+<file path=customXml/item71.xml><?xml version="1.0" encoding="utf-8"?>
+<Control xmlns="http://schemas.microsoft.com/VisualStudio/2011/storyboarding/control/v1.0">
+  <Id Name="System.Storyboarding.Icons.Help" RevisionId="05cd6d03-c0b2-488e-98a7-d68de69a2cfc" Stencil="System.Storyboarding.Icons" StencilRevisionId="05cd6d03-c0b2-488e-98a7-d68de69a2cfc" StencilVersion="0.1"/>
+</Control>
+</file>
+
+<file path=customXml/item72.xml><?xml version="1.0" encoding="utf-8"?>
+<Control xmlns="http://schemas.microsoft.com/VisualStudio/2011/storyboarding/control/v1.0">
+  <Id Name="System.Storyboarding.Common.Text" RevisionId="68ea164d-c1de-47a5-804f-d4d1290fa524" Stencil="System.Storyboarding.Common" StencilRevisionId="68ea164d-c1de-47a5-804f-d4d1290fa524" StencilVersion="0.1"/>
+</Control>
+</file>
+
+<file path=customXml/item73.xml><?xml version="1.0" encoding="utf-8"?>
+<Control xmlns="http://schemas.microsoft.com/VisualStudio/2011/storyboarding/control/v1.0">
+  <Id Name="System.Storyboard.Stencil.PositionControl" RevisionId="00000000-0000-0000-0000-000000000000" Stencil="System.Media" StencilRevisionId="00000000-0000-0000-0000-000000000000" StencilVersion="1.0"/>
+</Control>
+</file>
+
+<file path=customXml/item74.xml><?xml version="1.0" encoding="utf-8"?>
+<Control xmlns="http://schemas.microsoft.com/VisualStudio/2011/storyboarding/control/v1.0">
+  <Id Name="System.Storyboarding.Common.Text" RevisionId="68ea164d-c1de-47a5-804f-d4d1290fa524" Stencil="System.Storyboarding.Common" StencilRevisionId="68ea164d-c1de-47a5-804f-d4d1290fa524" StencilVersion="0.1"/>
+</Control>
+</file>
+
+<file path=customXml/item75.xml><?xml version="1.0" encoding="utf-8"?>
 <Control xmlns="http://schemas.microsoft.com/VisualStudio/2011/storyboarding/control/v1.0">
   <Id Name="System.Storyboard.Stencil.Title" RevisionId="00000000-0000-0000-0000-000000000000" Stencil="System.Common" StencilRevisionId="00000000-0000-0000-0000-000000000000" StencilVersion="1.0"/>
 </Control>
 </file>
 
-<file path=customXml/item71.xml><?xml version="1.0" encoding="utf-8"?>
-<Control xmlns="http://schemas.microsoft.com/VisualStudio/2011/storyboarding/control">
-  <Id Name="System.Storyboarding.WindowsApps.WindowsAppsMediumWideTile" Revision="1" Stencil="System.Storyboarding.WindowsApps" StencilVersion="0.1"/>
-</Control>
-</file>
-
-<file path=customXml/item72.xml><?xml version="1.0" encoding="utf-8"?>
-<Control xmlns="http://schemas.microsoft.com/VisualStudio/2011/storyboarding/control">
-  <Id Name="System.Storyboarding.WindowsApps.WindowsAppsMediumWideTile" Revision="1" Stencil="System.Storyboarding.WindowsApps" StencilVersion="0.1"/>
-</Control>
-</file>
-
-<file path=customXml/item73.xml><?xml version="1.0" encoding="utf-8"?>
-<Control xmlns="http://schemas.microsoft.com/VisualStudio/2011/storyboarding/control">
-  <Id Name="System.Storyboarding.WindowsApps.WindowsAppsMediumWideTile" Revision="1" Stencil="System.Storyboarding.WindowsApps" StencilVersion="0.1"/>
-</Control>
-</file>
-
-<file path=customXml/item74.xml><?xml version="1.0" encoding="utf-8"?>
-<Control xmlns="http://schemas.microsoft.com/VisualStudio/2011/storyboarding/control">
-  <Id Name="System.Storyboarding.WindowsApps.WindowsAppsMediumWideTile" Revision="1" Stencil="System.Storyboarding.WindowsApps" StencilVersion="0.1"/>
-</Control>
-</file>
-
-<file path=customXml/item75.xml><?xml version="1.0" encoding="utf-8"?>
-<Control xmlns="http://schemas.microsoft.com/VisualStudio/2011/storyboarding/control/v1.0">
-  <Id Name="System.Storyboard.Stencil.PlayControls" RevisionId="00000000-0000-0000-0000-000000000000" Stencil="System.Media" StencilRevisionId="00000000-0000-0000-0000-000000000000" StencilVersion="1.0"/>
-</Control>
-</file>
-
 <file path=customXml/item76.xml><?xml version="1.0" encoding="utf-8"?>
 <Control xmlns="http://schemas.microsoft.com/VisualStudio/2011/storyboarding/control/v1.0">
-  <Id Name="System.Storyboard.Stencil.HorizontalScrollbar" RevisionId="00000000-0000-0000-0000-000000000000" Stencil="System.Common" StencilRevisionId="00000000-0000-0000-0000-000000000000" StencilVersion="1.0"/>
+  <Id Name="System.Storyboard.Stencil.WidePhoneTile" RevisionId="00000000-0000-0000-0000-000000000000" Stencil="System.Windows_Phone_7" StencilRevisionId="00000000-0000-0000-0000-000000000000" StencilVersion="1.0"/>
 </Control>
 </file>
 
@@ -10873,30 +10846,24 @@
 </file>
 
 <file path=customXml/item78.xml><?xml version="1.0" encoding="utf-8"?>
+<Control xmlns="http://schemas.microsoft.com/VisualStudio/2011/storyboarding/control">
+  <Id Name="System.Storyboarding.WindowsApps.WindowsAppsMediumWideTile" Revision="1" Stencil="System.Storyboarding.WindowsApps" StencilVersion="0.1"/>
+</Control>
+</file>
+
+<file path=customXml/item79.xml><?xml version="1.0" encoding="utf-8"?>
 <Control xmlns="http://schemas.microsoft.com/VisualStudio/2011/storyboarding/control/v1.0">
   <Id Name="System.Storyboard.Stencil.Slider" RevisionId="00000000-0000-0000-0000-000000000000" Stencil="System.Common" StencilRevisionId="00000000-0000-0000-0000-000000000000" StencilVersion="1.0"/>
 </Control>
 </file>
 
-<file path=customXml/item79.xml><?xml version="1.0" encoding="utf-8"?>
-<Control xmlns="http://schemas.microsoft.com/VisualStudio/2011/storyboarding/control/v1.0">
-  <Id Name="System.Storyboard.Stencil.PhoneTile" RevisionId="00000000-0000-0000-0000-000000000000" Stencil="System.Windows_Phone_7" StencilRevisionId="00000000-0000-0000-0000-000000000000" StencilVersion="1.0"/>
-</Control>
-</file>
-
 <file path=customXml/item8.xml><?xml version="1.0" encoding="utf-8"?>
 <Control xmlns="http://schemas.microsoft.com/VisualStudio/2011/storyboarding/control">
-  <Id Name="System.Storyboarding.WindowsApps.WindowsAppsMediumWideTile" Revision="1" Stencil="System.Storyboarding.WindowsApps" StencilVersion="0.1"/>
+  <Id Name="System.Storyboarding.WindowsPhoneIcons.Video" RevisionId="5814b1e0-0169-11e0-a976-0800200c9a66" Stencil="System.Storyboarding.WindowsPhoneIcons" StencilRevisionId="5814b1e0-0169-11e0-a976-0800200c9a66" StencilVersion="0.1"/>
 </Control>
 </file>
 
 <file path=customXml/item80.xml><?xml version="1.0" encoding="utf-8"?>
-<Control xmlns="http://schemas.microsoft.com/VisualStudio/2011/storyboarding/control/v1.0">
-  <Id Name="System.Storyboard.Stencil.StatusBar" RevisionId="00000000-0000-0000-0000-000000000000" Stencil="System.Windows" StencilRevisionId="00000000-0000-0000-0000-000000000000" StencilVersion="1.0"/>
-</Control>
-</file>
-
-<file path=customXml/item81.xml><?xml version="1.0" encoding="utf-8"?>
 <?mso-contentType ?>
 <spe:Receivers xmlns:spe="http://schemas.microsoft.com/sharepoint/events">
   <Receiver>
@@ -10942,103 +10909,85 @@
 </spe:Receivers>
 </file>
 
+<file path=customXml/item81.xml><?xml version="1.0" encoding="utf-8"?>
+<Control xmlns="http://schemas.microsoft.com/VisualStudio/2011/storyboarding/control">
+  <Id Name="System.Storyboarding.Backgrounds.WebBrowser" RevisionId="bdb52a43-f875-417f-a3f8-9b0259dd3051" Stencil="System.Storyboarding.Backgrounds" StencilRevisionId="bdb52a43-f875-417f-a3f8-9b0259dd3051" StencilVersion="0.1"/>
+</Control>
+</file>
+
 <file path=customXml/item82.xml><?xml version="1.0" encoding="utf-8"?>
-<Control xmlns="http://schemas.microsoft.com/VisualStudio/2011/storyboarding/control/v1.0">
-  <Id Name="System.Storyboarding.Common.DropdownBox" RevisionId="68ea164d-c1de-47a5-804f-d4d1290fa524" Stencil="System.Storyboarding.Common" StencilRevisionId="68ea164d-c1de-47a5-804f-d4d1290fa524" StencilVersion="0.1"/>
-</Control>
-</file>
-
-<file path=customXml/item83.xml><?xml version="1.0" encoding="utf-8"?>
-<Control xmlns="http://schemas.microsoft.com/VisualStudio/2011/storyboarding/control/v1.0">
-  <Id Name="System.Storyboard.Stencil.Group" RevisionId="00000000-0000-0000-0000-000000000000" Stencil="System.Windows" StencilRevisionId="00000000-0000-0000-0000-000000000000" StencilVersion="1.0"/>
-</Control>
-</file>
-
-<file path=customXml/item84.xml><?xml version="1.0" encoding="utf-8"?>
 <Control xmlns="http://schemas.microsoft.com/VisualStudio/2011/storyboarding/control/v1.0">
   <Id Name="System.Storyboard.Stencil.PhoneTile" RevisionId="00000000-0000-0000-0000-000000000000" Stencil="System.Windows_Phone_7" StencilRevisionId="00000000-0000-0000-0000-000000000000" StencilVersion="1.0"/>
 </Control>
 </file>
 
-<file path=customXml/item85.xml><?xml version="1.0" encoding="utf-8"?>
-<Control xmlns="http://schemas.microsoft.com/VisualStudio/2011/storyboarding/control">
-  <Id Name="System.Storyboarding.Backgrounds.Window" RevisionId="bdb52a43-f875-417f-a3f8-9b0259dd3051" Stencil="System.Storyboarding.Backgrounds" StencilRevisionId="bdb52a43-f875-417f-a3f8-9b0259dd3051" StencilVersion="0.1"/>
-</Control>
-</file>
-
-<file path=customXml/item86.xml><?xml version="1.0" encoding="utf-8"?>
-<Control xmlns="http://schemas.microsoft.com/VisualStudio/2011/storyboarding/control">
-  <Id Name="System.Storyboarding.Backgrounds.WebBrowser" RevisionId="bdb52a43-f875-417f-a3f8-9b0259dd3051" Stencil="System.Storyboarding.Backgrounds" StencilRevisionId="bdb52a43-f875-417f-a3f8-9b0259dd3051" StencilVersion="0.1"/>
-</Control>
-</file>
-
-<file path=customXml/item87.xml><?xml version="1.0" encoding="utf-8"?>
-<Control xmlns="http://schemas.microsoft.com/VisualStudio/2011/storyboarding/control/v1.0">
-  <Id Name="System.Storyboard.Stencil.PieChart" RevisionId="00000000-0000-0000-0000-000000000000" Stencil="System.Media" StencilRevisionId="00000000-0000-0000-0000-000000000000" StencilVersion="1.0"/>
-</Control>
-</file>
-
-<file path=customXml/item88.xml><?xml version="1.0" encoding="utf-8"?>
-<Control xmlns="http://schemas.microsoft.com/VisualStudio/2011/storyboarding/control/v1.0">
-  <Id Name="System.Storyboard.Stencil.FourItemList" RevisionId="00000000-0000-0000-0000-000000000000" Stencil="System.Common" StencilRevisionId="00000000-0000-0000-0000-000000000000" StencilVersion="1.0"/>
-</Control>
-</file>
-
-<file path=customXml/item89.xml><?xml version="1.0" encoding="utf-8"?>
+<file path=customXml/item83.xml><?xml version="1.0" encoding="utf-8"?>
 <Control xmlns="http://schemas.microsoft.com/VisualStudio/2011/storyboarding/control">
   <Id Name="System.Storyboarding.Backgrounds.RibbonApplication" RevisionId="bdb52a43-f875-417f-a3f8-9b0259dd3051" Stencil="System.Storyboarding.Backgrounds" StencilRevisionId="bdb52a43-f875-417f-a3f8-9b0259dd3051" StencilVersion="0.1"/>
 </Control>
 </file>
 
-<file path=customXml/item9.xml><?xml version="1.0" encoding="utf-8"?>
+<file path=customXml/item84.xml><?xml version="1.0" encoding="utf-8"?>
+<Control xmlns="http://schemas.microsoft.com/VisualStudio/2011/storyboarding/control/v1.0">
+  <Id Name="System.Storyboard.Stencil.DropdownBox" RevisionId="00000000-0000-0000-0000-000000000000" Stencil="System.Common" StencilRevisionId="00000000-0000-0000-0000-000000000000" StencilVersion="1.0"/>
+</Control>
+</file>
+
+<file path=customXml/item85.xml><?xml version="1.0" encoding="utf-8"?>
 <Control xmlns="http://schemas.microsoft.com/VisualStudio/2011/storyboarding/control/v1.0">
   <Id Name="System.Storyboarding.Common.Text" RevisionId="68ea164d-c1de-47a5-804f-d4d1290fa524" Stencil="System.Storyboarding.Common" StencilRevisionId="68ea164d-c1de-47a5-804f-d4d1290fa524" StencilVersion="0.1"/>
 </Control>
 </file>
 
-<file path=customXml/item90.xml><?xml version="1.0" encoding="utf-8"?>
-<Control xmlns="http://schemas.microsoft.com/VisualStudio/2011/storyboarding/control/v1.0">
-  <Id Name="System.Storyboard.Stencil.Title" RevisionId="00000000-0000-0000-0000-000000000000" Stencil="System.Common" StencilRevisionId="00000000-0000-0000-0000-000000000000" StencilVersion="1.0"/>
-</Control>
-</file>
-
-<file path=customXml/item91.xml><?xml version="1.0" encoding="utf-8"?>
-<Control xmlns="http://schemas.microsoft.com/VisualStudio/2011/storyboarding/control/v1.0">
-  <Id Name="System.Storyboard.Stencil.TreeList" RevisionId="00000000-0000-0000-0000-000000000000" Stencil="System.Common" StencilRevisionId="00000000-0000-0000-0000-000000000000" StencilVersion="1.0"/>
-</Control>
-</file>
-
-<file path=customXml/item92.xml><?xml version="1.0" encoding="utf-8"?>
-<Control xmlns="http://schemas.microsoft.com/VisualStudio/2011/storyboarding/control/v1.0">
-  <Id Name="System.Storyboard.Stencil.PhoneApplicationBar" RevisionId="00000000-0000-0000-0000-000000000000" Stencil="System.Windows_Phone_7" StencilRevisionId="00000000-0000-0000-0000-000000000000" StencilVersion="1.0"/>
-</Control>
-</file>
-
-<file path=customXml/item93.xml><?xml version="1.0" encoding="utf-8"?>
-<Control xmlns="http://schemas.microsoft.com/VisualStudio/2011/storyboarding/control/v1.0">
-  <Id Name="System.Storyboard.Stencil.PhoneTile" RevisionId="00000000-0000-0000-0000-000000000000" Stencil="System.Windows_Phone_7" StencilRevisionId="00000000-0000-0000-0000-000000000000" StencilVersion="1.0"/>
-</Control>
-</file>
-
-<file path=customXml/item94.xml><?xml version="1.0" encoding="utf-8"?>
-<Control xmlns="http://schemas.microsoft.com/VisualStudio/2011/storyboarding/control/v1.0">
-  <Id Name="System.Storyboard.Stencil.PhoneTile" RevisionId="00000000-0000-0000-0000-000000000000" Stencil="System.Windows_Phone_7" StencilRevisionId="00000000-0000-0000-0000-000000000000" StencilVersion="1.0"/>
-</Control>
-</file>
-
-<file path=customXml/item95.xml><?xml version="1.0" encoding="utf-8"?>
-<Control xmlns="http://schemas.microsoft.com/VisualStudio/2011/storyboarding/control/v1.0">
-  <Id Name="System.Storyboard.Stencil.PhoneTile" RevisionId="00000000-0000-0000-0000-000000000000" Stencil="System.Windows_Phone_7" StencilRevisionId="00000000-0000-0000-0000-000000000000" StencilVersion="1.0"/>
-</Control>
-</file>
-
-<file path=customXml/item96.xml><?xml version="1.0" encoding="utf-8"?>
+<file path=customXml/item86.xml><?xml version="1.0" encoding="utf-8"?>
 <Control xmlns="http://schemas.microsoft.com/VisualStudio/2011/storyboarding/control">
   <Id Name="System.Storyboarding.WindowsApps.WindowsAppsMediumWideTile" Revision="1" Stencil="System.Storyboarding.WindowsApps" StencilVersion="0.1"/>
 </Control>
 </file>
 
-<file path=customXml/item97.xml><?xml version="1.0" encoding="utf-8"?>
+<file path=customXml/item87.xml><?xml version="1.0" encoding="utf-8"?>
+<Control xmlns="http://schemas.microsoft.com/VisualStudio/2011/storyboarding/control/v1.0">
+  <Id Name="System.Storyboard.Stencil.VerticalSplitter" RevisionId="00000000-0000-0000-0000-000000000000" Stencil="System.Windows" StencilRevisionId="00000000-0000-0000-0000-000000000000" StencilVersion="1.0"/>
+</Control>
+</file>
+
+<file path=customXml/item88.xml><?xml version="1.0" encoding="utf-8"?>
+<Control xmlns="http://schemas.microsoft.com/VisualStudio/2011/storyboarding/control">
+  <Id Name="System.Storyboarding.WindowsApps.WindowsAppsMediumWideTile" Revision="1" Stencil="System.Storyboarding.WindowsApps" StencilVersion="0.1"/>
+</Control>
+</file>
+
+<file path=customXml/item89.xml><?xml version="1.0" encoding="utf-8"?>
+<Control xmlns="http://schemas.microsoft.com/VisualStudio/2011/storyboarding/control/v1.0">
+  <Id Name="System.Storyboarding.Common.Text" RevisionId="68ea164d-c1de-47a5-804f-d4d1290fa524" Stencil="System.Storyboarding.Common" StencilRevisionId="68ea164d-c1de-47a5-804f-d4d1290fa524" StencilVersion="0.1"/>
+</Control>
+</file>
+
+<file path=customXml/item9.xml><?xml version="1.0" encoding="utf-8"?>
+<Control xmlns="http://schemas.microsoft.com/VisualStudio/2011/storyboarding/control/v1.0">
+  <Id Name="System.Storyboard.Stencil.TextArea" RevisionId="00000000-0000-0000-0000-000000000000" Stencil="System.Common" StencilRevisionId="00000000-0000-0000-0000-000000000000" StencilVersion="1.0"/>
+</Control>
+</file>
+
+<file path=customXml/item90.xml><?xml version="1.0" encoding="utf-8"?>
+<Control xmlns="http://schemas.microsoft.com/VisualStudio/2011/storyboarding/control/v1.0">
+  <Id Name="System.Storyboard.Stencil.Label" RevisionId="00000000-0000-0000-0000-000000000000" Stencil="System.Common" StencilRevisionId="00000000-0000-0000-0000-000000000000" StencilVersion="1.0"/>
+</Control>
+</file>
+
+<file path=customXml/item91.xml><?xml version="1.0" encoding="utf-8"?>
+<Control xmlns="http://schemas.microsoft.com/VisualStudio/2011/storyboarding/control">
+  <Id Name="System.Storyboarding.Backgrounds.WindowsPhoneLandscape" RevisionId="bdb52a43-f875-417f-a3f8-9b0259dd3051" Stencil="System.Storyboarding.Backgrounds" StencilRevisionId="bdb52a43-f875-417f-a3f8-9b0259dd3051" StencilVersion="0.1"/>
+</Control>
+</file>
+
+<file path=customXml/item92.xml><?xml version="1.0" encoding="utf-8"?>
+<Control xmlns="http://schemas.microsoft.com/VisualStudio/2011/storyboarding/control/v1.0">
+  <Id Name="System.Storyboard.Stencil.HorizontalScrollbar" RevisionId="00000000-0000-0000-0000-000000000000" Stencil="System.Common" StencilRevisionId="00000000-0000-0000-0000-000000000000" StencilVersion="1.0"/>
+</Control>
+</file>
+
+<file path=customXml/item93.xml><?xml version="1.0" encoding="utf-8"?>
 <ct:contentTypeSchema xmlns:ct="http://schemas.microsoft.com/office/2006/metadata/contentType" xmlns:ma="http://schemas.microsoft.com/office/2006/metadata/properties/metaAttributes" ct:_="" ma:_="" ma:contentTypeName="Document" ma:contentTypeID="0x01010022C9F813607D1D469674AAA3D24DC85B" ma:contentTypeVersion="0" ma:contentTypeDescription="Create a new document." ma:contentTypeScope="" ma:versionID="2370c695874a1292907530ead749c2be">
   <xsd:schema xmlns:xsd="http://www.w3.org/2001/XMLSchema" xmlns:xs="http://www.w3.org/2001/XMLSchema" xmlns:p="http://schemas.microsoft.com/office/2006/metadata/properties" xmlns:ns2="b4ebf394-daf6-497a-96c5-a2f8c10b38cf" targetNamespace="http://schemas.microsoft.com/office/2006/metadata/properties" ma:root="true" ma:fieldsID="9b19f9f2e3a2b2958cd8578711e95110" ns2:_="">
     <xsd:import namespace="b4ebf394-daf6-497a-96c5-a2f8c10b38cf"/>
@@ -11183,123 +11132,43 @@
 </ct:contentTypeSchema>
 </file>
 
+<file path=customXml/item94.xml><?xml version="1.0" encoding="utf-8"?>
+<Control xmlns="http://schemas.microsoft.com/VisualStudio/2011/storyboarding/control/v1.0">
+  <Id Name="System.Storyboard.Stencil.LineChart" RevisionId="00000000-0000-0000-0000-000000000000" Stencil="System.Media" StencilRevisionId="00000000-0000-0000-0000-000000000000" StencilVersion="1.0"/>
+</Control>
+</file>
+
+<file path=customXml/item95.xml><?xml version="1.0" encoding="utf-8"?>
+<Control xmlns="http://schemas.microsoft.com/VisualStudio/2011/storyboarding/control">
+  <Id Name="System.Storyboarding.WindowsApps.WindowsAppsMediumWideTile" Revision="1" Stencil="System.Storyboarding.WindowsApps" StencilVersion="0.1"/>
+</Control>
+</file>
+
+<file path=customXml/item96.xml><?xml version="1.0" encoding="utf-8"?>
+<Control xmlns="http://schemas.microsoft.com/VisualStudio/2011/storyboarding/control/v1.0">
+  <Id Name="System.Storyboard.Stencil.PhoneApplicationBar" RevisionId="00000000-0000-0000-0000-000000000000" Stencil="System.Windows_Phone_7" StencilRevisionId="00000000-0000-0000-0000-000000000000" StencilVersion="1.0"/>
+</Control>
+</file>
+
+<file path=customXml/item97.xml><?xml version="1.0" encoding="utf-8"?>
+<Control xmlns="http://schemas.microsoft.com/VisualStudio/2011/storyboarding/control">
+  <Id Name="System.Storyboarding.WindowsApps.WindowsAppsMediumWideTile" Revision="1" Stencil="System.Storyboarding.WindowsApps" StencilVersion="0.1"/>
+</Control>
+</file>
+
 <file path=customXml/item98.xml><?xml version="1.0" encoding="utf-8"?>
 <Control xmlns="http://schemas.microsoft.com/VisualStudio/2011/storyboarding/control/v1.0">
-  <Id Name="System.Storyboard.Stencil.TreeList" RevisionId="00000000-0000-0000-0000-000000000000" Stencil="System.Common" StencilRevisionId="00000000-0000-0000-0000-000000000000" StencilVersion="1.0"/>
+  <Id Name="System.Storyboard.Stencil.PhoneNotification" RevisionId="00000000-0000-0000-0000-000000000000" Stencil="System.Windows_Phone_7" StencilRevisionId="00000000-0000-0000-0000-000000000000" StencilVersion="1.0"/>
 </Control>
 </file>
 
 <file path=customXml/item99.xml><?xml version="1.0" encoding="utf-8"?>
-<Control xmlns="http://schemas.microsoft.com/VisualStudio/2011/storyboarding/control">
-  <Id Name="System.Storyboarding.Backgrounds.RibbonApplication" RevisionId="bdb52a43-f875-417f-a3f8-9b0259dd3051" Stencil="System.Storyboarding.Backgrounds" StencilRevisionId="bdb52a43-f875-417f-a3f8-9b0259dd3051" StencilVersion="0.1"/>
+<Control xmlns="http://schemas.microsoft.com/VisualStudio/2011/storyboarding/control/v1.0">
+  <Id Name="System.Storyboard.Stencil.PhoneTile" RevisionId="00000000-0000-0000-0000-000000000000" Stencil="System.Windows_Phone_7" StencilRevisionId="00000000-0000-0000-0000-000000000000" StencilVersion="1.0"/>
 </Control>
 </file>
 
 <file path=customXml/itemProps1.xml><?xml version="1.0" encoding="utf-8"?>
-<ds:datastoreItem xmlns:ds="http://schemas.openxmlformats.org/officeDocument/2006/customXml" ds:itemID="{699689A1-427B-4DEA-8FDB-0058CB4B38D8}">
-  <ds:schemaRefs>
-    <ds:schemaRef ds:uri="http://schemas.microsoft.com/VisualStudio/2011/storyboarding/control/v1.0"/>
-  </ds:schemaRefs>
-</ds:datastoreItem>
-</file>
-
-<file path=customXml/itemProps10.xml><?xml version="1.0" encoding="utf-8"?>
-<ds:datastoreItem xmlns:ds="http://schemas.openxmlformats.org/officeDocument/2006/customXml" ds:itemID="{6574190A-3D9E-42C1-B276-38E33156AA99}">
-  <ds:schemaRefs>
-    <ds:schemaRef ds:uri="http://schemas.microsoft.com/VisualStudio/2011/storyboarding/control/v1.0"/>
-  </ds:schemaRefs>
-</ds:datastoreItem>
-</file>
-
-<file path=customXml/itemProps11.xml><?xml version="1.0" encoding="utf-8"?>
-<ds:datastoreItem xmlns:ds="http://schemas.openxmlformats.org/officeDocument/2006/customXml" ds:itemID="{7C4FADB9-82C5-46C4-AD0E-6B60B5C6AEAE}">
-  <ds:schemaRefs>
-    <ds:schemaRef ds:uri="http://schemas.microsoft.com/VisualStudio/2011/storyboarding/control/v1.0"/>
-  </ds:schemaRefs>
-</ds:datastoreItem>
-</file>
-
-<file path=customXml/itemProps12.xml><?xml version="1.0" encoding="utf-8"?>
-<ds:datastoreItem xmlns:ds="http://schemas.openxmlformats.org/officeDocument/2006/customXml" ds:itemID="{B41892D7-DF8B-4D5A-8AD2-983048A35AA0}">
-  <ds:schemaRefs>
-    <ds:schemaRef ds:uri="http://schemas.microsoft.com/VisualStudio/2011/storyboarding/control/v1.0"/>
-  </ds:schemaRefs>
-</ds:datastoreItem>
-</file>
-
-<file path=customXml/itemProps13.xml><?xml version="1.0" encoding="utf-8"?>
-<ds:datastoreItem xmlns:ds="http://schemas.openxmlformats.org/officeDocument/2006/customXml" ds:itemID="{1325FCED-59E4-4A0E-AB40-72EC19C3A651}">
-  <ds:schemaRefs>
-    <ds:schemaRef ds:uri="http://schemas.microsoft.com/VisualStudio/2011/storyboarding/control"/>
-  </ds:schemaRefs>
-</ds:datastoreItem>
-</file>
-
-<file path=customXml/itemProps14.xml><?xml version="1.0" encoding="utf-8"?>
-<ds:datastoreItem xmlns:ds="http://schemas.openxmlformats.org/officeDocument/2006/customXml" ds:itemID="{F17D5AF6-3BD9-4DFF-AE9B-2E10D3430779}">
-  <ds:schemaRefs>
-    <ds:schemaRef ds:uri="http://schemas.microsoft.com/VisualStudio/2011/storyboarding/control/v1.0"/>
-  </ds:schemaRefs>
-</ds:datastoreItem>
-</file>
-
-<file path=customXml/itemProps15.xml><?xml version="1.0" encoding="utf-8"?>
-<ds:datastoreItem xmlns:ds="http://schemas.openxmlformats.org/officeDocument/2006/customXml" ds:itemID="{16772130-8F5D-442B-AA11-39D4F229ACC6}">
-  <ds:schemaRefs>
-    <ds:schemaRef ds:uri="http://schemas.microsoft.com/VisualStudio/2011/storyboarding/control/v1.0"/>
-  </ds:schemaRefs>
-</ds:datastoreItem>
-</file>
-
-<file path=customXml/itemProps16.xml><?xml version="1.0" encoding="utf-8"?>
-<ds:datastoreItem xmlns:ds="http://schemas.openxmlformats.org/officeDocument/2006/customXml" ds:itemID="{70C23831-7801-40F8-9A53-4E9925562CBE}">
-  <ds:schemaRefs>
-    <ds:schemaRef ds:uri="http://schemas.microsoft.com/VisualStudio/2011/storyboarding/control"/>
-  </ds:schemaRefs>
-</ds:datastoreItem>
-</file>
-
-<file path=customXml/itemProps17.xml><?xml version="1.0" encoding="utf-8"?>
-<ds:datastoreItem xmlns:ds="http://schemas.openxmlformats.org/officeDocument/2006/customXml" ds:itemID="{B0DBD337-FDC5-4C36-BF85-C09756391AA1}">
-  <ds:schemaRefs>
-    <ds:schemaRef ds:uri="http://schemas.microsoft.com/VisualStudio/2011/storyboarding/control/v1.0"/>
-  </ds:schemaRefs>
-</ds:datastoreItem>
-</file>
-
-<file path=customXml/itemProps18.xml><?xml version="1.0" encoding="utf-8"?>
-<ds:datastoreItem xmlns:ds="http://schemas.openxmlformats.org/officeDocument/2006/customXml" ds:itemID="{DDEEC505-9111-44CE-9DED-8A454ABEC272}">
-  <ds:schemaRefs>
-    <ds:schemaRef ds:uri="http://schemas.microsoft.com/VisualStudio/2011/storyboarding/control/v1.0"/>
-  </ds:schemaRefs>
-</ds:datastoreItem>
-</file>
-
-<file path=customXml/itemProps19.xml><?xml version="1.0" encoding="utf-8"?>
-<ds:datastoreItem xmlns:ds="http://schemas.openxmlformats.org/officeDocument/2006/customXml" ds:itemID="{0BD21A30-063A-4397-97B8-0121D45BD9D6}">
-  <ds:schemaRefs>
-    <ds:schemaRef ds:uri="http://schemas.microsoft.com/VisualStudio/2011/storyboarding/control/v1.0"/>
-  </ds:schemaRefs>
-</ds:datastoreItem>
-</file>
-
-<file path=customXml/itemProps2.xml><?xml version="1.0" encoding="utf-8"?>
-<ds:datastoreItem xmlns:ds="http://schemas.openxmlformats.org/officeDocument/2006/customXml" ds:itemID="{F7F9CBAC-60B8-4800-9EA1-9BB1523CD9B4}">
-  <ds:schemaRefs>
-    <ds:schemaRef ds:uri="http://schemas.microsoft.com/VisualStudio/2011/storyboarding/control"/>
-  </ds:schemaRefs>
-</ds:datastoreItem>
-</file>
-
-<file path=customXml/itemProps20.xml><?xml version="1.0" encoding="utf-8"?>
-<ds:datastoreItem xmlns:ds="http://schemas.openxmlformats.org/officeDocument/2006/customXml" ds:itemID="{B8C6D4DD-FC58-4C97-B28B-C1F0B6B80EE0}">
-  <ds:schemaRefs>
-    <ds:schemaRef ds:uri="http://schemas.microsoft.com/VisualStudio/2011/storyboarding/control"/>
-  </ds:schemaRefs>
-</ds:datastoreItem>
-</file>
-
-<file path=customXml/itemProps21.xml><?xml version="1.0" encoding="utf-8"?>
 <ds:datastoreItem xmlns:ds="http://schemas.openxmlformats.org/officeDocument/2006/customXml" ds:itemID="{729DB56D-F542-4709-9AE0-E83CD92BA163}">
   <ds:schemaRefs>
     <ds:schemaRef ds:uri="http://schemas.microsoft.com/VisualStudio/2011/storyboarding/control/v1.0"/>
@@ -11307,23 +11176,7 @@
 </ds:datastoreItem>
 </file>
 
-<file path=customXml/itemProps22.xml><?xml version="1.0" encoding="utf-8"?>
-<ds:datastoreItem xmlns:ds="http://schemas.openxmlformats.org/officeDocument/2006/customXml" ds:itemID="{23F8C33B-B43F-45BB-B385-DDAB00317A26}">
-  <ds:schemaRefs>
-    <ds:schemaRef ds:uri="http://schemas.microsoft.com/VisualStudio/2011/storyboarding/control"/>
-  </ds:schemaRefs>
-</ds:datastoreItem>
-</file>
-
-<file path=customXml/itemProps23.xml><?xml version="1.0" encoding="utf-8"?>
-<ds:datastoreItem xmlns:ds="http://schemas.openxmlformats.org/officeDocument/2006/customXml" ds:itemID="{C4783010-23AB-4BDC-BABF-F6576658A2B0}">
-  <ds:schemaRefs>
-    <ds:schemaRef ds:uri="http://schemas.microsoft.com/VisualStudio/2011/storyboarding/control/v1.0"/>
-  </ds:schemaRefs>
-</ds:datastoreItem>
-</file>
-
-<file path=customXml/itemProps24.xml><?xml version="1.0" encoding="utf-8"?>
+<file path=customXml/itemProps10.xml><?xml version="1.0" encoding="utf-8"?>
 <ds:datastoreItem xmlns:ds="http://schemas.openxmlformats.org/officeDocument/2006/customXml" ds:itemID="{A9E9510A-02AF-4564-9E17-46676C80E84C}">
   <ds:schemaRefs>
     <ds:schemaRef ds:uri="http://purl.org/dc/terms/"/>
@@ -11339,23 +11192,159 @@
 </ds:datastoreItem>
 </file>
 
-<file path=customXml/itemProps25.xml><?xml version="1.0" encoding="utf-8"?>
-<ds:datastoreItem xmlns:ds="http://schemas.openxmlformats.org/officeDocument/2006/customXml" ds:itemID="{7BF16C54-4775-4FA7-AF88-98AF6D5E8CA6}">
+<file path=customXml/itemProps11.xml><?xml version="1.0" encoding="utf-8"?>
+<ds:datastoreItem xmlns:ds="http://schemas.openxmlformats.org/officeDocument/2006/customXml" ds:itemID="{F782368F-0EE3-40FA-B682-80E11F49B65E}">
+  <ds:schemaRefs>
+    <ds:schemaRef ds:uri="http://schemas.microsoft.com/VisualStudio/2011/storyboarding/control"/>
+  </ds:schemaRefs>
+</ds:datastoreItem>
+</file>
+
+<file path=customXml/itemProps12.xml><?xml version="1.0" encoding="utf-8"?>
+<ds:datastoreItem xmlns:ds="http://schemas.openxmlformats.org/officeDocument/2006/customXml" ds:itemID="{E4D924B8-E923-4751-87E1-B31AA64A9F7B}">
   <ds:schemaRefs>
     <ds:schemaRef ds:uri="http://schemas.microsoft.com/VisualStudio/2011/storyboarding/control/v1.0"/>
   </ds:schemaRefs>
 </ds:datastoreItem>
 </file>
 
-<file path=customXml/itemProps26.xml><?xml version="1.0" encoding="utf-8"?>
-<ds:datastoreItem xmlns:ds="http://schemas.openxmlformats.org/officeDocument/2006/customXml" ds:itemID="{E4A0845B-41B6-4256-8FB3-E31EA581BF55}">
+<file path=customXml/itemProps13.xml><?xml version="1.0" encoding="utf-8"?>
+<ds:datastoreItem xmlns:ds="http://schemas.openxmlformats.org/officeDocument/2006/customXml" ds:itemID="{12DDBF6F-C153-48C1-97C0-85AA34D18FD2}">
+  <ds:schemaRefs>
+    <ds:schemaRef ds:uri="http://schemas.microsoft.com/VisualStudio/2011/storyboarding/control"/>
+  </ds:schemaRefs>
+</ds:datastoreItem>
+</file>
+
+<file path=customXml/itemProps14.xml><?xml version="1.0" encoding="utf-8"?>
+<ds:datastoreItem xmlns:ds="http://schemas.openxmlformats.org/officeDocument/2006/customXml" ds:itemID="{AD9C1405-6371-400D-A0E2-389A1557BE20}">
   <ds:schemaRefs>
     <ds:schemaRef ds:uri="http://schemas.microsoft.com/VisualStudio/2011/storyboarding/control/v1.0"/>
   </ds:schemaRefs>
 </ds:datastoreItem>
 </file>
 
+<file path=customXml/itemProps15.xml><?xml version="1.0" encoding="utf-8"?>
+<ds:datastoreItem xmlns:ds="http://schemas.openxmlformats.org/officeDocument/2006/customXml" ds:itemID="{B7BD4F34-B154-4D92-BE87-C557EB1B7EFB}">
+  <ds:schemaRefs>
+    <ds:schemaRef ds:uri="http://schemas.microsoft.com/sharepoint/v3/contenttype/forms"/>
+  </ds:schemaRefs>
+</ds:datastoreItem>
+</file>
+
+<file path=customXml/itemProps16.xml><?xml version="1.0" encoding="utf-8"?>
+<ds:datastoreItem xmlns:ds="http://schemas.openxmlformats.org/officeDocument/2006/customXml" ds:itemID="{A6E144E0-D919-4B3D-A3BD-4F079B739AC2}">
+  <ds:schemaRefs>
+    <ds:schemaRef ds:uri="http://schemas.microsoft.com/VisualStudio/2011/storyboarding/control"/>
+  </ds:schemaRefs>
+</ds:datastoreItem>
+</file>
+
+<file path=customXml/itemProps17.xml><?xml version="1.0" encoding="utf-8"?>
+<ds:datastoreItem xmlns:ds="http://schemas.openxmlformats.org/officeDocument/2006/customXml" ds:itemID="{08904217-40E1-4558-95D8-8D709CA82866}">
+  <ds:schemaRefs>
+    <ds:schemaRef ds:uri="http://schemas.microsoft.com/VisualStudio/2011/storyboarding/control/v1.0"/>
+  </ds:schemaRefs>
+</ds:datastoreItem>
+</file>
+
+<file path=customXml/itemProps18.xml><?xml version="1.0" encoding="utf-8"?>
+<ds:datastoreItem xmlns:ds="http://schemas.openxmlformats.org/officeDocument/2006/customXml" ds:itemID="{AE0CE2A3-FF32-4259-A452-A173604DCF0C}">
+  <ds:schemaRefs>
+    <ds:schemaRef ds:uri="http://schemas.microsoft.com/VisualStudio/2011/storyboarding/control"/>
+  </ds:schemaRefs>
+</ds:datastoreItem>
+</file>
+
+<file path=customXml/itemProps19.xml><?xml version="1.0" encoding="utf-8"?>
+<ds:datastoreItem xmlns:ds="http://schemas.openxmlformats.org/officeDocument/2006/customXml" ds:itemID="{9C4C7B07-3AE3-46A1-A54D-2BDFAB93A8EF}">
+  <ds:schemaRefs>
+    <ds:schemaRef ds:uri="http://schemas.microsoft.com/VisualStudio/2011/storyboarding/control/v1.0"/>
+  </ds:schemaRefs>
+</ds:datastoreItem>
+</file>
+
+<file path=customXml/itemProps2.xml><?xml version="1.0" encoding="utf-8"?>
+<ds:datastoreItem xmlns:ds="http://schemas.openxmlformats.org/officeDocument/2006/customXml" ds:itemID="{53BC856C-B486-437D-A7B4-612AE9417D7A}">
+  <ds:schemaRefs>
+    <ds:schemaRef ds:uri="http://schemas.microsoft.com/VisualStudio/2011/storyboarding/control/v1.0"/>
+  </ds:schemaRefs>
+</ds:datastoreItem>
+</file>
+
+<file path=customXml/itemProps20.xml><?xml version="1.0" encoding="utf-8"?>
+<ds:datastoreItem xmlns:ds="http://schemas.openxmlformats.org/officeDocument/2006/customXml" ds:itemID="{B2C9D19C-4878-43E0-A5AD-CB76AB49D960}">
+  <ds:schemaRefs>
+    <ds:schemaRef ds:uri="http://schemas.microsoft.com/VisualStudio/2011/storyboarding/control/v1.0"/>
+  </ds:schemaRefs>
+</ds:datastoreItem>
+</file>
+
+<file path=customXml/itemProps21.xml><?xml version="1.0" encoding="utf-8"?>
+<ds:datastoreItem xmlns:ds="http://schemas.openxmlformats.org/officeDocument/2006/customXml" ds:itemID="{09A94271-A29B-4164-A32F-3A755C9B59FC}">
+  <ds:schemaRefs>
+    <ds:schemaRef ds:uri="http://schemas.microsoft.com/VisualStudio/2011/storyboarding/control"/>
+  </ds:schemaRefs>
+</ds:datastoreItem>
+</file>
+
+<file path=customXml/itemProps22.xml><?xml version="1.0" encoding="utf-8"?>
+<ds:datastoreItem xmlns:ds="http://schemas.openxmlformats.org/officeDocument/2006/customXml" ds:itemID="{253B000D-0B23-420C-B5B5-11B6002E5391}">
+  <ds:schemaRefs>
+    <ds:schemaRef ds:uri="http://schemas.microsoft.com/VisualStudio/2011/storyboarding/control/v1.0"/>
+  </ds:schemaRefs>
+</ds:datastoreItem>
+</file>
+
+<file path=customXml/itemProps23.xml><?xml version="1.0" encoding="utf-8"?>
+<ds:datastoreItem xmlns:ds="http://schemas.openxmlformats.org/officeDocument/2006/customXml" ds:itemID="{2B6243A2-99B5-42ED-B049-93E27D774527}">
+  <ds:schemaRefs>
+    <ds:schemaRef ds:uri="http://schemas.microsoft.com/VisualStudio/2011/storyboarding/control/v1.0"/>
+  </ds:schemaRefs>
+</ds:datastoreItem>
+</file>
+
+<file path=customXml/itemProps24.xml><?xml version="1.0" encoding="utf-8"?>
+<ds:datastoreItem xmlns:ds="http://schemas.openxmlformats.org/officeDocument/2006/customXml" ds:itemID="{D356E6DB-54C9-4389-B932-0F583366BD4B}">
+  <ds:schemaRefs>
+    <ds:schemaRef ds:uri="http://schemas.microsoft.com/VisualStudio/2011/storyboarding/control/v1.0"/>
+  </ds:schemaRefs>
+</ds:datastoreItem>
+</file>
+
+<file path=customXml/itemProps25.xml><?xml version="1.0" encoding="utf-8"?>
+<ds:datastoreItem xmlns:ds="http://schemas.openxmlformats.org/officeDocument/2006/customXml" ds:itemID="{416D00B5-FBFE-483F-BE84-520287240459}">
+  <ds:schemaRefs>
+    <ds:schemaRef ds:uri="http://schemas.microsoft.com/VisualStudio/2011/storyboarding/control/v1.0"/>
+  </ds:schemaRefs>
+</ds:datastoreItem>
+</file>
+
+<file path=customXml/itemProps26.xml><?xml version="1.0" encoding="utf-8"?>
+<ds:datastoreItem xmlns:ds="http://schemas.openxmlformats.org/officeDocument/2006/customXml" ds:itemID="{0BD21A30-063A-4397-97B8-0121D45BD9D6}">
+  <ds:schemaRefs>
+    <ds:schemaRef ds:uri="http://schemas.microsoft.com/VisualStudio/2011/storyboarding/control/v1.0"/>
+  </ds:schemaRefs>
+</ds:datastoreItem>
+</file>
+
 <file path=customXml/itemProps27.xml><?xml version="1.0" encoding="utf-8"?>
+<ds:datastoreItem xmlns:ds="http://schemas.openxmlformats.org/officeDocument/2006/customXml" ds:itemID="{F17D5AF6-3BD9-4DFF-AE9B-2E10D3430779}">
+  <ds:schemaRefs>
+    <ds:schemaRef ds:uri="http://schemas.microsoft.com/VisualStudio/2011/storyboarding/control/v1.0"/>
+  </ds:schemaRefs>
+</ds:datastoreItem>
+</file>
+
+<file path=customXml/itemProps28.xml><?xml version="1.0" encoding="utf-8"?>
+<ds:datastoreItem xmlns:ds="http://schemas.openxmlformats.org/officeDocument/2006/customXml" ds:itemID="{23F8C33B-B43F-45BB-B385-DDAB00317A26}">
+  <ds:schemaRefs>
+    <ds:schemaRef ds:uri="http://schemas.microsoft.com/VisualStudio/2011/storyboarding/control"/>
+  </ds:schemaRefs>
+</ds:datastoreItem>
+</file>
+
+<file path=customXml/itemProps29.xml><?xml version="1.0" encoding="utf-8"?>
 <ds:datastoreItem xmlns:ds="http://schemas.openxmlformats.org/officeDocument/2006/customXml" ds:itemID="{5F81420E-DDF3-4689-9969-42E66499CA3E}">
   <ds:schemaRefs>
     <ds:schemaRef ds:uri="http://schemas.microsoft.com/VisualStudio/2011/storyboarding/control"/>
@@ -11363,24 +11352,8 @@
 </ds:datastoreItem>
 </file>
 
-<file path=customXml/itemProps28.xml><?xml version="1.0" encoding="utf-8"?>
-<ds:datastoreItem xmlns:ds="http://schemas.openxmlformats.org/officeDocument/2006/customXml" ds:itemID="{3ED2EF50-E36E-49D0-9F27-9EDAEC387091}">
-  <ds:schemaRefs>
-    <ds:schemaRef ds:uri="http://schemas.microsoft.com/VisualStudio/2011/storyboarding/control"/>
-  </ds:schemaRefs>
-</ds:datastoreItem>
-</file>
-
-<file path=customXml/itemProps29.xml><?xml version="1.0" encoding="utf-8"?>
-<ds:datastoreItem xmlns:ds="http://schemas.openxmlformats.org/officeDocument/2006/customXml" ds:itemID="{4EE14C2A-AD9F-4617-A8CC-4057921BFCA8}">
-  <ds:schemaRefs>
-    <ds:schemaRef ds:uri="http://schemas.microsoft.com/VisualStudio/2011/storyboarding/control/v1.0"/>
-  </ds:schemaRefs>
-</ds:datastoreItem>
-</file>
-
 <file path=customXml/itemProps3.xml><?xml version="1.0" encoding="utf-8"?>
-<ds:datastoreItem xmlns:ds="http://schemas.openxmlformats.org/officeDocument/2006/customXml" ds:itemID="{379BFC32-51F7-4218-B2AD-CFD6564CE11F}">
+<ds:datastoreItem xmlns:ds="http://schemas.openxmlformats.org/officeDocument/2006/customXml" ds:itemID="{D834D1AF-A33E-4664-8718-80F7137D9192}">
   <ds:schemaRefs>
     <ds:schemaRef ds:uri="http://schemas.microsoft.com/VisualStudio/2011/storyboarding/control"/>
   </ds:schemaRefs>
@@ -11396,6 +11369,374 @@
 </file>
 
 <file path=customXml/itemProps31.xml><?xml version="1.0" encoding="utf-8"?>
+<ds:datastoreItem xmlns:ds="http://schemas.openxmlformats.org/officeDocument/2006/customXml" ds:itemID="{63E5DE85-F05E-4507-B223-806D8F49F058}">
+  <ds:schemaRefs>
+    <ds:schemaRef ds:uri="http://schemas.microsoft.com/VisualStudio/2011/storyboarding/control/v1.0"/>
+  </ds:schemaRefs>
+</ds:datastoreItem>
+</file>
+
+<file path=customXml/itemProps32.xml><?xml version="1.0" encoding="utf-8"?>
+<ds:datastoreItem xmlns:ds="http://schemas.openxmlformats.org/officeDocument/2006/customXml" ds:itemID="{814432F2-7AE9-411E-9F7B-EBBF16C4666D}">
+  <ds:schemaRefs>
+    <ds:schemaRef ds:uri="http://schemas.microsoft.com/VisualStudio/2011/storyboarding/control/v1.0"/>
+  </ds:schemaRefs>
+</ds:datastoreItem>
+</file>
+
+<file path=customXml/itemProps33.xml><?xml version="1.0" encoding="utf-8"?>
+<ds:datastoreItem xmlns:ds="http://schemas.openxmlformats.org/officeDocument/2006/customXml" ds:itemID="{A84BE01C-E91B-4A90-8E7F-25887EF8E061}">
+  <ds:schemaRefs>
+    <ds:schemaRef ds:uri="http://schemas.microsoft.com/VisualStudio/2011/storyboarding/control/v1.0"/>
+  </ds:schemaRefs>
+</ds:datastoreItem>
+</file>
+
+<file path=customXml/itemProps34.xml><?xml version="1.0" encoding="utf-8"?>
+<ds:datastoreItem xmlns:ds="http://schemas.openxmlformats.org/officeDocument/2006/customXml" ds:itemID="{F395D8ED-A0D3-4F6E-91F3-A29EC16A8083}">
+  <ds:schemaRefs>
+    <ds:schemaRef ds:uri="http://schemas.microsoft.com/VisualStudio/2011/storyboarding/control/v1.0"/>
+  </ds:schemaRefs>
+</ds:datastoreItem>
+</file>
+
+<file path=customXml/itemProps35.xml><?xml version="1.0" encoding="utf-8"?>
+<ds:datastoreItem xmlns:ds="http://schemas.openxmlformats.org/officeDocument/2006/customXml" ds:itemID="{68AAD069-500F-4F2F-A35D-83216001A8DC}">
+  <ds:schemaRefs>
+    <ds:schemaRef ds:uri="http://schemas.microsoft.com/VisualStudio/2011/storyboarding/control"/>
+  </ds:schemaRefs>
+</ds:datastoreItem>
+</file>
+
+<file path=customXml/itemProps36.xml><?xml version="1.0" encoding="utf-8"?>
+<ds:datastoreItem xmlns:ds="http://schemas.openxmlformats.org/officeDocument/2006/customXml" ds:itemID="{156ACD54-663F-4146-A83C-D39B7758E090}">
+  <ds:schemaRefs>
+    <ds:schemaRef ds:uri="http://schemas.microsoft.com/VisualStudio/2011/storyboarding/control/v1.0"/>
+  </ds:schemaRefs>
+</ds:datastoreItem>
+</file>
+
+<file path=customXml/itemProps37.xml><?xml version="1.0" encoding="utf-8"?>
+<ds:datastoreItem xmlns:ds="http://schemas.openxmlformats.org/officeDocument/2006/customXml" ds:itemID="{1C7B3C9E-48C2-496C-AAF2-5C37AB663973}">
+  <ds:schemaRefs>
+    <ds:schemaRef ds:uri="http://schemas.microsoft.com/VisualStudio/2011/storyboarding/control"/>
+  </ds:schemaRefs>
+</ds:datastoreItem>
+</file>
+
+<file path=customXml/itemProps38.xml><?xml version="1.0" encoding="utf-8"?>
+<ds:datastoreItem xmlns:ds="http://schemas.openxmlformats.org/officeDocument/2006/customXml" ds:itemID="{2E901D8B-281C-4847-BEC4-E1DAD11CFF00}">
+  <ds:schemaRefs>
+    <ds:schemaRef ds:uri="http://schemas.microsoft.com/VisualStudio/2011/storyboarding/control"/>
+  </ds:schemaRefs>
+</ds:datastoreItem>
+</file>
+
+<file path=customXml/itemProps39.xml><?xml version="1.0" encoding="utf-8"?>
+<ds:datastoreItem xmlns:ds="http://schemas.openxmlformats.org/officeDocument/2006/customXml" ds:itemID="{B571350C-23C3-4B5A-8F49-FBEB6CF22964}">
+  <ds:schemaRefs>
+    <ds:schemaRef ds:uri="http://schemas.microsoft.com/VisualStudio/2011/storyboarding/control/v1.0"/>
+  </ds:schemaRefs>
+</ds:datastoreItem>
+</file>
+
+<file path=customXml/itemProps4.xml><?xml version="1.0" encoding="utf-8"?>
+<ds:datastoreItem xmlns:ds="http://schemas.openxmlformats.org/officeDocument/2006/customXml" ds:itemID="{1A853509-4993-44ED-BDEC-FF20A239A251}">
+  <ds:schemaRefs>
+    <ds:schemaRef ds:uri="http://schemas.microsoft.com/VisualStudio/2011/storyboarding/control"/>
+  </ds:schemaRefs>
+</ds:datastoreItem>
+</file>
+
+<file path=customXml/itemProps40.xml><?xml version="1.0" encoding="utf-8"?>
+<ds:datastoreItem xmlns:ds="http://schemas.openxmlformats.org/officeDocument/2006/customXml" ds:itemID="{BE267193-C1D2-4298-824E-E6BE5E6C1D22}">
+  <ds:schemaRefs>
+    <ds:schemaRef ds:uri="http://schemas.microsoft.com/VisualStudio/2011/storyboarding/control"/>
+  </ds:schemaRefs>
+</ds:datastoreItem>
+</file>
+
+<file path=customXml/itemProps41.xml><?xml version="1.0" encoding="utf-8"?>
+<ds:datastoreItem xmlns:ds="http://schemas.openxmlformats.org/officeDocument/2006/customXml" ds:itemID="{359B13B5-DE77-48C2-859A-70355A1B9D90}">
+  <ds:schemaRefs>
+    <ds:schemaRef ds:uri="http://schemas.microsoft.com/VisualStudio/2011/storyboarding/control/v1.0"/>
+  </ds:schemaRefs>
+</ds:datastoreItem>
+</file>
+
+<file path=customXml/itemProps42.xml><?xml version="1.0" encoding="utf-8"?>
+<ds:datastoreItem xmlns:ds="http://schemas.openxmlformats.org/officeDocument/2006/customXml" ds:itemID="{1AF31726-A62F-4331-8622-ED351D5149B7}">
+  <ds:schemaRefs>
+    <ds:schemaRef ds:uri="http://schemas.microsoft.com/VisualStudio/2011/storyboarding/control"/>
+  </ds:schemaRefs>
+</ds:datastoreItem>
+</file>
+
+<file path=customXml/itemProps43.xml><?xml version="1.0" encoding="utf-8"?>
+<ds:datastoreItem xmlns:ds="http://schemas.openxmlformats.org/officeDocument/2006/customXml" ds:itemID="{BA2C55E9-BDE8-41FC-B02F-EBA8C07A01F8}">
+  <ds:schemaRefs>
+    <ds:schemaRef ds:uri="http://schemas.microsoft.com/VisualStudio/2011/storyboarding/control/v1.0"/>
+  </ds:schemaRefs>
+</ds:datastoreItem>
+</file>
+
+<file path=customXml/itemProps44.xml><?xml version="1.0" encoding="utf-8"?>
+<ds:datastoreItem xmlns:ds="http://schemas.openxmlformats.org/officeDocument/2006/customXml" ds:itemID="{5E2E8CE4-298D-499A-B8B4-4A593AC844A5}">
+  <ds:schemaRefs>
+    <ds:schemaRef ds:uri="http://schemas.microsoft.com/VisualStudio/2011/storyboarding/control/v1.0"/>
+  </ds:schemaRefs>
+</ds:datastoreItem>
+</file>
+
+<file path=customXml/itemProps45.xml><?xml version="1.0" encoding="utf-8"?>
+<ds:datastoreItem xmlns:ds="http://schemas.openxmlformats.org/officeDocument/2006/customXml" ds:itemID="{379BFC32-51F7-4218-B2AD-CFD6564CE11F}">
+  <ds:schemaRefs>
+    <ds:schemaRef ds:uri="http://schemas.microsoft.com/VisualStudio/2011/storyboarding/control"/>
+  </ds:schemaRefs>
+</ds:datastoreItem>
+</file>
+
+<file path=customXml/itemProps46.xml><?xml version="1.0" encoding="utf-8"?>
+<ds:datastoreItem xmlns:ds="http://schemas.openxmlformats.org/officeDocument/2006/customXml" ds:itemID="{B41892D7-DF8B-4D5A-8AD2-983048A35AA0}">
+  <ds:schemaRefs>
+    <ds:schemaRef ds:uri="http://schemas.microsoft.com/VisualStudio/2011/storyboarding/control/v1.0"/>
+  </ds:schemaRefs>
+</ds:datastoreItem>
+</file>
+
+<file path=customXml/itemProps47.xml><?xml version="1.0" encoding="utf-8"?>
+<ds:datastoreItem xmlns:ds="http://schemas.openxmlformats.org/officeDocument/2006/customXml" ds:itemID="{B0DBD337-FDC5-4C36-BF85-C09756391AA1}">
+  <ds:schemaRefs>
+    <ds:schemaRef ds:uri="http://schemas.microsoft.com/VisualStudio/2011/storyboarding/control/v1.0"/>
+  </ds:schemaRefs>
+</ds:datastoreItem>
+</file>
+
+<file path=customXml/itemProps48.xml><?xml version="1.0" encoding="utf-8"?>
+<ds:datastoreItem xmlns:ds="http://schemas.openxmlformats.org/officeDocument/2006/customXml" ds:itemID="{7BF16C54-4775-4FA7-AF88-98AF6D5E8CA6}">
+  <ds:schemaRefs>
+    <ds:schemaRef ds:uri="http://schemas.microsoft.com/VisualStudio/2011/storyboarding/control/v1.0"/>
+  </ds:schemaRefs>
+</ds:datastoreItem>
+</file>
+
+<file path=customXml/itemProps49.xml><?xml version="1.0" encoding="utf-8"?>
+<ds:datastoreItem xmlns:ds="http://schemas.openxmlformats.org/officeDocument/2006/customXml" ds:itemID="{D8E0912A-795B-4916-9114-34B4F28A0EE3}">
+  <ds:schemaRefs>
+    <ds:schemaRef ds:uri="http://schemas.microsoft.com/VisualStudio/2011/storyboarding/control/v1.0"/>
+  </ds:schemaRefs>
+</ds:datastoreItem>
+</file>
+
+<file path=customXml/itemProps5.xml><?xml version="1.0" encoding="utf-8"?>
+<ds:datastoreItem xmlns:ds="http://schemas.openxmlformats.org/officeDocument/2006/customXml" ds:itemID="{2C0B842B-A6BD-4438-89CC-C23BD0A85ECD}">
+  <ds:schemaRefs>
+    <ds:schemaRef ds:uri="http://schemas.microsoft.com/VisualStudio/2011/storyboarding/control"/>
+  </ds:schemaRefs>
+</ds:datastoreItem>
+</file>
+
+<file path=customXml/itemProps50.xml><?xml version="1.0" encoding="utf-8"?>
+<ds:datastoreItem xmlns:ds="http://schemas.openxmlformats.org/officeDocument/2006/customXml" ds:itemID="{288CEDBF-3F9B-47CF-AF84-2B8486359159}">
+  <ds:schemaRefs>
+    <ds:schemaRef ds:uri="http://schemas.microsoft.com/VisualStudio/2011/storyboarding/control/v1.0"/>
+  </ds:schemaRefs>
+</ds:datastoreItem>
+</file>
+
+<file path=customXml/itemProps51.xml><?xml version="1.0" encoding="utf-8"?>
+<ds:datastoreItem xmlns:ds="http://schemas.openxmlformats.org/officeDocument/2006/customXml" ds:itemID="{029B11DB-B00D-4F9B-8DF3-D898C360902E}">
+  <ds:schemaRefs>
+    <ds:schemaRef ds:uri="http://schemas.microsoft.com/VisualStudio/2011/storyboarding/control"/>
+  </ds:schemaRefs>
+</ds:datastoreItem>
+</file>
+
+<file path=customXml/itemProps52.xml><?xml version="1.0" encoding="utf-8"?>
+<ds:datastoreItem xmlns:ds="http://schemas.openxmlformats.org/officeDocument/2006/customXml" ds:itemID="{CC419530-796D-4DBE-BBEE-9A6630A896E1}">
+  <ds:schemaRefs>
+    <ds:schemaRef ds:uri="http://schemas.microsoft.com/VisualStudio/2011/storyboarding/control/v1.0"/>
+  </ds:schemaRefs>
+</ds:datastoreItem>
+</file>
+
+<file path=customXml/itemProps53.xml><?xml version="1.0" encoding="utf-8"?>
+<ds:datastoreItem xmlns:ds="http://schemas.openxmlformats.org/officeDocument/2006/customXml" ds:itemID="{19CB1DF2-8822-4520-A56A-045D340F0C71}">
+  <ds:schemaRefs>
+    <ds:schemaRef ds:uri="http://schemas.microsoft.com/VisualStudio/2011/storyboarding/control/v1.0"/>
+  </ds:schemaRefs>
+</ds:datastoreItem>
+</file>
+
+<file path=customXml/itemProps54.xml><?xml version="1.0" encoding="utf-8"?>
+<ds:datastoreItem xmlns:ds="http://schemas.openxmlformats.org/officeDocument/2006/customXml" ds:itemID="{B8C6D4DD-FC58-4C97-B28B-C1F0B6B80EE0}">
+  <ds:schemaRefs>
+    <ds:schemaRef ds:uri="http://schemas.microsoft.com/VisualStudio/2011/storyboarding/control"/>
+  </ds:schemaRefs>
+</ds:datastoreItem>
+</file>
+
+<file path=customXml/itemProps55.xml><?xml version="1.0" encoding="utf-8"?>
+<ds:datastoreItem xmlns:ds="http://schemas.openxmlformats.org/officeDocument/2006/customXml" ds:itemID="{D705ACE5-FAF8-44EC-9622-845721B4A44D}">
+  <ds:schemaRefs>
+    <ds:schemaRef ds:uri="http://schemas.microsoft.com/VisualStudio/2011/storyboarding/control/v1.0"/>
+  </ds:schemaRefs>
+</ds:datastoreItem>
+</file>
+
+<file path=customXml/itemProps56.xml><?xml version="1.0" encoding="utf-8"?>
+<ds:datastoreItem xmlns:ds="http://schemas.openxmlformats.org/officeDocument/2006/customXml" ds:itemID="{4CFA599C-9F1C-4AB4-AB4F-10CF77B58F79}">
+  <ds:schemaRefs>
+    <ds:schemaRef ds:uri="http://schemas.microsoft.com/VisualStudio/2011/storyboarding/control/v1.0"/>
+  </ds:schemaRefs>
+</ds:datastoreItem>
+</file>
+
+<file path=customXml/itemProps57.xml><?xml version="1.0" encoding="utf-8"?>
+<ds:datastoreItem xmlns:ds="http://schemas.openxmlformats.org/officeDocument/2006/customXml" ds:itemID="{C40E64A7-7702-4466-95BD-ABEC09272CCB}">
+  <ds:schemaRefs>
+    <ds:schemaRef ds:uri="http://schemas.microsoft.com/VisualStudio/2011/storyboarding/control"/>
+  </ds:schemaRefs>
+</ds:datastoreItem>
+</file>
+
+<file path=customXml/itemProps58.xml><?xml version="1.0" encoding="utf-8"?>
+<ds:datastoreItem xmlns:ds="http://schemas.openxmlformats.org/officeDocument/2006/customXml" ds:itemID="{AA5E4F96-8C72-44F9-A0C5-FB007B246D91}">
+  <ds:schemaRefs>
+    <ds:schemaRef ds:uri="http://schemas.microsoft.com/VisualStudio/2011/storyboarding/control/v1.0"/>
+  </ds:schemaRefs>
+</ds:datastoreItem>
+</file>
+
+<file path=customXml/itemProps59.xml><?xml version="1.0" encoding="utf-8"?>
+<ds:datastoreItem xmlns:ds="http://schemas.openxmlformats.org/officeDocument/2006/customXml" ds:itemID="{4BCB20A2-9850-49DA-9BD6-A5D2B0ABF72F}">
+  <ds:schemaRefs>
+    <ds:schemaRef ds:uri="http://schemas.microsoft.com/VisualStudio/2011/storyboarding/control/v1.0"/>
+  </ds:schemaRefs>
+</ds:datastoreItem>
+</file>
+
+<file path=customXml/itemProps6.xml><?xml version="1.0" encoding="utf-8"?>
+<ds:datastoreItem xmlns:ds="http://schemas.openxmlformats.org/officeDocument/2006/customXml" ds:itemID="{A2DAA52B-5F52-4A8E-B601-7BF162CD738F}">
+  <ds:schemaRefs>
+    <ds:schemaRef ds:uri="http://schemas.microsoft.com/VisualStudio/2011/storyboarding/control/v1.0"/>
+  </ds:schemaRefs>
+</ds:datastoreItem>
+</file>
+
+<file path=customXml/itemProps60.xml><?xml version="1.0" encoding="utf-8"?>
+<ds:datastoreItem xmlns:ds="http://schemas.openxmlformats.org/officeDocument/2006/customXml" ds:itemID="{6772C88A-36A0-4EAC-86A3-BB16EEADAB3E}">
+  <ds:schemaRefs>
+    <ds:schemaRef ds:uri="http://schemas.microsoft.com/VisualStudio/2011/storyboarding/control/v1.0"/>
+  </ds:schemaRefs>
+</ds:datastoreItem>
+</file>
+
+<file path=customXml/itemProps61.xml><?xml version="1.0" encoding="utf-8"?>
+<ds:datastoreItem xmlns:ds="http://schemas.openxmlformats.org/officeDocument/2006/customXml" ds:itemID="{AB006AED-D3B6-450F-A436-759E490055A5}">
+  <ds:schemaRefs>
+    <ds:schemaRef ds:uri="http://schemas.microsoft.com/VisualStudio/2011/storyboarding/control/v1.0"/>
+  </ds:schemaRefs>
+</ds:datastoreItem>
+</file>
+
+<file path=customXml/itemProps62.xml><?xml version="1.0" encoding="utf-8"?>
+<ds:datastoreItem xmlns:ds="http://schemas.openxmlformats.org/officeDocument/2006/customXml" ds:itemID="{C1E8400F-CB83-4A16-AF3D-36FAF22BDD23}">
+  <ds:schemaRefs>
+    <ds:schemaRef ds:uri="http://schemas.microsoft.com/VisualStudio/2011/storyboarding/control/v1.0"/>
+  </ds:schemaRefs>
+</ds:datastoreItem>
+</file>
+
+<file path=customXml/itemProps63.xml><?xml version="1.0" encoding="utf-8"?>
+<ds:datastoreItem xmlns:ds="http://schemas.openxmlformats.org/officeDocument/2006/customXml" ds:itemID="{AAD6179F-00C3-44B7-9998-E9C87C4FA9EC}">
+  <ds:schemaRefs>
+    <ds:schemaRef ds:uri="http://schemas.microsoft.com/VisualStudio/2011/storyboarding/control"/>
+  </ds:schemaRefs>
+</ds:datastoreItem>
+</file>
+
+<file path=customXml/itemProps64.xml><?xml version="1.0" encoding="utf-8"?>
+<ds:datastoreItem xmlns:ds="http://schemas.openxmlformats.org/officeDocument/2006/customXml" ds:itemID="{699689A1-427B-4DEA-8FDB-0058CB4B38D8}">
+  <ds:schemaRefs>
+    <ds:schemaRef ds:uri="http://schemas.microsoft.com/VisualStudio/2011/storyboarding/control/v1.0"/>
+  </ds:schemaRefs>
+</ds:datastoreItem>
+</file>
+
+<file path=customXml/itemProps65.xml><?xml version="1.0" encoding="utf-8"?>
+<ds:datastoreItem xmlns:ds="http://schemas.openxmlformats.org/officeDocument/2006/customXml" ds:itemID="{A6ECB6E0-BD84-4681-8699-56A1B3F36A60}">
+  <ds:schemaRefs>
+    <ds:schemaRef ds:uri="http://schemas.microsoft.com/VisualStudio/2011/storyboarding/control"/>
+  </ds:schemaRefs>
+</ds:datastoreItem>
+</file>
+
+<file path=customXml/itemProps66.xml><?xml version="1.0" encoding="utf-8"?>
+<ds:datastoreItem xmlns:ds="http://schemas.openxmlformats.org/officeDocument/2006/customXml" ds:itemID="{16772130-8F5D-442B-AA11-39D4F229ACC6}">
+  <ds:schemaRefs>
+    <ds:schemaRef ds:uri="http://schemas.microsoft.com/VisualStudio/2011/storyboarding/control/v1.0"/>
+  </ds:schemaRefs>
+</ds:datastoreItem>
+</file>
+
+<file path=customXml/itemProps67.xml><?xml version="1.0" encoding="utf-8"?>
+<ds:datastoreItem xmlns:ds="http://schemas.openxmlformats.org/officeDocument/2006/customXml" ds:itemID="{C4783010-23AB-4BDC-BABF-F6576658A2B0}">
+  <ds:schemaRefs>
+    <ds:schemaRef ds:uri="http://schemas.microsoft.com/VisualStudio/2011/storyboarding/control/v1.0"/>
+  </ds:schemaRefs>
+</ds:datastoreItem>
+</file>
+
+<file path=customXml/itemProps68.xml><?xml version="1.0" encoding="utf-8"?>
+<ds:datastoreItem xmlns:ds="http://schemas.openxmlformats.org/officeDocument/2006/customXml" ds:itemID="{3ED2EF50-E36E-49D0-9F27-9EDAEC387091}">
+  <ds:schemaRefs>
+    <ds:schemaRef ds:uri="http://schemas.microsoft.com/VisualStudio/2011/storyboarding/control"/>
+  </ds:schemaRefs>
+</ds:datastoreItem>
+</file>
+
+<file path=customXml/itemProps69.xml><?xml version="1.0" encoding="utf-8"?>
+<ds:datastoreItem xmlns:ds="http://schemas.openxmlformats.org/officeDocument/2006/customXml" ds:itemID="{B4BE880E-F71A-4C21-A1C3-8A2437E3C677}">
+  <ds:schemaRefs>
+    <ds:schemaRef ds:uri="http://schemas.microsoft.com/VisualStudio/2011/storyboarding/control/v1.0"/>
+  </ds:schemaRefs>
+</ds:datastoreItem>
+</file>
+
+<file path=customXml/itemProps7.xml><?xml version="1.0" encoding="utf-8"?>
+<ds:datastoreItem xmlns:ds="http://schemas.openxmlformats.org/officeDocument/2006/customXml" ds:itemID="{574C0546-69B0-4850-A983-CDA8017CD4CE}">
+  <ds:schemaRefs>
+    <ds:schemaRef ds:uri="http://schemas.microsoft.com/VisualStudio/2011/storyboarding/control"/>
+  </ds:schemaRefs>
+</ds:datastoreItem>
+</file>
+
+<file path=customXml/itemProps70.xml><?xml version="1.0" encoding="utf-8"?>
+<ds:datastoreItem xmlns:ds="http://schemas.openxmlformats.org/officeDocument/2006/customXml" ds:itemID="{39536A02-E179-4A1C-9FA7-86EF40631969}">
+  <ds:schemaRefs>
+    <ds:schemaRef ds:uri="http://schemas.microsoft.com/VisualStudio/2011/storyboarding/control/v1.0"/>
+  </ds:schemaRefs>
+</ds:datastoreItem>
+</file>
+
+<file path=customXml/itemProps71.xml><?xml version="1.0" encoding="utf-8"?>
+<ds:datastoreItem xmlns:ds="http://schemas.openxmlformats.org/officeDocument/2006/customXml" ds:itemID="{63E54A0C-A919-4747-87DB-6EB5DB41F719}">
+  <ds:schemaRefs>
+    <ds:schemaRef ds:uri="http://schemas.microsoft.com/VisualStudio/2011/storyboarding/control/v1.0"/>
+  </ds:schemaRefs>
+</ds:datastoreItem>
+</file>
+
+<file path=customXml/itemProps72.xml><?xml version="1.0" encoding="utf-8"?>
+<ds:datastoreItem xmlns:ds="http://schemas.openxmlformats.org/officeDocument/2006/customXml" ds:itemID="{6574190A-3D9E-42C1-B276-38E33156AA99}">
+  <ds:schemaRefs>
+    <ds:schemaRef ds:uri="http://schemas.microsoft.com/VisualStudio/2011/storyboarding/control/v1.0"/>
+  </ds:schemaRefs>
+</ds:datastoreItem>
+</file>
+
+<file path=customXml/itemProps73.xml><?xml version="1.0" encoding="utf-8"?>
 <ds:datastoreItem xmlns:ds="http://schemas.openxmlformats.org/officeDocument/2006/customXml" ds:itemID="{A1B88D5F-41A7-488A-960C-6D819000899D}">
   <ds:schemaRefs>
     <ds:schemaRef ds:uri="http://schemas.microsoft.com/VisualStudio/2011/storyboarding/control/v1.0"/>
@@ -11403,23 +11744,135 @@
 </ds:datastoreItem>
 </file>
 
-<file path=customXml/itemProps32.xml><?xml version="1.0" encoding="utf-8"?>
-<ds:datastoreItem xmlns:ds="http://schemas.openxmlformats.org/officeDocument/2006/customXml" ds:itemID="{F782368F-0EE3-40FA-B682-80E11F49B65E}">
+<file path=customXml/itemProps74.xml><?xml version="1.0" encoding="utf-8"?>
+<ds:datastoreItem xmlns:ds="http://schemas.openxmlformats.org/officeDocument/2006/customXml" ds:itemID="{EDE713BE-A567-491C-902D-E6087D824056}">
+  <ds:schemaRefs>
+    <ds:schemaRef ds:uri="http://schemas.microsoft.com/VisualStudio/2011/storyboarding/control/v1.0"/>
+  </ds:schemaRefs>
+</ds:datastoreItem>
+</file>
+
+<file path=customXml/itemProps75.xml><?xml version="1.0" encoding="utf-8"?>
+<ds:datastoreItem xmlns:ds="http://schemas.openxmlformats.org/officeDocument/2006/customXml" ds:itemID="{9C57ED54-5F7A-476D-BFE2-C46C7230CC6B}">
+  <ds:schemaRefs>
+    <ds:schemaRef ds:uri="http://schemas.microsoft.com/VisualStudio/2011/storyboarding/control/v1.0"/>
+  </ds:schemaRefs>
+</ds:datastoreItem>
+</file>
+
+<file path=customXml/itemProps76.xml><?xml version="1.0" encoding="utf-8"?>
+<ds:datastoreItem xmlns:ds="http://schemas.openxmlformats.org/officeDocument/2006/customXml" ds:itemID="{AECE9E1B-E7C1-46F6-9945-164C1E49BE74}">
+  <ds:schemaRefs>
+    <ds:schemaRef ds:uri="http://schemas.microsoft.com/VisualStudio/2011/storyboarding/control/v1.0"/>
+  </ds:schemaRefs>
+</ds:datastoreItem>
+</file>
+
+<file path=customXml/itemProps77.xml><?xml version="1.0" encoding="utf-8"?>
+<ds:datastoreItem xmlns:ds="http://schemas.openxmlformats.org/officeDocument/2006/customXml" ds:itemID="{FD67FC06-DA15-486F-A046-DF7B79976F60}">
   <ds:schemaRefs>
     <ds:schemaRef ds:uri="http://schemas.microsoft.com/VisualStudio/2011/storyboarding/control"/>
   </ds:schemaRefs>
 </ds:datastoreItem>
 </file>
 
-<file path=customXml/itemProps33.xml><?xml version="1.0" encoding="utf-8"?>
-<ds:datastoreItem xmlns:ds="http://schemas.openxmlformats.org/officeDocument/2006/customXml" ds:itemID="{D8E0912A-795B-4916-9114-34B4F28A0EE3}">
+<file path=customXml/itemProps78.xml><?xml version="1.0" encoding="utf-8"?>
+<ds:datastoreItem xmlns:ds="http://schemas.openxmlformats.org/officeDocument/2006/customXml" ds:itemID="{036B989D-7053-42E0-85AB-8864B824736A}">
+  <ds:schemaRefs>
+    <ds:schemaRef ds:uri="http://schemas.microsoft.com/VisualStudio/2011/storyboarding/control"/>
+  </ds:schemaRefs>
+</ds:datastoreItem>
+</file>
+
+<file path=customXml/itemProps79.xml><?xml version="1.0" encoding="utf-8"?>
+<ds:datastoreItem xmlns:ds="http://schemas.openxmlformats.org/officeDocument/2006/customXml" ds:itemID="{E2968586-6EB5-4B3C-A2E1-82E35F695B75}">
   <ds:schemaRefs>
     <ds:schemaRef ds:uri="http://schemas.microsoft.com/VisualStudio/2011/storyboarding/control/v1.0"/>
   </ds:schemaRefs>
 </ds:datastoreItem>
 </file>
 
-<file path=customXml/itemProps34.xml><?xml version="1.0" encoding="utf-8"?>
+<file path=customXml/itemProps8.xml><?xml version="1.0" encoding="utf-8"?>
+<ds:datastoreItem xmlns:ds="http://schemas.openxmlformats.org/officeDocument/2006/customXml" ds:itemID="{70C23831-7801-40F8-9A53-4E9925562CBE}">
+  <ds:schemaRefs>
+    <ds:schemaRef ds:uri="http://schemas.microsoft.com/VisualStudio/2011/storyboarding/control"/>
+  </ds:schemaRefs>
+</ds:datastoreItem>
+</file>
+
+<file path=customXml/itemProps80.xml><?xml version="1.0" encoding="utf-8"?>
+<ds:datastoreItem xmlns:ds="http://schemas.openxmlformats.org/officeDocument/2006/customXml" ds:itemID="{18A6A270-A75C-4D7E-86E4-765FF07C5144}">
+  <ds:schemaRefs>
+    <ds:schemaRef ds:uri="http://schemas.microsoft.com/sharepoint/events"/>
+  </ds:schemaRefs>
+</ds:datastoreItem>
+</file>
+
+<file path=customXml/itemProps81.xml><?xml version="1.0" encoding="utf-8"?>
+<ds:datastoreItem xmlns:ds="http://schemas.openxmlformats.org/officeDocument/2006/customXml" ds:itemID="{387838C4-29F2-40AB-9647-8346D39956AB}">
+  <ds:schemaRefs>
+    <ds:schemaRef ds:uri="http://schemas.microsoft.com/VisualStudio/2011/storyboarding/control"/>
+  </ds:schemaRefs>
+</ds:datastoreItem>
+</file>
+
+<file path=customXml/itemProps82.xml><?xml version="1.0" encoding="utf-8"?>
+<ds:datastoreItem xmlns:ds="http://schemas.openxmlformats.org/officeDocument/2006/customXml" ds:itemID="{07B11A95-7731-4379-9E1B-32BC87FA2B56}">
+  <ds:schemaRefs>
+    <ds:schemaRef ds:uri="http://schemas.microsoft.com/VisualStudio/2011/storyboarding/control/v1.0"/>
+  </ds:schemaRefs>
+</ds:datastoreItem>
+</file>
+
+<file path=customXml/itemProps83.xml><?xml version="1.0" encoding="utf-8"?>
+<ds:datastoreItem xmlns:ds="http://schemas.openxmlformats.org/officeDocument/2006/customXml" ds:itemID="{E9C4CBB0-7D2F-42EC-9ED0-589327F3DDE1}">
+  <ds:schemaRefs>
+    <ds:schemaRef ds:uri="http://schemas.microsoft.com/VisualStudio/2011/storyboarding/control"/>
+  </ds:schemaRefs>
+</ds:datastoreItem>
+</file>
+
+<file path=customXml/itemProps84.xml><?xml version="1.0" encoding="utf-8"?>
+<ds:datastoreItem xmlns:ds="http://schemas.openxmlformats.org/officeDocument/2006/customXml" ds:itemID="{6B22741B-5AC6-4A2C-A57A-E4BDF22E0A90}">
+  <ds:schemaRefs>
+    <ds:schemaRef ds:uri="http://schemas.microsoft.com/VisualStudio/2011/storyboarding/control/v1.0"/>
+  </ds:schemaRefs>
+</ds:datastoreItem>
+</file>
+
+<file path=customXml/itemProps85.xml><?xml version="1.0" encoding="utf-8"?>
+<ds:datastoreItem xmlns:ds="http://schemas.openxmlformats.org/officeDocument/2006/customXml" ds:itemID="{3C6220BE-0F2A-49C6-BFB2-C458479F3F62}">
+  <ds:schemaRefs>
+    <ds:schemaRef ds:uri="http://schemas.microsoft.com/VisualStudio/2011/storyboarding/control/v1.0"/>
+  </ds:schemaRefs>
+</ds:datastoreItem>
+</file>
+
+<file path=customXml/itemProps86.xml><?xml version="1.0" encoding="utf-8"?>
+<ds:datastoreItem xmlns:ds="http://schemas.openxmlformats.org/officeDocument/2006/customXml" ds:itemID="{1325FCED-59E4-4A0E-AB40-72EC19C3A651}">
+  <ds:schemaRefs>
+    <ds:schemaRef ds:uri="http://schemas.microsoft.com/VisualStudio/2011/storyboarding/control"/>
+  </ds:schemaRefs>
+</ds:datastoreItem>
+</file>
+
+<file path=customXml/itemProps87.xml><?xml version="1.0" encoding="utf-8"?>
+<ds:datastoreItem xmlns:ds="http://schemas.openxmlformats.org/officeDocument/2006/customXml" ds:itemID="{DDEEC505-9111-44CE-9DED-8A454ABEC272}">
+  <ds:schemaRefs>
+    <ds:schemaRef ds:uri="http://schemas.microsoft.com/VisualStudio/2011/storyboarding/control/v1.0"/>
+  </ds:schemaRefs>
+</ds:datastoreItem>
+</file>
+
+<file path=customXml/itemProps88.xml><?xml version="1.0" encoding="utf-8"?>
+<ds:datastoreItem xmlns:ds="http://schemas.openxmlformats.org/officeDocument/2006/customXml" ds:itemID="{5A5E7016-2CE6-4389-89D1-05D5203E16D0}">
+  <ds:schemaRefs>
+    <ds:schemaRef ds:uri="http://schemas.microsoft.com/VisualStudio/2011/storyboarding/control"/>
+  </ds:schemaRefs>
+</ds:datastoreItem>
+</file>
+
+<file path=customXml/itemProps89.xml><?xml version="1.0" encoding="utf-8"?>
 <ds:datastoreItem xmlns:ds="http://schemas.openxmlformats.org/officeDocument/2006/customXml" ds:itemID="{20EE139D-44C7-4192-A8B7-E25390148E28}">
   <ds:schemaRefs>
     <ds:schemaRef ds:uri="http://schemas.microsoft.com/VisualStudio/2011/storyboarding/control/v1.0"/>
@@ -11427,143 +11880,15 @@
 </ds:datastoreItem>
 </file>
 
-<file path=customXml/itemProps35.xml><?xml version="1.0" encoding="utf-8"?>
-<ds:datastoreItem xmlns:ds="http://schemas.openxmlformats.org/officeDocument/2006/customXml" ds:itemID="{63E5DE85-F05E-4507-B223-806D8F49F058}">
+<file path=customXml/itemProps9.xml><?xml version="1.0" encoding="utf-8"?>
+<ds:datastoreItem xmlns:ds="http://schemas.openxmlformats.org/officeDocument/2006/customXml" ds:itemID="{7C4FADB9-82C5-46C4-AD0E-6B60B5C6AEAE}">
   <ds:schemaRefs>
     <ds:schemaRef ds:uri="http://schemas.microsoft.com/VisualStudio/2011/storyboarding/control/v1.0"/>
   </ds:schemaRefs>
 </ds:datastoreItem>
 </file>
 
-<file path=customXml/itemProps36.xml><?xml version="1.0" encoding="utf-8"?>
-<ds:datastoreItem xmlns:ds="http://schemas.openxmlformats.org/officeDocument/2006/customXml" ds:itemID="{B4BE880E-F71A-4C21-A1C3-8A2437E3C677}">
-  <ds:schemaRefs>
-    <ds:schemaRef ds:uri="http://schemas.microsoft.com/VisualStudio/2011/storyboarding/control/v1.0"/>
-  </ds:schemaRefs>
-</ds:datastoreItem>
-</file>
-
-<file path=customXml/itemProps37.xml><?xml version="1.0" encoding="utf-8"?>
-<ds:datastoreItem xmlns:ds="http://schemas.openxmlformats.org/officeDocument/2006/customXml" ds:itemID="{E4D924B8-E923-4751-87E1-B31AA64A9F7B}">
-  <ds:schemaRefs>
-    <ds:schemaRef ds:uri="http://schemas.microsoft.com/VisualStudio/2011/storyboarding/control/v1.0"/>
-  </ds:schemaRefs>
-</ds:datastoreItem>
-</file>
-
-<file path=customXml/itemProps38.xml><?xml version="1.0" encoding="utf-8"?>
-<ds:datastoreItem xmlns:ds="http://schemas.openxmlformats.org/officeDocument/2006/customXml" ds:itemID="{288CEDBF-3F9B-47CF-AF84-2B8486359159}">
-  <ds:schemaRefs>
-    <ds:schemaRef ds:uri="http://schemas.microsoft.com/VisualStudio/2011/storyboarding/control/v1.0"/>
-  </ds:schemaRefs>
-</ds:datastoreItem>
-</file>
-
-<file path=customXml/itemProps39.xml><?xml version="1.0" encoding="utf-8"?>
-<ds:datastoreItem xmlns:ds="http://schemas.openxmlformats.org/officeDocument/2006/customXml" ds:itemID="{5A5E7016-2CE6-4389-89D1-05D5203E16D0}">
-  <ds:schemaRefs>
-    <ds:schemaRef ds:uri="http://schemas.microsoft.com/VisualStudio/2011/storyboarding/control"/>
-  </ds:schemaRefs>
-</ds:datastoreItem>
-</file>
-
-<file path=customXml/itemProps4.xml><?xml version="1.0" encoding="utf-8"?>
-<ds:datastoreItem xmlns:ds="http://schemas.openxmlformats.org/officeDocument/2006/customXml" ds:itemID="{6B22741B-5AC6-4A2C-A57A-E4BDF22E0A90}">
-  <ds:schemaRefs>
-    <ds:schemaRef ds:uri="http://schemas.microsoft.com/VisualStudio/2011/storyboarding/control/v1.0"/>
-  </ds:schemaRefs>
-</ds:datastoreItem>
-</file>
-
-<file path=customXml/itemProps40.xml><?xml version="1.0" encoding="utf-8"?>
-<ds:datastoreItem xmlns:ds="http://schemas.openxmlformats.org/officeDocument/2006/customXml" ds:itemID="{12DDBF6F-C153-48C1-97C0-85AA34D18FD2}">
-  <ds:schemaRefs>
-    <ds:schemaRef ds:uri="http://schemas.microsoft.com/VisualStudio/2011/storyboarding/control"/>
-  </ds:schemaRefs>
-</ds:datastoreItem>
-</file>
-
-<file path=customXml/itemProps41.xml><?xml version="1.0" encoding="utf-8"?>
-<ds:datastoreItem xmlns:ds="http://schemas.openxmlformats.org/officeDocument/2006/customXml" ds:itemID="{D705ACE5-FAF8-44EC-9622-845721B4A44D}">
-  <ds:schemaRefs>
-    <ds:schemaRef ds:uri="http://schemas.microsoft.com/VisualStudio/2011/storyboarding/control/v1.0"/>
-  </ds:schemaRefs>
-</ds:datastoreItem>
-</file>
-
-<file path=customXml/itemProps42.xml><?xml version="1.0" encoding="utf-8"?>
-<ds:datastoreItem xmlns:ds="http://schemas.openxmlformats.org/officeDocument/2006/customXml" ds:itemID="{53BC856C-B486-437D-A7B4-612AE9417D7A}">
-  <ds:schemaRefs>
-    <ds:schemaRef ds:uri="http://schemas.microsoft.com/VisualStudio/2011/storyboarding/control/v1.0"/>
-  </ds:schemaRefs>
-</ds:datastoreItem>
-</file>
-
-<file path=customXml/itemProps43.xml><?xml version="1.0" encoding="utf-8"?>
-<ds:datastoreItem xmlns:ds="http://schemas.openxmlformats.org/officeDocument/2006/customXml" ds:itemID="{814432F2-7AE9-411E-9F7B-EBBF16C4666D}">
-  <ds:schemaRefs>
-    <ds:schemaRef ds:uri="http://schemas.microsoft.com/VisualStudio/2011/storyboarding/control/v1.0"/>
-  </ds:schemaRefs>
-</ds:datastoreItem>
-</file>
-
-<file path=customXml/itemProps44.xml><?xml version="1.0" encoding="utf-8"?>
-<ds:datastoreItem xmlns:ds="http://schemas.openxmlformats.org/officeDocument/2006/customXml" ds:itemID="{EDE713BE-A567-491C-902D-E6087D824056}">
-  <ds:schemaRefs>
-    <ds:schemaRef ds:uri="http://schemas.microsoft.com/VisualStudio/2011/storyboarding/control/v1.0"/>
-  </ds:schemaRefs>
-</ds:datastoreItem>
-</file>
-
-<file path=customXml/itemProps45.xml><?xml version="1.0" encoding="utf-8"?>
-<ds:datastoreItem xmlns:ds="http://schemas.openxmlformats.org/officeDocument/2006/customXml" ds:itemID="{AD9C1405-6371-400D-A0E2-389A1557BE20}">
-  <ds:schemaRefs>
-    <ds:schemaRef ds:uri="http://schemas.microsoft.com/VisualStudio/2011/storyboarding/control/v1.0"/>
-  </ds:schemaRefs>
-</ds:datastoreItem>
-</file>
-
-<file path=customXml/itemProps46.xml><?xml version="1.0" encoding="utf-8"?>
-<ds:datastoreItem xmlns:ds="http://schemas.openxmlformats.org/officeDocument/2006/customXml" ds:itemID="{029B11DB-B00D-4F9B-8DF3-D898C360902E}">
-  <ds:schemaRefs>
-    <ds:schemaRef ds:uri="http://schemas.microsoft.com/VisualStudio/2011/storyboarding/control"/>
-  </ds:schemaRefs>
-</ds:datastoreItem>
-</file>
-
-<file path=customXml/itemProps47.xml><?xml version="1.0" encoding="utf-8"?>
-<ds:datastoreItem xmlns:ds="http://schemas.openxmlformats.org/officeDocument/2006/customXml" ds:itemID="{D834D1AF-A33E-4664-8718-80F7137D9192}">
-  <ds:schemaRefs>
-    <ds:schemaRef ds:uri="http://schemas.microsoft.com/VisualStudio/2011/storyboarding/control"/>
-  </ds:schemaRefs>
-</ds:datastoreItem>
-</file>
-
-<file path=customXml/itemProps48.xml><?xml version="1.0" encoding="utf-8"?>
-<ds:datastoreItem xmlns:ds="http://schemas.openxmlformats.org/officeDocument/2006/customXml" ds:itemID="{A84BE01C-E91B-4A90-8E7F-25887EF8E061}">
-  <ds:schemaRefs>
-    <ds:schemaRef ds:uri="http://schemas.microsoft.com/VisualStudio/2011/storyboarding/control/v1.0"/>
-  </ds:schemaRefs>
-</ds:datastoreItem>
-</file>
-
-<file path=customXml/itemProps49.xml><?xml version="1.0" encoding="utf-8"?>
-<ds:datastoreItem xmlns:ds="http://schemas.openxmlformats.org/officeDocument/2006/customXml" ds:itemID="{39536A02-E179-4A1C-9FA7-86EF40631969}">
-  <ds:schemaRefs>
-    <ds:schemaRef ds:uri="http://schemas.microsoft.com/VisualStudio/2011/storyboarding/control/v1.0"/>
-  </ds:schemaRefs>
-</ds:datastoreItem>
-</file>
-
-<file path=customXml/itemProps5.xml><?xml version="1.0" encoding="utf-8"?>
-<ds:datastoreItem xmlns:ds="http://schemas.openxmlformats.org/officeDocument/2006/customXml" ds:itemID="{09A94271-A29B-4164-A32F-3A755C9B59FC}">
-  <ds:schemaRefs>
-    <ds:schemaRef ds:uri="http://schemas.microsoft.com/VisualStudio/2011/storyboarding/control"/>
-  </ds:schemaRefs>
-</ds:datastoreItem>
-</file>
-
-<file path=customXml/itemProps50.xml><?xml version="1.0" encoding="utf-8"?>
+<file path=customXml/itemProps90.xml><?xml version="1.0" encoding="utf-8"?>
 <ds:datastoreItem xmlns:ds="http://schemas.openxmlformats.org/officeDocument/2006/customXml" ds:itemID="{5423C7C4-EE26-4ED2-9F11-C9ABAA081BA5}">
   <ds:schemaRefs>
     <ds:schemaRef ds:uri="http://schemas.microsoft.com/VisualStudio/2011/storyboarding/control/v1.0"/>
@@ -11571,39 +11896,7 @@
 </ds:datastoreItem>
 </file>
 
-<file path=customXml/itemProps51.xml><?xml version="1.0" encoding="utf-8"?>
-<ds:datastoreItem xmlns:ds="http://schemas.openxmlformats.org/officeDocument/2006/customXml" ds:itemID="{B571350C-23C3-4B5A-8F49-FBEB6CF22964}">
-  <ds:schemaRefs>
-    <ds:schemaRef ds:uri="http://schemas.microsoft.com/VisualStudio/2011/storyboarding/control/v1.0"/>
-  </ds:schemaRefs>
-</ds:datastoreItem>
-</file>
-
-<file path=customXml/itemProps52.xml><?xml version="1.0" encoding="utf-8"?>
-<ds:datastoreItem xmlns:ds="http://schemas.openxmlformats.org/officeDocument/2006/customXml" ds:itemID="{9C57ED54-5F7A-476D-BFE2-C46C7230CC6B}">
-  <ds:schemaRefs>
-    <ds:schemaRef ds:uri="http://schemas.microsoft.com/VisualStudio/2011/storyboarding/control/v1.0"/>
-  </ds:schemaRefs>
-</ds:datastoreItem>
-</file>
-
-<file path=customXml/itemProps53.xml><?xml version="1.0" encoding="utf-8"?>
-<ds:datastoreItem xmlns:ds="http://schemas.openxmlformats.org/officeDocument/2006/customXml" ds:itemID="{B7BD4F34-B154-4D92-BE87-C557EB1B7EFB}">
-  <ds:schemaRefs>
-    <ds:schemaRef ds:uri="http://schemas.microsoft.com/sharepoint/v3/contenttype/forms"/>
-  </ds:schemaRefs>
-</ds:datastoreItem>
-</file>
-
-<file path=customXml/itemProps54.xml><?xml version="1.0" encoding="utf-8"?>
-<ds:datastoreItem xmlns:ds="http://schemas.openxmlformats.org/officeDocument/2006/customXml" ds:itemID="{4CFA599C-9F1C-4AB4-AB4F-10CF77B58F79}">
-  <ds:schemaRefs>
-    <ds:schemaRef ds:uri="http://schemas.microsoft.com/VisualStudio/2011/storyboarding/control/v1.0"/>
-  </ds:schemaRefs>
-</ds:datastoreItem>
-</file>
-
-<file path=customXml/itemProps55.xml><?xml version="1.0" encoding="utf-8"?>
+<file path=customXml/itemProps91.xml><?xml version="1.0" encoding="utf-8"?>
 <ds:datastoreItem xmlns:ds="http://schemas.openxmlformats.org/officeDocument/2006/customXml" ds:itemID="{E2EFB470-892C-4F70-98FA-B53F970592A9}">
   <ds:schemaRefs>
     <ds:schemaRef ds:uri="http://schemas.microsoft.com/VisualStudio/2011/storyboarding/control"/>
@@ -11611,183 +11904,7 @@
 </ds:datastoreItem>
 </file>
 
-<file path=customXml/itemProps56.xml><?xml version="1.0" encoding="utf-8"?>
-<ds:datastoreItem xmlns:ds="http://schemas.openxmlformats.org/officeDocument/2006/customXml" ds:itemID="{F395D8ED-A0D3-4F6E-91F3-A29EC16A8083}">
-  <ds:schemaRefs>
-    <ds:schemaRef ds:uri="http://schemas.microsoft.com/VisualStudio/2011/storyboarding/control/v1.0"/>
-  </ds:schemaRefs>
-</ds:datastoreItem>
-</file>
-
-<file path=customXml/itemProps57.xml><?xml version="1.0" encoding="utf-8"?>
-<ds:datastoreItem xmlns:ds="http://schemas.openxmlformats.org/officeDocument/2006/customXml" ds:itemID="{63E54A0C-A919-4747-87DB-6EB5DB41F719}">
-  <ds:schemaRefs>
-    <ds:schemaRef ds:uri="http://schemas.microsoft.com/VisualStudio/2011/storyboarding/control/v1.0"/>
-  </ds:schemaRefs>
-</ds:datastoreItem>
-</file>
-
-<file path=customXml/itemProps58.xml><?xml version="1.0" encoding="utf-8"?>
-<ds:datastoreItem xmlns:ds="http://schemas.openxmlformats.org/officeDocument/2006/customXml" ds:itemID="{A6E144E0-D919-4B3D-A3BD-4F079B739AC2}">
-  <ds:schemaRefs>
-    <ds:schemaRef ds:uri="http://schemas.microsoft.com/VisualStudio/2011/storyboarding/control"/>
-  </ds:schemaRefs>
-</ds:datastoreItem>
-</file>
-
-<file path=customXml/itemProps59.xml><?xml version="1.0" encoding="utf-8"?>
-<ds:datastoreItem xmlns:ds="http://schemas.openxmlformats.org/officeDocument/2006/customXml" ds:itemID="{CC419530-796D-4DBE-BBEE-9A6630A896E1}">
-  <ds:schemaRefs>
-    <ds:schemaRef ds:uri="http://schemas.microsoft.com/VisualStudio/2011/storyboarding/control/v1.0"/>
-  </ds:schemaRefs>
-</ds:datastoreItem>
-</file>
-
-<file path=customXml/itemProps6.xml><?xml version="1.0" encoding="utf-8"?>
-<ds:datastoreItem xmlns:ds="http://schemas.openxmlformats.org/officeDocument/2006/customXml" ds:itemID="{A6ECB6E0-BD84-4681-8699-56A1B3F36A60}">
-  <ds:schemaRefs>
-    <ds:schemaRef ds:uri="http://schemas.microsoft.com/VisualStudio/2011/storyboarding/control"/>
-  </ds:schemaRefs>
-</ds:datastoreItem>
-</file>
-
-<file path=customXml/itemProps60.xml><?xml version="1.0" encoding="utf-8"?>
-<ds:datastoreItem xmlns:ds="http://schemas.openxmlformats.org/officeDocument/2006/customXml" ds:itemID="{AECE9E1B-E7C1-46F6-9945-164C1E49BE74}">
-  <ds:schemaRefs>
-    <ds:schemaRef ds:uri="http://schemas.microsoft.com/VisualStudio/2011/storyboarding/control/v1.0"/>
-  </ds:schemaRefs>
-</ds:datastoreItem>
-</file>
-
-<file path=customXml/itemProps61.xml><?xml version="1.0" encoding="utf-8"?>
-<ds:datastoreItem xmlns:ds="http://schemas.openxmlformats.org/officeDocument/2006/customXml" ds:itemID="{253B000D-0B23-420C-B5B5-11B6002E5391}">
-  <ds:schemaRefs>
-    <ds:schemaRef ds:uri="http://schemas.microsoft.com/VisualStudio/2011/storyboarding/control/v1.0"/>
-  </ds:schemaRefs>
-</ds:datastoreItem>
-</file>
-
-<file path=customXml/itemProps62.xml><?xml version="1.0" encoding="utf-8"?>
-<ds:datastoreItem xmlns:ds="http://schemas.openxmlformats.org/officeDocument/2006/customXml" ds:itemID="{C40E64A7-7702-4466-95BD-ABEC09272CCB}">
-  <ds:schemaRefs>
-    <ds:schemaRef ds:uri="http://schemas.microsoft.com/VisualStudio/2011/storyboarding/control"/>
-  </ds:schemaRefs>
-</ds:datastoreItem>
-</file>
-
-<file path=customXml/itemProps63.xml><?xml version="1.0" encoding="utf-8"?>
-<ds:datastoreItem xmlns:ds="http://schemas.openxmlformats.org/officeDocument/2006/customXml" ds:itemID="{1A853509-4993-44ED-BDEC-FF20A239A251}">
-  <ds:schemaRefs>
-    <ds:schemaRef ds:uri="http://schemas.microsoft.com/VisualStudio/2011/storyboarding/control"/>
-  </ds:schemaRefs>
-</ds:datastoreItem>
-</file>
-
-<file path=customXml/itemProps64.xml><?xml version="1.0" encoding="utf-8"?>
-<ds:datastoreItem xmlns:ds="http://schemas.openxmlformats.org/officeDocument/2006/customXml" ds:itemID="{68AAD069-500F-4F2F-A35D-83216001A8DC}">
-  <ds:schemaRefs>
-    <ds:schemaRef ds:uri="http://schemas.microsoft.com/VisualStudio/2011/storyboarding/control"/>
-  </ds:schemaRefs>
-</ds:datastoreItem>
-</file>
-
-<file path=customXml/itemProps65.xml><?xml version="1.0" encoding="utf-8"?>
-<ds:datastoreItem xmlns:ds="http://schemas.openxmlformats.org/officeDocument/2006/customXml" ds:itemID="{FD67FC06-DA15-486F-A046-DF7B79976F60}">
-  <ds:schemaRefs>
-    <ds:schemaRef ds:uri="http://schemas.microsoft.com/VisualStudio/2011/storyboarding/control"/>
-  </ds:schemaRefs>
-</ds:datastoreItem>
-</file>
-
-<file path=customXml/itemProps66.xml><?xml version="1.0" encoding="utf-8"?>
-<ds:datastoreItem xmlns:ds="http://schemas.openxmlformats.org/officeDocument/2006/customXml" ds:itemID="{08904217-40E1-4558-95D8-8D709CA82866}">
-  <ds:schemaRefs>
-    <ds:schemaRef ds:uri="http://schemas.microsoft.com/VisualStudio/2011/storyboarding/control/v1.0"/>
-  </ds:schemaRefs>
-</ds:datastoreItem>
-</file>
-
-<file path=customXml/itemProps67.xml><?xml version="1.0" encoding="utf-8"?>
-<ds:datastoreItem xmlns:ds="http://schemas.openxmlformats.org/officeDocument/2006/customXml" ds:itemID="{19CB1DF2-8822-4520-A56A-045D340F0C71}">
-  <ds:schemaRefs>
-    <ds:schemaRef ds:uri="http://schemas.microsoft.com/VisualStudio/2011/storyboarding/control/v1.0"/>
-  </ds:schemaRefs>
-</ds:datastoreItem>
-</file>
-
-<file path=customXml/itemProps68.xml><?xml version="1.0" encoding="utf-8"?>
-<ds:datastoreItem xmlns:ds="http://schemas.openxmlformats.org/officeDocument/2006/customXml" ds:itemID="{2C0B842B-A6BD-4438-89CC-C23BD0A85ECD}">
-  <ds:schemaRefs>
-    <ds:schemaRef ds:uri="http://schemas.microsoft.com/VisualStudio/2011/storyboarding/control"/>
-  </ds:schemaRefs>
-</ds:datastoreItem>
-</file>
-
-<file path=customXml/itemProps69.xml><?xml version="1.0" encoding="utf-8"?>
-<ds:datastoreItem xmlns:ds="http://schemas.openxmlformats.org/officeDocument/2006/customXml" ds:itemID="{156ACD54-663F-4146-A83C-D39B7758E090}">
-  <ds:schemaRefs>
-    <ds:schemaRef ds:uri="http://schemas.microsoft.com/VisualStudio/2011/storyboarding/control/v1.0"/>
-  </ds:schemaRefs>
-</ds:datastoreItem>
-</file>
-
-<file path=customXml/itemProps7.xml><?xml version="1.0" encoding="utf-8"?>
-<ds:datastoreItem xmlns:ds="http://schemas.openxmlformats.org/officeDocument/2006/customXml" ds:itemID="{188F6680-9EB8-4B03-8D3B-773D66FC777A}">
-  <ds:schemaRefs>
-    <ds:schemaRef ds:uri="http://schemas.microsoft.com/VisualStudio/2011/storyboarding/control/v1.0"/>
-  </ds:schemaRefs>
-</ds:datastoreItem>
-</file>
-
-<file path=customXml/itemProps70.xml><?xml version="1.0" encoding="utf-8"?>
-<ds:datastoreItem xmlns:ds="http://schemas.openxmlformats.org/officeDocument/2006/customXml" ds:itemID="{AA5E4F96-8C72-44F9-A0C5-FB007B246D91}">
-  <ds:schemaRefs>
-    <ds:schemaRef ds:uri="http://schemas.microsoft.com/VisualStudio/2011/storyboarding/control/v1.0"/>
-  </ds:schemaRefs>
-</ds:datastoreItem>
-</file>
-
-<file path=customXml/itemProps71.xml><?xml version="1.0" encoding="utf-8"?>
-<ds:datastoreItem xmlns:ds="http://schemas.openxmlformats.org/officeDocument/2006/customXml" ds:itemID="{CA0F2729-8F0E-4601-8BBB-5DF84EDFD3EB}">
-  <ds:schemaRefs>
-    <ds:schemaRef ds:uri="http://schemas.microsoft.com/VisualStudio/2011/storyboarding/control"/>
-  </ds:schemaRefs>
-</ds:datastoreItem>
-</file>
-
-<file path=customXml/itemProps72.xml><?xml version="1.0" encoding="utf-8"?>
-<ds:datastoreItem xmlns:ds="http://schemas.openxmlformats.org/officeDocument/2006/customXml" ds:itemID="{BE267193-C1D2-4298-824E-E6BE5E6C1D22}">
-  <ds:schemaRefs>
-    <ds:schemaRef ds:uri="http://schemas.microsoft.com/VisualStudio/2011/storyboarding/control"/>
-  </ds:schemaRefs>
-</ds:datastoreItem>
-</file>
-
-<file path=customXml/itemProps73.xml><?xml version="1.0" encoding="utf-8"?>
-<ds:datastoreItem xmlns:ds="http://schemas.openxmlformats.org/officeDocument/2006/customXml" ds:itemID="{036B989D-7053-42E0-85AB-8864B824736A}">
-  <ds:schemaRefs>
-    <ds:schemaRef ds:uri="http://schemas.microsoft.com/VisualStudio/2011/storyboarding/control"/>
-  </ds:schemaRefs>
-</ds:datastoreItem>
-</file>
-
-<file path=customXml/itemProps74.xml><?xml version="1.0" encoding="utf-8"?>
-<ds:datastoreItem xmlns:ds="http://schemas.openxmlformats.org/officeDocument/2006/customXml" ds:itemID="{AE0CE2A3-FF32-4259-A452-A173604DCF0C}">
-  <ds:schemaRefs>
-    <ds:schemaRef ds:uri="http://schemas.microsoft.com/VisualStudio/2011/storyboarding/control"/>
-  </ds:schemaRefs>
-</ds:datastoreItem>
-</file>
-
-<file path=customXml/itemProps75.xml><?xml version="1.0" encoding="utf-8"?>
-<ds:datastoreItem xmlns:ds="http://schemas.openxmlformats.org/officeDocument/2006/customXml" ds:itemID="{4BCB20A2-9850-49DA-9BD6-A5D2B0ABF72F}">
-  <ds:schemaRefs>
-    <ds:schemaRef ds:uri="http://schemas.microsoft.com/VisualStudio/2011/storyboarding/control/v1.0"/>
-  </ds:schemaRefs>
-</ds:datastoreItem>
-</file>
-
-<file path=customXml/itemProps76.xml><?xml version="1.0" encoding="utf-8"?>
+<file path=customXml/itemProps92.xml><?xml version="1.0" encoding="utf-8"?>
 <ds:datastoreItem xmlns:ds="http://schemas.openxmlformats.org/officeDocument/2006/customXml" ds:itemID="{CB953D38-E965-4BB2-94FE-DF647E85A654}">
   <ds:schemaRefs>
     <ds:schemaRef ds:uri="http://schemas.microsoft.com/VisualStudio/2011/storyboarding/control/v1.0"/>
@@ -11795,183 +11912,7 @@
 </ds:datastoreItem>
 </file>
 
-<file path=customXml/itemProps77.xml><?xml version="1.0" encoding="utf-8"?>
-<ds:datastoreItem xmlns:ds="http://schemas.openxmlformats.org/officeDocument/2006/customXml" ds:itemID="{1C7B3C9E-48C2-496C-AAF2-5C37AB663973}">
-  <ds:schemaRefs>
-    <ds:schemaRef ds:uri="http://schemas.microsoft.com/VisualStudio/2011/storyboarding/control"/>
-  </ds:schemaRefs>
-</ds:datastoreItem>
-</file>
-
-<file path=customXml/itemProps78.xml><?xml version="1.0" encoding="utf-8"?>
-<ds:datastoreItem xmlns:ds="http://schemas.openxmlformats.org/officeDocument/2006/customXml" ds:itemID="{E2968586-6EB5-4B3C-A2E1-82E35F695B75}">
-  <ds:schemaRefs>
-    <ds:schemaRef ds:uri="http://schemas.microsoft.com/VisualStudio/2011/storyboarding/control/v1.0"/>
-  </ds:schemaRefs>
-</ds:datastoreItem>
-</file>
-
-<file path=customXml/itemProps79.xml><?xml version="1.0" encoding="utf-8"?>
-<ds:datastoreItem xmlns:ds="http://schemas.openxmlformats.org/officeDocument/2006/customXml" ds:itemID="{9C4C7B07-3AE3-46A1-A54D-2BDFAB93A8EF}">
-  <ds:schemaRefs>
-    <ds:schemaRef ds:uri="http://schemas.microsoft.com/VisualStudio/2011/storyboarding/control/v1.0"/>
-  </ds:schemaRefs>
-</ds:datastoreItem>
-</file>
-
-<file path=customXml/itemProps8.xml><?xml version="1.0" encoding="utf-8"?>
-<ds:datastoreItem xmlns:ds="http://schemas.openxmlformats.org/officeDocument/2006/customXml" ds:itemID="{2E901D8B-281C-4847-BEC4-E1DAD11CFF00}">
-  <ds:schemaRefs>
-    <ds:schemaRef ds:uri="http://schemas.microsoft.com/VisualStudio/2011/storyboarding/control"/>
-  </ds:schemaRefs>
-</ds:datastoreItem>
-</file>
-
-<file path=customXml/itemProps80.xml><?xml version="1.0" encoding="utf-8"?>
-<ds:datastoreItem xmlns:ds="http://schemas.openxmlformats.org/officeDocument/2006/customXml" ds:itemID="{359B13B5-DE77-48C2-859A-70355A1B9D90}">
-  <ds:schemaRefs>
-    <ds:schemaRef ds:uri="http://schemas.microsoft.com/VisualStudio/2011/storyboarding/control/v1.0"/>
-  </ds:schemaRefs>
-</ds:datastoreItem>
-</file>
-
-<file path=customXml/itemProps81.xml><?xml version="1.0" encoding="utf-8"?>
-<ds:datastoreItem xmlns:ds="http://schemas.openxmlformats.org/officeDocument/2006/customXml" ds:itemID="{18A6A270-A75C-4D7E-86E4-765FF07C5144}">
-  <ds:schemaRefs>
-    <ds:schemaRef ds:uri="http://schemas.microsoft.com/sharepoint/events"/>
-  </ds:schemaRefs>
-</ds:datastoreItem>
-</file>
-
-<file path=customXml/itemProps82.xml><?xml version="1.0" encoding="utf-8"?>
-<ds:datastoreItem xmlns:ds="http://schemas.openxmlformats.org/officeDocument/2006/customXml" ds:itemID="{2B6243A2-99B5-42ED-B049-93E27D774527}">
-  <ds:schemaRefs>
-    <ds:schemaRef ds:uri="http://schemas.microsoft.com/VisualStudio/2011/storyboarding/control/v1.0"/>
-  </ds:schemaRefs>
-</ds:datastoreItem>
-</file>
-
-<file path=customXml/itemProps83.xml><?xml version="1.0" encoding="utf-8"?>
-<ds:datastoreItem xmlns:ds="http://schemas.openxmlformats.org/officeDocument/2006/customXml" ds:itemID="{6772C88A-36A0-4EAC-86A3-BB16EEADAB3E}">
-  <ds:schemaRefs>
-    <ds:schemaRef ds:uri="http://schemas.microsoft.com/VisualStudio/2011/storyboarding/control/v1.0"/>
-  </ds:schemaRefs>
-</ds:datastoreItem>
-</file>
-
-<file path=customXml/itemProps84.xml><?xml version="1.0" encoding="utf-8"?>
-<ds:datastoreItem xmlns:ds="http://schemas.openxmlformats.org/officeDocument/2006/customXml" ds:itemID="{A2DAA52B-5F52-4A8E-B601-7BF162CD738F}">
-  <ds:schemaRefs>
-    <ds:schemaRef ds:uri="http://schemas.microsoft.com/VisualStudio/2011/storyboarding/control/v1.0"/>
-  </ds:schemaRefs>
-</ds:datastoreItem>
-</file>
-
-<file path=customXml/itemProps85.xml><?xml version="1.0" encoding="utf-8"?>
-<ds:datastoreItem xmlns:ds="http://schemas.openxmlformats.org/officeDocument/2006/customXml" ds:itemID="{1AF31726-A62F-4331-8622-ED351D5149B7}">
-  <ds:schemaRefs>
-    <ds:schemaRef ds:uri="http://schemas.microsoft.com/VisualStudio/2011/storyboarding/control"/>
-  </ds:schemaRefs>
-</ds:datastoreItem>
-</file>
-
-<file path=customXml/itemProps86.xml><?xml version="1.0" encoding="utf-8"?>
-<ds:datastoreItem xmlns:ds="http://schemas.openxmlformats.org/officeDocument/2006/customXml" ds:itemID="{387838C4-29F2-40AB-9647-8346D39956AB}">
-  <ds:schemaRefs>
-    <ds:schemaRef ds:uri="http://schemas.microsoft.com/VisualStudio/2011/storyboarding/control"/>
-  </ds:schemaRefs>
-</ds:datastoreItem>
-</file>
-
-<file path=customXml/itemProps87.xml><?xml version="1.0" encoding="utf-8"?>
-<ds:datastoreItem xmlns:ds="http://schemas.openxmlformats.org/officeDocument/2006/customXml" ds:itemID="{B2C9D19C-4878-43E0-A5AD-CB76AB49D960}">
-  <ds:schemaRefs>
-    <ds:schemaRef ds:uri="http://schemas.microsoft.com/VisualStudio/2011/storyboarding/control/v1.0"/>
-  </ds:schemaRefs>
-</ds:datastoreItem>
-</file>
-
-<file path=customXml/itemProps88.xml><?xml version="1.0" encoding="utf-8"?>
-<ds:datastoreItem xmlns:ds="http://schemas.openxmlformats.org/officeDocument/2006/customXml" ds:itemID="{AB006AED-D3B6-450F-A436-759E490055A5}">
-  <ds:schemaRefs>
-    <ds:schemaRef ds:uri="http://schemas.microsoft.com/VisualStudio/2011/storyboarding/control/v1.0"/>
-  </ds:schemaRefs>
-</ds:datastoreItem>
-</file>
-
-<file path=customXml/itemProps89.xml><?xml version="1.0" encoding="utf-8"?>
-<ds:datastoreItem xmlns:ds="http://schemas.openxmlformats.org/officeDocument/2006/customXml" ds:itemID="{574C0546-69B0-4850-A983-CDA8017CD4CE}">
-  <ds:schemaRefs>
-    <ds:schemaRef ds:uri="http://schemas.microsoft.com/VisualStudio/2011/storyboarding/control"/>
-  </ds:schemaRefs>
-</ds:datastoreItem>
-</file>
-
-<file path=customXml/itemProps9.xml><?xml version="1.0" encoding="utf-8"?>
-<ds:datastoreItem xmlns:ds="http://schemas.openxmlformats.org/officeDocument/2006/customXml" ds:itemID="{3C6220BE-0F2A-49C6-BFB2-C458479F3F62}">
-  <ds:schemaRefs>
-    <ds:schemaRef ds:uri="http://schemas.microsoft.com/VisualStudio/2011/storyboarding/control/v1.0"/>
-  </ds:schemaRefs>
-</ds:datastoreItem>
-</file>
-
-<file path=customXml/itemProps90.xml><?xml version="1.0" encoding="utf-8"?>
-<ds:datastoreItem xmlns:ds="http://schemas.openxmlformats.org/officeDocument/2006/customXml" ds:itemID="{D356E6DB-54C9-4389-B932-0F583366BD4B}">
-  <ds:schemaRefs>
-    <ds:schemaRef ds:uri="http://schemas.microsoft.com/VisualStudio/2011/storyboarding/control/v1.0"/>
-  </ds:schemaRefs>
-</ds:datastoreItem>
-</file>
-
-<file path=customXml/itemProps91.xml><?xml version="1.0" encoding="utf-8"?>
-<ds:datastoreItem xmlns:ds="http://schemas.openxmlformats.org/officeDocument/2006/customXml" ds:itemID="{C1E8400F-CB83-4A16-AF3D-36FAF22BDD23}">
-  <ds:schemaRefs>
-    <ds:schemaRef ds:uri="http://schemas.microsoft.com/VisualStudio/2011/storyboarding/control/v1.0"/>
-  </ds:schemaRefs>
-</ds:datastoreItem>
-</file>
-
-<file path=customXml/itemProps92.xml><?xml version="1.0" encoding="utf-8"?>
-<ds:datastoreItem xmlns:ds="http://schemas.openxmlformats.org/officeDocument/2006/customXml" ds:itemID="{E6C688DD-065A-4726-BCE5-E5AFDA3F5641}">
-  <ds:schemaRefs>
-    <ds:schemaRef ds:uri="http://schemas.microsoft.com/VisualStudio/2011/storyboarding/control/v1.0"/>
-  </ds:schemaRefs>
-</ds:datastoreItem>
-</file>
-
 <file path=customXml/itemProps93.xml><?xml version="1.0" encoding="utf-8"?>
-<ds:datastoreItem xmlns:ds="http://schemas.openxmlformats.org/officeDocument/2006/customXml" ds:itemID="{BA2C55E9-BDE8-41FC-B02F-EBA8C07A01F8}">
-  <ds:schemaRefs>
-    <ds:schemaRef ds:uri="http://schemas.microsoft.com/VisualStudio/2011/storyboarding/control/v1.0"/>
-  </ds:schemaRefs>
-</ds:datastoreItem>
-</file>
-
-<file path=customXml/itemProps94.xml><?xml version="1.0" encoding="utf-8"?>
-<ds:datastoreItem xmlns:ds="http://schemas.openxmlformats.org/officeDocument/2006/customXml" ds:itemID="{07B11A95-7731-4379-9E1B-32BC87FA2B56}">
-  <ds:schemaRefs>
-    <ds:schemaRef ds:uri="http://schemas.microsoft.com/VisualStudio/2011/storyboarding/control/v1.0"/>
-  </ds:schemaRefs>
-</ds:datastoreItem>
-</file>
-
-<file path=customXml/itemProps95.xml><?xml version="1.0" encoding="utf-8"?>
-<ds:datastoreItem xmlns:ds="http://schemas.openxmlformats.org/officeDocument/2006/customXml" ds:itemID="{416D00B5-FBFE-483F-BE84-520287240459}">
-  <ds:schemaRefs>
-    <ds:schemaRef ds:uri="http://schemas.microsoft.com/VisualStudio/2011/storyboarding/control/v1.0"/>
-  </ds:schemaRefs>
-</ds:datastoreItem>
-</file>
-
-<file path=customXml/itemProps96.xml><?xml version="1.0" encoding="utf-8"?>
-<ds:datastoreItem xmlns:ds="http://schemas.openxmlformats.org/officeDocument/2006/customXml" ds:itemID="{AAD6179F-00C3-44B7-9998-E9C87C4FA9EC}">
-  <ds:schemaRefs>
-    <ds:schemaRef ds:uri="http://schemas.microsoft.com/VisualStudio/2011/storyboarding/control"/>
-  </ds:schemaRefs>
-</ds:datastoreItem>
-</file>
-
-<file path=customXml/itemProps97.xml><?xml version="1.0" encoding="utf-8"?>
 <ds:datastoreItem xmlns:ds="http://schemas.openxmlformats.org/officeDocument/2006/customXml" ds:itemID="{2FEB3A16-E640-4049-92BF-229BF3B54149}">
   <ds:schemaRefs>
     <ds:schemaRef ds:uri="http://schemas.microsoft.com/office/2006/metadata/contentType"/>
@@ -11989,18 +11930,50 @@
 </ds:datastoreItem>
 </file>
 
-<file path=customXml/itemProps98.xml><?xml version="1.0" encoding="utf-8"?>
-<ds:datastoreItem xmlns:ds="http://schemas.openxmlformats.org/officeDocument/2006/customXml" ds:itemID="{5E2E8CE4-298D-499A-B8B4-4A593AC844A5}">
+<file path=customXml/itemProps94.xml><?xml version="1.0" encoding="utf-8"?>
+<ds:datastoreItem xmlns:ds="http://schemas.openxmlformats.org/officeDocument/2006/customXml" ds:itemID="{188F6680-9EB8-4B03-8D3B-773D66FC777A}">
   <ds:schemaRefs>
     <ds:schemaRef ds:uri="http://schemas.microsoft.com/VisualStudio/2011/storyboarding/control/v1.0"/>
   </ds:schemaRefs>
 </ds:datastoreItem>
 </file>
 
-<file path=customXml/itemProps99.xml><?xml version="1.0" encoding="utf-8"?>
-<ds:datastoreItem xmlns:ds="http://schemas.openxmlformats.org/officeDocument/2006/customXml" ds:itemID="{E9C4CBB0-7D2F-42EC-9ED0-589327F3DDE1}">
+<file path=customXml/itemProps95.xml><?xml version="1.0" encoding="utf-8"?>
+<ds:datastoreItem xmlns:ds="http://schemas.openxmlformats.org/officeDocument/2006/customXml" ds:itemID="{CA0F2729-8F0E-4601-8BBB-5DF84EDFD3EB}">
   <ds:schemaRefs>
     <ds:schemaRef ds:uri="http://schemas.microsoft.com/VisualStudio/2011/storyboarding/control"/>
   </ds:schemaRefs>
 </ds:datastoreItem>
+</file>
+
+<file path=customXml/itemProps96.xml><?xml version="1.0" encoding="utf-8"?>
+<ds:datastoreItem xmlns:ds="http://schemas.openxmlformats.org/officeDocument/2006/customXml" ds:itemID="{E6C688DD-065A-4726-BCE5-E5AFDA3F5641}">
+  <ds:schemaRefs>
+    <ds:schemaRef ds:uri="http://schemas.microsoft.com/VisualStudio/2011/storyboarding/control/v1.0"/>
+  </ds:schemaRefs>
+</ds:datastoreItem>
+</file>
+
+<file path=customXml/itemProps97.xml><?xml version="1.0" encoding="utf-8"?>
+<ds:datastoreItem xmlns:ds="http://schemas.openxmlformats.org/officeDocument/2006/customXml" ds:itemID="{F7F9CBAC-60B8-4800-9EA1-9BB1523CD9B4}">
+  <ds:schemaRefs>
+    <ds:schemaRef ds:uri="http://schemas.microsoft.com/VisualStudio/2011/storyboarding/control"/>
+  </ds:schemaRefs>
+</ds:datastoreItem>
+</file>
+
+<file path=customXml/itemProps98.xml><?xml version="1.0" encoding="utf-8"?>
+<ds:datastoreItem xmlns:ds="http://schemas.openxmlformats.org/officeDocument/2006/customXml" ds:itemID="{4EE14C2A-AD9F-4617-A8CC-4057921BFCA8}">
+  <ds:schemaRefs>
+    <ds:schemaRef ds:uri="http://schemas.microsoft.com/VisualStudio/2011/storyboarding/control/v1.0"/>
+  </ds:schemaRefs>
+</ds:datastoreItem>
+</file>
+
+<file path=customXml/itemProps99.xml><?xml version="1.0" encoding="utf-8"?>
+<ds:datastoreItem xmlns:ds="http://schemas.openxmlformats.org/officeDocument/2006/customXml" ds:itemID="{E4A0845B-41B6-4256-8FB3-E31EA581BF55}">
+  <ds:schemaRefs>
+    <ds:schemaRef ds:uri="http://schemas.microsoft.com/VisualStudio/2011/storyboarding/control/v1.0"/>
+  </ds:schemaRefs>
+</ds:datastoreItem>
 </file>
</xml_diff>